<commit_message>
Added first text to poster
</commit_message>
<xml_diff>
--- a/Poster.pptx
+++ b/Poster.pptx
@@ -243,7 +243,7 @@
           <a:p>
             <a:fld id="{91AE326B-1E28-4C22-A3D1-EDFB78E65B5C}" type="datetimeFigureOut">
               <a:rPr lang="LID4096" smtClean="0"/>
-              <a:t>02/28/2024</a:t>
+              <a:t>02/29/2024</a:t>
             </a:fld>
             <a:endParaRPr lang="LID4096"/>
           </a:p>
@@ -413,7 +413,7 @@
           <a:p>
             <a:fld id="{91AE326B-1E28-4C22-A3D1-EDFB78E65B5C}" type="datetimeFigureOut">
               <a:rPr lang="LID4096" smtClean="0"/>
-              <a:t>02/28/2024</a:t>
+              <a:t>02/29/2024</a:t>
             </a:fld>
             <a:endParaRPr lang="LID4096"/>
           </a:p>
@@ -593,7 +593,7 @@
           <a:p>
             <a:fld id="{91AE326B-1E28-4C22-A3D1-EDFB78E65B5C}" type="datetimeFigureOut">
               <a:rPr lang="LID4096" smtClean="0"/>
-              <a:t>02/28/2024</a:t>
+              <a:t>02/29/2024</a:t>
             </a:fld>
             <a:endParaRPr lang="LID4096"/>
           </a:p>
@@ -763,7 +763,7 @@
           <a:p>
             <a:fld id="{91AE326B-1E28-4C22-A3D1-EDFB78E65B5C}" type="datetimeFigureOut">
               <a:rPr lang="LID4096" smtClean="0"/>
-              <a:t>02/28/2024</a:t>
+              <a:t>02/29/2024</a:t>
             </a:fld>
             <a:endParaRPr lang="LID4096"/>
           </a:p>
@@ -1007,7 +1007,7 @@
           <a:p>
             <a:fld id="{91AE326B-1E28-4C22-A3D1-EDFB78E65B5C}" type="datetimeFigureOut">
               <a:rPr lang="LID4096" smtClean="0"/>
-              <a:t>02/28/2024</a:t>
+              <a:t>02/29/2024</a:t>
             </a:fld>
             <a:endParaRPr lang="LID4096"/>
           </a:p>
@@ -1239,7 +1239,7 @@
           <a:p>
             <a:fld id="{91AE326B-1E28-4C22-A3D1-EDFB78E65B5C}" type="datetimeFigureOut">
               <a:rPr lang="LID4096" smtClean="0"/>
-              <a:t>02/28/2024</a:t>
+              <a:t>02/29/2024</a:t>
             </a:fld>
             <a:endParaRPr lang="LID4096"/>
           </a:p>
@@ -1606,7 +1606,7 @@
           <a:p>
             <a:fld id="{91AE326B-1E28-4C22-A3D1-EDFB78E65B5C}" type="datetimeFigureOut">
               <a:rPr lang="LID4096" smtClean="0"/>
-              <a:t>02/28/2024</a:t>
+              <a:t>02/29/2024</a:t>
             </a:fld>
             <a:endParaRPr lang="LID4096"/>
           </a:p>
@@ -1724,7 +1724,7 @@
           <a:p>
             <a:fld id="{91AE326B-1E28-4C22-A3D1-EDFB78E65B5C}" type="datetimeFigureOut">
               <a:rPr lang="LID4096" smtClean="0"/>
-              <a:t>02/28/2024</a:t>
+              <a:t>02/29/2024</a:t>
             </a:fld>
             <a:endParaRPr lang="LID4096"/>
           </a:p>
@@ -1819,7 +1819,7 @@
           <a:p>
             <a:fld id="{91AE326B-1E28-4C22-A3D1-EDFB78E65B5C}" type="datetimeFigureOut">
               <a:rPr lang="LID4096" smtClean="0"/>
-              <a:t>02/28/2024</a:t>
+              <a:t>02/29/2024</a:t>
             </a:fld>
             <a:endParaRPr lang="LID4096"/>
           </a:p>
@@ -2096,7 +2096,7 @@
           <a:p>
             <a:fld id="{91AE326B-1E28-4C22-A3D1-EDFB78E65B5C}" type="datetimeFigureOut">
               <a:rPr lang="LID4096" smtClean="0"/>
-              <a:t>02/28/2024</a:t>
+              <a:t>02/29/2024</a:t>
             </a:fld>
             <a:endParaRPr lang="LID4096"/>
           </a:p>
@@ -2353,7 +2353,7 @@
           <a:p>
             <a:fld id="{91AE326B-1E28-4C22-A3D1-EDFB78E65B5C}" type="datetimeFigureOut">
               <a:rPr lang="LID4096" smtClean="0"/>
-              <a:t>02/28/2024</a:t>
+              <a:t>02/29/2024</a:t>
             </a:fld>
             <a:endParaRPr lang="LID4096"/>
           </a:p>
@@ -2566,7 +2566,7 @@
           <a:p>
             <a:fld id="{91AE326B-1E28-4C22-A3D1-EDFB78E65B5C}" type="datetimeFigureOut">
               <a:rPr lang="LID4096" smtClean="0"/>
-              <a:t>02/28/2024</a:t>
+              <a:t>02/29/2024</a:t>
             </a:fld>
             <a:endParaRPr lang="LID4096"/>
           </a:p>
@@ -2997,9 +2997,9 @@
           <p:nvPr/>
         </p:nvCxnSpPr>
         <p:spPr>
-          <a:xfrm flipH="1">
-            <a:off x="10583361" y="1770114"/>
-            <a:ext cx="230458" cy="18921046"/>
+          <a:xfrm>
+            <a:off x="10724541" y="1770114"/>
+            <a:ext cx="0" cy="19068388"/>
           </a:xfrm>
           <a:prstGeom prst="line">
             <a:avLst/>
@@ -3038,9 +3038,9 @@
           <p:nvPr/>
         </p:nvCxnSpPr>
         <p:spPr>
-          <a:xfrm flipH="1">
-            <a:off x="19990836" y="1295278"/>
-            <a:ext cx="84592" cy="19463360"/>
+          <a:xfrm>
+            <a:off x="20011983" y="1770114"/>
+            <a:ext cx="42296" cy="18988524"/>
           </a:xfrm>
           <a:prstGeom prst="line">
             <a:avLst/>
@@ -3253,52 +3253,6 @@
       </p:sp>
       <p:sp>
         <p:nvSpPr>
-          <p:cNvPr id="12" name="Rectangle: Rounded Corners 11">
-            <a:extLst>
-              <a:ext uri="{FF2B5EF4-FFF2-40B4-BE49-F238E27FC236}">
-                <a16:creationId xmlns:a16="http://schemas.microsoft.com/office/drawing/2014/main" id="{3CE2BCF0-7AE8-7126-5EE0-C623F334742F}"/>
-              </a:ext>
-            </a:extLst>
-          </p:cNvPr>
-          <p:cNvSpPr/>
-          <p:nvPr/>
-        </p:nvSpPr>
-        <p:spPr>
-          <a:xfrm>
-            <a:off x="6128481" y="159726"/>
-            <a:ext cx="18252831" cy="1581151"/>
-          </a:xfrm>
-          <a:prstGeom prst="roundRect">
-            <a:avLst>
-              <a:gd name="adj" fmla="val 32237"/>
-            </a:avLst>
-          </a:prstGeom>
-        </p:spPr>
-        <p:style>
-          <a:lnRef idx="1">
-            <a:schemeClr val="accent1"/>
-          </a:lnRef>
-          <a:fillRef idx="2">
-            <a:schemeClr val="accent1"/>
-          </a:fillRef>
-          <a:effectRef idx="1">
-            <a:schemeClr val="accent1"/>
-          </a:effectRef>
-          <a:fontRef idx="minor">
-            <a:schemeClr val="dk1"/>
-          </a:fontRef>
-        </p:style>
-        <p:txBody>
-          <a:bodyPr rtlCol="0" anchor="ctr"/>
-          <a:lstStyle/>
-          <a:p>
-            <a:pPr algn="ctr"/>
-            <a:endParaRPr lang="LID4096"/>
-          </a:p>
-        </p:txBody>
-      </p:sp>
-      <p:sp>
-        <p:nvSpPr>
           <p:cNvPr id="13" name="Rectangle 12">
             <a:extLst>
               <a:ext uri="{FF2B5EF4-FFF2-40B4-BE49-F238E27FC236}">
@@ -3312,7 +3266,7 @@
         <p:spPr>
           <a:xfrm>
             <a:off x="6269158" y="159726"/>
-            <a:ext cx="17989062" cy="1569660"/>
+            <a:ext cx="17989062" cy="1446550"/>
           </a:xfrm>
           <a:prstGeom prst="rect">
             <a:avLst/>
@@ -3327,7 +3281,7 @@
           <a:p>
             <a:pPr algn="ctr"/>
             <a:r>
-              <a:rPr lang="en-US" sz="9600" b="0" cap="none" spc="0" dirty="0">
+              <a:rPr lang="en-US" sz="8800" b="1" cap="none" spc="0" dirty="0">
                 <a:ln w="0"/>
                 <a:solidFill>
                   <a:schemeClr val="tx1"/>
@@ -3339,6 +3293,7 @@
                     </a:schemeClr>
                   </a:outerShdw>
                 </a:effectLst>
+                <a:latin typeface="Georgia" panose="02040502050405020303" pitchFamily="18" charset="0"/>
               </a:rPr>
               <a:t>Tensor Time Series Clustering</a:t>
             </a:r>
@@ -3739,6 +3694,3156 @@
           </a:p>
         </p:txBody>
       </p:sp>
+      <p:sp>
+        <p:nvSpPr>
+          <p:cNvPr id="26" name="TextBox 25">
+            <a:extLst>
+              <a:ext uri="{FF2B5EF4-FFF2-40B4-BE49-F238E27FC236}">
+                <a16:creationId xmlns:a16="http://schemas.microsoft.com/office/drawing/2014/main" id="{30888E27-9828-8CC9-E2FD-7316F16E5299}"/>
+              </a:ext>
+            </a:extLst>
+          </p:cNvPr>
+          <p:cNvSpPr txBox="1"/>
+          <p:nvPr/>
+        </p:nvSpPr>
+        <p:spPr>
+          <a:xfrm>
+            <a:off x="1136991" y="1878933"/>
+            <a:ext cx="9267411" cy="707886"/>
+          </a:xfrm>
+          <a:prstGeom prst="rect">
+            <a:avLst/>
+          </a:prstGeom>
+          <a:noFill/>
+        </p:spPr>
+        <p:txBody>
+          <a:bodyPr wrap="square" rtlCol="0">
+            <a:spAutoFit/>
+          </a:bodyPr>
+          <a:lstStyle/>
+          <a:p>
+            <a:pPr algn="ctr"/>
+            <a:r>
+              <a:rPr lang="en-US" sz="4000" b="1" dirty="0">
+                <a:latin typeface="Georgia" panose="02040502050405020303" pitchFamily="18" charset="0"/>
+              </a:rPr>
+              <a:t>De dataset</a:t>
+            </a:r>
+          </a:p>
+        </p:txBody>
+      </p:sp>
+      <p:sp>
+        <p:nvSpPr>
+          <p:cNvPr id="27" name="TextBox 26">
+            <a:extLst>
+              <a:ext uri="{FF2B5EF4-FFF2-40B4-BE49-F238E27FC236}">
+                <a16:creationId xmlns:a16="http://schemas.microsoft.com/office/drawing/2014/main" id="{AF9AF18F-DF77-26C7-8BFF-F6130FEFE2A1}"/>
+              </a:ext>
+            </a:extLst>
+          </p:cNvPr>
+          <p:cNvSpPr txBox="1"/>
+          <p:nvPr/>
+        </p:nvSpPr>
+        <p:spPr>
+          <a:xfrm>
+            <a:off x="1136991" y="2736366"/>
+            <a:ext cx="9267407" cy="2123658"/>
+          </a:xfrm>
+          <a:prstGeom prst="rect">
+            <a:avLst/>
+          </a:prstGeom>
+          <a:noFill/>
+        </p:spPr>
+        <p:txBody>
+          <a:bodyPr wrap="square" rtlCol="0">
+            <a:spAutoFit/>
+          </a:bodyPr>
+          <a:lstStyle/>
+          <a:p>
+            <a:r>
+              <a:rPr lang="en-US" sz="2400" b="1" dirty="0">
+                <a:latin typeface="Georgia" panose="02040502050405020303" pitchFamily="18" charset="0"/>
+              </a:rPr>
+              <a:t>AMIE: </a:t>
+            </a:r>
+            <a:r>
+              <a:rPr lang="en-US" sz="2400" dirty="0">
+                <a:latin typeface="Georgia" panose="02040502050405020303" pitchFamily="18" charset="0"/>
+              </a:rPr>
+              <a:t>Automatic Monitoring of Indoor Exercises</a:t>
+            </a:r>
+          </a:p>
+          <a:p>
+            <a:pPr marL="742950" lvl="1" indent="-285750">
+              <a:buFont typeface="Arial" panose="020B0604020202020204" pitchFamily="34" charset="0"/>
+              <a:buChar char="•"/>
+            </a:pPr>
+            <a:r>
+              <a:rPr lang="en-US" dirty="0">
+                <a:latin typeface="Georgia" panose="02040502050405020303" pitchFamily="18" charset="0"/>
+              </a:rPr>
+              <a:t> </a:t>
+            </a:r>
+            <a:r>
+              <a:rPr lang="en-US" dirty="0" err="1">
+                <a:latin typeface="Georgia" panose="02040502050405020303" pitchFamily="18" charset="0"/>
+              </a:rPr>
+              <a:t>Metingen</a:t>
+            </a:r>
+            <a:r>
+              <a:rPr lang="en-US" dirty="0">
+                <a:latin typeface="Georgia" panose="02040502050405020303" pitchFamily="18" charset="0"/>
+              </a:rPr>
+              <a:t> van </a:t>
+            </a:r>
+            <a:r>
+              <a:rPr lang="en-US" dirty="0" err="1">
+                <a:latin typeface="Georgia" panose="02040502050405020303" pitchFamily="18" charset="0"/>
+              </a:rPr>
+              <a:t>lichaamsgewichtoefeningen</a:t>
+            </a:r>
+            <a:endParaRPr lang="en-US" dirty="0">
+              <a:latin typeface="Georgia" panose="02040502050405020303" pitchFamily="18" charset="0"/>
+            </a:endParaRPr>
+          </a:p>
+          <a:p>
+            <a:pPr marL="1200150" lvl="2" indent="-285750">
+              <a:buFont typeface="Arial" panose="020B0604020202020204" pitchFamily="34" charset="0"/>
+              <a:buChar char="•"/>
+            </a:pPr>
+            <a:r>
+              <a:rPr lang="en-US" dirty="0">
+                <a:latin typeface="Georgia" panose="02040502050405020303" pitchFamily="18" charset="0"/>
+              </a:rPr>
+              <a:t>Squats</a:t>
+            </a:r>
+          </a:p>
+          <a:p>
+            <a:pPr marL="1200150" lvl="2" indent="-285750">
+              <a:buFont typeface="Arial" panose="020B0604020202020204" pitchFamily="34" charset="0"/>
+              <a:buChar char="•"/>
+            </a:pPr>
+            <a:r>
+              <a:rPr lang="en-US" dirty="0">
+                <a:latin typeface="Georgia" panose="02040502050405020303" pitchFamily="18" charset="0"/>
+              </a:rPr>
+              <a:t>Forward lunges</a:t>
+            </a:r>
+          </a:p>
+          <a:p>
+            <a:pPr marL="1200150" lvl="2" indent="-285750">
+              <a:buFont typeface="Arial" panose="020B0604020202020204" pitchFamily="34" charset="0"/>
+              <a:buChar char="•"/>
+            </a:pPr>
+            <a:r>
+              <a:rPr lang="en-US" dirty="0">
+                <a:latin typeface="Georgia" panose="02040502050405020303" pitchFamily="18" charset="0"/>
+              </a:rPr>
+              <a:t>Side lunges</a:t>
+            </a:r>
+          </a:p>
+          <a:p>
+            <a:pPr lvl="2"/>
+            <a:endParaRPr lang="en-US" dirty="0">
+              <a:latin typeface="Georgia" panose="02040502050405020303" pitchFamily="18" charset="0"/>
+            </a:endParaRPr>
+          </a:p>
+          <a:p>
+            <a:pPr marL="742950" lvl="1" indent="-285750">
+              <a:buFont typeface="Arial" panose="020B0604020202020204" pitchFamily="34" charset="0"/>
+              <a:buChar char="•"/>
+            </a:pPr>
+            <a:r>
+              <a:rPr lang="en-US" b="1" dirty="0" err="1">
+                <a:latin typeface="Georgia" panose="02040502050405020303" pitchFamily="18" charset="0"/>
+              </a:rPr>
+              <a:t>Tijdsreeksen</a:t>
+            </a:r>
+            <a:r>
+              <a:rPr lang="en-US" dirty="0">
+                <a:latin typeface="Georgia" panose="02040502050405020303" pitchFamily="18" charset="0"/>
+              </a:rPr>
+              <a:t> </a:t>
+            </a:r>
+            <a:r>
+              <a:rPr lang="en-US" dirty="0" err="1">
+                <a:latin typeface="Georgia" panose="02040502050405020303" pitchFamily="18" charset="0"/>
+              </a:rPr>
+              <a:t>als</a:t>
+            </a:r>
+            <a:r>
+              <a:rPr lang="en-US" dirty="0">
+                <a:latin typeface="Georgia" panose="02040502050405020303" pitchFamily="18" charset="0"/>
+              </a:rPr>
+              <a:t> </a:t>
+            </a:r>
+            <a:r>
+              <a:rPr lang="en-US" dirty="0" err="1">
+                <a:latin typeface="Georgia" panose="02040502050405020303" pitchFamily="18" charset="0"/>
+              </a:rPr>
+              <a:t>datapunten</a:t>
+            </a:r>
+            <a:r>
+              <a:rPr lang="en-US" dirty="0">
+                <a:latin typeface="Georgia" panose="02040502050405020303" pitchFamily="18" charset="0"/>
+              </a:rPr>
+              <a:t>: </a:t>
+            </a:r>
+            <a:r>
+              <a:rPr lang="en-US" dirty="0" err="1">
+                <a:latin typeface="Georgia" panose="02040502050405020303" pitchFamily="18" charset="0"/>
+              </a:rPr>
+              <a:t>Posities</a:t>
+            </a:r>
+            <a:r>
+              <a:rPr lang="en-US" dirty="0">
+                <a:latin typeface="Georgia" panose="02040502050405020303" pitchFamily="18" charset="0"/>
+              </a:rPr>
+              <a:t> </a:t>
+            </a:r>
+            <a:r>
+              <a:rPr lang="en-US" dirty="0" err="1">
+                <a:latin typeface="Georgia" panose="02040502050405020303" pitchFamily="18" charset="0"/>
+              </a:rPr>
+              <a:t>bij</a:t>
+            </a:r>
+            <a:r>
+              <a:rPr lang="en-US" dirty="0">
+                <a:latin typeface="Georgia" panose="02040502050405020303" pitchFamily="18" charset="0"/>
+              </a:rPr>
+              <a:t> de </a:t>
+            </a:r>
+            <a:r>
+              <a:rPr lang="en-US" dirty="0" err="1">
+                <a:latin typeface="Georgia" panose="02040502050405020303" pitchFamily="18" charset="0"/>
+              </a:rPr>
+              <a:t>uitvoering</a:t>
+            </a:r>
+            <a:r>
+              <a:rPr lang="en-US" dirty="0">
+                <a:latin typeface="Georgia" panose="02040502050405020303" pitchFamily="18" charset="0"/>
+              </a:rPr>
+              <a:t> </a:t>
+            </a:r>
+            <a:r>
+              <a:rPr lang="en-US" dirty="0" err="1">
+                <a:latin typeface="Georgia" panose="02040502050405020303" pitchFamily="18" charset="0"/>
+              </a:rPr>
+              <a:t>gemeten</a:t>
+            </a:r>
+            <a:r>
+              <a:rPr lang="en-US" dirty="0">
+                <a:latin typeface="Georgia" panose="02040502050405020303" pitchFamily="18" charset="0"/>
+              </a:rPr>
+              <a:t> </a:t>
+            </a:r>
+            <a:r>
+              <a:rPr lang="en-US" dirty="0" err="1">
+                <a:latin typeface="Georgia" panose="02040502050405020303" pitchFamily="18" charset="0"/>
+              </a:rPr>
+              <a:t>doorheen</a:t>
+            </a:r>
+            <a:r>
+              <a:rPr lang="en-US" dirty="0">
+                <a:latin typeface="Georgia" panose="02040502050405020303" pitchFamily="18" charset="0"/>
+              </a:rPr>
+              <a:t> de </a:t>
+            </a:r>
+            <a:r>
+              <a:rPr lang="en-US" dirty="0" err="1">
+                <a:latin typeface="Georgia" panose="02040502050405020303" pitchFamily="18" charset="0"/>
+              </a:rPr>
+              <a:t>tijd</a:t>
+            </a:r>
+            <a:endParaRPr lang="en-US" dirty="0">
+              <a:latin typeface="Georgia" panose="02040502050405020303" pitchFamily="18" charset="0"/>
+            </a:endParaRPr>
+          </a:p>
+        </p:txBody>
+      </p:sp>
+      <p:sp>
+        <p:nvSpPr>
+          <p:cNvPr id="30" name="TextBox 29">
+            <a:extLst>
+              <a:ext uri="{FF2B5EF4-FFF2-40B4-BE49-F238E27FC236}">
+                <a16:creationId xmlns:a16="http://schemas.microsoft.com/office/drawing/2014/main" id="{9B7A2DFB-DB36-0821-67F1-08FA0FD00E40}"/>
+              </a:ext>
+            </a:extLst>
+          </p:cNvPr>
+          <p:cNvSpPr txBox="1"/>
+          <p:nvPr/>
+        </p:nvSpPr>
+        <p:spPr>
+          <a:xfrm>
+            <a:off x="11044673" y="1878933"/>
+            <a:ext cx="8647173" cy="707886"/>
+          </a:xfrm>
+          <a:prstGeom prst="rect">
+            <a:avLst/>
+          </a:prstGeom>
+          <a:noFill/>
+        </p:spPr>
+        <p:txBody>
+          <a:bodyPr wrap="square" rtlCol="0">
+            <a:spAutoFit/>
+          </a:bodyPr>
+          <a:lstStyle/>
+          <a:p>
+            <a:pPr algn="ctr"/>
+            <a:r>
+              <a:rPr lang="en-US" sz="4000" b="1" dirty="0" err="1">
+                <a:latin typeface="Georgia" panose="02040502050405020303" pitchFamily="18" charset="0"/>
+              </a:rPr>
+              <a:t>Benadering</a:t>
+            </a:r>
+            <a:r>
+              <a:rPr lang="en-US" sz="4000" b="1" dirty="0">
+                <a:latin typeface="Georgia" panose="02040502050405020303" pitchFamily="18" charset="0"/>
+              </a:rPr>
+              <a:t> van </a:t>
+            </a:r>
+            <a:r>
+              <a:rPr lang="en-US" sz="4000" b="1" dirty="0" err="1">
+                <a:latin typeface="Georgia" panose="02040502050405020303" pitchFamily="18" charset="0"/>
+              </a:rPr>
+              <a:t>een</a:t>
+            </a:r>
+            <a:r>
+              <a:rPr lang="en-US" sz="4000" b="1" dirty="0">
+                <a:latin typeface="Georgia" panose="02040502050405020303" pitchFamily="18" charset="0"/>
+              </a:rPr>
+              <a:t> Tensor</a:t>
+            </a:r>
+          </a:p>
+        </p:txBody>
+      </p:sp>
+      <p:pic>
+        <p:nvPicPr>
+          <p:cNvPr id="32" name="Picture 31" descr="A graph showing the temperature">
+            <a:extLst>
+              <a:ext uri="{FF2B5EF4-FFF2-40B4-BE49-F238E27FC236}">
+                <a16:creationId xmlns:a16="http://schemas.microsoft.com/office/drawing/2014/main" id="{85487C62-8C4F-03C8-7003-0C2A286E28D2}"/>
+              </a:ext>
+            </a:extLst>
+          </p:cNvPr>
+          <p:cNvPicPr>
+            <a:picLocks noChangeAspect="1"/>
+          </p:cNvPicPr>
+          <p:nvPr/>
+        </p:nvPicPr>
+        <p:blipFill>
+          <a:blip r:embed="rId2">
+            <a:extLst>
+              <a:ext uri="{28A0092B-C50C-407E-A947-70E740481C1C}">
+                <a14:useLocalDpi xmlns:a14="http://schemas.microsoft.com/office/drawing/2010/main" val="0"/>
+              </a:ext>
+            </a:extLst>
+          </a:blip>
+          <a:stretch>
+            <a:fillRect/>
+          </a:stretch>
+        </p:blipFill>
+        <p:spPr>
+          <a:xfrm>
+            <a:off x="1591589" y="5084054"/>
+            <a:ext cx="4677569" cy="1671451"/>
+          </a:xfrm>
+          <a:prstGeom prst="rect">
+            <a:avLst/>
+          </a:prstGeom>
+        </p:spPr>
+      </p:pic>
+      <p:sp>
+        <p:nvSpPr>
+          <p:cNvPr id="33" name="TextBox 32">
+            <a:extLst>
+              <a:ext uri="{FF2B5EF4-FFF2-40B4-BE49-F238E27FC236}">
+                <a16:creationId xmlns:a16="http://schemas.microsoft.com/office/drawing/2014/main" id="{8579529E-A01B-E557-3652-3FEF79C034B9}"/>
+              </a:ext>
+            </a:extLst>
+          </p:cNvPr>
+          <p:cNvSpPr txBox="1"/>
+          <p:nvPr/>
+        </p:nvSpPr>
+        <p:spPr>
+          <a:xfrm>
+            <a:off x="1136989" y="6979534"/>
+            <a:ext cx="9267409" cy="2400657"/>
+          </a:xfrm>
+          <a:prstGeom prst="rect">
+            <a:avLst/>
+          </a:prstGeom>
+          <a:noFill/>
+        </p:spPr>
+        <p:txBody>
+          <a:bodyPr wrap="square" rtlCol="0">
+            <a:spAutoFit/>
+          </a:bodyPr>
+          <a:lstStyle/>
+          <a:p>
+            <a:r>
+              <a:rPr lang="en-US" sz="2400" b="1" dirty="0" err="1"/>
+              <a:t>Datapunten</a:t>
+            </a:r>
+            <a:r>
+              <a:rPr lang="en-US" sz="2400" b="1" dirty="0"/>
+              <a:t> </a:t>
+            </a:r>
+            <a:r>
+              <a:rPr lang="en-US" sz="2400" b="1" dirty="0" err="1"/>
+              <a:t>vergelijken</a:t>
+            </a:r>
+            <a:endParaRPr lang="en-US" sz="2400" b="1" dirty="0"/>
+          </a:p>
+          <a:p>
+            <a:pPr marL="742950" lvl="1" indent="-285750">
+              <a:buFont typeface="Arial" panose="020B0604020202020204" pitchFamily="34" charset="0"/>
+              <a:buChar char="•"/>
+            </a:pPr>
+            <a:r>
+              <a:rPr lang="en-US" b="1" dirty="0"/>
+              <a:t>Dynamic Time Warping (DTW): </a:t>
+            </a:r>
+            <a:r>
+              <a:rPr lang="en-US" dirty="0" err="1"/>
+              <a:t>berekent</a:t>
+            </a:r>
+            <a:r>
+              <a:rPr lang="en-US" dirty="0"/>
+              <a:t> </a:t>
+            </a:r>
+            <a:r>
+              <a:rPr lang="en-US" dirty="0" err="1"/>
+              <a:t>afstand</a:t>
+            </a:r>
+            <a:r>
+              <a:rPr lang="en-US" dirty="0"/>
+              <a:t> </a:t>
+            </a:r>
+            <a:r>
+              <a:rPr lang="en-US" dirty="0" err="1"/>
+              <a:t>tussen</a:t>
+            </a:r>
+            <a:r>
+              <a:rPr lang="en-US" dirty="0"/>
+              <a:t> 2 </a:t>
+            </a:r>
+            <a:r>
+              <a:rPr lang="en-US" dirty="0" err="1"/>
+              <a:t>tijdsreeksen</a:t>
+            </a:r>
+            <a:endParaRPr lang="en-US" dirty="0"/>
+          </a:p>
+          <a:p>
+            <a:pPr marL="1200150" lvl="2" indent="-285750">
+              <a:buFont typeface="Arial" panose="020B0604020202020204" pitchFamily="34" charset="0"/>
+              <a:buChar char="•"/>
+            </a:pPr>
+            <a:r>
+              <a:rPr lang="en-US" dirty="0" err="1"/>
+              <a:t>Gelijkaardige</a:t>
+            </a:r>
+            <a:r>
+              <a:rPr lang="en-US" dirty="0"/>
+              <a:t> data </a:t>
+            </a:r>
+            <a:r>
+              <a:rPr lang="en-US" dirty="0" err="1"/>
+              <a:t>krijgen</a:t>
+            </a:r>
+            <a:r>
+              <a:rPr lang="en-US" dirty="0"/>
+              <a:t> </a:t>
+            </a:r>
+            <a:r>
+              <a:rPr lang="en-US" dirty="0" err="1"/>
+              <a:t>een</a:t>
+            </a:r>
+            <a:r>
+              <a:rPr lang="en-US" dirty="0"/>
+              <a:t> </a:t>
+            </a:r>
+            <a:r>
+              <a:rPr lang="en-US" dirty="0" err="1"/>
+              <a:t>kleine</a:t>
+            </a:r>
+            <a:r>
+              <a:rPr lang="en-US" dirty="0"/>
+              <a:t> </a:t>
+            </a:r>
+            <a:r>
+              <a:rPr lang="en-US" dirty="0" err="1"/>
+              <a:t>afstand</a:t>
+            </a:r>
+            <a:endParaRPr lang="en-US" dirty="0"/>
+          </a:p>
+          <a:p>
+            <a:pPr marL="1200150" lvl="2" indent="-285750">
+              <a:buFont typeface="Arial" panose="020B0604020202020204" pitchFamily="34" charset="0"/>
+              <a:buChar char="•"/>
+            </a:pPr>
+            <a:r>
+              <a:rPr lang="en-US" dirty="0"/>
+              <a:t>O(n</a:t>
+            </a:r>
+            <a:r>
+              <a:rPr lang="en-US" baseline="30000" dirty="0"/>
+              <a:t>2</a:t>
+            </a:r>
+            <a:r>
+              <a:rPr lang="en-US" dirty="0"/>
+              <a:t>) </a:t>
+            </a:r>
+            <a:r>
+              <a:rPr lang="en-US" dirty="0" err="1"/>
+              <a:t>tijd</a:t>
+            </a:r>
+            <a:endParaRPr lang="en-US" dirty="0"/>
+          </a:p>
+          <a:p>
+            <a:pPr lvl="2"/>
+            <a:endParaRPr lang="en-US" dirty="0"/>
+          </a:p>
+          <a:p>
+            <a:pPr marL="742950" lvl="1" indent="-285750">
+              <a:buFont typeface="Arial" panose="020B0604020202020204" pitchFamily="34" charset="0"/>
+              <a:buChar char="•"/>
+            </a:pPr>
+            <a:r>
+              <a:rPr lang="en-US" b="1" dirty="0" err="1"/>
+              <a:t>Afstandstensor</a:t>
+            </a:r>
+            <a:r>
+              <a:rPr lang="en-US" b="1" dirty="0"/>
+              <a:t>: </a:t>
+            </a:r>
+            <a:r>
+              <a:rPr lang="en-US" dirty="0"/>
+              <a:t>elk element </a:t>
+            </a:r>
+            <a:r>
+              <a:rPr lang="en-US" dirty="0" err="1"/>
+              <a:t>een</a:t>
+            </a:r>
+            <a:r>
+              <a:rPr lang="en-US" dirty="0"/>
+              <a:t> DTW </a:t>
+            </a:r>
+            <a:r>
+              <a:rPr lang="en-US" dirty="0" err="1"/>
+              <a:t>afstand</a:t>
+            </a:r>
+            <a:r>
+              <a:rPr lang="en-US" dirty="0"/>
+              <a:t> </a:t>
+            </a:r>
+            <a:r>
+              <a:rPr lang="en-US" dirty="0" err="1"/>
+              <a:t>tussen</a:t>
+            </a:r>
+            <a:r>
+              <a:rPr lang="en-US" dirty="0"/>
+              <a:t> 2 </a:t>
+            </a:r>
+            <a:r>
+              <a:rPr lang="en-US" dirty="0" err="1"/>
+              <a:t>datapunten</a:t>
+            </a:r>
+            <a:endParaRPr lang="en-US" dirty="0"/>
+          </a:p>
+          <a:p>
+            <a:pPr lvl="2"/>
+            <a:r>
+              <a:rPr lang="en-US" dirty="0"/>
+              <a:t>=&gt; </a:t>
+            </a:r>
+            <a:r>
+              <a:rPr lang="en-US" dirty="0" err="1"/>
+              <a:t>Elementen</a:t>
+            </a:r>
+            <a:r>
+              <a:rPr lang="en-US" dirty="0"/>
+              <a:t> </a:t>
+            </a:r>
+            <a:r>
+              <a:rPr lang="en-US" dirty="0" err="1"/>
+              <a:t>berekenen</a:t>
+            </a:r>
+            <a:r>
+              <a:rPr lang="en-US" dirty="0"/>
+              <a:t> </a:t>
+            </a:r>
+            <a:r>
+              <a:rPr lang="en-US" dirty="0" err="1"/>
+              <a:t>kostelijk</a:t>
+            </a:r>
+            <a:r>
+              <a:rPr lang="en-US" dirty="0"/>
+              <a:t>!</a:t>
+            </a:r>
+          </a:p>
+          <a:p>
+            <a:pPr marL="1200150" lvl="2" indent="-285750">
+              <a:buFont typeface="Arial" panose="020B0604020202020204" pitchFamily="34" charset="0"/>
+              <a:buChar char="•"/>
+            </a:pPr>
+            <a:endParaRPr lang="en-US" dirty="0"/>
+          </a:p>
+        </p:txBody>
+      </p:sp>
+      <p:pic>
+        <p:nvPicPr>
+          <p:cNvPr id="35" name="Picture 34" descr="A person with their arms out&#10;&#10;Description automatically generated with medium confidence">
+            <a:extLst>
+              <a:ext uri="{FF2B5EF4-FFF2-40B4-BE49-F238E27FC236}">
+                <a16:creationId xmlns:a16="http://schemas.microsoft.com/office/drawing/2014/main" id="{4E77B1EC-B406-80EC-E3CC-8602FC5BB3B2}"/>
+              </a:ext>
+            </a:extLst>
+          </p:cNvPr>
+          <p:cNvPicPr>
+            <a:picLocks noChangeAspect="1"/>
+          </p:cNvPicPr>
+          <p:nvPr/>
+        </p:nvPicPr>
+        <p:blipFill>
+          <a:blip r:embed="rId3">
+            <a:extLst>
+              <a:ext uri="{28A0092B-C50C-407E-A947-70E740481C1C}">
+                <a14:useLocalDpi xmlns:a14="http://schemas.microsoft.com/office/drawing/2010/main" val="0"/>
+              </a:ext>
+            </a:extLst>
+          </a:blip>
+          <a:stretch>
+            <a:fillRect/>
+          </a:stretch>
+        </p:blipFill>
+        <p:spPr>
+          <a:xfrm>
+            <a:off x="7463071" y="5084053"/>
+            <a:ext cx="1553676" cy="1671452"/>
+          </a:xfrm>
+          <a:prstGeom prst="rect">
+            <a:avLst/>
+          </a:prstGeom>
+        </p:spPr>
+      </p:pic>
+      <p:sp>
+        <p:nvSpPr>
+          <p:cNvPr id="41" name="TextBox 40">
+            <a:extLst>
+              <a:ext uri="{FF2B5EF4-FFF2-40B4-BE49-F238E27FC236}">
+                <a16:creationId xmlns:a16="http://schemas.microsoft.com/office/drawing/2014/main" id="{0F4FFE23-505A-CB79-8AD4-5A2C2CB88FD7}"/>
+              </a:ext>
+            </a:extLst>
+          </p:cNvPr>
+          <p:cNvSpPr txBox="1"/>
+          <p:nvPr/>
+        </p:nvSpPr>
+        <p:spPr>
+          <a:xfrm>
+            <a:off x="11044671" y="2750657"/>
+            <a:ext cx="8647173" cy="5693866"/>
+          </a:xfrm>
+          <a:prstGeom prst="rect">
+            <a:avLst/>
+          </a:prstGeom>
+          <a:noFill/>
+        </p:spPr>
+        <p:txBody>
+          <a:bodyPr wrap="square">
+            <a:spAutoFit/>
+          </a:bodyPr>
+          <a:lstStyle/>
+          <a:p>
+            <a:r>
+              <a:rPr lang="en-US" sz="2400" b="1" dirty="0" err="1">
+                <a:latin typeface="Georgia" panose="02040502050405020303" pitchFamily="18" charset="0"/>
+              </a:rPr>
+              <a:t>Candecomp</a:t>
+            </a:r>
+            <a:r>
+              <a:rPr lang="en-US" sz="2400" b="1" dirty="0">
+                <a:latin typeface="Georgia" panose="02040502050405020303" pitchFamily="18" charset="0"/>
+              </a:rPr>
+              <a:t>/</a:t>
+            </a:r>
+            <a:r>
+              <a:rPr lang="en-US" sz="2400" b="1" dirty="0" err="1">
+                <a:latin typeface="Georgia" panose="02040502050405020303" pitchFamily="18" charset="0"/>
+              </a:rPr>
+              <a:t>Parafac</a:t>
+            </a:r>
+            <a:r>
+              <a:rPr lang="en-US" sz="2400" b="1" dirty="0">
+                <a:latin typeface="Georgia" panose="02040502050405020303" pitchFamily="18" charset="0"/>
+              </a:rPr>
+              <a:t> (CP) </a:t>
+            </a:r>
+            <a:r>
+              <a:rPr lang="en-US" sz="2400" b="1" dirty="0" err="1">
+                <a:latin typeface="Georgia" panose="02040502050405020303" pitchFamily="18" charset="0"/>
+              </a:rPr>
+              <a:t>decompositie</a:t>
+            </a:r>
+            <a:endParaRPr lang="en-US" sz="2400" b="1" dirty="0">
+              <a:latin typeface="Georgia" panose="02040502050405020303" pitchFamily="18" charset="0"/>
+            </a:endParaRPr>
+          </a:p>
+          <a:p>
+            <a:pPr marL="742950" lvl="1" indent="-285750">
+              <a:buFont typeface="Arial" panose="020B0604020202020204" pitchFamily="34" charset="0"/>
+              <a:buChar char="•"/>
+            </a:pPr>
+            <a:r>
+              <a:rPr lang="en-US" dirty="0" err="1">
+                <a:latin typeface="Georgia" panose="02040502050405020303" pitchFamily="18" charset="0"/>
+              </a:rPr>
+              <a:t>Opdelen</a:t>
+            </a:r>
+            <a:r>
+              <a:rPr lang="en-US" dirty="0">
+                <a:latin typeface="Georgia" panose="02040502050405020303" pitchFamily="18" charset="0"/>
+              </a:rPr>
+              <a:t> van de tensor in </a:t>
+            </a:r>
+            <a:r>
+              <a:rPr lang="en-US" dirty="0" err="1">
+                <a:latin typeface="Georgia" panose="02040502050405020303" pitchFamily="18" charset="0"/>
+              </a:rPr>
+              <a:t>een</a:t>
+            </a:r>
+            <a:r>
+              <a:rPr lang="en-US" dirty="0">
+                <a:latin typeface="Georgia" panose="02040502050405020303" pitchFamily="18" charset="0"/>
+              </a:rPr>
+              <a:t> </a:t>
+            </a:r>
+            <a:r>
+              <a:rPr lang="en-US" dirty="0" err="1">
+                <a:latin typeface="Georgia" panose="02040502050405020303" pitchFamily="18" charset="0"/>
+              </a:rPr>
+              <a:t>som</a:t>
+            </a:r>
+            <a:r>
+              <a:rPr lang="en-US" dirty="0">
+                <a:latin typeface="Georgia" panose="02040502050405020303" pitchFamily="18" charset="0"/>
+              </a:rPr>
+              <a:t> van </a:t>
+            </a:r>
+            <a:r>
+              <a:rPr lang="en-US" dirty="0" err="1">
+                <a:latin typeface="Georgia" panose="02040502050405020303" pitchFamily="18" charset="0"/>
+              </a:rPr>
+              <a:t>vectoren</a:t>
+            </a:r>
+            <a:endParaRPr lang="en-US" dirty="0">
+              <a:latin typeface="Georgia" panose="02040502050405020303" pitchFamily="18" charset="0"/>
+            </a:endParaRPr>
+          </a:p>
+          <a:p>
+            <a:pPr marL="742950" lvl="1" indent="-285750">
+              <a:buFont typeface="Arial" panose="020B0604020202020204" pitchFamily="34" charset="0"/>
+              <a:buChar char="•"/>
+            </a:pPr>
+            <a:r>
+              <a:rPr lang="en-US" dirty="0">
+                <a:latin typeface="Georgia" panose="02040502050405020303" pitchFamily="18" charset="0"/>
+              </a:rPr>
+              <a:t>Alternating Least Squares </a:t>
+            </a:r>
+            <a:r>
+              <a:rPr lang="en-US" dirty="0" err="1">
+                <a:latin typeface="Georgia" panose="02040502050405020303" pitchFamily="18" charset="0"/>
+              </a:rPr>
+              <a:t>algoritme</a:t>
+            </a:r>
+            <a:endParaRPr lang="en-US" dirty="0">
+              <a:latin typeface="Georgia" panose="02040502050405020303" pitchFamily="18" charset="0"/>
+            </a:endParaRPr>
+          </a:p>
+          <a:p>
+            <a:pPr marL="742950" lvl="1" indent="-285750">
+              <a:buFont typeface="Arial" panose="020B0604020202020204" pitchFamily="34" charset="0"/>
+              <a:buChar char="•"/>
+            </a:pPr>
+            <a:r>
+              <a:rPr lang="en-US" dirty="0">
+                <a:latin typeface="Georgia" panose="02040502050405020303" pitchFamily="18" charset="0"/>
+              </a:rPr>
+              <a:t>De </a:t>
+            </a:r>
+            <a:r>
+              <a:rPr lang="en-US" dirty="0" err="1">
+                <a:latin typeface="Georgia" panose="02040502050405020303" pitchFamily="18" charset="0"/>
+              </a:rPr>
+              <a:t>volledige</a:t>
+            </a:r>
+            <a:r>
+              <a:rPr lang="en-US" dirty="0">
+                <a:latin typeface="Georgia" panose="02040502050405020303" pitchFamily="18" charset="0"/>
+              </a:rPr>
+              <a:t> tensor </a:t>
+            </a:r>
+            <a:r>
+              <a:rPr lang="en-US" dirty="0" err="1">
+                <a:latin typeface="Georgia" panose="02040502050405020303" pitchFamily="18" charset="0"/>
+              </a:rPr>
+              <a:t>nodig</a:t>
+            </a:r>
+            <a:r>
+              <a:rPr lang="en-US" dirty="0">
+                <a:latin typeface="Georgia" panose="02040502050405020303" pitchFamily="18" charset="0"/>
+              </a:rPr>
+              <a:t> =&gt; </a:t>
+            </a:r>
+            <a:r>
+              <a:rPr lang="en-US" dirty="0" err="1">
+                <a:latin typeface="Georgia" panose="02040502050405020303" pitchFamily="18" charset="0"/>
+              </a:rPr>
+              <a:t>Kostelijk</a:t>
+            </a:r>
+            <a:endParaRPr lang="en-US" dirty="0">
+              <a:latin typeface="Georgia" panose="02040502050405020303" pitchFamily="18" charset="0"/>
+            </a:endParaRPr>
+          </a:p>
+          <a:p>
+            <a:endParaRPr lang="en-US" dirty="0">
+              <a:latin typeface="Georgia" panose="02040502050405020303" pitchFamily="18" charset="0"/>
+            </a:endParaRPr>
+          </a:p>
+          <a:p>
+            <a:r>
+              <a:rPr lang="en-US" sz="2400" b="1" dirty="0">
+                <a:latin typeface="Georgia" panose="02040502050405020303" pitchFamily="18" charset="0"/>
+              </a:rPr>
+              <a:t>Adaptive Cross Approximation for Tensors (ACA-T) </a:t>
+            </a:r>
+            <a:r>
+              <a:rPr lang="en-US" sz="2400" b="1" dirty="0" err="1">
+                <a:latin typeface="Georgia" panose="02040502050405020303" pitchFamily="18" charset="0"/>
+              </a:rPr>
+              <a:t>decompositie</a:t>
+            </a:r>
+            <a:endParaRPr lang="en-US" dirty="0">
+              <a:latin typeface="Georgia" panose="02040502050405020303" pitchFamily="18" charset="0"/>
+            </a:endParaRPr>
+          </a:p>
+          <a:p>
+            <a:pPr marL="285750" indent="-285750">
+              <a:buFont typeface="Arial" panose="020B0604020202020204" pitchFamily="34" charset="0"/>
+              <a:buChar char="•"/>
+            </a:pPr>
+            <a:r>
+              <a:rPr lang="en-US" dirty="0">
+                <a:latin typeface="Georgia" panose="02040502050405020303" pitchFamily="18" charset="0"/>
+              </a:rPr>
+              <a:t>Som van </a:t>
+            </a:r>
+            <a:r>
+              <a:rPr lang="en-US" dirty="0" err="1">
+                <a:latin typeface="Georgia" panose="02040502050405020303" pitchFamily="18" charset="0"/>
+              </a:rPr>
+              <a:t>een</a:t>
+            </a:r>
+            <a:r>
+              <a:rPr lang="en-US" dirty="0">
+                <a:latin typeface="Georgia" panose="02040502050405020303" pitchFamily="18" charset="0"/>
+              </a:rPr>
+              <a:t> </a:t>
+            </a:r>
+            <a:r>
+              <a:rPr lang="en-US" dirty="0" err="1">
+                <a:latin typeface="Georgia" panose="02040502050405020303" pitchFamily="18" charset="0"/>
+              </a:rPr>
+              <a:t>uitwendig</a:t>
+            </a:r>
+            <a:r>
+              <a:rPr lang="en-US" dirty="0">
+                <a:latin typeface="Georgia" panose="02040502050405020303" pitchFamily="18" charset="0"/>
+              </a:rPr>
+              <a:t> product van matrices/</a:t>
+            </a:r>
+            <a:r>
+              <a:rPr lang="en-US" dirty="0" err="1">
+                <a:latin typeface="Georgia" panose="02040502050405020303" pitchFamily="18" charset="0"/>
+              </a:rPr>
+              <a:t>vectoren</a:t>
+            </a:r>
+            <a:endParaRPr lang="en-US" dirty="0">
+              <a:latin typeface="Georgia" panose="02040502050405020303" pitchFamily="18" charset="0"/>
+            </a:endParaRPr>
+          </a:p>
+          <a:p>
+            <a:pPr marL="285750" indent="-285750">
+              <a:buFont typeface="Arial" panose="020B0604020202020204" pitchFamily="34" charset="0"/>
+              <a:buChar char="•"/>
+            </a:pPr>
+            <a:r>
+              <a:rPr lang="en-US" b="1" dirty="0" err="1">
+                <a:latin typeface="Georgia" panose="02040502050405020303" pitchFamily="18" charset="0"/>
+              </a:rPr>
+              <a:t>Adaptief</a:t>
+            </a:r>
+            <a:r>
+              <a:rPr lang="en-US" b="1" dirty="0">
+                <a:latin typeface="Georgia" panose="02040502050405020303" pitchFamily="18" charset="0"/>
+              </a:rPr>
+              <a:t> = </a:t>
+            </a:r>
+            <a:r>
+              <a:rPr lang="en-US" dirty="0" err="1">
+                <a:latin typeface="Georgia" panose="02040502050405020303" pitchFamily="18" charset="0"/>
+              </a:rPr>
+              <a:t>Gericht</a:t>
+            </a:r>
+            <a:r>
+              <a:rPr lang="en-US" dirty="0">
+                <a:latin typeface="Georgia" panose="02040502050405020303" pitchFamily="18" charset="0"/>
+              </a:rPr>
+              <a:t> </a:t>
+            </a:r>
+            <a:r>
+              <a:rPr lang="en-US" dirty="0" err="1">
+                <a:latin typeface="Georgia" panose="02040502050405020303" pitchFamily="18" charset="0"/>
+              </a:rPr>
+              <a:t>vectoren</a:t>
+            </a:r>
+            <a:r>
+              <a:rPr lang="en-US" dirty="0">
+                <a:latin typeface="Georgia" panose="02040502050405020303" pitchFamily="18" charset="0"/>
+              </a:rPr>
+              <a:t> in Tensor </a:t>
+            </a:r>
+            <a:r>
+              <a:rPr lang="en-US" dirty="0" err="1">
+                <a:latin typeface="Georgia" panose="02040502050405020303" pitchFamily="18" charset="0"/>
+              </a:rPr>
+              <a:t>kiezen</a:t>
+            </a:r>
+            <a:endParaRPr lang="en-US" dirty="0">
+              <a:latin typeface="Georgia" panose="02040502050405020303" pitchFamily="18" charset="0"/>
+            </a:endParaRPr>
+          </a:p>
+          <a:p>
+            <a:pPr marL="285750" indent="-285750">
+              <a:buFont typeface="Arial" panose="020B0604020202020204" pitchFamily="34" charset="0"/>
+              <a:buChar char="•"/>
+            </a:pPr>
+            <a:r>
+              <a:rPr lang="en-US" dirty="0">
+                <a:latin typeface="Georgia" panose="02040502050405020303" pitchFamily="18" charset="0"/>
+              </a:rPr>
+              <a:t>‘Klein’ </a:t>
+            </a:r>
+            <a:r>
+              <a:rPr lang="en-US" dirty="0" err="1">
+                <a:latin typeface="Georgia" panose="02040502050405020303" pitchFamily="18" charset="0"/>
+              </a:rPr>
+              <a:t>deel</a:t>
+            </a:r>
+            <a:r>
+              <a:rPr lang="en-US" dirty="0">
+                <a:latin typeface="Georgia" panose="02040502050405020303" pitchFamily="18" charset="0"/>
+              </a:rPr>
+              <a:t> van de tensor </a:t>
+            </a:r>
+            <a:r>
+              <a:rPr lang="en-US" dirty="0" err="1">
+                <a:latin typeface="Georgia" panose="02040502050405020303" pitchFamily="18" charset="0"/>
+              </a:rPr>
+              <a:t>nodig</a:t>
+            </a:r>
+            <a:endParaRPr lang="en-US" dirty="0">
+              <a:latin typeface="Georgia" panose="02040502050405020303" pitchFamily="18" charset="0"/>
+            </a:endParaRPr>
+          </a:p>
+          <a:p>
+            <a:endParaRPr lang="en-US" dirty="0">
+              <a:latin typeface="Georgia" panose="02040502050405020303" pitchFamily="18" charset="0"/>
+            </a:endParaRPr>
+          </a:p>
+          <a:p>
+            <a:r>
+              <a:rPr lang="en-US" sz="2000" b="1" dirty="0">
+                <a:latin typeface="Georgia" panose="02040502050405020303" pitchFamily="18" charset="0"/>
+              </a:rPr>
+              <a:t>Matrix </a:t>
+            </a:r>
+            <a:r>
+              <a:rPr lang="en-US" sz="2000" b="1" dirty="0" err="1">
+                <a:latin typeface="Georgia" panose="02040502050405020303" pitchFamily="18" charset="0"/>
+              </a:rPr>
+              <a:t>Methode</a:t>
+            </a:r>
+            <a:r>
+              <a:rPr lang="en-US" sz="2000" b="1" dirty="0">
+                <a:latin typeface="Georgia" panose="02040502050405020303" pitchFamily="18" charset="0"/>
+              </a:rPr>
+              <a:t>: </a:t>
+            </a:r>
+          </a:p>
+          <a:p>
+            <a:pPr marL="742950" lvl="1" indent="-285750">
+              <a:buFont typeface="Arial" panose="020B0604020202020204" pitchFamily="34" charset="0"/>
+              <a:buChar char="•"/>
+            </a:pPr>
+            <a:r>
+              <a:rPr lang="en-US" dirty="0" err="1">
+                <a:latin typeface="Georgia" panose="02040502050405020303" pitchFamily="18" charset="0"/>
+              </a:rPr>
+              <a:t>Kostelijk</a:t>
+            </a:r>
+            <a:endParaRPr lang="en-US" dirty="0">
+              <a:latin typeface="Georgia" panose="02040502050405020303" pitchFamily="18" charset="0"/>
+            </a:endParaRPr>
+          </a:p>
+          <a:p>
+            <a:endParaRPr lang="en-US" dirty="0">
+              <a:latin typeface="Georgia" panose="02040502050405020303" pitchFamily="18" charset="0"/>
+            </a:endParaRPr>
+          </a:p>
+          <a:p>
+            <a:endParaRPr lang="en-US" dirty="0">
+              <a:latin typeface="Georgia" panose="02040502050405020303" pitchFamily="18" charset="0"/>
+            </a:endParaRPr>
+          </a:p>
+          <a:p>
+            <a:endParaRPr lang="en-US" dirty="0">
+              <a:latin typeface="Georgia" panose="02040502050405020303" pitchFamily="18" charset="0"/>
+            </a:endParaRPr>
+          </a:p>
+          <a:p>
+            <a:endParaRPr lang="en-US" dirty="0">
+              <a:latin typeface="Georgia" panose="02040502050405020303" pitchFamily="18" charset="0"/>
+            </a:endParaRPr>
+          </a:p>
+          <a:p>
+            <a:r>
+              <a:rPr lang="en-US" sz="2000" b="1" dirty="0" err="1">
+                <a:latin typeface="Georgia" panose="02040502050405020303" pitchFamily="18" charset="0"/>
+              </a:rPr>
+              <a:t>Vectoren</a:t>
+            </a:r>
+            <a:r>
+              <a:rPr lang="en-US" sz="2000" b="1" dirty="0">
+                <a:latin typeface="Georgia" panose="02040502050405020303" pitchFamily="18" charset="0"/>
+              </a:rPr>
+              <a:t> </a:t>
+            </a:r>
+            <a:r>
+              <a:rPr lang="en-US" sz="2000" b="1" dirty="0" err="1">
+                <a:latin typeface="Georgia" panose="02040502050405020303" pitchFamily="18" charset="0"/>
+              </a:rPr>
+              <a:t>Methode</a:t>
+            </a:r>
+            <a:r>
+              <a:rPr lang="en-US" sz="2000" b="1" dirty="0">
+                <a:latin typeface="Georgia" panose="02040502050405020303" pitchFamily="18" charset="0"/>
+              </a:rPr>
+              <a:t>: </a:t>
+            </a:r>
+          </a:p>
+          <a:p>
+            <a:pPr marL="742950" lvl="1" indent="-285750">
+              <a:buFont typeface="Arial" panose="020B0604020202020204" pitchFamily="34" charset="0"/>
+              <a:buChar char="•"/>
+            </a:pPr>
+            <a:r>
+              <a:rPr lang="en-US" dirty="0" err="1">
+                <a:latin typeface="Georgia" panose="02040502050405020303" pitchFamily="18" charset="0"/>
+              </a:rPr>
+              <a:t>Hogere</a:t>
+            </a:r>
+            <a:r>
+              <a:rPr lang="en-US" dirty="0">
+                <a:latin typeface="Georgia" panose="02040502050405020303" pitchFamily="18" charset="0"/>
+              </a:rPr>
+              <a:t> </a:t>
+            </a:r>
+            <a:r>
+              <a:rPr lang="en-US" dirty="0" err="1">
+                <a:latin typeface="Georgia" panose="02040502050405020303" pitchFamily="18" charset="0"/>
+              </a:rPr>
+              <a:t>relatieve</a:t>
+            </a:r>
+            <a:r>
+              <a:rPr lang="en-US" dirty="0">
+                <a:latin typeface="Georgia" panose="02040502050405020303" pitchFamily="18" charset="0"/>
+              </a:rPr>
+              <a:t> </a:t>
+            </a:r>
+            <a:r>
+              <a:rPr lang="en-US" dirty="0" err="1">
+                <a:latin typeface="Georgia" panose="02040502050405020303" pitchFamily="18" charset="0"/>
+              </a:rPr>
+              <a:t>fout</a:t>
+            </a:r>
+            <a:endParaRPr lang="en-US" dirty="0">
+              <a:latin typeface="Georgia" panose="02040502050405020303" pitchFamily="18" charset="0"/>
+            </a:endParaRPr>
+          </a:p>
+        </p:txBody>
+      </p:sp>
+      <p:pic>
+        <p:nvPicPr>
+          <p:cNvPr id="43" name="Graphic 42">
+            <a:extLst>
+              <a:ext uri="{FF2B5EF4-FFF2-40B4-BE49-F238E27FC236}">
+                <a16:creationId xmlns:a16="http://schemas.microsoft.com/office/drawing/2014/main" id="{AD2B65FD-5A6C-7016-26C2-E6583202AD7F}"/>
+              </a:ext>
+            </a:extLst>
+          </p:cNvPr>
+          <p:cNvPicPr>
+            <a:picLocks noChangeAspect="1"/>
+          </p:cNvPicPr>
+          <p:nvPr/>
+        </p:nvPicPr>
+        <p:blipFill>
+          <a:blip r:embed="rId4">
+            <a:extLst>
+              <a:ext uri="{28A0092B-C50C-407E-A947-70E740481C1C}">
+                <a14:useLocalDpi xmlns:a14="http://schemas.microsoft.com/office/drawing/2010/main" val="0"/>
+              </a:ext>
+              <a:ext uri="{96DAC541-7B7A-43D3-8B79-37D633B846F1}">
+                <asvg:svgBlip xmlns:asvg="http://schemas.microsoft.com/office/drawing/2016/SVG/main" r:embed="rId5"/>
+              </a:ext>
+            </a:extLst>
+          </a:blip>
+          <a:stretch>
+            <a:fillRect/>
+          </a:stretch>
+        </p:blipFill>
+        <p:spPr>
+          <a:xfrm>
+            <a:off x="13006245" y="8343634"/>
+            <a:ext cx="6737272" cy="1243187"/>
+          </a:xfrm>
+          <a:prstGeom prst="rect">
+            <a:avLst/>
+          </a:prstGeom>
+        </p:spPr>
+      </p:pic>
+      <p:pic>
+        <p:nvPicPr>
+          <p:cNvPr id="45" name="Graphic 44">
+            <a:extLst>
+              <a:ext uri="{FF2B5EF4-FFF2-40B4-BE49-F238E27FC236}">
+                <a16:creationId xmlns:a16="http://schemas.microsoft.com/office/drawing/2014/main" id="{AC7E9D9A-2061-516E-39CD-A50D0B087F90}"/>
+              </a:ext>
+            </a:extLst>
+          </p:cNvPr>
+          <p:cNvPicPr>
+            <a:picLocks noChangeAspect="1"/>
+          </p:cNvPicPr>
+          <p:nvPr/>
+        </p:nvPicPr>
+        <p:blipFill>
+          <a:blip r:embed="rId6">
+            <a:extLst>
+              <a:ext uri="{28A0092B-C50C-407E-A947-70E740481C1C}">
+                <a14:useLocalDpi xmlns:a14="http://schemas.microsoft.com/office/drawing/2010/main" val="0"/>
+              </a:ext>
+              <a:ext uri="{96DAC541-7B7A-43D3-8B79-37D633B846F1}">
+                <asvg:svgBlip xmlns:asvg="http://schemas.microsoft.com/office/drawing/2016/SVG/main" r:embed="rId7"/>
+              </a:ext>
+            </a:extLst>
+          </a:blip>
+          <a:stretch>
+            <a:fillRect/>
+          </a:stretch>
+        </p:blipFill>
+        <p:spPr>
+          <a:xfrm>
+            <a:off x="13006245" y="6289198"/>
+            <a:ext cx="6737272" cy="1273509"/>
+          </a:xfrm>
+          <a:prstGeom prst="rect">
+            <a:avLst/>
+          </a:prstGeom>
+        </p:spPr>
+      </p:pic>
+      <p:sp>
+        <p:nvSpPr>
+          <p:cNvPr id="46" name="TextBox 45">
+            <a:extLst>
+              <a:ext uri="{FF2B5EF4-FFF2-40B4-BE49-F238E27FC236}">
+                <a16:creationId xmlns:a16="http://schemas.microsoft.com/office/drawing/2014/main" id="{307686A5-126C-F470-C370-2A29BDBB9710}"/>
+              </a:ext>
+            </a:extLst>
+          </p:cNvPr>
+          <p:cNvSpPr txBox="1"/>
+          <p:nvPr/>
+        </p:nvSpPr>
+        <p:spPr>
+          <a:xfrm>
+            <a:off x="1136991" y="11960287"/>
+            <a:ext cx="9267412" cy="707886"/>
+          </a:xfrm>
+          <a:prstGeom prst="rect">
+            <a:avLst/>
+          </a:prstGeom>
+          <a:noFill/>
+        </p:spPr>
+        <p:txBody>
+          <a:bodyPr wrap="square" rtlCol="0">
+            <a:spAutoFit/>
+          </a:bodyPr>
+          <a:lstStyle/>
+          <a:p>
+            <a:pPr algn="ctr"/>
+            <a:r>
+              <a:rPr lang="en-US" sz="4000" b="1" dirty="0">
+                <a:latin typeface="Georgia" panose="02040502050405020303" pitchFamily="18" charset="0"/>
+              </a:rPr>
+              <a:t>Doel van het </a:t>
+            </a:r>
+            <a:r>
+              <a:rPr lang="en-US" sz="4000" b="1" dirty="0" err="1">
+                <a:latin typeface="Georgia" panose="02040502050405020303" pitchFamily="18" charset="0"/>
+              </a:rPr>
+              <a:t>onderzoek</a:t>
+            </a:r>
+            <a:endParaRPr lang="en-US" sz="4000" b="1" dirty="0">
+              <a:latin typeface="Georgia" panose="02040502050405020303" pitchFamily="18" charset="0"/>
+            </a:endParaRPr>
+          </a:p>
+        </p:txBody>
+      </p:sp>
+      <p:sp>
+        <p:nvSpPr>
+          <p:cNvPr id="52" name="TextBox 51">
+            <a:extLst>
+              <a:ext uri="{FF2B5EF4-FFF2-40B4-BE49-F238E27FC236}">
+                <a16:creationId xmlns:a16="http://schemas.microsoft.com/office/drawing/2014/main" id="{0F586E3B-CA9C-5C25-FDA9-01BE1C991847}"/>
+              </a:ext>
+            </a:extLst>
+          </p:cNvPr>
+          <p:cNvSpPr txBox="1"/>
+          <p:nvPr/>
+        </p:nvSpPr>
+        <p:spPr>
+          <a:xfrm>
+            <a:off x="1115852" y="12934040"/>
+            <a:ext cx="9267409" cy="7386638"/>
+          </a:xfrm>
+          <a:prstGeom prst="rect">
+            <a:avLst/>
+          </a:prstGeom>
+          <a:noFill/>
+        </p:spPr>
+        <p:txBody>
+          <a:bodyPr wrap="square">
+            <a:spAutoFit/>
+          </a:bodyPr>
+          <a:lstStyle/>
+          <a:p>
+            <a:r>
+              <a:rPr lang="en-US" sz="2400" b="1" dirty="0" err="1">
+                <a:latin typeface="Georgia" panose="02040502050405020303" pitchFamily="18" charset="0"/>
+              </a:rPr>
+              <a:t>Tijdsreeksen</a:t>
+            </a:r>
+            <a:r>
+              <a:rPr lang="en-US" sz="2400" b="1" dirty="0">
+                <a:latin typeface="Georgia" panose="02040502050405020303" pitchFamily="18" charset="0"/>
+              </a:rPr>
+              <a:t> </a:t>
+            </a:r>
+            <a:r>
+              <a:rPr lang="en-US" sz="2400" b="1" dirty="0" err="1">
+                <a:latin typeface="Georgia" panose="02040502050405020303" pitchFamily="18" charset="0"/>
+              </a:rPr>
+              <a:t>clusteren</a:t>
+            </a:r>
+            <a:endParaRPr lang="en-US" sz="2400" b="1" dirty="0">
+              <a:latin typeface="Georgia" panose="02040502050405020303" pitchFamily="18" charset="0"/>
+            </a:endParaRPr>
+          </a:p>
+          <a:p>
+            <a:pPr marL="800100" lvl="1" indent="-342900">
+              <a:buFont typeface="+mj-lt"/>
+              <a:buAutoNum type="arabicParenR"/>
+            </a:pPr>
+            <a:r>
+              <a:rPr lang="en-US" dirty="0">
+                <a:latin typeface="Georgia" panose="02040502050405020303" pitchFamily="18" charset="0"/>
+              </a:rPr>
+              <a:t>Tensor </a:t>
+            </a:r>
+            <a:r>
+              <a:rPr lang="en-US" dirty="0" err="1">
+                <a:latin typeface="Georgia" panose="02040502050405020303" pitchFamily="18" charset="0"/>
+              </a:rPr>
+              <a:t>decompositie</a:t>
+            </a:r>
+            <a:r>
+              <a:rPr lang="en-US" dirty="0">
+                <a:latin typeface="Georgia" panose="02040502050405020303" pitchFamily="18" charset="0"/>
+              </a:rPr>
+              <a:t> </a:t>
+            </a:r>
+            <a:r>
+              <a:rPr lang="en-US" dirty="0" err="1">
+                <a:latin typeface="Georgia" panose="02040502050405020303" pitchFamily="18" charset="0"/>
+              </a:rPr>
+              <a:t>berekenen</a:t>
+            </a:r>
+            <a:endParaRPr lang="en-US" dirty="0">
+              <a:latin typeface="Georgia" panose="02040502050405020303" pitchFamily="18" charset="0"/>
+            </a:endParaRPr>
+          </a:p>
+          <a:p>
+            <a:pPr marL="1257300" lvl="2" indent="-342900">
+              <a:buFont typeface="Arial" panose="020B0604020202020204" pitchFamily="34" charset="0"/>
+              <a:buChar char="•"/>
+            </a:pPr>
+            <a:r>
+              <a:rPr lang="en-US" dirty="0">
+                <a:latin typeface="Georgia" panose="02040502050405020303" pitchFamily="18" charset="0"/>
+              </a:rPr>
+              <a:t>CP </a:t>
+            </a:r>
+            <a:r>
+              <a:rPr lang="en-US" dirty="0" err="1">
+                <a:latin typeface="Georgia" panose="02040502050405020303" pitchFamily="18" charset="0"/>
+              </a:rPr>
+              <a:t>decompositie</a:t>
+            </a:r>
+            <a:r>
+              <a:rPr lang="en-US" dirty="0">
+                <a:latin typeface="Georgia" panose="02040502050405020303" pitchFamily="18" charset="0"/>
+              </a:rPr>
+              <a:t>: </a:t>
+            </a:r>
+            <a:r>
+              <a:rPr lang="en-US" dirty="0" err="1">
+                <a:latin typeface="Georgia" panose="02040502050405020303" pitchFamily="18" charset="0"/>
+              </a:rPr>
+              <a:t>een</a:t>
+            </a:r>
+            <a:r>
+              <a:rPr lang="en-US" dirty="0">
+                <a:latin typeface="Georgia" panose="02040502050405020303" pitchFamily="18" charset="0"/>
+              </a:rPr>
+              <a:t> </a:t>
+            </a:r>
+            <a:r>
+              <a:rPr lang="en-US" dirty="0" err="1">
+                <a:latin typeface="Georgia" panose="02040502050405020303" pitchFamily="18" charset="0"/>
+              </a:rPr>
+              <a:t>zeer</a:t>
+            </a:r>
+            <a:r>
+              <a:rPr lang="en-US" dirty="0">
+                <a:latin typeface="Georgia" panose="02040502050405020303" pitchFamily="18" charset="0"/>
+              </a:rPr>
+              <a:t> </a:t>
+            </a:r>
+            <a:r>
+              <a:rPr lang="en-US" dirty="0" err="1">
+                <a:latin typeface="Georgia" panose="02040502050405020303" pitchFamily="18" charset="0"/>
+              </a:rPr>
+              <a:t>goede</a:t>
+            </a:r>
+            <a:r>
+              <a:rPr lang="en-US" dirty="0">
+                <a:latin typeface="Georgia" panose="02040502050405020303" pitchFamily="18" charset="0"/>
+              </a:rPr>
+              <a:t> </a:t>
+            </a:r>
+            <a:r>
+              <a:rPr lang="en-US" dirty="0" err="1">
+                <a:latin typeface="Georgia" panose="02040502050405020303" pitchFamily="18" charset="0"/>
+              </a:rPr>
+              <a:t>decompositie</a:t>
+            </a:r>
+            <a:endParaRPr lang="en-US" dirty="0">
+              <a:latin typeface="Georgia" panose="02040502050405020303" pitchFamily="18" charset="0"/>
+            </a:endParaRPr>
+          </a:p>
+          <a:p>
+            <a:pPr marL="1257300" lvl="2" indent="-342900">
+              <a:buFont typeface="Arial" panose="020B0604020202020204" pitchFamily="34" charset="0"/>
+              <a:buChar char="•"/>
+            </a:pPr>
+            <a:r>
+              <a:rPr lang="en-US" dirty="0" err="1">
+                <a:latin typeface="Georgia" panose="02040502050405020303" pitchFamily="18" charset="0"/>
+              </a:rPr>
+              <a:t>Adaptieve</a:t>
+            </a:r>
+            <a:r>
+              <a:rPr lang="en-US" dirty="0">
+                <a:latin typeface="Georgia" panose="02040502050405020303" pitchFamily="18" charset="0"/>
+              </a:rPr>
+              <a:t> </a:t>
+            </a:r>
+            <a:r>
+              <a:rPr lang="en-US" dirty="0" err="1">
+                <a:latin typeface="Georgia" panose="02040502050405020303" pitchFamily="18" charset="0"/>
+              </a:rPr>
+              <a:t>methodes</a:t>
+            </a:r>
+            <a:r>
+              <a:rPr lang="en-US" dirty="0">
+                <a:latin typeface="Georgia" panose="02040502050405020303" pitchFamily="18" charset="0"/>
+              </a:rPr>
+              <a:t>: </a:t>
+            </a:r>
+            <a:r>
+              <a:rPr lang="en-US" dirty="0" err="1">
+                <a:latin typeface="Georgia" panose="02040502050405020303" pitchFamily="18" charset="0"/>
+              </a:rPr>
+              <a:t>een</a:t>
+            </a:r>
+            <a:r>
+              <a:rPr lang="en-US" dirty="0">
+                <a:latin typeface="Georgia" panose="02040502050405020303" pitchFamily="18" charset="0"/>
+              </a:rPr>
+              <a:t> </a:t>
+            </a:r>
+            <a:r>
+              <a:rPr lang="en-US" dirty="0" err="1">
+                <a:latin typeface="Georgia" panose="02040502050405020303" pitchFamily="18" charset="0"/>
+              </a:rPr>
+              <a:t>uitbreiding</a:t>
+            </a:r>
+            <a:r>
+              <a:rPr lang="en-US" dirty="0">
+                <a:latin typeface="Georgia" panose="02040502050405020303" pitchFamily="18" charset="0"/>
+              </a:rPr>
+              <a:t> van ACA </a:t>
+            </a:r>
+            <a:r>
+              <a:rPr lang="en-US" dirty="0" err="1">
+                <a:latin typeface="Georgia" panose="02040502050405020303" pitchFamily="18" charset="0"/>
+              </a:rPr>
+              <a:t>voor</a:t>
+            </a:r>
+            <a:r>
+              <a:rPr lang="en-US" dirty="0">
+                <a:latin typeface="Georgia" panose="02040502050405020303" pitchFamily="18" charset="0"/>
+              </a:rPr>
+              <a:t> matrices </a:t>
+            </a:r>
+            <a:r>
+              <a:rPr lang="en-US" dirty="0" err="1">
+                <a:latin typeface="Georgia" panose="02040502050405020303" pitchFamily="18" charset="0"/>
+              </a:rPr>
+              <a:t>naar</a:t>
+            </a:r>
+            <a:r>
+              <a:rPr lang="en-US" dirty="0">
+                <a:latin typeface="Georgia" panose="02040502050405020303" pitchFamily="18" charset="0"/>
+              </a:rPr>
+              <a:t> </a:t>
+            </a:r>
+            <a:r>
+              <a:rPr lang="en-US" dirty="0" err="1">
+                <a:latin typeface="Georgia" panose="02040502050405020303" pitchFamily="18" charset="0"/>
+              </a:rPr>
+              <a:t>tensoren</a:t>
+            </a:r>
+            <a:endParaRPr lang="en-US" dirty="0">
+              <a:latin typeface="Georgia" panose="02040502050405020303" pitchFamily="18" charset="0"/>
+            </a:endParaRPr>
+          </a:p>
+          <a:p>
+            <a:pPr marL="1257300" lvl="2" indent="-342900">
+              <a:buFont typeface="Arial" panose="020B0604020202020204" pitchFamily="34" charset="0"/>
+              <a:buChar char="•"/>
+            </a:pPr>
+            <a:endParaRPr lang="en-US" dirty="0">
+              <a:latin typeface="Georgia" panose="02040502050405020303" pitchFamily="18" charset="0"/>
+            </a:endParaRPr>
+          </a:p>
+          <a:p>
+            <a:pPr marL="800100" lvl="1" indent="-342900">
+              <a:buFont typeface="+mj-lt"/>
+              <a:buAutoNum type="arabicParenR"/>
+            </a:pPr>
+            <a:r>
+              <a:rPr lang="en-US" dirty="0" err="1">
+                <a:latin typeface="Georgia" panose="02040502050405020303" pitchFamily="18" charset="0"/>
+              </a:rPr>
+              <a:t>Vectoren</a:t>
+            </a:r>
+            <a:r>
+              <a:rPr lang="en-US" dirty="0">
+                <a:latin typeface="Georgia" panose="02040502050405020303" pitchFamily="18" charset="0"/>
+              </a:rPr>
+              <a:t> </a:t>
+            </a:r>
+            <a:r>
+              <a:rPr lang="en-US" dirty="0" err="1">
+                <a:latin typeface="Georgia" panose="02040502050405020303" pitchFamily="18" charset="0"/>
+              </a:rPr>
+              <a:t>uit</a:t>
+            </a:r>
+            <a:r>
+              <a:rPr lang="en-US" dirty="0">
+                <a:latin typeface="Georgia" panose="02040502050405020303" pitchFamily="18" charset="0"/>
+              </a:rPr>
+              <a:t> termen van de </a:t>
+            </a:r>
+            <a:r>
+              <a:rPr lang="en-US" dirty="0" err="1">
+                <a:latin typeface="Georgia" panose="02040502050405020303" pitchFamily="18" charset="0"/>
+              </a:rPr>
+              <a:t>decompositie</a:t>
+            </a:r>
+            <a:r>
+              <a:rPr lang="en-US" dirty="0">
+                <a:latin typeface="Georgia" panose="02040502050405020303" pitchFamily="18" charset="0"/>
+              </a:rPr>
+              <a:t> </a:t>
+            </a:r>
+            <a:r>
+              <a:rPr lang="en-US" dirty="0" err="1">
+                <a:latin typeface="Georgia" panose="02040502050405020303" pitchFamily="18" charset="0"/>
+              </a:rPr>
+              <a:t>verzamelen</a:t>
+            </a:r>
+            <a:r>
+              <a:rPr lang="en-US" dirty="0">
+                <a:latin typeface="Georgia" panose="02040502050405020303" pitchFamily="18" charset="0"/>
+              </a:rPr>
+              <a:t> </a:t>
+            </a:r>
+            <a:r>
+              <a:rPr lang="en-US" dirty="0" err="1">
+                <a:latin typeface="Georgia" panose="02040502050405020303" pitchFamily="18" charset="0"/>
+              </a:rPr>
+              <a:t>als</a:t>
+            </a:r>
+            <a:r>
+              <a:rPr lang="en-US" dirty="0">
+                <a:latin typeface="Georgia" panose="02040502050405020303" pitchFamily="18" charset="0"/>
+              </a:rPr>
+              <a:t> ‘feature </a:t>
+            </a:r>
+            <a:r>
+              <a:rPr lang="en-US" dirty="0" err="1">
+                <a:latin typeface="Georgia" panose="02040502050405020303" pitchFamily="18" charset="0"/>
+              </a:rPr>
+              <a:t>vectoren</a:t>
+            </a:r>
+            <a:r>
+              <a:rPr lang="en-US" dirty="0">
+                <a:latin typeface="Georgia" panose="02040502050405020303" pitchFamily="18" charset="0"/>
+              </a:rPr>
+              <a:t>’</a:t>
+            </a:r>
+          </a:p>
+          <a:p>
+            <a:pPr marL="800100" lvl="1" indent="-342900">
+              <a:buFont typeface="+mj-lt"/>
+              <a:buAutoNum type="arabicParenR"/>
+            </a:pPr>
+            <a:endParaRPr lang="en-US" dirty="0">
+              <a:latin typeface="Georgia" panose="02040502050405020303" pitchFamily="18" charset="0"/>
+            </a:endParaRPr>
+          </a:p>
+          <a:p>
+            <a:pPr marL="800100" lvl="1" indent="-342900">
+              <a:buFont typeface="+mj-lt"/>
+              <a:buAutoNum type="arabicParenR"/>
+            </a:pPr>
+            <a:r>
+              <a:rPr lang="en-US" dirty="0">
+                <a:latin typeface="Georgia" panose="02040502050405020303" pitchFamily="18" charset="0"/>
+              </a:rPr>
+              <a:t>K-means clustering </a:t>
+            </a:r>
+            <a:r>
+              <a:rPr lang="en-US" dirty="0" err="1">
+                <a:latin typeface="Georgia" panose="02040502050405020303" pitchFamily="18" charset="0"/>
+              </a:rPr>
+              <a:t>algoritme</a:t>
+            </a:r>
+            <a:r>
+              <a:rPr lang="en-US" dirty="0">
+                <a:latin typeface="Georgia" panose="02040502050405020303" pitchFamily="18" charset="0"/>
+              </a:rPr>
+              <a:t> </a:t>
+            </a:r>
+            <a:r>
+              <a:rPr lang="en-US" dirty="0" err="1">
+                <a:latin typeface="Georgia" panose="02040502050405020303" pitchFamily="18" charset="0"/>
+              </a:rPr>
+              <a:t>gebruiken</a:t>
+            </a:r>
+            <a:r>
+              <a:rPr lang="en-US" dirty="0">
+                <a:latin typeface="Georgia" panose="02040502050405020303" pitchFamily="18" charset="0"/>
+              </a:rPr>
+              <a:t> met </a:t>
+            </a:r>
+            <a:r>
+              <a:rPr lang="en-US" dirty="0" err="1">
+                <a:latin typeface="Georgia" panose="02040502050405020303" pitchFamily="18" charset="0"/>
+              </a:rPr>
+              <a:t>deze</a:t>
+            </a:r>
+            <a:r>
+              <a:rPr lang="en-US" dirty="0">
+                <a:latin typeface="Georgia" panose="02040502050405020303" pitchFamily="18" charset="0"/>
+              </a:rPr>
+              <a:t> feature </a:t>
+            </a:r>
+            <a:r>
+              <a:rPr lang="en-US" dirty="0" err="1">
+                <a:latin typeface="Georgia" panose="02040502050405020303" pitchFamily="18" charset="0"/>
+              </a:rPr>
+              <a:t>vectoren</a:t>
+            </a:r>
+            <a:endParaRPr lang="en-US" dirty="0">
+              <a:latin typeface="Georgia" panose="02040502050405020303" pitchFamily="18" charset="0"/>
+            </a:endParaRPr>
+          </a:p>
+          <a:p>
+            <a:pPr marL="742950" lvl="1" indent="-285750">
+              <a:buFont typeface="Arial" panose="020B0604020202020204" pitchFamily="34" charset="0"/>
+              <a:buChar char="•"/>
+            </a:pPr>
+            <a:endParaRPr lang="en-US" dirty="0">
+              <a:latin typeface="Georgia" panose="02040502050405020303" pitchFamily="18" charset="0"/>
+            </a:endParaRPr>
+          </a:p>
+          <a:p>
+            <a:pPr lvl="1"/>
+            <a:endParaRPr lang="en-US" dirty="0">
+              <a:latin typeface="Georgia" panose="02040502050405020303" pitchFamily="18" charset="0"/>
+            </a:endParaRPr>
+          </a:p>
+          <a:p>
+            <a:r>
+              <a:rPr lang="en-US" sz="2400" b="1" dirty="0" err="1">
+                <a:latin typeface="Georgia" panose="02040502050405020303" pitchFamily="18" charset="0"/>
+              </a:rPr>
+              <a:t>Verhouding</a:t>
+            </a:r>
+            <a:r>
+              <a:rPr lang="en-US" sz="2400" b="1" dirty="0">
+                <a:latin typeface="Georgia" panose="02040502050405020303" pitchFamily="18" charset="0"/>
+              </a:rPr>
+              <a:t> van DTW </a:t>
+            </a:r>
+            <a:r>
+              <a:rPr lang="en-US" sz="2400" b="1" dirty="0" err="1">
+                <a:latin typeface="Georgia" panose="02040502050405020303" pitchFamily="18" charset="0"/>
+              </a:rPr>
+              <a:t>operaties</a:t>
+            </a:r>
+            <a:r>
+              <a:rPr lang="en-US" sz="2400" b="1" dirty="0">
+                <a:latin typeface="Georgia" panose="02040502050405020303" pitchFamily="18" charset="0"/>
+              </a:rPr>
+              <a:t> met </a:t>
+            </a:r>
+            <a:r>
+              <a:rPr lang="en-US" sz="2400" b="1" dirty="0" err="1">
+                <a:latin typeface="Georgia" panose="02040502050405020303" pitchFamily="18" charset="0"/>
+              </a:rPr>
+              <a:t>relatieve</a:t>
+            </a:r>
+            <a:r>
+              <a:rPr lang="en-US" sz="2400" b="1" dirty="0">
+                <a:latin typeface="Georgia" panose="02040502050405020303" pitchFamily="18" charset="0"/>
+              </a:rPr>
+              <a:t> </a:t>
+            </a:r>
+            <a:r>
+              <a:rPr lang="en-US" sz="2400" b="1" dirty="0" err="1">
+                <a:latin typeface="Georgia" panose="02040502050405020303" pitchFamily="18" charset="0"/>
+              </a:rPr>
+              <a:t>fout</a:t>
+            </a:r>
+            <a:r>
+              <a:rPr lang="en-US" sz="2400" b="1" dirty="0">
+                <a:latin typeface="Georgia" panose="02040502050405020303" pitchFamily="18" charset="0"/>
+              </a:rPr>
+              <a:t>*</a:t>
+            </a:r>
+          </a:p>
+          <a:p>
+            <a:pPr marL="285750" indent="-285750">
+              <a:buFont typeface="Arial" panose="020B0604020202020204" pitchFamily="34" charset="0"/>
+              <a:buChar char="•"/>
+            </a:pPr>
+            <a:r>
+              <a:rPr lang="en-US" dirty="0" err="1">
+                <a:latin typeface="Georgia" panose="02040502050405020303" pitchFamily="18" charset="0"/>
+              </a:rPr>
+              <a:t>Decomposities</a:t>
+            </a:r>
+            <a:r>
+              <a:rPr lang="en-US" dirty="0">
+                <a:latin typeface="Georgia" panose="02040502050405020303" pitchFamily="18" charset="0"/>
+              </a:rPr>
+              <a:t> </a:t>
+            </a:r>
+            <a:r>
+              <a:rPr lang="en-US" dirty="0" err="1">
+                <a:latin typeface="Georgia" panose="02040502050405020303" pitchFamily="18" charset="0"/>
+              </a:rPr>
+              <a:t>berekenen</a:t>
+            </a:r>
+            <a:endParaRPr lang="en-US" dirty="0">
+              <a:latin typeface="Georgia" panose="02040502050405020303" pitchFamily="18" charset="0"/>
+            </a:endParaRPr>
+          </a:p>
+          <a:p>
+            <a:pPr marL="800100" lvl="1" indent="-342900">
+              <a:buFont typeface="Arial" panose="020B0604020202020204" pitchFamily="34" charset="0"/>
+              <a:buChar char="•"/>
+            </a:pPr>
+            <a:r>
+              <a:rPr lang="en-US" dirty="0">
+                <a:latin typeface="Georgia" panose="02040502050405020303" pitchFamily="18" charset="0"/>
+              </a:rPr>
+              <a:t>Het </a:t>
+            </a:r>
+            <a:r>
+              <a:rPr lang="en-US" dirty="0" err="1">
+                <a:latin typeface="Georgia" panose="02040502050405020303" pitchFamily="18" charset="0"/>
+              </a:rPr>
+              <a:t>aantal</a:t>
+            </a:r>
+            <a:r>
+              <a:rPr lang="en-US" dirty="0">
+                <a:latin typeface="Georgia" panose="02040502050405020303" pitchFamily="18" charset="0"/>
+              </a:rPr>
+              <a:t> DTW </a:t>
+            </a:r>
+            <a:r>
+              <a:rPr lang="en-US" dirty="0" err="1">
+                <a:latin typeface="Georgia" panose="02040502050405020303" pitchFamily="18" charset="0"/>
+              </a:rPr>
+              <a:t>operaties</a:t>
+            </a:r>
+            <a:r>
+              <a:rPr lang="en-US" dirty="0">
+                <a:latin typeface="Georgia" panose="02040502050405020303" pitchFamily="18" charset="0"/>
+              </a:rPr>
+              <a:t>:  	</a:t>
+            </a:r>
+            <a:r>
+              <a:rPr lang="en-US" dirty="0" err="1">
+                <a:latin typeface="Georgia" panose="02040502050405020303" pitchFamily="18" charset="0"/>
+              </a:rPr>
+              <a:t>maat</a:t>
+            </a:r>
+            <a:r>
+              <a:rPr lang="en-US" dirty="0">
+                <a:latin typeface="Georgia" panose="02040502050405020303" pitchFamily="18" charset="0"/>
+              </a:rPr>
+              <a:t> </a:t>
+            </a:r>
+            <a:r>
+              <a:rPr lang="en-US" dirty="0" err="1">
+                <a:latin typeface="Georgia" panose="02040502050405020303" pitchFamily="18" charset="0"/>
+              </a:rPr>
+              <a:t>voor</a:t>
+            </a:r>
+            <a:r>
+              <a:rPr lang="en-US" dirty="0">
+                <a:latin typeface="Georgia" panose="02040502050405020303" pitchFamily="18" charset="0"/>
+              </a:rPr>
+              <a:t> de </a:t>
+            </a:r>
+            <a:r>
+              <a:rPr lang="en-US" dirty="0" err="1">
+                <a:latin typeface="Georgia" panose="02040502050405020303" pitchFamily="18" charset="0"/>
+              </a:rPr>
+              <a:t>snelheid</a:t>
+            </a:r>
+            <a:r>
+              <a:rPr lang="en-US" dirty="0">
+                <a:latin typeface="Georgia" panose="02040502050405020303" pitchFamily="18" charset="0"/>
+              </a:rPr>
+              <a:t> van het </a:t>
+            </a:r>
+            <a:r>
+              <a:rPr lang="en-US" dirty="0" err="1">
+                <a:latin typeface="Georgia" panose="02040502050405020303" pitchFamily="18" charset="0"/>
+              </a:rPr>
+              <a:t>algoritme</a:t>
+            </a:r>
+            <a:endParaRPr lang="en-US" dirty="0">
+              <a:latin typeface="Georgia" panose="02040502050405020303" pitchFamily="18" charset="0"/>
+            </a:endParaRPr>
+          </a:p>
+          <a:p>
+            <a:pPr marL="800100" lvl="1" indent="-342900">
+              <a:buFont typeface="Arial" panose="020B0604020202020204" pitchFamily="34" charset="0"/>
+              <a:buChar char="•"/>
+            </a:pPr>
+            <a:r>
+              <a:rPr lang="en-US" dirty="0">
+                <a:latin typeface="Georgia" panose="02040502050405020303" pitchFamily="18" charset="0"/>
+              </a:rPr>
+              <a:t>De </a:t>
+            </a:r>
+            <a:r>
+              <a:rPr lang="en-US" dirty="0" err="1">
+                <a:latin typeface="Georgia" panose="02040502050405020303" pitchFamily="18" charset="0"/>
+              </a:rPr>
+              <a:t>relatieve</a:t>
+            </a:r>
+            <a:r>
+              <a:rPr lang="en-US" dirty="0">
+                <a:latin typeface="Georgia" panose="02040502050405020303" pitchFamily="18" charset="0"/>
+              </a:rPr>
+              <a:t> </a:t>
+            </a:r>
+            <a:r>
+              <a:rPr lang="en-US" dirty="0" err="1">
+                <a:latin typeface="Georgia" panose="02040502050405020303" pitchFamily="18" charset="0"/>
+              </a:rPr>
+              <a:t>fout</a:t>
+            </a:r>
+            <a:r>
+              <a:rPr lang="en-US" dirty="0">
+                <a:latin typeface="Georgia" panose="02040502050405020303" pitchFamily="18" charset="0"/>
+              </a:rPr>
+              <a:t>:			</a:t>
+            </a:r>
+            <a:r>
+              <a:rPr lang="en-US" dirty="0" err="1">
+                <a:latin typeface="Georgia" panose="02040502050405020303" pitchFamily="18" charset="0"/>
+              </a:rPr>
+              <a:t>maat</a:t>
+            </a:r>
+            <a:r>
+              <a:rPr lang="en-US" dirty="0">
+                <a:latin typeface="Georgia" panose="02040502050405020303" pitchFamily="18" charset="0"/>
+              </a:rPr>
+              <a:t> </a:t>
+            </a:r>
+            <a:r>
+              <a:rPr lang="en-US" dirty="0" err="1">
+                <a:latin typeface="Georgia" panose="02040502050405020303" pitchFamily="18" charset="0"/>
+              </a:rPr>
+              <a:t>voor</a:t>
+            </a:r>
+            <a:r>
+              <a:rPr lang="en-US" dirty="0">
+                <a:latin typeface="Georgia" panose="02040502050405020303" pitchFamily="18" charset="0"/>
+              </a:rPr>
+              <a:t> de </a:t>
+            </a:r>
+            <a:r>
+              <a:rPr lang="en-US" dirty="0" err="1">
+                <a:latin typeface="Georgia" panose="02040502050405020303" pitchFamily="18" charset="0"/>
+              </a:rPr>
+              <a:t>nauwkeurigheid</a:t>
+            </a:r>
+            <a:endParaRPr lang="en-US" dirty="0">
+              <a:latin typeface="Georgia" panose="02040502050405020303" pitchFamily="18" charset="0"/>
+            </a:endParaRPr>
+          </a:p>
+          <a:p>
+            <a:pPr marL="285750" indent="-285750">
+              <a:buFont typeface="Arial" panose="020B0604020202020204" pitchFamily="34" charset="0"/>
+              <a:buChar char="•"/>
+            </a:pPr>
+            <a:endParaRPr lang="en-US" b="1" dirty="0"/>
+          </a:p>
+          <a:p>
+            <a:r>
+              <a:rPr lang="en-US" sz="2400" b="1" dirty="0">
+                <a:latin typeface="Georgia" panose="02040502050405020303" pitchFamily="18" charset="0"/>
+              </a:rPr>
+              <a:t>We </a:t>
+            </a:r>
+            <a:r>
+              <a:rPr lang="en-US" sz="2400" b="1" dirty="0" err="1">
+                <a:latin typeface="Georgia" panose="02040502050405020303" pitchFamily="18" charset="0"/>
+              </a:rPr>
+              <a:t>willen</a:t>
+            </a:r>
+            <a:r>
+              <a:rPr lang="en-US" sz="2400" b="1" dirty="0">
+                <a:latin typeface="Georgia" panose="02040502050405020303" pitchFamily="18" charset="0"/>
+              </a:rPr>
+              <a:t> </a:t>
+            </a:r>
+            <a:r>
+              <a:rPr lang="en-US" sz="2400" b="1" dirty="0" err="1">
+                <a:latin typeface="Georgia" panose="02040502050405020303" pitchFamily="18" charset="0"/>
+              </a:rPr>
+              <a:t>een</a:t>
+            </a:r>
+            <a:r>
+              <a:rPr lang="en-US" sz="2400" b="1" dirty="0">
+                <a:latin typeface="Georgia" panose="02040502050405020303" pitchFamily="18" charset="0"/>
+              </a:rPr>
+              <a:t> zo </a:t>
+            </a:r>
+            <a:r>
+              <a:rPr lang="en-US" sz="2400" b="1" dirty="0" err="1">
+                <a:latin typeface="Georgia" panose="02040502050405020303" pitchFamily="18" charset="0"/>
+              </a:rPr>
+              <a:t>laag</a:t>
+            </a:r>
+            <a:r>
+              <a:rPr lang="en-US" sz="2400" b="1" dirty="0">
+                <a:latin typeface="Georgia" panose="02040502050405020303" pitchFamily="18" charset="0"/>
+              </a:rPr>
+              <a:t> </a:t>
+            </a:r>
+            <a:r>
+              <a:rPr lang="en-US" sz="2400" b="1" dirty="0" err="1">
+                <a:latin typeface="Georgia" panose="02040502050405020303" pitchFamily="18" charset="0"/>
+              </a:rPr>
+              <a:t>mogelijke</a:t>
+            </a:r>
+            <a:r>
+              <a:rPr lang="en-US" sz="2400" b="1" dirty="0">
+                <a:latin typeface="Georgia" panose="02040502050405020303" pitchFamily="18" charset="0"/>
+              </a:rPr>
+              <a:t> </a:t>
+            </a:r>
+            <a:r>
+              <a:rPr lang="en-US" sz="2400" b="1" dirty="0" err="1">
+                <a:latin typeface="Georgia" panose="02040502050405020303" pitchFamily="18" charset="0"/>
+              </a:rPr>
+              <a:t>relatieve</a:t>
+            </a:r>
+            <a:r>
+              <a:rPr lang="en-US" sz="2400" b="1" dirty="0">
+                <a:latin typeface="Georgia" panose="02040502050405020303" pitchFamily="18" charset="0"/>
+              </a:rPr>
+              <a:t> </a:t>
+            </a:r>
+            <a:r>
+              <a:rPr lang="en-US" sz="2400" b="1" dirty="0" err="1">
+                <a:latin typeface="Georgia" panose="02040502050405020303" pitchFamily="18" charset="0"/>
+              </a:rPr>
+              <a:t>fout</a:t>
+            </a:r>
+            <a:r>
+              <a:rPr lang="en-US" sz="2400" b="1" dirty="0">
+                <a:latin typeface="Georgia" panose="02040502050405020303" pitchFamily="18" charset="0"/>
+              </a:rPr>
+              <a:t> </a:t>
+            </a:r>
+            <a:r>
+              <a:rPr lang="en-US" sz="2400" b="1" dirty="0" err="1">
+                <a:latin typeface="Georgia" panose="02040502050405020303" pitchFamily="18" charset="0"/>
+              </a:rPr>
+              <a:t>zonder</a:t>
+            </a:r>
+            <a:r>
+              <a:rPr lang="en-US" sz="2400" b="1" dirty="0">
+                <a:latin typeface="Georgia" panose="02040502050405020303" pitchFamily="18" charset="0"/>
+              </a:rPr>
+              <a:t> </a:t>
+            </a:r>
+            <a:r>
+              <a:rPr lang="en-US" sz="2400" b="1" dirty="0" err="1">
+                <a:latin typeface="Georgia" panose="02040502050405020303" pitchFamily="18" charset="0"/>
+              </a:rPr>
+              <a:t>te</a:t>
+            </a:r>
+            <a:r>
+              <a:rPr lang="en-US" sz="2400" b="1" dirty="0">
+                <a:latin typeface="Georgia" panose="02040502050405020303" pitchFamily="18" charset="0"/>
+              </a:rPr>
+              <a:t> </a:t>
+            </a:r>
+            <a:r>
+              <a:rPr lang="en-US" sz="2400" b="1" dirty="0" err="1">
+                <a:latin typeface="Georgia" panose="02040502050405020303" pitchFamily="18" charset="0"/>
+              </a:rPr>
+              <a:t>veel</a:t>
+            </a:r>
+            <a:r>
+              <a:rPr lang="en-US" sz="2400" b="1" dirty="0">
+                <a:latin typeface="Georgia" panose="02040502050405020303" pitchFamily="18" charset="0"/>
+              </a:rPr>
+              <a:t> DTW </a:t>
+            </a:r>
+            <a:r>
+              <a:rPr lang="en-US" sz="2400" b="1" dirty="0" err="1">
+                <a:latin typeface="Georgia" panose="02040502050405020303" pitchFamily="18" charset="0"/>
+              </a:rPr>
+              <a:t>operaties</a:t>
+            </a:r>
+            <a:endParaRPr lang="en-US" dirty="0"/>
+          </a:p>
+          <a:p>
+            <a:pPr marL="285750" indent="-285750">
+              <a:buFont typeface="Arial" panose="020B0604020202020204" pitchFamily="34" charset="0"/>
+              <a:buChar char="•"/>
+            </a:pPr>
+            <a:r>
+              <a:rPr lang="en-US" dirty="0"/>
+              <a:t>We </a:t>
+            </a:r>
+            <a:r>
+              <a:rPr lang="en-US" dirty="0" err="1"/>
+              <a:t>hopen</a:t>
+            </a:r>
+            <a:r>
+              <a:rPr lang="en-US" dirty="0"/>
+              <a:t> </a:t>
+            </a:r>
+            <a:r>
+              <a:rPr lang="en-US" dirty="0" err="1"/>
+              <a:t>dat</a:t>
+            </a:r>
+            <a:r>
+              <a:rPr lang="en-US" dirty="0"/>
+              <a:t> </a:t>
+            </a:r>
+            <a:r>
+              <a:rPr lang="en-US" dirty="0" err="1"/>
+              <a:t>een</a:t>
+            </a:r>
+            <a:r>
+              <a:rPr lang="en-US" dirty="0"/>
+              <a:t> </a:t>
+            </a:r>
+            <a:r>
+              <a:rPr lang="en-US" dirty="0" err="1"/>
+              <a:t>adaptieve</a:t>
+            </a:r>
+            <a:r>
+              <a:rPr lang="en-US" dirty="0"/>
+              <a:t> </a:t>
+            </a:r>
+            <a:r>
+              <a:rPr lang="en-US" dirty="0" err="1"/>
+              <a:t>decompositie</a:t>
+            </a:r>
+            <a:r>
+              <a:rPr lang="en-US" dirty="0"/>
+              <a:t> </a:t>
+            </a:r>
+            <a:r>
+              <a:rPr lang="en-US" dirty="0" err="1"/>
+              <a:t>een</a:t>
+            </a:r>
+            <a:r>
+              <a:rPr lang="en-US" dirty="0"/>
+              <a:t> </a:t>
+            </a:r>
+            <a:r>
+              <a:rPr lang="en-US" dirty="0" err="1"/>
+              <a:t>goede</a:t>
+            </a:r>
+            <a:r>
+              <a:rPr lang="en-US" dirty="0"/>
+              <a:t> </a:t>
+            </a:r>
+            <a:r>
+              <a:rPr lang="en-US" dirty="0" err="1"/>
+              <a:t>relatieve</a:t>
+            </a:r>
+            <a:r>
+              <a:rPr lang="en-US" dirty="0"/>
+              <a:t> </a:t>
+            </a:r>
+            <a:r>
+              <a:rPr lang="en-US" dirty="0" err="1"/>
+              <a:t>fout</a:t>
+            </a:r>
+            <a:r>
+              <a:rPr lang="en-US" dirty="0"/>
+              <a:t> </a:t>
+            </a:r>
+            <a:r>
+              <a:rPr lang="en-US" dirty="0" err="1"/>
+              <a:t>geeft</a:t>
+            </a:r>
+            <a:r>
+              <a:rPr lang="en-US" dirty="0"/>
+              <a:t> </a:t>
+            </a:r>
+            <a:r>
+              <a:rPr lang="en-US" dirty="0" err="1"/>
+              <a:t>en</a:t>
+            </a:r>
+            <a:r>
+              <a:rPr lang="en-US" dirty="0"/>
+              <a:t> het </a:t>
+            </a:r>
+            <a:r>
+              <a:rPr lang="en-US" dirty="0" err="1"/>
+              <a:t>aantal</a:t>
+            </a:r>
+            <a:r>
+              <a:rPr lang="en-US" dirty="0"/>
+              <a:t> DTW </a:t>
+            </a:r>
+            <a:r>
+              <a:rPr lang="en-US" dirty="0" err="1"/>
+              <a:t>operaties</a:t>
+            </a:r>
+            <a:r>
+              <a:rPr lang="en-US" dirty="0"/>
+              <a:t> </a:t>
+            </a:r>
+            <a:r>
+              <a:rPr lang="en-US" dirty="0" err="1"/>
+              <a:t>laag</a:t>
+            </a:r>
+            <a:r>
+              <a:rPr lang="en-US" dirty="0"/>
+              <a:t> </a:t>
+            </a:r>
+            <a:r>
+              <a:rPr lang="en-US" dirty="0" err="1"/>
+              <a:t>houdt</a:t>
+            </a:r>
+            <a:r>
+              <a:rPr lang="en-US" dirty="0"/>
+              <a:t> </a:t>
+            </a:r>
+            <a:r>
+              <a:rPr lang="en-US" dirty="0" err="1"/>
+              <a:t>vergeleken</a:t>
+            </a:r>
+            <a:r>
+              <a:rPr lang="en-US" dirty="0"/>
+              <a:t> met de </a:t>
+            </a:r>
+            <a:r>
+              <a:rPr lang="en-US" dirty="0" err="1"/>
+              <a:t>volledige</a:t>
+            </a:r>
+            <a:r>
+              <a:rPr lang="en-US" dirty="0"/>
+              <a:t> tensor </a:t>
+            </a:r>
+            <a:r>
+              <a:rPr lang="en-US" dirty="0" err="1"/>
+              <a:t>te</a:t>
+            </a:r>
+            <a:r>
+              <a:rPr lang="en-US" dirty="0"/>
+              <a:t> </a:t>
+            </a:r>
+            <a:r>
+              <a:rPr lang="en-US" dirty="0" err="1"/>
+              <a:t>berekenen</a:t>
+            </a:r>
+            <a:r>
+              <a:rPr lang="en-US" dirty="0"/>
+              <a:t>.</a:t>
+            </a:r>
+          </a:p>
+          <a:p>
+            <a:pPr marL="285750" indent="-285750">
+              <a:buFont typeface="Arial" panose="020B0604020202020204" pitchFamily="34" charset="0"/>
+              <a:buChar char="•"/>
+            </a:pPr>
+            <a:r>
+              <a:rPr lang="en-US" dirty="0"/>
+              <a:t>We </a:t>
+            </a:r>
+            <a:r>
+              <a:rPr lang="en-US" dirty="0" err="1"/>
+              <a:t>vermoeden</a:t>
+            </a:r>
+            <a:r>
+              <a:rPr lang="en-US" dirty="0"/>
+              <a:t> </a:t>
+            </a:r>
+            <a:r>
+              <a:rPr lang="en-US" dirty="0" err="1"/>
+              <a:t>dat</a:t>
+            </a:r>
+            <a:r>
+              <a:rPr lang="en-US" dirty="0"/>
+              <a:t> </a:t>
+            </a:r>
+            <a:r>
+              <a:rPr lang="en-US" dirty="0" err="1"/>
+              <a:t>een</a:t>
+            </a:r>
+            <a:r>
+              <a:rPr lang="en-US" dirty="0"/>
+              <a:t> </a:t>
+            </a:r>
+            <a:r>
+              <a:rPr lang="en-US" dirty="0" err="1"/>
+              <a:t>kleine</a:t>
+            </a:r>
+            <a:r>
+              <a:rPr lang="en-US" dirty="0"/>
+              <a:t> </a:t>
+            </a:r>
+            <a:r>
+              <a:rPr lang="en-US" dirty="0" err="1"/>
+              <a:t>relatieve</a:t>
+            </a:r>
+            <a:r>
+              <a:rPr lang="en-US" dirty="0"/>
+              <a:t> </a:t>
+            </a:r>
+            <a:r>
+              <a:rPr lang="en-US" dirty="0" err="1"/>
+              <a:t>fout</a:t>
+            </a:r>
+            <a:r>
+              <a:rPr lang="en-US" dirty="0"/>
+              <a:t> </a:t>
+            </a:r>
+            <a:r>
+              <a:rPr lang="en-US" dirty="0" err="1"/>
+              <a:t>een</a:t>
+            </a:r>
+            <a:r>
+              <a:rPr lang="en-US" dirty="0"/>
+              <a:t> </a:t>
+            </a:r>
+            <a:r>
+              <a:rPr lang="en-US" dirty="0" err="1"/>
+              <a:t>goede</a:t>
+            </a:r>
+            <a:r>
+              <a:rPr lang="en-US" dirty="0"/>
+              <a:t> </a:t>
+            </a:r>
+            <a:r>
+              <a:rPr lang="en-US" dirty="0" err="1"/>
+              <a:t>maat</a:t>
+            </a:r>
+            <a:r>
+              <a:rPr lang="en-US" dirty="0"/>
+              <a:t> is om </a:t>
+            </a:r>
+            <a:r>
+              <a:rPr lang="en-US" dirty="0" err="1"/>
+              <a:t>een</a:t>
+            </a:r>
+            <a:r>
+              <a:rPr lang="en-US" dirty="0"/>
+              <a:t> clustering </a:t>
+            </a:r>
+            <a:r>
+              <a:rPr lang="en-US" dirty="0" err="1"/>
+              <a:t>te</a:t>
+            </a:r>
+            <a:r>
+              <a:rPr lang="en-US" dirty="0"/>
+              <a:t> </a:t>
+            </a:r>
+            <a:r>
+              <a:rPr lang="en-US" dirty="0" err="1"/>
+              <a:t>verkrijgen</a:t>
+            </a:r>
+            <a:r>
+              <a:rPr lang="en-US" dirty="0"/>
+              <a:t> </a:t>
+            </a:r>
+            <a:r>
+              <a:rPr lang="en-US" dirty="0" err="1"/>
+              <a:t>gelijkaardig</a:t>
+            </a:r>
+            <a:r>
+              <a:rPr lang="en-US" dirty="0"/>
+              <a:t> </a:t>
+            </a:r>
+            <a:r>
+              <a:rPr lang="en-US" dirty="0" err="1"/>
+              <a:t>aan</a:t>
+            </a:r>
+            <a:r>
+              <a:rPr lang="en-US" dirty="0"/>
+              <a:t> de clustering met de CP </a:t>
+            </a:r>
+            <a:r>
+              <a:rPr lang="en-US" dirty="0" err="1"/>
+              <a:t>decompositie</a:t>
+            </a:r>
+            <a:r>
+              <a:rPr lang="en-US" dirty="0"/>
+              <a:t>.</a:t>
+            </a:r>
+          </a:p>
+          <a:p>
+            <a:pPr marL="285750" indent="-285750">
+              <a:buFont typeface="Arial" panose="020B0604020202020204" pitchFamily="34" charset="0"/>
+              <a:buChar char="•"/>
+            </a:pPr>
+            <a:endParaRPr lang="en-US" dirty="0"/>
+          </a:p>
+          <a:p>
+            <a:pPr marL="285750" indent="-285750">
+              <a:buFont typeface="Arial" panose="020B0604020202020204" pitchFamily="34" charset="0"/>
+              <a:buChar char="•"/>
+            </a:pPr>
+            <a:endParaRPr lang="en-US" dirty="0"/>
+          </a:p>
+          <a:p>
+            <a:r>
+              <a:rPr lang="en-US" dirty="0"/>
+              <a:t>*de </a:t>
+            </a:r>
+            <a:r>
+              <a:rPr lang="en-US" dirty="0" err="1"/>
+              <a:t>relatieve</a:t>
+            </a:r>
+            <a:r>
+              <a:rPr lang="en-US" dirty="0"/>
+              <a:t> </a:t>
+            </a:r>
+            <a:r>
+              <a:rPr lang="en-US" dirty="0" err="1"/>
+              <a:t>fout</a:t>
+            </a:r>
+            <a:r>
+              <a:rPr lang="en-US" dirty="0"/>
+              <a:t> van </a:t>
+            </a:r>
+            <a:r>
+              <a:rPr lang="en-US" dirty="0" err="1"/>
+              <a:t>een</a:t>
+            </a:r>
+            <a:r>
+              <a:rPr lang="en-US" dirty="0"/>
+              <a:t> </a:t>
+            </a:r>
+            <a:r>
+              <a:rPr lang="en-US" dirty="0" err="1"/>
+              <a:t>decompositie</a:t>
+            </a:r>
+            <a:r>
+              <a:rPr lang="en-US" dirty="0"/>
+              <a:t> is de norm van het </a:t>
+            </a:r>
+            <a:r>
+              <a:rPr lang="en-US" dirty="0" err="1"/>
+              <a:t>residu</a:t>
+            </a:r>
+            <a:r>
+              <a:rPr lang="en-US" dirty="0"/>
+              <a:t> van die </a:t>
+            </a:r>
+            <a:r>
+              <a:rPr lang="en-US" dirty="0" err="1"/>
+              <a:t>decompositie</a:t>
+            </a:r>
+            <a:r>
+              <a:rPr lang="en-US" dirty="0"/>
+              <a:t> met de </a:t>
+            </a:r>
+            <a:r>
+              <a:rPr lang="en-US" dirty="0" err="1"/>
+              <a:t>werkelijke</a:t>
+            </a:r>
+            <a:r>
+              <a:rPr lang="en-US" dirty="0"/>
+              <a:t> tensor ten </a:t>
+            </a:r>
+            <a:r>
+              <a:rPr lang="en-US" dirty="0" err="1"/>
+              <a:t>opzichte</a:t>
+            </a:r>
+            <a:r>
+              <a:rPr lang="en-US" dirty="0"/>
+              <a:t> van de norm van de tensor.</a:t>
+            </a:r>
+          </a:p>
+        </p:txBody>
+      </p:sp>
+      <p:sp>
+        <p:nvSpPr>
+          <p:cNvPr id="57" name="TextBox 56">
+            <a:extLst>
+              <a:ext uri="{FF2B5EF4-FFF2-40B4-BE49-F238E27FC236}">
+                <a16:creationId xmlns:a16="http://schemas.microsoft.com/office/drawing/2014/main" id="{E044936A-AD09-DE4A-FBF9-318BDDECABE5}"/>
+              </a:ext>
+            </a:extLst>
+          </p:cNvPr>
+          <p:cNvSpPr txBox="1"/>
+          <p:nvPr/>
+        </p:nvSpPr>
+        <p:spPr>
+          <a:xfrm>
+            <a:off x="11044671" y="11964305"/>
+            <a:ext cx="8626017" cy="707886"/>
+          </a:xfrm>
+          <a:prstGeom prst="rect">
+            <a:avLst/>
+          </a:prstGeom>
+          <a:noFill/>
+        </p:spPr>
+        <p:txBody>
+          <a:bodyPr wrap="square">
+            <a:spAutoFit/>
+          </a:bodyPr>
+          <a:lstStyle/>
+          <a:p>
+            <a:pPr marL="0" marR="0" lvl="0" indent="0" algn="ctr" defTabSz="457200" rtl="0" eaLnBrk="1" fontAlgn="auto" latinLnBrk="0" hangingPunct="1">
+              <a:lnSpc>
+                <a:spcPct val="100000"/>
+              </a:lnSpc>
+              <a:spcBef>
+                <a:spcPts val="0"/>
+              </a:spcBef>
+              <a:spcAft>
+                <a:spcPts val="0"/>
+              </a:spcAft>
+              <a:buClrTx/>
+              <a:buSzTx/>
+              <a:buFontTx/>
+              <a:buNone/>
+              <a:tabLst/>
+              <a:defRPr/>
+            </a:pPr>
+            <a:r>
+              <a:rPr lang="en-US" sz="4000" b="1" dirty="0">
+                <a:solidFill>
+                  <a:prstClr val="black"/>
+                </a:solidFill>
+                <a:latin typeface="Georgia" panose="02040502050405020303" pitchFamily="18" charset="0"/>
+              </a:rPr>
+              <a:t>Ons </a:t>
+            </a:r>
+            <a:r>
+              <a:rPr lang="en-US" sz="4000" b="1" dirty="0" err="1">
+                <a:solidFill>
+                  <a:prstClr val="black"/>
+                </a:solidFill>
+                <a:latin typeface="Georgia" panose="02040502050405020303" pitchFamily="18" charset="0"/>
+              </a:rPr>
+              <a:t>onderzoek</a:t>
+            </a:r>
+            <a:endParaRPr kumimoji="0" lang="en-US" sz="4000" b="1" i="0" u="none" strike="noStrike" kern="1200" cap="none" spc="0" normalizeH="0" baseline="0" noProof="0" dirty="0">
+              <a:ln>
+                <a:noFill/>
+              </a:ln>
+              <a:solidFill>
+                <a:prstClr val="black"/>
+              </a:solidFill>
+              <a:effectLst/>
+              <a:uLnTx/>
+              <a:uFillTx/>
+              <a:latin typeface="Georgia" panose="02040502050405020303" pitchFamily="18" charset="0"/>
+              <a:ea typeface="+mn-ea"/>
+              <a:cs typeface="+mn-cs"/>
+            </a:endParaRPr>
+          </a:p>
+        </p:txBody>
+      </p:sp>
+      <p:sp>
+        <p:nvSpPr>
+          <p:cNvPr id="61" name="TextBox 60">
+            <a:extLst>
+              <a:ext uri="{FF2B5EF4-FFF2-40B4-BE49-F238E27FC236}">
+                <a16:creationId xmlns:a16="http://schemas.microsoft.com/office/drawing/2014/main" id="{D375DB09-6AF4-82C6-88D4-F53E1A59037D}"/>
+              </a:ext>
+            </a:extLst>
+          </p:cNvPr>
+          <p:cNvSpPr txBox="1"/>
+          <p:nvPr/>
+        </p:nvSpPr>
+        <p:spPr>
+          <a:xfrm>
+            <a:off x="20374410" y="1862042"/>
+            <a:ext cx="9521908" cy="707886"/>
+          </a:xfrm>
+          <a:prstGeom prst="rect">
+            <a:avLst/>
+          </a:prstGeom>
+          <a:noFill/>
+        </p:spPr>
+        <p:txBody>
+          <a:bodyPr wrap="square">
+            <a:spAutoFit/>
+          </a:bodyPr>
+          <a:lstStyle/>
+          <a:p>
+            <a:pPr marL="0" marR="0" lvl="0" indent="0" algn="ctr" defTabSz="457200" rtl="0" eaLnBrk="1" fontAlgn="auto" latinLnBrk="0" hangingPunct="1">
+              <a:lnSpc>
+                <a:spcPct val="100000"/>
+              </a:lnSpc>
+              <a:spcBef>
+                <a:spcPts val="0"/>
+              </a:spcBef>
+              <a:spcAft>
+                <a:spcPts val="0"/>
+              </a:spcAft>
+              <a:buClrTx/>
+              <a:buSzTx/>
+              <a:buFontTx/>
+              <a:buNone/>
+              <a:tabLst/>
+              <a:defRPr/>
+            </a:pPr>
+            <a:r>
+              <a:rPr lang="en-US" sz="4000" b="1" dirty="0" err="1">
+                <a:solidFill>
+                  <a:prstClr val="black"/>
+                </a:solidFill>
+                <a:latin typeface="Georgia" panose="02040502050405020303" pitchFamily="18" charset="0"/>
+              </a:rPr>
+              <a:t>Resultaten</a:t>
+            </a:r>
+            <a:r>
+              <a:rPr lang="en-US" sz="4000" b="1" dirty="0">
+                <a:solidFill>
+                  <a:prstClr val="black"/>
+                </a:solidFill>
+                <a:latin typeface="Georgia" panose="02040502050405020303" pitchFamily="18" charset="0"/>
+              </a:rPr>
+              <a:t>: Tensor </a:t>
+            </a:r>
+            <a:r>
+              <a:rPr lang="en-US" sz="4000" b="1" dirty="0" err="1">
+                <a:solidFill>
+                  <a:prstClr val="black"/>
+                </a:solidFill>
+                <a:latin typeface="Georgia" panose="02040502050405020303" pitchFamily="18" charset="0"/>
+              </a:rPr>
+              <a:t>Benadering</a:t>
+            </a:r>
+            <a:endParaRPr kumimoji="0" lang="en-US" sz="4000" b="1" i="0" u="none" strike="noStrike" kern="1200" cap="none" spc="0" normalizeH="0" baseline="0" noProof="0" dirty="0">
+              <a:ln>
+                <a:noFill/>
+              </a:ln>
+              <a:solidFill>
+                <a:prstClr val="black"/>
+              </a:solidFill>
+              <a:effectLst/>
+              <a:uLnTx/>
+              <a:uFillTx/>
+              <a:latin typeface="Georgia" panose="02040502050405020303" pitchFamily="18" charset="0"/>
+              <a:ea typeface="+mn-ea"/>
+              <a:cs typeface="+mn-cs"/>
+            </a:endParaRPr>
+          </a:p>
+        </p:txBody>
+      </p:sp>
+      <p:sp>
+        <p:nvSpPr>
+          <p:cNvPr id="63" name="TextBox 62">
+            <a:extLst>
+              <a:ext uri="{FF2B5EF4-FFF2-40B4-BE49-F238E27FC236}">
+                <a16:creationId xmlns:a16="http://schemas.microsoft.com/office/drawing/2014/main" id="{EACA3CEC-4554-0E00-C2A9-A963A0190011}"/>
+              </a:ext>
+            </a:extLst>
+          </p:cNvPr>
+          <p:cNvSpPr txBox="1"/>
+          <p:nvPr/>
+        </p:nvSpPr>
+        <p:spPr>
+          <a:xfrm>
+            <a:off x="20374410" y="11964305"/>
+            <a:ext cx="9521908" cy="707886"/>
+          </a:xfrm>
+          <a:prstGeom prst="rect">
+            <a:avLst/>
+          </a:prstGeom>
+          <a:noFill/>
+        </p:spPr>
+        <p:txBody>
+          <a:bodyPr wrap="square">
+            <a:spAutoFit/>
+          </a:bodyPr>
+          <a:lstStyle/>
+          <a:p>
+            <a:pPr marL="0" marR="0" lvl="0" indent="0" algn="ctr" defTabSz="457200" rtl="0" eaLnBrk="1" fontAlgn="auto" latinLnBrk="0" hangingPunct="1">
+              <a:lnSpc>
+                <a:spcPct val="100000"/>
+              </a:lnSpc>
+              <a:spcBef>
+                <a:spcPts val="0"/>
+              </a:spcBef>
+              <a:spcAft>
+                <a:spcPts val="0"/>
+              </a:spcAft>
+              <a:buClrTx/>
+              <a:buSzTx/>
+              <a:buFontTx/>
+              <a:buNone/>
+              <a:tabLst/>
+              <a:defRPr/>
+            </a:pPr>
+            <a:r>
+              <a:rPr kumimoji="0" lang="en-US" sz="4000" b="1" i="0" u="none" strike="noStrike" kern="1200" cap="none" spc="0" normalizeH="0" baseline="0" noProof="0" dirty="0" err="1">
+                <a:ln>
+                  <a:noFill/>
+                </a:ln>
+                <a:solidFill>
+                  <a:prstClr val="black"/>
+                </a:solidFill>
+                <a:effectLst/>
+                <a:uLnTx/>
+                <a:uFillTx/>
+                <a:latin typeface="Georgia" panose="02040502050405020303" pitchFamily="18" charset="0"/>
+                <a:ea typeface="+mn-ea"/>
+                <a:cs typeface="+mn-cs"/>
+              </a:rPr>
+              <a:t>Resultaten</a:t>
+            </a:r>
+            <a:r>
+              <a:rPr kumimoji="0" lang="en-US" sz="4000" b="1" i="0" u="none" strike="noStrike" kern="1200" cap="none" spc="0" normalizeH="0" baseline="0" noProof="0" dirty="0">
+                <a:ln>
+                  <a:noFill/>
+                </a:ln>
+                <a:solidFill>
+                  <a:prstClr val="black"/>
+                </a:solidFill>
+                <a:effectLst/>
+                <a:uLnTx/>
+                <a:uFillTx/>
+                <a:latin typeface="Georgia" panose="02040502050405020303" pitchFamily="18" charset="0"/>
+                <a:ea typeface="+mn-ea"/>
+                <a:cs typeface="+mn-cs"/>
+              </a:rPr>
+              <a:t>: Clustering</a:t>
+            </a:r>
+          </a:p>
+        </p:txBody>
+      </p:sp>
+      <p:sp>
+        <p:nvSpPr>
+          <p:cNvPr id="64" name="TextBox 63">
+            <a:extLst>
+              <a:ext uri="{FF2B5EF4-FFF2-40B4-BE49-F238E27FC236}">
+                <a16:creationId xmlns:a16="http://schemas.microsoft.com/office/drawing/2014/main" id="{6C2F656B-EE18-FE4D-BD0A-B7AB0C4F8997}"/>
+              </a:ext>
+            </a:extLst>
+          </p:cNvPr>
+          <p:cNvSpPr txBox="1"/>
+          <p:nvPr/>
+        </p:nvSpPr>
+        <p:spPr>
+          <a:xfrm>
+            <a:off x="11148636" y="16666386"/>
+            <a:ext cx="8604866" cy="1200329"/>
+          </a:xfrm>
+          <a:prstGeom prst="rect">
+            <a:avLst/>
+          </a:prstGeom>
+          <a:noFill/>
+        </p:spPr>
+        <p:txBody>
+          <a:bodyPr wrap="square" rtlCol="0">
+            <a:spAutoFit/>
+          </a:bodyPr>
+          <a:lstStyle/>
+          <a:p>
+            <a:r>
+              <a:rPr lang="en-US" sz="2400" b="1" dirty="0" err="1">
+                <a:latin typeface="Georgia" panose="02040502050405020303" pitchFamily="18" charset="0"/>
+              </a:rPr>
+              <a:t>Hypothese</a:t>
+            </a:r>
+            <a:r>
+              <a:rPr lang="en-US" sz="2400" b="1" dirty="0">
+                <a:latin typeface="Georgia" panose="02040502050405020303" pitchFamily="18" charset="0"/>
+              </a:rPr>
+              <a:t>: De </a:t>
+            </a:r>
+            <a:r>
+              <a:rPr lang="en-US" sz="2400" b="1" dirty="0" err="1">
+                <a:latin typeface="Georgia" panose="02040502050405020303" pitchFamily="18" charset="0"/>
+              </a:rPr>
+              <a:t>uitgebreide</a:t>
+            </a:r>
+            <a:r>
+              <a:rPr lang="en-US" sz="2400" b="1" dirty="0">
+                <a:latin typeface="Georgia" panose="02040502050405020303" pitchFamily="18" charset="0"/>
+              </a:rPr>
+              <a:t> </a:t>
+            </a:r>
+            <a:r>
+              <a:rPr lang="en-US" sz="2400" b="1" dirty="0" err="1">
+                <a:latin typeface="Georgia" panose="02040502050405020303" pitchFamily="18" charset="0"/>
+              </a:rPr>
+              <a:t>vectoren</a:t>
+            </a:r>
+            <a:r>
+              <a:rPr lang="en-US" sz="2400" b="1" dirty="0">
+                <a:latin typeface="Georgia" panose="02040502050405020303" pitchFamily="18" charset="0"/>
+              </a:rPr>
+              <a:t> </a:t>
+            </a:r>
+            <a:r>
+              <a:rPr lang="en-US" sz="2400" b="1" dirty="0" err="1">
+                <a:latin typeface="Georgia" panose="02040502050405020303" pitchFamily="18" charset="0"/>
+              </a:rPr>
+              <a:t>methode</a:t>
+            </a:r>
+            <a:r>
+              <a:rPr lang="en-US" sz="2400" b="1" dirty="0">
+                <a:latin typeface="Georgia" panose="02040502050405020303" pitchFamily="18" charset="0"/>
+              </a:rPr>
+              <a:t> </a:t>
+            </a:r>
+            <a:r>
+              <a:rPr lang="en-US" sz="2400" b="1" dirty="0" err="1">
+                <a:latin typeface="Georgia" panose="02040502050405020303" pitchFamily="18" charset="0"/>
+              </a:rPr>
+              <a:t>zal</a:t>
+            </a:r>
+            <a:r>
+              <a:rPr lang="en-US" sz="2400" b="1" dirty="0">
+                <a:latin typeface="Georgia" panose="02040502050405020303" pitchFamily="18" charset="0"/>
+              </a:rPr>
+              <a:t> </a:t>
+            </a:r>
+            <a:r>
+              <a:rPr lang="en-US" sz="2400" b="1" dirty="0" err="1">
+                <a:latin typeface="Georgia" panose="02040502050405020303" pitchFamily="18" charset="0"/>
+              </a:rPr>
+              <a:t>voor</a:t>
+            </a:r>
+            <a:r>
+              <a:rPr lang="en-US" sz="2400" b="1" dirty="0">
+                <a:latin typeface="Georgia" panose="02040502050405020303" pitchFamily="18" charset="0"/>
+              </a:rPr>
+              <a:t> </a:t>
+            </a:r>
+            <a:r>
+              <a:rPr lang="en-US" sz="2400" b="1" dirty="0" err="1">
+                <a:latin typeface="Georgia" panose="02040502050405020303" pitchFamily="18" charset="0"/>
+              </a:rPr>
+              <a:t>een</a:t>
+            </a:r>
+            <a:r>
+              <a:rPr lang="en-US" sz="2400" b="1" dirty="0">
+                <a:latin typeface="Georgia" panose="02040502050405020303" pitchFamily="18" charset="0"/>
+              </a:rPr>
+              <a:t> </a:t>
+            </a:r>
+            <a:r>
+              <a:rPr lang="en-US" sz="2400" b="1" dirty="0" err="1">
+                <a:latin typeface="Georgia" panose="02040502050405020303" pitchFamily="18" charset="0"/>
+              </a:rPr>
+              <a:t>kleinere</a:t>
+            </a:r>
+            <a:r>
+              <a:rPr lang="en-US" sz="2400" b="1" dirty="0">
+                <a:latin typeface="Georgia" panose="02040502050405020303" pitchFamily="18" charset="0"/>
+              </a:rPr>
+              <a:t> </a:t>
+            </a:r>
+            <a:r>
+              <a:rPr lang="en-US" sz="2400" b="1" dirty="0" err="1">
+                <a:latin typeface="Georgia" panose="02040502050405020303" pitchFamily="18" charset="0"/>
+              </a:rPr>
+              <a:t>relatieve</a:t>
+            </a:r>
+            <a:r>
+              <a:rPr lang="en-US" sz="2400" b="1" dirty="0">
+                <a:latin typeface="Georgia" panose="02040502050405020303" pitchFamily="18" charset="0"/>
+              </a:rPr>
+              <a:t> </a:t>
+            </a:r>
+            <a:r>
+              <a:rPr lang="en-US" sz="2400" b="1" dirty="0" err="1">
+                <a:latin typeface="Georgia" panose="02040502050405020303" pitchFamily="18" charset="0"/>
+              </a:rPr>
+              <a:t>fout</a:t>
+            </a:r>
+            <a:r>
+              <a:rPr lang="en-US" sz="2400" b="1" dirty="0">
+                <a:latin typeface="Georgia" panose="02040502050405020303" pitchFamily="18" charset="0"/>
+              </a:rPr>
+              <a:t> </a:t>
+            </a:r>
+            <a:r>
+              <a:rPr lang="en-US" sz="2400" b="1" dirty="0" err="1">
+                <a:latin typeface="Georgia" panose="02040502050405020303" pitchFamily="18" charset="0"/>
+              </a:rPr>
+              <a:t>zorgen</a:t>
+            </a:r>
+            <a:r>
+              <a:rPr lang="en-US" sz="2400" b="1" dirty="0">
+                <a:latin typeface="Georgia" panose="02040502050405020303" pitchFamily="18" charset="0"/>
+              </a:rPr>
+              <a:t> maar het </a:t>
+            </a:r>
+            <a:r>
+              <a:rPr lang="en-US" sz="2400" b="1" dirty="0" err="1">
+                <a:latin typeface="Georgia" panose="02040502050405020303" pitchFamily="18" charset="0"/>
+              </a:rPr>
+              <a:t>aantal</a:t>
+            </a:r>
+            <a:r>
+              <a:rPr lang="en-US" sz="2400" b="1" dirty="0">
+                <a:latin typeface="Georgia" panose="02040502050405020303" pitchFamily="18" charset="0"/>
+              </a:rPr>
+              <a:t> DTW </a:t>
+            </a:r>
+            <a:r>
+              <a:rPr lang="en-US" sz="2400" b="1" dirty="0" err="1">
+                <a:latin typeface="Georgia" panose="02040502050405020303" pitchFamily="18" charset="0"/>
+              </a:rPr>
+              <a:t>operaties</a:t>
+            </a:r>
+            <a:r>
+              <a:rPr lang="en-US" sz="2400" b="1" dirty="0">
+                <a:latin typeface="Georgia" panose="02040502050405020303" pitchFamily="18" charset="0"/>
+              </a:rPr>
+              <a:t> </a:t>
+            </a:r>
+            <a:r>
+              <a:rPr lang="en-US" sz="2400" b="1" dirty="0" err="1">
+                <a:latin typeface="Georgia" panose="02040502050405020303" pitchFamily="18" charset="0"/>
+              </a:rPr>
+              <a:t>laag</a:t>
+            </a:r>
+            <a:r>
+              <a:rPr lang="en-US" sz="2400" b="1" dirty="0">
+                <a:latin typeface="Georgia" panose="02040502050405020303" pitchFamily="18" charset="0"/>
+              </a:rPr>
+              <a:t> </a:t>
+            </a:r>
+            <a:r>
+              <a:rPr lang="en-US" sz="2400" b="1" dirty="0" err="1">
+                <a:latin typeface="Georgia" panose="02040502050405020303" pitchFamily="18" charset="0"/>
+              </a:rPr>
+              <a:t>houden</a:t>
+            </a:r>
+            <a:r>
+              <a:rPr lang="en-US" sz="2400" b="1" dirty="0">
+                <a:latin typeface="Georgia" panose="02040502050405020303" pitchFamily="18" charset="0"/>
+              </a:rPr>
+              <a:t>. </a:t>
+            </a:r>
+            <a:endParaRPr lang="en-US" b="1" dirty="0">
+              <a:latin typeface="Georgia" panose="02040502050405020303" pitchFamily="18" charset="0"/>
+            </a:endParaRPr>
+          </a:p>
+        </p:txBody>
+      </p:sp>
+      <p:sp>
+        <p:nvSpPr>
+          <p:cNvPr id="65" name="TextBox 64">
+            <a:extLst>
+              <a:ext uri="{FF2B5EF4-FFF2-40B4-BE49-F238E27FC236}">
+                <a16:creationId xmlns:a16="http://schemas.microsoft.com/office/drawing/2014/main" id="{425B837F-E0CE-51C2-33A6-7CA95146F82C}"/>
+              </a:ext>
+            </a:extLst>
+          </p:cNvPr>
+          <p:cNvSpPr txBox="1"/>
+          <p:nvPr/>
+        </p:nvSpPr>
+        <p:spPr>
+          <a:xfrm>
+            <a:off x="11148636" y="12934040"/>
+            <a:ext cx="8522052" cy="1846659"/>
+          </a:xfrm>
+          <a:prstGeom prst="rect">
+            <a:avLst/>
+          </a:prstGeom>
+          <a:noFill/>
+        </p:spPr>
+        <p:txBody>
+          <a:bodyPr wrap="square" rtlCol="0">
+            <a:spAutoFit/>
+          </a:bodyPr>
+          <a:lstStyle/>
+          <a:p>
+            <a:r>
+              <a:rPr lang="en-US" sz="2400" b="1" dirty="0">
+                <a:latin typeface="Georgia" panose="02040502050405020303" pitchFamily="18" charset="0"/>
+              </a:rPr>
+              <a:t>De </a:t>
+            </a:r>
+            <a:r>
+              <a:rPr lang="en-US" sz="2400" b="1" dirty="0" err="1">
+                <a:latin typeface="Georgia" panose="02040502050405020303" pitchFamily="18" charset="0"/>
+              </a:rPr>
+              <a:t>uitgebreide</a:t>
+            </a:r>
+            <a:r>
+              <a:rPr lang="en-US" sz="2400" b="1" dirty="0">
+                <a:latin typeface="Georgia" panose="02040502050405020303" pitchFamily="18" charset="0"/>
+              </a:rPr>
+              <a:t> </a:t>
+            </a:r>
+            <a:r>
+              <a:rPr lang="en-US" sz="2400" b="1" dirty="0" err="1">
+                <a:latin typeface="Georgia" panose="02040502050405020303" pitchFamily="18" charset="0"/>
+              </a:rPr>
+              <a:t>vectoren</a:t>
+            </a:r>
+            <a:r>
+              <a:rPr lang="en-US" sz="2400" b="1" dirty="0">
+                <a:latin typeface="Georgia" panose="02040502050405020303" pitchFamily="18" charset="0"/>
+              </a:rPr>
+              <a:t> </a:t>
+            </a:r>
+            <a:r>
+              <a:rPr lang="en-US" sz="2400" b="1" dirty="0" err="1">
+                <a:latin typeface="Georgia" panose="02040502050405020303" pitchFamily="18" charset="0"/>
+              </a:rPr>
+              <a:t>methode</a:t>
+            </a:r>
+            <a:endParaRPr lang="en-US" sz="2400" b="1" dirty="0">
+              <a:latin typeface="Georgia" panose="02040502050405020303" pitchFamily="18" charset="0"/>
+            </a:endParaRPr>
+          </a:p>
+          <a:p>
+            <a:pPr marL="742950" lvl="1" indent="-285750">
+              <a:buFont typeface="Arial" panose="020B0604020202020204" pitchFamily="34" charset="0"/>
+              <a:buChar char="•"/>
+            </a:pPr>
+            <a:r>
+              <a:rPr lang="en-US" dirty="0" err="1">
+                <a:latin typeface="Georgia" panose="02040502050405020303" pitchFamily="18" charset="0"/>
+              </a:rPr>
+              <a:t>Starten</a:t>
+            </a:r>
+            <a:r>
+              <a:rPr lang="en-US" dirty="0">
+                <a:latin typeface="Georgia" panose="02040502050405020303" pitchFamily="18" charset="0"/>
+              </a:rPr>
+              <a:t> </a:t>
+            </a:r>
+            <a:r>
+              <a:rPr lang="en-US" dirty="0" err="1">
+                <a:latin typeface="Georgia" panose="02040502050405020303" pitchFamily="18" charset="0"/>
+              </a:rPr>
+              <a:t>vanuit</a:t>
+            </a:r>
+            <a:r>
+              <a:rPr lang="en-US" dirty="0">
+                <a:latin typeface="Georgia" panose="02040502050405020303" pitchFamily="18" charset="0"/>
+              </a:rPr>
+              <a:t> de matrix </a:t>
+            </a:r>
+            <a:r>
+              <a:rPr lang="en-US" dirty="0" err="1">
+                <a:latin typeface="Georgia" panose="02040502050405020303" pitchFamily="18" charset="0"/>
+              </a:rPr>
+              <a:t>methode</a:t>
+            </a:r>
+            <a:endParaRPr lang="en-US" dirty="0">
+              <a:latin typeface="Georgia" panose="02040502050405020303" pitchFamily="18" charset="0"/>
+            </a:endParaRPr>
+          </a:p>
+          <a:p>
+            <a:pPr marL="742950" lvl="1" indent="-285750">
+              <a:buFont typeface="Arial" panose="020B0604020202020204" pitchFamily="34" charset="0"/>
+              <a:buChar char="•"/>
+            </a:pPr>
+            <a:r>
+              <a:rPr lang="en-US" dirty="0">
+                <a:latin typeface="Georgia" panose="02040502050405020303" pitchFamily="18" charset="0"/>
+              </a:rPr>
+              <a:t>De matrix in </a:t>
+            </a:r>
+            <a:r>
+              <a:rPr lang="en-US" dirty="0" err="1">
+                <a:latin typeface="Georgia" panose="02040502050405020303" pitchFamily="18" charset="0"/>
+              </a:rPr>
+              <a:t>elke</a:t>
+            </a:r>
+            <a:r>
+              <a:rPr lang="en-US" dirty="0">
+                <a:latin typeface="Georgia" panose="02040502050405020303" pitchFamily="18" charset="0"/>
+              </a:rPr>
+              <a:t> term </a:t>
+            </a:r>
+            <a:r>
+              <a:rPr lang="en-US" dirty="0" err="1">
+                <a:latin typeface="Georgia" panose="02040502050405020303" pitchFamily="18" charset="0"/>
+              </a:rPr>
+              <a:t>opnieuw</a:t>
+            </a:r>
+            <a:r>
+              <a:rPr lang="en-US" dirty="0">
+                <a:latin typeface="Georgia" panose="02040502050405020303" pitchFamily="18" charset="0"/>
+              </a:rPr>
+              <a:t> </a:t>
+            </a:r>
+            <a:r>
+              <a:rPr lang="en-US" dirty="0" err="1">
+                <a:latin typeface="Georgia" panose="02040502050405020303" pitchFamily="18" charset="0"/>
+              </a:rPr>
+              <a:t>benaderen</a:t>
+            </a:r>
+            <a:r>
+              <a:rPr lang="en-US" dirty="0">
+                <a:latin typeface="Georgia" panose="02040502050405020303" pitchFamily="18" charset="0"/>
+              </a:rPr>
+              <a:t> (met ACA </a:t>
+            </a:r>
+            <a:r>
+              <a:rPr lang="en-US" dirty="0" err="1">
+                <a:latin typeface="Georgia" panose="02040502050405020303" pitchFamily="18" charset="0"/>
+              </a:rPr>
+              <a:t>voor</a:t>
+            </a:r>
+            <a:r>
+              <a:rPr lang="en-US" dirty="0">
+                <a:latin typeface="Georgia" panose="02040502050405020303" pitchFamily="18" charset="0"/>
+              </a:rPr>
+              <a:t> matrices)</a:t>
+            </a:r>
+          </a:p>
+          <a:p>
+            <a:pPr marL="742950" lvl="1" indent="-285750">
+              <a:buFont typeface="Arial" panose="020B0604020202020204" pitchFamily="34" charset="0"/>
+              <a:buChar char="•"/>
+            </a:pPr>
+            <a:r>
+              <a:rPr lang="en-US" dirty="0" err="1">
+                <a:latin typeface="Georgia" panose="02040502050405020303" pitchFamily="18" charset="0"/>
+              </a:rPr>
+              <a:t>elke</a:t>
+            </a:r>
+            <a:r>
+              <a:rPr lang="en-US" dirty="0">
+                <a:latin typeface="Georgia" panose="02040502050405020303" pitchFamily="18" charset="0"/>
+              </a:rPr>
+              <a:t> term </a:t>
+            </a:r>
+            <a:r>
+              <a:rPr lang="en-US" dirty="0" err="1">
+                <a:latin typeface="Georgia" panose="02040502050405020303" pitchFamily="18" charset="0"/>
+              </a:rPr>
+              <a:t>bevat</a:t>
+            </a:r>
+            <a:r>
+              <a:rPr lang="en-US" dirty="0">
+                <a:latin typeface="Georgia" panose="02040502050405020303" pitchFamily="18" charset="0"/>
+              </a:rPr>
+              <a:t>:</a:t>
+            </a:r>
+          </a:p>
+          <a:p>
+            <a:pPr marL="1200150" lvl="2" indent="-285750">
+              <a:buFont typeface="Arial" panose="020B0604020202020204" pitchFamily="34" charset="0"/>
+              <a:buChar char="•"/>
+            </a:pPr>
+            <a:r>
+              <a:rPr lang="en-US" b="1" dirty="0">
+                <a:latin typeface="Georgia" panose="02040502050405020303" pitchFamily="18" charset="0"/>
+              </a:rPr>
+              <a:t>Tube:</a:t>
+            </a:r>
+            <a:r>
+              <a:rPr lang="en-US" dirty="0">
+                <a:latin typeface="Georgia" panose="02040502050405020303" pitchFamily="18" charset="0"/>
+              </a:rPr>
+              <a:t> </a:t>
+            </a:r>
+            <a:r>
+              <a:rPr lang="en-US" dirty="0" err="1">
+                <a:latin typeface="Georgia" panose="02040502050405020303" pitchFamily="18" charset="0"/>
+              </a:rPr>
+              <a:t>een</a:t>
+            </a:r>
+            <a:r>
+              <a:rPr lang="en-US" dirty="0">
+                <a:latin typeface="Georgia" panose="02040502050405020303" pitchFamily="18" charset="0"/>
+              </a:rPr>
+              <a:t> vector mode-3 </a:t>
+            </a:r>
+          </a:p>
+          <a:p>
+            <a:pPr marL="1200150" lvl="2" indent="-285750">
+              <a:buFont typeface="Arial" panose="020B0604020202020204" pitchFamily="34" charset="0"/>
+              <a:buChar char="•"/>
+            </a:pPr>
+            <a:r>
+              <a:rPr lang="en-US" b="1" dirty="0">
+                <a:latin typeface="Georgia" panose="02040502050405020303" pitchFamily="18" charset="0"/>
+              </a:rPr>
+              <a:t>Matrix-</a:t>
+            </a:r>
+            <a:r>
+              <a:rPr lang="en-US" b="1" dirty="0" err="1">
+                <a:latin typeface="Georgia" panose="02040502050405020303" pitchFamily="18" charset="0"/>
+              </a:rPr>
+              <a:t>decompositie</a:t>
+            </a:r>
+            <a:r>
+              <a:rPr lang="en-US" b="1" dirty="0">
+                <a:latin typeface="Georgia" panose="02040502050405020303" pitchFamily="18" charset="0"/>
+              </a:rPr>
+              <a:t>: </a:t>
+            </a:r>
+            <a:r>
+              <a:rPr lang="en-US" dirty="0" err="1">
+                <a:latin typeface="Georgia" panose="02040502050405020303" pitchFamily="18" charset="0"/>
+              </a:rPr>
+              <a:t>som</a:t>
+            </a:r>
+            <a:r>
+              <a:rPr lang="en-US" dirty="0">
+                <a:latin typeface="Georgia" panose="02040502050405020303" pitchFamily="18" charset="0"/>
+              </a:rPr>
+              <a:t> van termen met 2 </a:t>
+            </a:r>
+            <a:r>
+              <a:rPr lang="en-US" dirty="0" err="1">
+                <a:latin typeface="Georgia" panose="02040502050405020303" pitchFamily="18" charset="0"/>
+              </a:rPr>
+              <a:t>vectoren</a:t>
+            </a:r>
+            <a:r>
+              <a:rPr lang="en-US" dirty="0">
+                <a:latin typeface="Georgia" panose="02040502050405020303" pitchFamily="18" charset="0"/>
+              </a:rPr>
+              <a:t> mode-1 </a:t>
+            </a:r>
+            <a:r>
+              <a:rPr lang="en-US" dirty="0" err="1">
+                <a:latin typeface="Georgia" panose="02040502050405020303" pitchFamily="18" charset="0"/>
+              </a:rPr>
+              <a:t>en</a:t>
+            </a:r>
+            <a:r>
+              <a:rPr lang="en-US" dirty="0">
+                <a:latin typeface="Georgia" panose="02040502050405020303" pitchFamily="18" charset="0"/>
+              </a:rPr>
+              <a:t> 2</a:t>
+            </a:r>
+          </a:p>
+        </p:txBody>
+      </p:sp>
+      <p:pic>
+        <p:nvPicPr>
+          <p:cNvPr id="66" name="Graphic 65">
+            <a:extLst>
+              <a:ext uri="{FF2B5EF4-FFF2-40B4-BE49-F238E27FC236}">
+                <a16:creationId xmlns:a16="http://schemas.microsoft.com/office/drawing/2014/main" id="{9F382A2D-94FA-3B8D-C406-F25D7FDED5C9}"/>
+              </a:ext>
+            </a:extLst>
+          </p:cNvPr>
+          <p:cNvPicPr>
+            <a:picLocks noChangeAspect="1"/>
+          </p:cNvPicPr>
+          <p:nvPr/>
+        </p:nvPicPr>
+        <p:blipFill>
+          <a:blip r:embed="rId4">
+            <a:extLst>
+              <a:ext uri="{28A0092B-C50C-407E-A947-70E740481C1C}">
+                <a14:useLocalDpi xmlns:a14="http://schemas.microsoft.com/office/drawing/2010/main" val="0"/>
+              </a:ext>
+              <a:ext uri="{96DAC541-7B7A-43D3-8B79-37D633B846F1}">
+                <asvg:svgBlip xmlns:asvg="http://schemas.microsoft.com/office/drawing/2016/SVG/main" r:embed="rId5"/>
+              </a:ext>
+            </a:extLst>
+          </a:blip>
+          <a:stretch>
+            <a:fillRect/>
+          </a:stretch>
+        </p:blipFill>
+        <p:spPr>
+          <a:xfrm>
+            <a:off x="11989043" y="15100478"/>
+            <a:ext cx="6737272" cy="1243187"/>
+          </a:xfrm>
+          <a:prstGeom prst="rect">
+            <a:avLst/>
+          </a:prstGeom>
+        </p:spPr>
+      </p:pic>
     </p:spTree>
     <p:extLst>
       <p:ext uri="{BB962C8B-B14F-4D97-AF65-F5344CB8AC3E}">

</xml_diff>

<commit_message>
Poster content changed + added new graphics
</commit_message>
<xml_diff>
--- a/Poster.pptx
+++ b/Poster.pptx
@@ -3084,6 +3084,20 @@
           <a:prstGeom prst="rightArrow">
             <a:avLst/>
           </a:prstGeom>
+          <a:solidFill>
+            <a:schemeClr val="accent1">
+              <a:lumMod val="60000"/>
+              <a:lumOff val="40000"/>
+            </a:schemeClr>
+          </a:solidFill>
+          <a:ln>
+            <a:solidFill>
+              <a:schemeClr val="accent1">
+                <a:lumMod val="60000"/>
+                <a:lumOff val="40000"/>
+              </a:schemeClr>
+            </a:solidFill>
+          </a:ln>
         </p:spPr>
         <p:style>
           <a:lnRef idx="1">
@@ -3123,7 +3137,7 @@
         <p:spPr>
           <a:xfrm>
             <a:off x="545672" y="352425"/>
-            <a:ext cx="445110" cy="20486077"/>
+            <a:ext cx="445110" cy="20541615"/>
           </a:xfrm>
           <a:prstGeom prst="upArrow">
             <a:avLst>
@@ -3131,6 +3145,20 @@
               <a:gd name="adj2" fmla="val 75000"/>
             </a:avLst>
           </a:prstGeom>
+          <a:solidFill>
+            <a:schemeClr val="accent1">
+              <a:lumMod val="60000"/>
+              <a:lumOff val="40000"/>
+            </a:schemeClr>
+          </a:solidFill>
+          <a:ln>
+            <a:solidFill>
+              <a:schemeClr val="accent1">
+                <a:lumMod val="60000"/>
+                <a:lumOff val="40000"/>
+              </a:schemeClr>
+            </a:solidFill>
+          </a:ln>
         </p:spPr>
         <p:style>
           <a:lnRef idx="1">
@@ -3169,12 +3197,26 @@
         </p:nvSpPr>
         <p:spPr>
           <a:xfrm>
-            <a:off x="28917626" y="20151864"/>
+            <a:off x="28883812" y="20219341"/>
             <a:ext cx="978692" cy="1078593"/>
           </a:xfrm>
           <a:prstGeom prst="chevron">
             <a:avLst/>
           </a:prstGeom>
+          <a:solidFill>
+            <a:schemeClr val="accent1">
+              <a:lumMod val="60000"/>
+              <a:lumOff val="40000"/>
+            </a:schemeClr>
+          </a:solidFill>
+          <a:ln>
+            <a:solidFill>
+              <a:schemeClr val="accent1">
+                <a:lumMod val="60000"/>
+                <a:lumOff val="40000"/>
+              </a:schemeClr>
+            </a:solidFill>
+          </a:ln>
         </p:spPr>
         <p:style>
           <a:lnRef idx="1">
@@ -3223,6 +3265,20 @@
           <a:prstGeom prst="chevron">
             <a:avLst/>
           </a:prstGeom>
+          <a:solidFill>
+            <a:schemeClr val="accent1">
+              <a:lumMod val="60000"/>
+              <a:lumOff val="40000"/>
+            </a:schemeClr>
+          </a:solidFill>
+          <a:ln>
+            <a:solidFill>
+              <a:schemeClr val="accent1">
+                <a:lumMod val="60000"/>
+                <a:lumOff val="40000"/>
+              </a:schemeClr>
+            </a:solidFill>
+          </a:ln>
         </p:spPr>
         <p:style>
           <a:lnRef idx="1">
@@ -3243,7 +3299,7 @@
           <a:lstStyle/>
           <a:p>
             <a:pPr algn="ctr"/>
-            <a:endParaRPr lang="LID4096">
+            <a:endParaRPr lang="LID4096" dirty="0">
               <a:solidFill>
                 <a:schemeClr val="tx1"/>
               </a:solidFill>
@@ -4219,7 +4275,7 @@
             </a:r>
             <a:r>
               <a:rPr lang="en-US" dirty="0"/>
-              <a:t>elk element </a:t>
+              <a:t>elk element is </a:t>
             </a:r>
             <a:r>
               <a:rPr lang="en-US" dirty="0" err="1"/>
@@ -4254,8 +4310,14 @@
           <a:p>
             <a:pPr lvl="2"/>
             <a:r>
+              <a:rPr lang="en-US" dirty="0">
+                <a:latin typeface="Georgia Pro Cond Semibold" panose="02040706050405020303" pitchFamily="18" charset="0"/>
+              </a:rPr>
+              <a:t>→</a:t>
+            </a:r>
+            <a:r>
               <a:rPr lang="en-US" dirty="0"/>
-              <a:t>=&gt; </a:t>
+              <a:t> </a:t>
             </a:r>
             <a:r>
               <a:rPr lang="en-US" dirty="0" err="1"/>
@@ -4395,22 +4457,16 @@
               <a:buChar char="•"/>
             </a:pPr>
             <a:r>
-              <a:rPr lang="en-US" dirty="0" err="1">
-                <a:latin typeface="Georgia" panose="02040502050405020303" pitchFamily="18" charset="0"/>
-              </a:rPr>
-              <a:t>Opdelen</a:t>
-            </a:r>
-            <a:r>
-              <a:rPr lang="en-US" dirty="0">
-                <a:latin typeface="Georgia" panose="02040502050405020303" pitchFamily="18" charset="0"/>
-              </a:rPr>
-              <a:t> van de tensor in </a:t>
-            </a:r>
-            <a:r>
-              <a:rPr lang="en-US" dirty="0" err="1">
-                <a:latin typeface="Georgia" panose="02040502050405020303" pitchFamily="18" charset="0"/>
-              </a:rPr>
-              <a:t>een</a:t>
+              <a:rPr lang="en-US" dirty="0">
+                <a:latin typeface="Georgia" panose="02040502050405020303" pitchFamily="18" charset="0"/>
+              </a:rPr>
+              <a:t>Som van </a:t>
+            </a:r>
+            <a:r>
+              <a:rPr lang="en-US" dirty="0" err="1">
+                <a:latin typeface="Georgia" panose="02040502050405020303" pitchFamily="18" charset="0"/>
+              </a:rPr>
+              <a:t>uitwendige</a:t>
             </a:r>
             <a:r>
               <a:rPr lang="en-US" dirty="0">
@@ -4422,7 +4478,7 @@
               <a:rPr lang="en-US" dirty="0" err="1">
                 <a:latin typeface="Georgia" panose="02040502050405020303" pitchFamily="18" charset="0"/>
               </a:rPr>
-              <a:t>som</a:t>
+              <a:t>producten</a:t>
             </a:r>
             <a:r>
               <a:rPr lang="en-US" dirty="0">
@@ -4529,180 +4585,130 @@
             </a:endParaRPr>
           </a:p>
           <a:p>
-            <a:pPr marL="285750" indent="-285750">
-              <a:buFont typeface="Arial" panose="020B0604020202020204" pitchFamily="34" charset="0"/>
-              <a:buChar char="•"/>
-            </a:pPr>
-            <a:r>
-              <a:rPr lang="en-US" dirty="0">
-                <a:latin typeface="Georgia" panose="02040502050405020303" pitchFamily="18" charset="0"/>
-              </a:rPr>
-              <a:t>Som van </a:t>
-            </a:r>
-            <a:r>
-              <a:rPr lang="en-US" dirty="0" err="1">
-                <a:latin typeface="Georgia" panose="02040502050405020303" pitchFamily="18" charset="0"/>
-              </a:rPr>
-              <a:t>een</a:t>
-            </a:r>
-            <a:r>
-              <a:rPr lang="en-US" dirty="0">
-                <a:latin typeface="Georgia" panose="02040502050405020303" pitchFamily="18" charset="0"/>
-              </a:rPr>
-              <a:t> </a:t>
-            </a:r>
-            <a:r>
-              <a:rPr lang="en-US" dirty="0" err="1">
-                <a:latin typeface="Georgia" panose="02040502050405020303" pitchFamily="18" charset="0"/>
-              </a:rPr>
-              <a:t>uitwendig</a:t>
-            </a:r>
-            <a:r>
-              <a:rPr lang="en-US" dirty="0">
-                <a:latin typeface="Georgia" panose="02040502050405020303" pitchFamily="18" charset="0"/>
-              </a:rPr>
-              <a:t> product van matrices/</a:t>
-            </a:r>
-            <a:r>
-              <a:rPr lang="en-US" dirty="0" err="1">
-                <a:latin typeface="Georgia" panose="02040502050405020303" pitchFamily="18" charset="0"/>
-              </a:rPr>
-              <a:t>vectoren</a:t>
-            </a:r>
-            <a:endParaRPr lang="en-US" dirty="0">
-              <a:latin typeface="Georgia" panose="02040502050405020303" pitchFamily="18" charset="0"/>
-            </a:endParaRPr>
-          </a:p>
-          <a:p>
-            <a:pPr marL="285750" indent="-285750">
-              <a:buFont typeface="Arial" panose="020B0604020202020204" pitchFamily="34" charset="0"/>
-              <a:buChar char="•"/>
-            </a:pPr>
-            <a:r>
-              <a:rPr lang="en-US" b="1" dirty="0" err="1">
-                <a:latin typeface="Georgia" panose="02040502050405020303" pitchFamily="18" charset="0"/>
-              </a:rPr>
-              <a:t>Adaptief</a:t>
-            </a:r>
-            <a:r>
-              <a:rPr lang="en-US" b="1" dirty="0">
-                <a:latin typeface="Georgia" panose="02040502050405020303" pitchFamily="18" charset="0"/>
-              </a:rPr>
-              <a:t> = </a:t>
-            </a:r>
-            <a:r>
-              <a:rPr lang="en-US" dirty="0" err="1">
-                <a:latin typeface="Georgia" panose="02040502050405020303" pitchFamily="18" charset="0"/>
-              </a:rPr>
-              <a:t>Gericht</a:t>
-            </a:r>
-            <a:r>
-              <a:rPr lang="en-US" dirty="0">
-                <a:latin typeface="Georgia" panose="02040502050405020303" pitchFamily="18" charset="0"/>
-              </a:rPr>
-              <a:t> </a:t>
-            </a:r>
-            <a:r>
-              <a:rPr lang="en-US" dirty="0" err="1">
-                <a:latin typeface="Georgia" panose="02040502050405020303" pitchFamily="18" charset="0"/>
-              </a:rPr>
-              <a:t>vectoren</a:t>
-            </a:r>
-            <a:r>
-              <a:rPr lang="en-US" dirty="0">
-                <a:latin typeface="Georgia" panose="02040502050405020303" pitchFamily="18" charset="0"/>
-              </a:rPr>
-              <a:t> in Tensor </a:t>
-            </a:r>
-            <a:r>
-              <a:rPr lang="en-US" dirty="0" err="1">
-                <a:latin typeface="Georgia" panose="02040502050405020303" pitchFamily="18" charset="0"/>
-              </a:rPr>
-              <a:t>kiezen</a:t>
-            </a:r>
-            <a:endParaRPr lang="en-US" dirty="0">
-              <a:latin typeface="Georgia" panose="02040502050405020303" pitchFamily="18" charset="0"/>
-            </a:endParaRPr>
-          </a:p>
-          <a:p>
-            <a:pPr marL="285750" indent="-285750">
-              <a:buFont typeface="Arial" panose="020B0604020202020204" pitchFamily="34" charset="0"/>
-              <a:buChar char="•"/>
-            </a:pPr>
-            <a:r>
-              <a:rPr lang="en-US" dirty="0">
-                <a:latin typeface="Georgia" panose="02040502050405020303" pitchFamily="18" charset="0"/>
-              </a:rPr>
-              <a:t>‘Klein’ </a:t>
-            </a:r>
-            <a:r>
-              <a:rPr lang="en-US" dirty="0" err="1">
-                <a:latin typeface="Georgia" panose="02040502050405020303" pitchFamily="18" charset="0"/>
-              </a:rPr>
-              <a:t>deel</a:t>
-            </a:r>
-            <a:r>
-              <a:rPr lang="en-US" dirty="0">
-                <a:latin typeface="Georgia" panose="02040502050405020303" pitchFamily="18" charset="0"/>
-              </a:rPr>
-              <a:t> van de tensor </a:t>
-            </a:r>
-            <a:r>
-              <a:rPr lang="en-US" dirty="0" err="1">
-                <a:latin typeface="Georgia" panose="02040502050405020303" pitchFamily="18" charset="0"/>
-              </a:rPr>
-              <a:t>nodig</a:t>
-            </a:r>
-            <a:endParaRPr lang="en-US" dirty="0">
-              <a:latin typeface="Georgia" panose="02040502050405020303" pitchFamily="18" charset="0"/>
-            </a:endParaRPr>
-          </a:p>
-          <a:p>
-            <a:endParaRPr lang="en-US" dirty="0">
-              <a:latin typeface="Georgia" panose="02040502050405020303" pitchFamily="18" charset="0"/>
-            </a:endParaRPr>
-          </a:p>
-          <a:p>
-            <a:r>
-              <a:rPr lang="en-US" sz="2000" b="1" dirty="0">
-                <a:latin typeface="Georgia" panose="02040502050405020303" pitchFamily="18" charset="0"/>
-              </a:rPr>
-              <a:t>Matrix </a:t>
-            </a:r>
-            <a:r>
-              <a:rPr lang="en-US" sz="2000" b="1" dirty="0" err="1">
-                <a:latin typeface="Georgia" panose="02040502050405020303" pitchFamily="18" charset="0"/>
-              </a:rPr>
-              <a:t>Methode</a:t>
-            </a:r>
-            <a:r>
-              <a:rPr lang="en-US" sz="2000" b="1" dirty="0">
-                <a:latin typeface="Georgia" panose="02040502050405020303" pitchFamily="18" charset="0"/>
-              </a:rPr>
-              <a:t>: </a:t>
-            </a:r>
-          </a:p>
-          <a:p>
             <a:pPr marL="742950" lvl="1" indent="-285750">
               <a:buFont typeface="Arial" panose="020B0604020202020204" pitchFamily="34" charset="0"/>
               <a:buChar char="•"/>
             </a:pPr>
             <a:r>
-              <a:rPr lang="en-US" dirty="0" err="1">
-                <a:latin typeface="Georgia" panose="02040502050405020303" pitchFamily="18" charset="0"/>
-              </a:rPr>
-              <a:t>Kostelijk</a:t>
+              <a:rPr lang="en-US" dirty="0">
+                <a:latin typeface="Georgia" panose="02040502050405020303" pitchFamily="18" charset="0"/>
+              </a:rPr>
+              <a:t>Som van </a:t>
+            </a:r>
+            <a:r>
+              <a:rPr lang="en-US" dirty="0" err="1">
+                <a:latin typeface="Georgia" panose="02040502050405020303" pitchFamily="18" charset="0"/>
+              </a:rPr>
+              <a:t>uitwendige</a:t>
+            </a:r>
+            <a:r>
+              <a:rPr lang="en-US" dirty="0">
+                <a:latin typeface="Georgia" panose="02040502050405020303" pitchFamily="18" charset="0"/>
+              </a:rPr>
+              <a:t> </a:t>
+            </a:r>
+            <a:r>
+              <a:rPr lang="en-US" dirty="0" err="1">
+                <a:latin typeface="Georgia" panose="02040502050405020303" pitchFamily="18" charset="0"/>
+              </a:rPr>
+              <a:t>producten</a:t>
+            </a:r>
+            <a:r>
+              <a:rPr lang="en-US" dirty="0">
+                <a:latin typeface="Georgia" panose="02040502050405020303" pitchFamily="18" charset="0"/>
+              </a:rPr>
+              <a:t> van matrices/</a:t>
+            </a:r>
+            <a:r>
+              <a:rPr lang="en-US" dirty="0" err="1">
+                <a:latin typeface="Georgia" panose="02040502050405020303" pitchFamily="18" charset="0"/>
+              </a:rPr>
+              <a:t>vectoren</a:t>
             </a:r>
             <a:endParaRPr lang="en-US" dirty="0">
               <a:latin typeface="Georgia" panose="02040502050405020303" pitchFamily="18" charset="0"/>
             </a:endParaRPr>
           </a:p>
           <a:p>
+            <a:pPr marL="742950" lvl="1" indent="-285750">
+              <a:buFont typeface="Arial" panose="020B0604020202020204" pitchFamily="34" charset="0"/>
+              <a:buChar char="•"/>
+            </a:pPr>
+            <a:r>
+              <a:rPr lang="en-US" b="1" dirty="0" err="1">
+                <a:latin typeface="Georgia" panose="02040502050405020303" pitchFamily="18" charset="0"/>
+              </a:rPr>
+              <a:t>Adaptief</a:t>
+            </a:r>
+            <a:r>
+              <a:rPr lang="en-US" b="1" dirty="0">
+                <a:latin typeface="Georgia" panose="02040502050405020303" pitchFamily="18" charset="0"/>
+              </a:rPr>
+              <a:t> = </a:t>
+            </a:r>
+            <a:r>
+              <a:rPr lang="en-US" dirty="0" err="1">
+                <a:latin typeface="Georgia" panose="02040502050405020303" pitchFamily="18" charset="0"/>
+              </a:rPr>
+              <a:t>Gericht</a:t>
+            </a:r>
+            <a:r>
+              <a:rPr lang="en-US" dirty="0">
+                <a:latin typeface="Georgia" panose="02040502050405020303" pitchFamily="18" charset="0"/>
+              </a:rPr>
+              <a:t> </a:t>
+            </a:r>
+            <a:r>
+              <a:rPr lang="en-US" dirty="0" err="1">
+                <a:latin typeface="Georgia" panose="02040502050405020303" pitchFamily="18" charset="0"/>
+              </a:rPr>
+              <a:t>vectoren</a:t>
+            </a:r>
+            <a:r>
+              <a:rPr lang="en-US" dirty="0">
+                <a:latin typeface="Georgia" panose="02040502050405020303" pitchFamily="18" charset="0"/>
+              </a:rPr>
+              <a:t> in Tensor </a:t>
+            </a:r>
+            <a:r>
+              <a:rPr lang="en-US" dirty="0" err="1">
+                <a:latin typeface="Georgia" panose="02040502050405020303" pitchFamily="18" charset="0"/>
+              </a:rPr>
+              <a:t>kiezen</a:t>
+            </a:r>
             <a:endParaRPr lang="en-US" dirty="0">
               <a:latin typeface="Georgia" panose="02040502050405020303" pitchFamily="18" charset="0"/>
             </a:endParaRPr>
           </a:p>
           <a:p>
+            <a:pPr marL="742950" lvl="1" indent="-285750">
+              <a:buFont typeface="Arial" panose="020B0604020202020204" pitchFamily="34" charset="0"/>
+              <a:buChar char="•"/>
+            </a:pPr>
+            <a:r>
+              <a:rPr lang="en-US" dirty="0">
+                <a:latin typeface="Georgia" panose="02040502050405020303" pitchFamily="18" charset="0"/>
+              </a:rPr>
+              <a:t>‘Klein’ </a:t>
+            </a:r>
+            <a:r>
+              <a:rPr lang="en-US" dirty="0" err="1">
+                <a:latin typeface="Georgia" panose="02040502050405020303" pitchFamily="18" charset="0"/>
+              </a:rPr>
+              <a:t>deel</a:t>
+            </a:r>
+            <a:r>
+              <a:rPr lang="en-US" dirty="0">
+                <a:latin typeface="Georgia" panose="02040502050405020303" pitchFamily="18" charset="0"/>
+              </a:rPr>
+              <a:t> van de tensor </a:t>
+            </a:r>
+            <a:r>
+              <a:rPr lang="en-US" dirty="0" err="1">
+                <a:latin typeface="Georgia" panose="02040502050405020303" pitchFamily="18" charset="0"/>
+              </a:rPr>
+              <a:t>nodig</a:t>
+            </a:r>
             <a:endParaRPr lang="en-US" dirty="0">
               <a:latin typeface="Georgia" panose="02040502050405020303" pitchFamily="18" charset="0"/>
             </a:endParaRPr>
@@ -4713,11 +4719,61 @@
             </a:endParaRPr>
           </a:p>
           <a:p>
+            <a:r>
+              <a:rPr lang="en-US" sz="2000" b="1" dirty="0">
+                <a:latin typeface="Georgia" panose="02040502050405020303" pitchFamily="18" charset="0"/>
+              </a:rPr>
+              <a:t>Matrix </a:t>
+            </a:r>
+            <a:r>
+              <a:rPr lang="en-US" sz="2000" b="1" dirty="0" err="1">
+                <a:latin typeface="Georgia" panose="02040502050405020303" pitchFamily="18" charset="0"/>
+              </a:rPr>
+              <a:t>Methode</a:t>
+            </a:r>
+            <a:r>
+              <a:rPr lang="en-US" sz="2000" b="1" dirty="0">
+                <a:latin typeface="Georgia" panose="02040502050405020303" pitchFamily="18" charset="0"/>
+              </a:rPr>
+              <a:t> (Matrix ACA-T): </a:t>
+            </a:r>
+          </a:p>
+          <a:p>
+            <a:pPr marL="742950" lvl="1" indent="-285750">
+              <a:buFont typeface="Arial" panose="020B0604020202020204" pitchFamily="34" charset="0"/>
+              <a:buChar char="•"/>
+            </a:pPr>
+            <a:r>
+              <a:rPr lang="en-US" dirty="0" err="1">
+                <a:latin typeface="Georgia" panose="02040502050405020303" pitchFamily="18" charset="0"/>
+              </a:rPr>
+              <a:t>Kostelijk</a:t>
+            </a:r>
             <a:endParaRPr lang="en-US" dirty="0">
               <a:latin typeface="Georgia" panose="02040502050405020303" pitchFamily="18" charset="0"/>
             </a:endParaRPr>
           </a:p>
           <a:p>
+            <a:endParaRPr lang="en-US" dirty="0">
+              <a:latin typeface="Georgia" panose="02040502050405020303" pitchFamily="18" charset="0"/>
+            </a:endParaRPr>
+          </a:p>
+          <a:p>
+            <a:endParaRPr lang="en-US" dirty="0">
+              <a:latin typeface="Georgia" panose="02040502050405020303" pitchFamily="18" charset="0"/>
+            </a:endParaRPr>
+          </a:p>
+          <a:p>
+            <a:endParaRPr lang="en-US" dirty="0">
+              <a:latin typeface="Georgia" panose="02040502050405020303" pitchFamily="18" charset="0"/>
+            </a:endParaRPr>
+          </a:p>
+          <a:p>
+            <a:endParaRPr lang="en-US" dirty="0">
+              <a:latin typeface="Georgia" panose="02040502050405020303" pitchFamily="18" charset="0"/>
+            </a:endParaRPr>
+          </a:p>
+          <a:p>
             <a:r>
               <a:rPr lang="en-US" sz="2000" b="1" dirty="0" err="1">
                 <a:latin typeface="Georgia" panose="02040502050405020303" pitchFamily="18" charset="0"/>
@@ -4740,7 +4796,7 @@
               <a:rPr lang="en-US" sz="2000" b="1" dirty="0">
                 <a:latin typeface="Georgia" panose="02040502050405020303" pitchFamily="18" charset="0"/>
               </a:rPr>
-              <a:t>: </a:t>
+              <a:t> (Vector ACA-T type 1): </a:t>
             </a:r>
           </a:p>
           <a:p>
@@ -4854,7 +4910,7 @@
         </p:blipFill>
         <p:spPr>
           <a:xfrm>
-            <a:off x="13006245" y="6289198"/>
+            <a:off x="13006245" y="6365849"/>
             <a:ext cx="6737272" cy="1273509"/>
           </a:xfrm>
           <a:prstGeom prst="rect">
@@ -4923,8 +4979,8 @@
         </p:nvSpPr>
         <p:spPr>
           <a:xfrm>
-            <a:off x="1115852" y="12934040"/>
-            <a:ext cx="9267409" cy="7386638"/>
+            <a:off x="1104100" y="12674892"/>
+            <a:ext cx="9267409" cy="3323987"/>
           </a:xfrm>
           <a:prstGeom prst="rect">
             <a:avLst/>
@@ -5019,7 +5075,19 @@
               <a:rPr lang="en-US" dirty="0" err="1">
                 <a:latin typeface="Georgia" panose="02040502050405020303" pitchFamily="18" charset="0"/>
               </a:rPr>
-              <a:t>een</a:t>
+              <a:t>benadert</a:t>
+            </a:r>
+            <a:r>
+              <a:rPr lang="en-US" dirty="0">
+                <a:latin typeface="Georgia" panose="02040502050405020303" pitchFamily="18" charset="0"/>
+              </a:rPr>
+              <a:t> tensor </a:t>
+            </a:r>
+            <a:r>
+              <a:rPr lang="en-US" dirty="0" err="1">
+                <a:latin typeface="Georgia" panose="02040502050405020303" pitchFamily="18" charset="0"/>
+              </a:rPr>
+              <a:t>zeer</a:t>
             </a:r>
             <a:r>
               <a:rPr lang="en-US" dirty="0">
@@ -5031,31 +5099,7 @@
               <a:rPr lang="en-US" dirty="0" err="1">
                 <a:latin typeface="Georgia" panose="02040502050405020303" pitchFamily="18" charset="0"/>
               </a:rPr>
-              <a:t>zeer</a:t>
-            </a:r>
-            <a:r>
-              <a:rPr lang="en-US" dirty="0">
-                <a:latin typeface="Georgia" panose="02040502050405020303" pitchFamily="18" charset="0"/>
-              </a:rPr>
-              <a:t> </a:t>
-            </a:r>
-            <a:r>
-              <a:rPr lang="en-US" dirty="0" err="1">
-                <a:latin typeface="Georgia" panose="02040502050405020303" pitchFamily="18" charset="0"/>
-              </a:rPr>
-              <a:t>goede</a:t>
-            </a:r>
-            <a:r>
-              <a:rPr lang="en-US" dirty="0">
-                <a:latin typeface="Georgia" panose="02040502050405020303" pitchFamily="18" charset="0"/>
-              </a:rPr>
-              <a:t> </a:t>
-            </a:r>
-            <a:r>
-              <a:rPr lang="en-US" dirty="0" err="1">
-                <a:latin typeface="Georgia" panose="02040502050405020303" pitchFamily="18" charset="0"/>
-              </a:rPr>
-              <a:t>decompositie</a:t>
+              <a:t>goed</a:t>
             </a:r>
             <a:endParaRPr lang="en-US" dirty="0">
               <a:latin typeface="Georgia" panose="02040502050405020303" pitchFamily="18" charset="0"/>
@@ -5094,55 +5138,19 @@
               <a:rPr lang="en-US" dirty="0" err="1">
                 <a:latin typeface="Georgia" panose="02040502050405020303" pitchFamily="18" charset="0"/>
               </a:rPr>
-              <a:t>een</a:t>
-            </a:r>
-            <a:r>
-              <a:rPr lang="en-US" dirty="0">
-                <a:latin typeface="Georgia" panose="02040502050405020303" pitchFamily="18" charset="0"/>
-              </a:rPr>
-              <a:t> </a:t>
-            </a:r>
-            <a:r>
-              <a:rPr lang="en-US" dirty="0" err="1">
-                <a:latin typeface="Georgia" panose="02040502050405020303" pitchFamily="18" charset="0"/>
-              </a:rPr>
-              <a:t>uitbreiding</a:t>
-            </a:r>
-            <a:r>
-              <a:rPr lang="en-US" dirty="0">
-                <a:latin typeface="Georgia" panose="02040502050405020303" pitchFamily="18" charset="0"/>
-              </a:rPr>
-              <a:t> van ACA </a:t>
-            </a:r>
-            <a:r>
-              <a:rPr lang="en-US" dirty="0" err="1">
-                <a:latin typeface="Georgia" panose="02040502050405020303" pitchFamily="18" charset="0"/>
-              </a:rPr>
-              <a:t>voor</a:t>
-            </a:r>
-            <a:r>
-              <a:rPr lang="en-US" dirty="0">
-                <a:latin typeface="Georgia" panose="02040502050405020303" pitchFamily="18" charset="0"/>
-              </a:rPr>
-              <a:t> matrices </a:t>
-            </a:r>
-            <a:r>
-              <a:rPr lang="en-US" dirty="0" err="1">
-                <a:latin typeface="Georgia" panose="02040502050405020303" pitchFamily="18" charset="0"/>
-              </a:rPr>
-              <a:t>naar</a:t>
-            </a:r>
-            <a:r>
-              <a:rPr lang="en-US" dirty="0">
-                <a:latin typeface="Georgia" panose="02040502050405020303" pitchFamily="18" charset="0"/>
-              </a:rPr>
-              <a:t> </a:t>
-            </a:r>
-            <a:r>
-              <a:rPr lang="en-US" dirty="0" err="1">
-                <a:latin typeface="Georgia" panose="02040502050405020303" pitchFamily="18" charset="0"/>
-              </a:rPr>
-              <a:t>tensoren</a:t>
+              <a:t>steunen</a:t>
+            </a:r>
+            <a:r>
+              <a:rPr lang="en-US" dirty="0">
+                <a:latin typeface="Georgia" panose="02040502050405020303" pitchFamily="18" charset="0"/>
+              </a:rPr>
+              <a:t> op ACA </a:t>
+            </a:r>
+            <a:r>
+              <a:rPr lang="en-US" dirty="0" err="1">
+                <a:latin typeface="Georgia" panose="02040502050405020303" pitchFamily="18" charset="0"/>
+              </a:rPr>
+              <a:t>algoritme</a:t>
             </a:r>
             <a:endParaRPr lang="en-US" dirty="0">
               <a:latin typeface="Georgia" panose="02040502050405020303" pitchFamily="18" charset="0"/>
@@ -5318,34 +5326,40 @@
           </a:p>
           <a:p>
             <a:r>
+              <a:rPr lang="en-US" sz="2400" b="1" dirty="0">
+                <a:latin typeface="Georgia" panose="02040502050405020303" pitchFamily="18" charset="0"/>
+              </a:rPr>
+              <a:t>DTW </a:t>
+            </a:r>
+            <a:r>
               <a:rPr lang="en-US" sz="2400" b="1" dirty="0" err="1">
                 <a:latin typeface="Georgia" panose="02040502050405020303" pitchFamily="18" charset="0"/>
               </a:rPr>
-              <a:t>Verhouding</a:t>
+              <a:t>operaties</a:t>
             </a:r>
             <a:r>
               <a:rPr lang="en-US" sz="2400" b="1" dirty="0">
                 <a:latin typeface="Georgia" panose="02040502050405020303" pitchFamily="18" charset="0"/>
               </a:rPr>
-              <a:t> van DTW </a:t>
+              <a:t> van </a:t>
             </a:r>
             <a:r>
               <a:rPr lang="en-US" sz="2400" b="1" dirty="0" err="1">
                 <a:latin typeface="Georgia" panose="02040502050405020303" pitchFamily="18" charset="0"/>
               </a:rPr>
-              <a:t>operaties</a:t>
+              <a:t>decompositie</a:t>
             </a:r>
             <a:r>
               <a:rPr lang="en-US" sz="2400" b="1" dirty="0">
                 <a:latin typeface="Georgia" panose="02040502050405020303" pitchFamily="18" charset="0"/>
               </a:rPr>
-              <a:t> met </a:t>
+              <a:t> </a:t>
             </a:r>
             <a:r>
               <a:rPr lang="en-US" sz="2400" b="1" dirty="0" err="1">
                 <a:latin typeface="Georgia" panose="02040502050405020303" pitchFamily="18" charset="0"/>
               </a:rPr>
-              <a:t>relatieve</a:t>
+              <a:t>laag</a:t>
             </a:r>
             <a:r>
               <a:rPr lang="en-US" sz="2400" b="1" dirty="0">
@@ -5357,697 +5371,17 @@
               <a:rPr lang="en-US" sz="2400" b="1" dirty="0" err="1">
                 <a:latin typeface="Georgia" panose="02040502050405020303" pitchFamily="18" charset="0"/>
               </a:rPr>
-              <a:t>fout</a:t>
+              <a:t>houden</a:t>
             </a:r>
             <a:r>
               <a:rPr lang="en-US" sz="2400" b="1" dirty="0">
                 <a:latin typeface="Georgia" panose="02040502050405020303" pitchFamily="18" charset="0"/>
               </a:rPr>
-              <a:t>*</a:t>
-            </a:r>
-          </a:p>
-          <a:p>
-            <a:pPr marL="285750" indent="-285750">
-              <a:buFont typeface="Arial" panose="020B0604020202020204" pitchFamily="34" charset="0"/>
-              <a:buChar char="•"/>
-            </a:pPr>
-            <a:r>
-              <a:rPr lang="en-US" dirty="0" err="1">
-                <a:latin typeface="Georgia" panose="02040502050405020303" pitchFamily="18" charset="0"/>
-              </a:rPr>
-              <a:t>Decomposities</a:t>
-            </a:r>
-            <a:r>
-              <a:rPr lang="en-US" dirty="0">
-                <a:latin typeface="Georgia" panose="02040502050405020303" pitchFamily="18" charset="0"/>
-              </a:rPr>
               <a:t> </a:t>
-            </a:r>
-            <a:r>
-              <a:rPr lang="en-US" dirty="0" err="1">
-                <a:latin typeface="Georgia" panose="02040502050405020303" pitchFamily="18" charset="0"/>
-              </a:rPr>
-              <a:t>berekenen</a:t>
             </a:r>
             <a:endParaRPr lang="en-US" dirty="0">
               <a:latin typeface="Georgia" panose="02040502050405020303" pitchFamily="18" charset="0"/>
             </a:endParaRPr>
-          </a:p>
-          <a:p>
-            <a:pPr marL="800100" lvl="1" indent="-342900">
-              <a:buFont typeface="Arial" panose="020B0604020202020204" pitchFamily="34" charset="0"/>
-              <a:buChar char="•"/>
-            </a:pPr>
-            <a:r>
-              <a:rPr lang="en-US" dirty="0">
-                <a:latin typeface="Georgia" panose="02040502050405020303" pitchFamily="18" charset="0"/>
-              </a:rPr>
-              <a:t>Het </a:t>
-            </a:r>
-            <a:r>
-              <a:rPr lang="en-US" dirty="0" err="1">
-                <a:latin typeface="Georgia" panose="02040502050405020303" pitchFamily="18" charset="0"/>
-              </a:rPr>
-              <a:t>aantal</a:t>
-            </a:r>
-            <a:r>
-              <a:rPr lang="en-US" dirty="0">
-                <a:latin typeface="Georgia" panose="02040502050405020303" pitchFamily="18" charset="0"/>
-              </a:rPr>
-              <a:t> DTW </a:t>
-            </a:r>
-            <a:r>
-              <a:rPr lang="en-US" dirty="0" err="1">
-                <a:latin typeface="Georgia" panose="02040502050405020303" pitchFamily="18" charset="0"/>
-              </a:rPr>
-              <a:t>operaties</a:t>
-            </a:r>
-            <a:r>
-              <a:rPr lang="en-US" dirty="0">
-                <a:latin typeface="Georgia" panose="02040502050405020303" pitchFamily="18" charset="0"/>
-              </a:rPr>
-              <a:t>:  	</a:t>
-            </a:r>
-            <a:r>
-              <a:rPr lang="en-US" dirty="0" err="1">
-                <a:latin typeface="Georgia" panose="02040502050405020303" pitchFamily="18" charset="0"/>
-              </a:rPr>
-              <a:t>maat</a:t>
-            </a:r>
-            <a:r>
-              <a:rPr lang="en-US" dirty="0">
-                <a:latin typeface="Georgia" panose="02040502050405020303" pitchFamily="18" charset="0"/>
-              </a:rPr>
-              <a:t> </a:t>
-            </a:r>
-            <a:r>
-              <a:rPr lang="en-US" dirty="0" err="1">
-                <a:latin typeface="Georgia" panose="02040502050405020303" pitchFamily="18" charset="0"/>
-              </a:rPr>
-              <a:t>voor</a:t>
-            </a:r>
-            <a:r>
-              <a:rPr lang="en-US" dirty="0">
-                <a:latin typeface="Georgia" panose="02040502050405020303" pitchFamily="18" charset="0"/>
-              </a:rPr>
-              <a:t> de </a:t>
-            </a:r>
-            <a:r>
-              <a:rPr lang="en-US" dirty="0" err="1">
-                <a:latin typeface="Georgia" panose="02040502050405020303" pitchFamily="18" charset="0"/>
-              </a:rPr>
-              <a:t>snelheid</a:t>
-            </a:r>
-            <a:r>
-              <a:rPr lang="en-US" dirty="0">
-                <a:latin typeface="Georgia" panose="02040502050405020303" pitchFamily="18" charset="0"/>
-              </a:rPr>
-              <a:t> van het </a:t>
-            </a:r>
-            <a:r>
-              <a:rPr lang="en-US" dirty="0" err="1">
-                <a:latin typeface="Georgia" panose="02040502050405020303" pitchFamily="18" charset="0"/>
-              </a:rPr>
-              <a:t>algoritme</a:t>
-            </a:r>
-            <a:endParaRPr lang="en-US" dirty="0">
-              <a:latin typeface="Georgia" panose="02040502050405020303" pitchFamily="18" charset="0"/>
-            </a:endParaRPr>
-          </a:p>
-          <a:p>
-            <a:pPr marL="800100" lvl="1" indent="-342900">
-              <a:buFont typeface="Arial" panose="020B0604020202020204" pitchFamily="34" charset="0"/>
-              <a:buChar char="•"/>
-            </a:pPr>
-            <a:r>
-              <a:rPr lang="en-US" dirty="0">
-                <a:latin typeface="Georgia" panose="02040502050405020303" pitchFamily="18" charset="0"/>
-              </a:rPr>
-              <a:t>De </a:t>
-            </a:r>
-            <a:r>
-              <a:rPr lang="en-US" dirty="0" err="1">
-                <a:latin typeface="Georgia" panose="02040502050405020303" pitchFamily="18" charset="0"/>
-              </a:rPr>
-              <a:t>relatieve</a:t>
-            </a:r>
-            <a:r>
-              <a:rPr lang="en-US" dirty="0">
-                <a:latin typeface="Georgia" panose="02040502050405020303" pitchFamily="18" charset="0"/>
-              </a:rPr>
-              <a:t> </a:t>
-            </a:r>
-            <a:r>
-              <a:rPr lang="en-US" dirty="0" err="1">
-                <a:latin typeface="Georgia" panose="02040502050405020303" pitchFamily="18" charset="0"/>
-              </a:rPr>
-              <a:t>fout</a:t>
-            </a:r>
-            <a:r>
-              <a:rPr lang="en-US" dirty="0">
-                <a:latin typeface="Georgia" panose="02040502050405020303" pitchFamily="18" charset="0"/>
-              </a:rPr>
-              <a:t>:			</a:t>
-            </a:r>
-            <a:r>
-              <a:rPr lang="en-US" dirty="0" err="1">
-                <a:latin typeface="Georgia" panose="02040502050405020303" pitchFamily="18" charset="0"/>
-              </a:rPr>
-              <a:t>maat</a:t>
-            </a:r>
-            <a:r>
-              <a:rPr lang="en-US" dirty="0">
-                <a:latin typeface="Georgia" panose="02040502050405020303" pitchFamily="18" charset="0"/>
-              </a:rPr>
-              <a:t> </a:t>
-            </a:r>
-            <a:r>
-              <a:rPr lang="en-US" dirty="0" err="1">
-                <a:latin typeface="Georgia" panose="02040502050405020303" pitchFamily="18" charset="0"/>
-              </a:rPr>
-              <a:t>voor</a:t>
-            </a:r>
-            <a:r>
-              <a:rPr lang="en-US" dirty="0">
-                <a:latin typeface="Georgia" panose="02040502050405020303" pitchFamily="18" charset="0"/>
-              </a:rPr>
-              <a:t> de </a:t>
-            </a:r>
-            <a:r>
-              <a:rPr lang="en-US" dirty="0" err="1">
-                <a:latin typeface="Georgia" panose="02040502050405020303" pitchFamily="18" charset="0"/>
-              </a:rPr>
-              <a:t>nauwkeurigheid</a:t>
-            </a:r>
-            <a:endParaRPr lang="en-US" dirty="0">
-              <a:latin typeface="Georgia" panose="02040502050405020303" pitchFamily="18" charset="0"/>
-            </a:endParaRPr>
-          </a:p>
-          <a:p>
-            <a:pPr marL="285750" indent="-285750">
-              <a:buFont typeface="Arial" panose="020B0604020202020204" pitchFamily="34" charset="0"/>
-              <a:buChar char="•"/>
-            </a:pPr>
-            <a:endParaRPr lang="en-US" b="1" dirty="0"/>
-          </a:p>
-          <a:p>
-            <a:r>
-              <a:rPr lang="en-US" sz="2400" b="1" dirty="0">
-                <a:latin typeface="Georgia" panose="02040502050405020303" pitchFamily="18" charset="0"/>
-              </a:rPr>
-              <a:t>We </a:t>
-            </a:r>
-            <a:r>
-              <a:rPr lang="en-US" sz="2400" b="1" dirty="0" err="1">
-                <a:latin typeface="Georgia" panose="02040502050405020303" pitchFamily="18" charset="0"/>
-              </a:rPr>
-              <a:t>willen</a:t>
-            </a:r>
-            <a:r>
-              <a:rPr lang="en-US" sz="2400" b="1" dirty="0">
-                <a:latin typeface="Georgia" panose="02040502050405020303" pitchFamily="18" charset="0"/>
-              </a:rPr>
-              <a:t> </a:t>
-            </a:r>
-            <a:r>
-              <a:rPr lang="en-US" sz="2400" b="1" dirty="0" err="1">
-                <a:latin typeface="Georgia" panose="02040502050405020303" pitchFamily="18" charset="0"/>
-              </a:rPr>
-              <a:t>een</a:t>
-            </a:r>
-            <a:r>
-              <a:rPr lang="en-US" sz="2400" b="1" dirty="0">
-                <a:latin typeface="Georgia" panose="02040502050405020303" pitchFamily="18" charset="0"/>
-              </a:rPr>
-              <a:t> zo </a:t>
-            </a:r>
-            <a:r>
-              <a:rPr lang="en-US" sz="2400" b="1" dirty="0" err="1">
-                <a:latin typeface="Georgia" panose="02040502050405020303" pitchFamily="18" charset="0"/>
-              </a:rPr>
-              <a:t>laag</a:t>
-            </a:r>
-            <a:r>
-              <a:rPr lang="en-US" sz="2400" b="1" dirty="0">
-                <a:latin typeface="Georgia" panose="02040502050405020303" pitchFamily="18" charset="0"/>
-              </a:rPr>
-              <a:t> </a:t>
-            </a:r>
-            <a:r>
-              <a:rPr lang="en-US" sz="2400" b="1" dirty="0" err="1">
-                <a:latin typeface="Georgia" panose="02040502050405020303" pitchFamily="18" charset="0"/>
-              </a:rPr>
-              <a:t>mogelijke</a:t>
-            </a:r>
-            <a:r>
-              <a:rPr lang="en-US" sz="2400" b="1" dirty="0">
-                <a:latin typeface="Georgia" panose="02040502050405020303" pitchFamily="18" charset="0"/>
-              </a:rPr>
-              <a:t> </a:t>
-            </a:r>
-            <a:r>
-              <a:rPr lang="en-US" sz="2400" b="1" dirty="0" err="1">
-                <a:latin typeface="Georgia" panose="02040502050405020303" pitchFamily="18" charset="0"/>
-              </a:rPr>
-              <a:t>relatieve</a:t>
-            </a:r>
-            <a:r>
-              <a:rPr lang="en-US" sz="2400" b="1" dirty="0">
-                <a:latin typeface="Georgia" panose="02040502050405020303" pitchFamily="18" charset="0"/>
-              </a:rPr>
-              <a:t> </a:t>
-            </a:r>
-            <a:r>
-              <a:rPr lang="en-US" sz="2400" b="1" dirty="0" err="1">
-                <a:latin typeface="Georgia" panose="02040502050405020303" pitchFamily="18" charset="0"/>
-              </a:rPr>
-              <a:t>fout</a:t>
-            </a:r>
-            <a:r>
-              <a:rPr lang="en-US" sz="2400" b="1" dirty="0">
-                <a:latin typeface="Georgia" panose="02040502050405020303" pitchFamily="18" charset="0"/>
-              </a:rPr>
-              <a:t> </a:t>
-            </a:r>
-            <a:r>
-              <a:rPr lang="en-US" sz="2400" b="1" dirty="0" err="1">
-                <a:latin typeface="Georgia" panose="02040502050405020303" pitchFamily="18" charset="0"/>
-              </a:rPr>
-              <a:t>zonder</a:t>
-            </a:r>
-            <a:r>
-              <a:rPr lang="en-US" sz="2400" b="1" dirty="0">
-                <a:latin typeface="Georgia" panose="02040502050405020303" pitchFamily="18" charset="0"/>
-              </a:rPr>
-              <a:t> </a:t>
-            </a:r>
-            <a:r>
-              <a:rPr lang="en-US" sz="2400" b="1" dirty="0" err="1">
-                <a:latin typeface="Georgia" panose="02040502050405020303" pitchFamily="18" charset="0"/>
-              </a:rPr>
-              <a:t>te</a:t>
-            </a:r>
-            <a:r>
-              <a:rPr lang="en-US" sz="2400" b="1" dirty="0">
-                <a:latin typeface="Georgia" panose="02040502050405020303" pitchFamily="18" charset="0"/>
-              </a:rPr>
-              <a:t> </a:t>
-            </a:r>
-            <a:r>
-              <a:rPr lang="en-US" sz="2400" b="1" dirty="0" err="1">
-                <a:latin typeface="Georgia" panose="02040502050405020303" pitchFamily="18" charset="0"/>
-              </a:rPr>
-              <a:t>veel</a:t>
-            </a:r>
-            <a:r>
-              <a:rPr lang="en-US" sz="2400" b="1" dirty="0">
-                <a:latin typeface="Georgia" panose="02040502050405020303" pitchFamily="18" charset="0"/>
-              </a:rPr>
-              <a:t> DTW </a:t>
-            </a:r>
-            <a:r>
-              <a:rPr lang="en-US" sz="2400" b="1" dirty="0" err="1">
-                <a:latin typeface="Georgia" panose="02040502050405020303" pitchFamily="18" charset="0"/>
-              </a:rPr>
-              <a:t>operaties</a:t>
-            </a:r>
-            <a:endParaRPr lang="en-US" dirty="0"/>
-          </a:p>
-          <a:p>
-            <a:pPr marL="285750" indent="-285750">
-              <a:buFont typeface="Arial" panose="020B0604020202020204" pitchFamily="34" charset="0"/>
-              <a:buChar char="•"/>
-            </a:pPr>
-            <a:r>
-              <a:rPr lang="en-US" dirty="0"/>
-              <a:t>We </a:t>
-            </a:r>
-            <a:r>
-              <a:rPr lang="en-US" dirty="0" err="1"/>
-              <a:t>hopen</a:t>
-            </a:r>
-            <a:r>
-              <a:rPr lang="en-US" dirty="0"/>
-              <a:t> </a:t>
-            </a:r>
-            <a:r>
-              <a:rPr lang="en-US" dirty="0" err="1"/>
-              <a:t>dat</a:t>
-            </a:r>
-            <a:r>
-              <a:rPr lang="en-US" dirty="0"/>
-              <a:t> </a:t>
-            </a:r>
-            <a:r>
-              <a:rPr lang="en-US" dirty="0" err="1"/>
-              <a:t>een</a:t>
-            </a:r>
-            <a:r>
-              <a:rPr lang="en-US" dirty="0"/>
-              <a:t> </a:t>
-            </a:r>
-            <a:r>
-              <a:rPr lang="en-US" dirty="0" err="1"/>
-              <a:t>adaptieve</a:t>
-            </a:r>
-            <a:r>
-              <a:rPr lang="en-US" dirty="0"/>
-              <a:t> </a:t>
-            </a:r>
-            <a:r>
-              <a:rPr lang="en-US" dirty="0" err="1"/>
-              <a:t>decompositie</a:t>
-            </a:r>
-            <a:r>
-              <a:rPr lang="en-US" dirty="0"/>
-              <a:t> </a:t>
-            </a:r>
-            <a:r>
-              <a:rPr lang="en-US" dirty="0" err="1"/>
-              <a:t>een</a:t>
-            </a:r>
-            <a:r>
-              <a:rPr lang="en-US" dirty="0"/>
-              <a:t> </a:t>
-            </a:r>
-            <a:r>
-              <a:rPr lang="en-US" dirty="0" err="1"/>
-              <a:t>goede</a:t>
-            </a:r>
-            <a:r>
-              <a:rPr lang="en-US" dirty="0"/>
-              <a:t> </a:t>
-            </a:r>
-            <a:r>
-              <a:rPr lang="en-US" dirty="0" err="1"/>
-              <a:t>relatieve</a:t>
-            </a:r>
-            <a:r>
-              <a:rPr lang="en-US" dirty="0"/>
-              <a:t> </a:t>
-            </a:r>
-            <a:r>
-              <a:rPr lang="en-US" dirty="0" err="1"/>
-              <a:t>fout</a:t>
-            </a:r>
-            <a:r>
-              <a:rPr lang="en-US" dirty="0"/>
-              <a:t> </a:t>
-            </a:r>
-            <a:r>
-              <a:rPr lang="en-US" dirty="0" err="1"/>
-              <a:t>geeft</a:t>
-            </a:r>
-            <a:r>
-              <a:rPr lang="en-US" dirty="0"/>
-              <a:t> </a:t>
-            </a:r>
-            <a:r>
-              <a:rPr lang="en-US" dirty="0" err="1"/>
-              <a:t>en</a:t>
-            </a:r>
-            <a:r>
-              <a:rPr lang="en-US" dirty="0"/>
-              <a:t> het </a:t>
-            </a:r>
-            <a:r>
-              <a:rPr lang="en-US" dirty="0" err="1"/>
-              <a:t>aantal</a:t>
-            </a:r>
-            <a:r>
-              <a:rPr lang="en-US" dirty="0"/>
-              <a:t> DTW </a:t>
-            </a:r>
-            <a:r>
-              <a:rPr lang="en-US" dirty="0" err="1"/>
-              <a:t>operaties</a:t>
-            </a:r>
-            <a:r>
-              <a:rPr lang="en-US" dirty="0"/>
-              <a:t> </a:t>
-            </a:r>
-            <a:r>
-              <a:rPr lang="en-US" dirty="0" err="1"/>
-              <a:t>laag</a:t>
-            </a:r>
-            <a:r>
-              <a:rPr lang="en-US" dirty="0"/>
-              <a:t> </a:t>
-            </a:r>
-            <a:r>
-              <a:rPr lang="en-US" dirty="0" err="1"/>
-              <a:t>houdt</a:t>
-            </a:r>
-            <a:r>
-              <a:rPr lang="en-US" dirty="0"/>
-              <a:t> </a:t>
-            </a:r>
-            <a:r>
-              <a:rPr lang="en-US" dirty="0" err="1"/>
-              <a:t>vergeleken</a:t>
-            </a:r>
-            <a:r>
-              <a:rPr lang="en-US" dirty="0"/>
-              <a:t> met de </a:t>
-            </a:r>
-            <a:r>
-              <a:rPr lang="en-US" dirty="0" err="1"/>
-              <a:t>volledige</a:t>
-            </a:r>
-            <a:r>
-              <a:rPr lang="en-US" dirty="0"/>
-              <a:t> tensor </a:t>
-            </a:r>
-            <a:r>
-              <a:rPr lang="en-US" dirty="0" err="1"/>
-              <a:t>te</a:t>
-            </a:r>
-            <a:r>
-              <a:rPr lang="en-US" dirty="0"/>
-              <a:t> </a:t>
-            </a:r>
-            <a:r>
-              <a:rPr lang="en-US" dirty="0" err="1"/>
-              <a:t>berekenen</a:t>
-            </a:r>
-            <a:r>
-              <a:rPr lang="en-US" dirty="0"/>
-              <a:t>.</a:t>
-            </a:r>
-          </a:p>
-          <a:p>
-            <a:pPr marL="285750" indent="-285750">
-              <a:buFont typeface="Arial" panose="020B0604020202020204" pitchFamily="34" charset="0"/>
-              <a:buChar char="•"/>
-            </a:pPr>
-            <a:r>
-              <a:rPr lang="en-US" dirty="0"/>
-              <a:t>We </a:t>
-            </a:r>
-            <a:r>
-              <a:rPr lang="en-US" dirty="0" err="1"/>
-              <a:t>vermoeden</a:t>
-            </a:r>
-            <a:r>
-              <a:rPr lang="en-US" dirty="0"/>
-              <a:t> </a:t>
-            </a:r>
-            <a:r>
-              <a:rPr lang="en-US" dirty="0" err="1"/>
-              <a:t>dat</a:t>
-            </a:r>
-            <a:r>
-              <a:rPr lang="en-US" dirty="0"/>
-              <a:t> </a:t>
-            </a:r>
-            <a:r>
-              <a:rPr lang="en-US" dirty="0" err="1"/>
-              <a:t>een</a:t>
-            </a:r>
-            <a:r>
-              <a:rPr lang="en-US" dirty="0"/>
-              <a:t> </a:t>
-            </a:r>
-            <a:r>
-              <a:rPr lang="en-US" dirty="0" err="1"/>
-              <a:t>kleine</a:t>
-            </a:r>
-            <a:r>
-              <a:rPr lang="en-US" dirty="0"/>
-              <a:t> </a:t>
-            </a:r>
-            <a:r>
-              <a:rPr lang="en-US" dirty="0" err="1"/>
-              <a:t>relatieve</a:t>
-            </a:r>
-            <a:r>
-              <a:rPr lang="en-US" dirty="0"/>
-              <a:t> </a:t>
-            </a:r>
-            <a:r>
-              <a:rPr lang="en-US" dirty="0" err="1"/>
-              <a:t>fout</a:t>
-            </a:r>
-            <a:r>
-              <a:rPr lang="en-US" dirty="0"/>
-              <a:t> </a:t>
-            </a:r>
-            <a:r>
-              <a:rPr lang="en-US" dirty="0" err="1"/>
-              <a:t>een</a:t>
-            </a:r>
-            <a:r>
-              <a:rPr lang="en-US" dirty="0"/>
-              <a:t> </a:t>
-            </a:r>
-            <a:r>
-              <a:rPr lang="en-US" dirty="0" err="1"/>
-              <a:t>goede</a:t>
-            </a:r>
-            <a:r>
-              <a:rPr lang="en-US" dirty="0"/>
-              <a:t> </a:t>
-            </a:r>
-            <a:r>
-              <a:rPr lang="en-US" dirty="0" err="1"/>
-              <a:t>maat</a:t>
-            </a:r>
-            <a:r>
-              <a:rPr lang="en-US" dirty="0"/>
-              <a:t> is om </a:t>
-            </a:r>
-            <a:r>
-              <a:rPr lang="en-US" dirty="0" err="1"/>
-              <a:t>een</a:t>
-            </a:r>
-            <a:r>
-              <a:rPr lang="en-US" dirty="0"/>
-              <a:t> clustering </a:t>
-            </a:r>
-            <a:r>
-              <a:rPr lang="en-US" dirty="0" err="1"/>
-              <a:t>te</a:t>
-            </a:r>
-            <a:r>
-              <a:rPr lang="en-US" dirty="0"/>
-              <a:t> </a:t>
-            </a:r>
-            <a:r>
-              <a:rPr lang="en-US" dirty="0" err="1"/>
-              <a:t>verkrijgen</a:t>
-            </a:r>
-            <a:r>
-              <a:rPr lang="en-US" dirty="0"/>
-              <a:t> </a:t>
-            </a:r>
-            <a:r>
-              <a:rPr lang="en-US" dirty="0" err="1"/>
-              <a:t>gelijkaardig</a:t>
-            </a:r>
-            <a:r>
-              <a:rPr lang="en-US" dirty="0"/>
-              <a:t> </a:t>
-            </a:r>
-            <a:r>
-              <a:rPr lang="en-US" dirty="0" err="1"/>
-              <a:t>aan</a:t>
-            </a:r>
-            <a:r>
-              <a:rPr lang="en-US" dirty="0"/>
-              <a:t> de clustering met de CP </a:t>
-            </a:r>
-            <a:r>
-              <a:rPr lang="en-US" dirty="0" err="1"/>
-              <a:t>decompositie</a:t>
-            </a:r>
-            <a:r>
-              <a:rPr lang="en-US" dirty="0"/>
-              <a:t>.</a:t>
-            </a:r>
-          </a:p>
-          <a:p>
-            <a:pPr marL="285750" indent="-285750">
-              <a:buFont typeface="Arial" panose="020B0604020202020204" pitchFamily="34" charset="0"/>
-              <a:buChar char="•"/>
-            </a:pPr>
-            <a:endParaRPr lang="en-US" dirty="0"/>
-          </a:p>
-          <a:p>
-            <a:pPr marL="285750" indent="-285750">
-              <a:buFont typeface="Arial" panose="020B0604020202020204" pitchFamily="34" charset="0"/>
-              <a:buChar char="•"/>
-            </a:pPr>
-            <a:endParaRPr lang="en-US" dirty="0"/>
-          </a:p>
-          <a:p>
-            <a:r>
-              <a:rPr lang="en-US" dirty="0"/>
-              <a:t>*de </a:t>
-            </a:r>
-            <a:r>
-              <a:rPr lang="en-US" dirty="0" err="1"/>
-              <a:t>relatieve</a:t>
-            </a:r>
-            <a:r>
-              <a:rPr lang="en-US" dirty="0"/>
-              <a:t> </a:t>
-            </a:r>
-            <a:r>
-              <a:rPr lang="en-US" dirty="0" err="1"/>
-              <a:t>fout</a:t>
-            </a:r>
-            <a:r>
-              <a:rPr lang="en-US" dirty="0"/>
-              <a:t> van </a:t>
-            </a:r>
-            <a:r>
-              <a:rPr lang="en-US" dirty="0" err="1"/>
-              <a:t>een</a:t>
-            </a:r>
-            <a:r>
-              <a:rPr lang="en-US" dirty="0"/>
-              <a:t> </a:t>
-            </a:r>
-            <a:r>
-              <a:rPr lang="en-US" dirty="0" err="1"/>
-              <a:t>decompositie</a:t>
-            </a:r>
-            <a:r>
-              <a:rPr lang="en-US" dirty="0"/>
-              <a:t> is de norm van het </a:t>
-            </a:r>
-            <a:r>
-              <a:rPr lang="en-US" dirty="0" err="1"/>
-              <a:t>residu</a:t>
-            </a:r>
-            <a:r>
-              <a:rPr lang="en-US" dirty="0"/>
-              <a:t> van die </a:t>
-            </a:r>
-            <a:r>
-              <a:rPr lang="en-US" dirty="0" err="1"/>
-              <a:t>decompositie</a:t>
-            </a:r>
-            <a:r>
-              <a:rPr lang="en-US" dirty="0"/>
-              <a:t> met de </a:t>
-            </a:r>
-            <a:r>
-              <a:rPr lang="en-US" dirty="0" err="1"/>
-              <a:t>werkelijke</a:t>
-            </a:r>
-            <a:r>
-              <a:rPr lang="en-US" dirty="0"/>
-              <a:t> tensor ten </a:t>
-            </a:r>
-            <a:r>
-              <a:rPr lang="en-US" dirty="0" err="1"/>
-              <a:t>opzichte</a:t>
-            </a:r>
-            <a:r>
-              <a:rPr lang="en-US" dirty="0"/>
-              <a:t> van de norm van de tensor.</a:t>
-            </a:r>
           </a:p>
         </p:txBody>
       </p:sp>
@@ -6316,8 +5650,8 @@
         </p:nvSpPr>
         <p:spPr>
           <a:xfrm>
-            <a:off x="11148636" y="16666386"/>
-            <a:ext cx="8604866" cy="1200329"/>
+            <a:off x="10982425" y="18877771"/>
+            <a:ext cx="8750508" cy="1200329"/>
           </a:xfrm>
           <a:prstGeom prst="rect">
             <a:avLst/>
@@ -6530,8 +5864,8 @@
         </p:nvSpPr>
         <p:spPr>
           <a:xfrm>
-            <a:off x="11148636" y="12934040"/>
-            <a:ext cx="8522052" cy="1846659"/>
+            <a:off x="11107231" y="12662504"/>
+            <a:ext cx="8522052" cy="2677656"/>
           </a:xfrm>
           <a:prstGeom prst="rect">
             <a:avLst/>
@@ -6668,20 +6002,68 @@
               <a:rPr lang="en-US" dirty="0">
                 <a:latin typeface="Georgia" panose="02040502050405020303" pitchFamily="18" charset="0"/>
               </a:rPr>
-              <a:t> (met ACA </a:t>
-            </a:r>
-            <a:r>
-              <a:rPr lang="en-US" dirty="0" err="1">
-                <a:latin typeface="Georgia" panose="02040502050405020303" pitchFamily="18" charset="0"/>
-              </a:rPr>
-              <a:t>voor</a:t>
-            </a:r>
-            <a:r>
-              <a:rPr lang="en-US" dirty="0">
-                <a:latin typeface="Georgia" panose="02040502050405020303" pitchFamily="18" charset="0"/>
-              </a:rPr>
-              <a:t> matrices)</a:t>
-            </a:r>
+              <a:t> met ACA</a:t>
+            </a:r>
+          </a:p>
+          <a:p>
+            <a:pPr lvl="2"/>
+            <a:r>
+              <a:rPr lang="en-US" i="1" dirty="0">
+                <a:latin typeface="Georgia" panose="02040502050405020303" pitchFamily="18" charset="0"/>
+              </a:rPr>
+              <a:t>→ </a:t>
+            </a:r>
+            <a:r>
+              <a:rPr lang="en-US" dirty="0" err="1">
+                <a:latin typeface="Georgia" panose="02040502050405020303" pitchFamily="18" charset="0"/>
+              </a:rPr>
+              <a:t>notatie</a:t>
+            </a:r>
+            <a:r>
+              <a:rPr lang="en-US" dirty="0">
+                <a:latin typeface="Georgia" panose="02040502050405020303" pitchFamily="18" charset="0"/>
+              </a:rPr>
+              <a:t>: </a:t>
+            </a:r>
+            <a:r>
+              <a:rPr lang="en-US" i="1" dirty="0">
+                <a:latin typeface="Georgia" panose="02040502050405020303" pitchFamily="18" charset="0"/>
+              </a:rPr>
+              <a:t>type k </a:t>
+            </a:r>
+            <a:r>
+              <a:rPr lang="en-US" dirty="0">
+                <a:latin typeface="Georgia" panose="02040502050405020303" pitchFamily="18" charset="0"/>
+              </a:rPr>
+              <a:t>= k termen in </a:t>
+            </a:r>
+            <a:r>
+              <a:rPr lang="en-US" dirty="0" err="1">
+                <a:latin typeface="Georgia" panose="02040502050405020303" pitchFamily="18" charset="0"/>
+              </a:rPr>
+              <a:t>elke</a:t>
+            </a:r>
+            <a:r>
+              <a:rPr lang="en-US" dirty="0">
+                <a:latin typeface="Georgia" panose="02040502050405020303" pitchFamily="18" charset="0"/>
+              </a:rPr>
+              <a:t> matrix </a:t>
+            </a:r>
+            <a:r>
+              <a:rPr lang="en-US" dirty="0" err="1">
+                <a:latin typeface="Georgia" panose="02040502050405020303" pitchFamily="18" charset="0"/>
+              </a:rPr>
+              <a:t>decompositie</a:t>
+            </a:r>
+            <a:endParaRPr lang="en-US" dirty="0">
+              <a:latin typeface="Georgia" panose="02040502050405020303" pitchFamily="18" charset="0"/>
+            </a:endParaRPr>
+          </a:p>
+          <a:p>
+            <a:pPr lvl="2"/>
+            <a:endParaRPr lang="en-US" i="1" dirty="0">
+              <a:latin typeface="Georgia" panose="02040502050405020303" pitchFamily="18" charset="0"/>
+            </a:endParaRPr>
           </a:p>
           <a:p>
             <a:pPr marL="742950" lvl="1" indent="-285750">
@@ -6803,14 +6185,1076 @@
               <a:t> 2</a:t>
             </a:r>
           </a:p>
+          <a:p>
+            <a:pPr lvl="2"/>
+            <a:r>
+              <a:rPr lang="en-US" dirty="0">
+                <a:latin typeface="Georgia" panose="02040502050405020303" pitchFamily="18" charset="0"/>
+              </a:rPr>
+              <a:t>	</a:t>
+            </a:r>
+          </a:p>
+        </p:txBody>
+      </p:sp>
+      <p:cxnSp>
+        <p:nvCxnSpPr>
+          <p:cNvPr id="4" name="Straight Arrow Connector 3">
+            <a:extLst>
+              <a:ext uri="{FF2B5EF4-FFF2-40B4-BE49-F238E27FC236}">
+                <a16:creationId xmlns:a16="http://schemas.microsoft.com/office/drawing/2014/main" id="{4F06542D-2BDC-5383-2D50-A3F8EF8CF9B7}"/>
+              </a:ext>
+            </a:extLst>
+          </p:cNvPr>
+          <p:cNvCxnSpPr>
+            <a:cxnSpLocks/>
+          </p:cNvCxnSpPr>
+          <p:nvPr/>
+        </p:nvCxnSpPr>
+        <p:spPr>
+          <a:xfrm flipH="1">
+            <a:off x="4078139" y="16689294"/>
+            <a:ext cx="1030005" cy="707019"/>
+          </a:xfrm>
+          <a:prstGeom prst="straightConnector1">
+            <a:avLst/>
+          </a:prstGeom>
+          <a:ln>
+            <a:tailEnd type="triangle"/>
+          </a:ln>
+        </p:spPr>
+        <p:style>
+          <a:lnRef idx="1">
+            <a:schemeClr val="dk1"/>
+          </a:lnRef>
+          <a:fillRef idx="0">
+            <a:schemeClr val="dk1"/>
+          </a:fillRef>
+          <a:effectRef idx="0">
+            <a:schemeClr val="dk1"/>
+          </a:effectRef>
+          <a:fontRef idx="minor">
+            <a:schemeClr val="tx1"/>
+          </a:fontRef>
+        </p:style>
+      </p:cxnSp>
+      <p:sp>
+        <p:nvSpPr>
+          <p:cNvPr id="8" name="TextBox 7">
+            <a:extLst>
+              <a:ext uri="{FF2B5EF4-FFF2-40B4-BE49-F238E27FC236}">
+                <a16:creationId xmlns:a16="http://schemas.microsoft.com/office/drawing/2014/main" id="{AA916ADF-3043-CCEA-032C-0C884785428B}"/>
+              </a:ext>
+            </a:extLst>
+          </p:cNvPr>
+          <p:cNvSpPr txBox="1"/>
+          <p:nvPr/>
+        </p:nvSpPr>
+        <p:spPr>
+          <a:xfrm>
+            <a:off x="3772959" y="16206801"/>
+            <a:ext cx="3402956" cy="400110"/>
+          </a:xfrm>
+          <a:prstGeom prst="rect">
+            <a:avLst/>
+          </a:prstGeom>
+          <a:noFill/>
+        </p:spPr>
+        <p:txBody>
+          <a:bodyPr wrap="square" rtlCol="0">
+            <a:spAutoFit/>
+          </a:bodyPr>
+          <a:lstStyle/>
+          <a:p>
+            <a:pPr algn="ctr"/>
+            <a:r>
+              <a:rPr lang="en-US" sz="2000" dirty="0" err="1">
+                <a:latin typeface="Georgia" panose="02040502050405020303" pitchFamily="18" charset="0"/>
+              </a:rPr>
+              <a:t>decompositie</a:t>
+            </a:r>
+            <a:r>
+              <a:rPr lang="en-US" sz="2000" dirty="0">
+                <a:latin typeface="Georgia" panose="02040502050405020303" pitchFamily="18" charset="0"/>
+              </a:rPr>
+              <a:t> </a:t>
+            </a:r>
+            <a:r>
+              <a:rPr lang="en-US" sz="2000" dirty="0" err="1">
+                <a:latin typeface="Georgia" panose="02040502050405020303" pitchFamily="18" charset="0"/>
+              </a:rPr>
+              <a:t>berekenen</a:t>
+            </a:r>
+            <a:endParaRPr lang="en-US" sz="2000" dirty="0">
+              <a:latin typeface="Georgia" panose="02040502050405020303" pitchFamily="18" charset="0"/>
+            </a:endParaRPr>
+          </a:p>
+        </p:txBody>
+      </p:sp>
+      <p:cxnSp>
+        <p:nvCxnSpPr>
+          <p:cNvPr id="12" name="Straight Arrow Connector 11">
+            <a:extLst>
+              <a:ext uri="{FF2B5EF4-FFF2-40B4-BE49-F238E27FC236}">
+                <a16:creationId xmlns:a16="http://schemas.microsoft.com/office/drawing/2014/main" id="{80B34E41-F537-1844-07D7-461F1C0E02EF}"/>
+              </a:ext>
+            </a:extLst>
+          </p:cNvPr>
+          <p:cNvCxnSpPr>
+            <a:cxnSpLocks/>
+          </p:cNvCxnSpPr>
+          <p:nvPr/>
+        </p:nvCxnSpPr>
+        <p:spPr>
+          <a:xfrm>
+            <a:off x="5932315" y="16689294"/>
+            <a:ext cx="1039591" cy="707019"/>
+          </a:xfrm>
+          <a:prstGeom prst="straightConnector1">
+            <a:avLst/>
+          </a:prstGeom>
+          <a:ln>
+            <a:tailEnd type="triangle"/>
+          </a:ln>
+        </p:spPr>
+        <p:style>
+          <a:lnRef idx="1">
+            <a:schemeClr val="dk1"/>
+          </a:lnRef>
+          <a:fillRef idx="0">
+            <a:schemeClr val="dk1"/>
+          </a:fillRef>
+          <a:effectRef idx="0">
+            <a:schemeClr val="dk1"/>
+          </a:effectRef>
+          <a:fontRef idx="minor">
+            <a:schemeClr val="tx1"/>
+          </a:fontRef>
+        </p:style>
+      </p:cxnSp>
+      <p:sp>
+        <p:nvSpPr>
+          <p:cNvPr id="14" name="TextBox 13">
+            <a:extLst>
+              <a:ext uri="{FF2B5EF4-FFF2-40B4-BE49-F238E27FC236}">
+                <a16:creationId xmlns:a16="http://schemas.microsoft.com/office/drawing/2014/main" id="{6FB68A00-3805-2C4C-A5D0-14D6A3D224F6}"/>
+              </a:ext>
+            </a:extLst>
+          </p:cNvPr>
+          <p:cNvSpPr txBox="1"/>
+          <p:nvPr/>
+        </p:nvSpPr>
+        <p:spPr>
+          <a:xfrm>
+            <a:off x="6489816" y="16823769"/>
+            <a:ext cx="2738708" cy="338554"/>
+          </a:xfrm>
+          <a:prstGeom prst="rect">
+            <a:avLst/>
+          </a:prstGeom>
+          <a:noFill/>
+        </p:spPr>
+        <p:txBody>
+          <a:bodyPr wrap="square" rtlCol="0">
+            <a:spAutoFit/>
+          </a:bodyPr>
+          <a:lstStyle/>
+          <a:p>
+            <a:pPr algn="ctr"/>
+            <a:r>
+              <a:rPr lang="en-US" sz="1600" i="1" dirty="0" err="1">
+                <a:latin typeface="Georgia" panose="02040502050405020303" pitchFamily="18" charset="0"/>
+              </a:rPr>
+              <a:t>weinig</a:t>
+            </a:r>
+            <a:r>
+              <a:rPr lang="en-US" sz="1600" i="1" dirty="0">
+                <a:latin typeface="Georgia" panose="02040502050405020303" pitchFamily="18" charset="0"/>
+              </a:rPr>
+              <a:t> DTW </a:t>
+            </a:r>
+            <a:r>
+              <a:rPr lang="en-US" sz="1600" i="1" dirty="0" err="1">
+                <a:latin typeface="Georgia" panose="02040502050405020303" pitchFamily="18" charset="0"/>
+              </a:rPr>
+              <a:t>operaties</a:t>
+            </a:r>
+            <a:endParaRPr lang="en-US" sz="1600" i="1" dirty="0">
+              <a:latin typeface="Georgia" panose="02040502050405020303" pitchFamily="18" charset="0"/>
+            </a:endParaRPr>
+          </a:p>
+        </p:txBody>
+      </p:sp>
+      <p:sp>
+        <p:nvSpPr>
+          <p:cNvPr id="16" name="TextBox 15">
+            <a:extLst>
+              <a:ext uri="{FF2B5EF4-FFF2-40B4-BE49-F238E27FC236}">
+                <a16:creationId xmlns:a16="http://schemas.microsoft.com/office/drawing/2014/main" id="{F46A8F40-EB2E-040D-4557-C5E5A39BDE88}"/>
+              </a:ext>
+            </a:extLst>
+          </p:cNvPr>
+          <p:cNvSpPr txBox="1"/>
+          <p:nvPr/>
+        </p:nvSpPr>
+        <p:spPr>
+          <a:xfrm>
+            <a:off x="2264654" y="16823769"/>
+            <a:ext cx="2291112" cy="338554"/>
+          </a:xfrm>
+          <a:prstGeom prst="rect">
+            <a:avLst/>
+          </a:prstGeom>
+          <a:noFill/>
+        </p:spPr>
+        <p:txBody>
+          <a:bodyPr wrap="square">
+            <a:spAutoFit/>
+          </a:bodyPr>
+          <a:lstStyle/>
+          <a:p>
+            <a:pPr algn="ctr"/>
+            <a:r>
+              <a:rPr lang="en-US" sz="1600" i="1" dirty="0" err="1">
+                <a:latin typeface="Georgia" panose="02040502050405020303" pitchFamily="18" charset="0"/>
+              </a:rPr>
+              <a:t>kleine</a:t>
+            </a:r>
+            <a:r>
+              <a:rPr lang="en-US" sz="1600" i="1" dirty="0">
+                <a:latin typeface="Georgia" panose="02040502050405020303" pitchFamily="18" charset="0"/>
+              </a:rPr>
+              <a:t> </a:t>
+            </a:r>
+            <a:r>
+              <a:rPr lang="en-US" sz="1600" i="1" dirty="0" err="1">
+                <a:latin typeface="Georgia" panose="02040502050405020303" pitchFamily="18" charset="0"/>
+              </a:rPr>
+              <a:t>relatieve</a:t>
+            </a:r>
+            <a:r>
+              <a:rPr lang="en-US" sz="1600" i="1" dirty="0">
+                <a:latin typeface="Georgia" panose="02040502050405020303" pitchFamily="18" charset="0"/>
+              </a:rPr>
+              <a:t> </a:t>
+            </a:r>
+            <a:r>
+              <a:rPr lang="en-US" sz="1600" i="1" dirty="0" err="1">
+                <a:latin typeface="Georgia" panose="02040502050405020303" pitchFamily="18" charset="0"/>
+              </a:rPr>
+              <a:t>fout</a:t>
+            </a:r>
+            <a:endParaRPr lang="en-US" sz="1600" dirty="0"/>
+          </a:p>
+        </p:txBody>
+      </p:sp>
+      <p:sp>
+        <p:nvSpPr>
+          <p:cNvPr id="17" name="TextBox 16">
+            <a:extLst>
+              <a:ext uri="{FF2B5EF4-FFF2-40B4-BE49-F238E27FC236}">
+                <a16:creationId xmlns:a16="http://schemas.microsoft.com/office/drawing/2014/main" id="{D57B9BF5-115E-3A29-7D28-1EE7B0B2A116}"/>
+              </a:ext>
+            </a:extLst>
+          </p:cNvPr>
+          <p:cNvSpPr txBox="1"/>
+          <p:nvPr/>
+        </p:nvSpPr>
+        <p:spPr>
+          <a:xfrm>
+            <a:off x="1918729" y="17478383"/>
+            <a:ext cx="3177527" cy="369332"/>
+          </a:xfrm>
+          <a:prstGeom prst="rect">
+            <a:avLst/>
+          </a:prstGeom>
+          <a:noFill/>
+        </p:spPr>
+        <p:txBody>
+          <a:bodyPr wrap="square" rtlCol="0">
+            <a:spAutoFit/>
+          </a:bodyPr>
+          <a:lstStyle/>
+          <a:p>
+            <a:pPr marL="0" marR="0" lvl="0" indent="0" algn="l" defTabSz="457200" rtl="0" eaLnBrk="1" fontAlgn="auto" latinLnBrk="0" hangingPunct="1">
+              <a:lnSpc>
+                <a:spcPct val="100000"/>
+              </a:lnSpc>
+              <a:spcBef>
+                <a:spcPts val="0"/>
+              </a:spcBef>
+              <a:spcAft>
+                <a:spcPts val="0"/>
+              </a:spcAft>
+              <a:buClrTx/>
+              <a:buSzTx/>
+              <a:buFontTx/>
+              <a:buNone/>
+              <a:tabLst/>
+              <a:defRPr/>
+            </a:pPr>
+            <a:r>
+              <a:rPr kumimoji="0" lang="en-US" sz="1800" b="0" i="0" u="none" strike="noStrike" kern="1200" cap="none" spc="0" normalizeH="0" baseline="0" noProof="0" dirty="0" err="1">
+                <a:ln>
+                  <a:noFill/>
+                </a:ln>
+                <a:solidFill>
+                  <a:prstClr val="black"/>
+                </a:solidFill>
+                <a:effectLst/>
+                <a:uLnTx/>
+                <a:uFillTx/>
+                <a:latin typeface="Georgia" panose="02040502050405020303" pitchFamily="18" charset="0"/>
+                <a:ea typeface="+mn-ea"/>
+                <a:cs typeface="+mn-cs"/>
+              </a:rPr>
+              <a:t>maat</a:t>
+            </a:r>
+            <a:r>
+              <a:rPr kumimoji="0" lang="en-US" sz="1800" b="0" i="0" u="none" strike="noStrike" kern="1200" cap="none" spc="0" normalizeH="0" baseline="0" noProof="0" dirty="0">
+                <a:ln>
+                  <a:noFill/>
+                </a:ln>
+                <a:solidFill>
+                  <a:prstClr val="black"/>
+                </a:solidFill>
+                <a:effectLst/>
+                <a:uLnTx/>
+                <a:uFillTx/>
+                <a:latin typeface="Georgia" panose="02040502050405020303" pitchFamily="18" charset="0"/>
+                <a:ea typeface="+mn-ea"/>
+                <a:cs typeface="+mn-cs"/>
+              </a:rPr>
+              <a:t> </a:t>
+            </a:r>
+            <a:r>
+              <a:rPr kumimoji="0" lang="en-US" sz="1800" b="0" i="0" u="none" strike="noStrike" kern="1200" cap="none" spc="0" normalizeH="0" baseline="0" noProof="0" dirty="0" err="1">
+                <a:ln>
+                  <a:noFill/>
+                </a:ln>
+                <a:solidFill>
+                  <a:prstClr val="black"/>
+                </a:solidFill>
+                <a:effectLst/>
+                <a:uLnTx/>
+                <a:uFillTx/>
+                <a:latin typeface="Georgia" panose="02040502050405020303" pitchFamily="18" charset="0"/>
+                <a:ea typeface="+mn-ea"/>
+                <a:cs typeface="+mn-cs"/>
+              </a:rPr>
+              <a:t>voor</a:t>
+            </a:r>
+            <a:r>
+              <a:rPr kumimoji="0" lang="en-US" sz="1800" b="0" i="0" u="none" strike="noStrike" kern="1200" cap="none" spc="0" normalizeH="0" baseline="0" noProof="0" dirty="0">
+                <a:ln>
+                  <a:noFill/>
+                </a:ln>
+                <a:solidFill>
+                  <a:prstClr val="black"/>
+                </a:solidFill>
+                <a:effectLst/>
+                <a:uLnTx/>
+                <a:uFillTx/>
+                <a:latin typeface="Georgia" panose="02040502050405020303" pitchFamily="18" charset="0"/>
+                <a:ea typeface="+mn-ea"/>
+                <a:cs typeface="+mn-cs"/>
+              </a:rPr>
+              <a:t> </a:t>
+            </a:r>
+            <a:r>
+              <a:rPr kumimoji="0" lang="en-US" sz="1800" b="0" i="0" u="none" strike="noStrike" kern="1200" cap="none" spc="0" normalizeH="0" baseline="0" noProof="0" dirty="0" err="1">
+                <a:ln>
+                  <a:noFill/>
+                </a:ln>
+                <a:solidFill>
+                  <a:prstClr val="black"/>
+                </a:solidFill>
+                <a:effectLst/>
+                <a:uLnTx/>
+                <a:uFillTx/>
+                <a:latin typeface="Georgia" panose="02040502050405020303" pitchFamily="18" charset="0"/>
+                <a:ea typeface="+mn-ea"/>
+                <a:cs typeface="+mn-cs"/>
+              </a:rPr>
+              <a:t>nauwkeurigheid</a:t>
+            </a:r>
+            <a:endParaRPr kumimoji="0" lang="en-US" sz="1800" b="0" i="0" u="none" strike="noStrike" kern="1200" cap="none" spc="0" normalizeH="0" baseline="0" noProof="0" dirty="0">
+              <a:ln>
+                <a:noFill/>
+              </a:ln>
+              <a:solidFill>
+                <a:prstClr val="black"/>
+              </a:solidFill>
+              <a:effectLst/>
+              <a:uLnTx/>
+              <a:uFillTx/>
+              <a:latin typeface="Georgia" panose="02040502050405020303" pitchFamily="18" charset="0"/>
+              <a:ea typeface="+mn-ea"/>
+              <a:cs typeface="+mn-cs"/>
+            </a:endParaRPr>
+          </a:p>
+        </p:txBody>
+      </p:sp>
+      <p:sp>
+        <p:nvSpPr>
+          <p:cNvPr id="18" name="TextBox 17">
+            <a:extLst>
+              <a:ext uri="{FF2B5EF4-FFF2-40B4-BE49-F238E27FC236}">
+                <a16:creationId xmlns:a16="http://schemas.microsoft.com/office/drawing/2014/main" id="{F09861A5-107C-135D-B25C-AE32099583C2}"/>
+              </a:ext>
+            </a:extLst>
+          </p:cNvPr>
+          <p:cNvSpPr txBox="1"/>
+          <p:nvPr/>
+        </p:nvSpPr>
+        <p:spPr>
+          <a:xfrm>
+            <a:off x="6327619" y="17484204"/>
+            <a:ext cx="3177527" cy="369332"/>
+          </a:xfrm>
+          <a:prstGeom prst="rect">
+            <a:avLst/>
+          </a:prstGeom>
+          <a:noFill/>
+        </p:spPr>
+        <p:txBody>
+          <a:bodyPr wrap="square" rtlCol="0">
+            <a:spAutoFit/>
+          </a:bodyPr>
+          <a:lstStyle/>
+          <a:p>
+            <a:pPr marL="0" marR="0" lvl="0" indent="0" defTabSz="457200" rtl="0" eaLnBrk="1" fontAlgn="auto" latinLnBrk="0" hangingPunct="1">
+              <a:lnSpc>
+                <a:spcPct val="100000"/>
+              </a:lnSpc>
+              <a:spcBef>
+                <a:spcPts val="0"/>
+              </a:spcBef>
+              <a:spcAft>
+                <a:spcPts val="0"/>
+              </a:spcAft>
+              <a:buClrTx/>
+              <a:buSzTx/>
+              <a:buFontTx/>
+              <a:buNone/>
+              <a:tabLst/>
+              <a:defRPr/>
+            </a:pPr>
+            <a:r>
+              <a:rPr kumimoji="0" lang="en-US" sz="1800" b="0" i="0" u="none" strike="noStrike" kern="1200" cap="none" spc="0" normalizeH="0" baseline="0" noProof="0" dirty="0" err="1">
+                <a:ln>
+                  <a:noFill/>
+                </a:ln>
+                <a:solidFill>
+                  <a:prstClr val="black"/>
+                </a:solidFill>
+                <a:effectLst/>
+                <a:uLnTx/>
+                <a:uFillTx/>
+                <a:latin typeface="Georgia" panose="02040502050405020303" pitchFamily="18" charset="0"/>
+                <a:ea typeface="+mn-ea"/>
+                <a:cs typeface="+mn-cs"/>
+              </a:rPr>
+              <a:t>maat</a:t>
+            </a:r>
+            <a:r>
+              <a:rPr kumimoji="0" lang="en-US" sz="1800" b="0" i="0" u="none" strike="noStrike" kern="1200" cap="none" spc="0" normalizeH="0" baseline="0" noProof="0" dirty="0">
+                <a:ln>
+                  <a:noFill/>
+                </a:ln>
+                <a:solidFill>
+                  <a:prstClr val="black"/>
+                </a:solidFill>
+                <a:effectLst/>
+                <a:uLnTx/>
+                <a:uFillTx/>
+                <a:latin typeface="Georgia" panose="02040502050405020303" pitchFamily="18" charset="0"/>
+                <a:ea typeface="+mn-ea"/>
+                <a:cs typeface="+mn-cs"/>
+              </a:rPr>
+              <a:t> </a:t>
+            </a:r>
+            <a:r>
+              <a:rPr kumimoji="0" lang="en-US" sz="1800" b="0" i="0" u="none" strike="noStrike" kern="1200" cap="none" spc="0" normalizeH="0" baseline="0" noProof="0" dirty="0" err="1">
+                <a:ln>
+                  <a:noFill/>
+                </a:ln>
+                <a:solidFill>
+                  <a:prstClr val="black"/>
+                </a:solidFill>
+                <a:effectLst/>
+                <a:uLnTx/>
+                <a:uFillTx/>
+                <a:latin typeface="Georgia" panose="02040502050405020303" pitchFamily="18" charset="0"/>
+                <a:ea typeface="+mn-ea"/>
+                <a:cs typeface="+mn-cs"/>
+              </a:rPr>
+              <a:t>voor</a:t>
+            </a:r>
+            <a:r>
+              <a:rPr kumimoji="0" lang="en-US" sz="1800" b="0" i="0" u="none" strike="noStrike" kern="1200" cap="none" spc="0" normalizeH="0" baseline="0" noProof="0" dirty="0">
+                <a:ln>
+                  <a:noFill/>
+                </a:ln>
+                <a:solidFill>
+                  <a:prstClr val="black"/>
+                </a:solidFill>
+                <a:effectLst/>
+                <a:uLnTx/>
+                <a:uFillTx/>
+                <a:latin typeface="Georgia" panose="02040502050405020303" pitchFamily="18" charset="0"/>
+                <a:ea typeface="+mn-ea"/>
+                <a:cs typeface="+mn-cs"/>
+              </a:rPr>
+              <a:t> </a:t>
+            </a:r>
+            <a:r>
+              <a:rPr kumimoji="0" lang="en-US" sz="1800" b="0" i="0" u="none" strike="noStrike" kern="1200" cap="none" spc="0" normalizeH="0" baseline="0" noProof="0" dirty="0" err="1">
+                <a:ln>
+                  <a:noFill/>
+                </a:ln>
+                <a:solidFill>
+                  <a:prstClr val="black"/>
+                </a:solidFill>
+                <a:effectLst/>
+                <a:uLnTx/>
+                <a:uFillTx/>
+                <a:latin typeface="Georgia" panose="02040502050405020303" pitchFamily="18" charset="0"/>
+                <a:ea typeface="+mn-ea"/>
+                <a:cs typeface="+mn-cs"/>
+              </a:rPr>
+              <a:t>snelheid</a:t>
+            </a:r>
+            <a:endParaRPr kumimoji="0" lang="en-US" sz="1800" b="0" i="0" u="none" strike="noStrike" kern="1200" cap="none" spc="0" normalizeH="0" baseline="0" noProof="0" dirty="0">
+              <a:ln>
+                <a:noFill/>
+              </a:ln>
+              <a:solidFill>
+                <a:prstClr val="black"/>
+              </a:solidFill>
+              <a:effectLst/>
+              <a:uLnTx/>
+              <a:uFillTx/>
+              <a:latin typeface="Georgia" panose="02040502050405020303" pitchFamily="18" charset="0"/>
+              <a:ea typeface="+mn-ea"/>
+              <a:cs typeface="+mn-cs"/>
+            </a:endParaRPr>
+          </a:p>
+        </p:txBody>
+      </p:sp>
+      <p:sp>
+        <p:nvSpPr>
+          <p:cNvPr id="19" name="TextBox 18">
+            <a:extLst>
+              <a:ext uri="{FF2B5EF4-FFF2-40B4-BE49-F238E27FC236}">
+                <a16:creationId xmlns:a16="http://schemas.microsoft.com/office/drawing/2014/main" id="{C63D40D1-EBC9-F65A-7B52-6EB153910D56}"/>
+              </a:ext>
+            </a:extLst>
+          </p:cNvPr>
+          <p:cNvSpPr txBox="1"/>
+          <p:nvPr/>
+        </p:nvSpPr>
+        <p:spPr>
+          <a:xfrm>
+            <a:off x="1115852" y="18153616"/>
+            <a:ext cx="9141234" cy="2369880"/>
+          </a:xfrm>
+          <a:prstGeom prst="rect">
+            <a:avLst/>
+          </a:prstGeom>
+          <a:noFill/>
+        </p:spPr>
+        <p:txBody>
+          <a:bodyPr wrap="square" rtlCol="0">
+            <a:spAutoFit/>
+          </a:bodyPr>
+          <a:lstStyle/>
+          <a:p>
+            <a:r>
+              <a:rPr lang="en-US" sz="2400" b="1" dirty="0">
+                <a:latin typeface="Georgia" panose="02040502050405020303" pitchFamily="18" charset="0"/>
+              </a:rPr>
+              <a:t>Adaptive Cross Approximation (ACA) </a:t>
+            </a:r>
+            <a:r>
+              <a:rPr lang="en-US" sz="2400" b="1" dirty="0" err="1">
+                <a:latin typeface="Georgia" panose="02040502050405020303" pitchFamily="18" charset="0"/>
+              </a:rPr>
+              <a:t>uitbreiden</a:t>
+            </a:r>
+            <a:endParaRPr lang="en-US" sz="2400" b="1" dirty="0">
+              <a:latin typeface="Georgia" panose="02040502050405020303" pitchFamily="18" charset="0"/>
+            </a:endParaRPr>
+          </a:p>
+          <a:p>
+            <a:pPr marL="800100" lvl="1" indent="-342900">
+              <a:buFont typeface="Arial" panose="020B0604020202020204" pitchFamily="34" charset="0"/>
+              <a:buChar char="•"/>
+            </a:pPr>
+            <a:r>
+              <a:rPr lang="en-US" dirty="0" err="1">
+                <a:latin typeface="Georgia" panose="02040502050405020303" pitchFamily="18" charset="0"/>
+              </a:rPr>
+              <a:t>Decompositie</a:t>
+            </a:r>
+            <a:r>
+              <a:rPr lang="en-US" dirty="0">
+                <a:latin typeface="Georgia" panose="02040502050405020303" pitchFamily="18" charset="0"/>
+              </a:rPr>
+              <a:t> </a:t>
+            </a:r>
+            <a:r>
+              <a:rPr lang="en-US" dirty="0" err="1">
+                <a:latin typeface="Georgia" panose="02040502050405020303" pitchFamily="18" charset="0"/>
+              </a:rPr>
+              <a:t>algoritme</a:t>
+            </a:r>
+            <a:r>
+              <a:rPr lang="en-US" dirty="0">
+                <a:latin typeface="Georgia" panose="02040502050405020303" pitchFamily="18" charset="0"/>
+              </a:rPr>
+              <a:t> </a:t>
+            </a:r>
+            <a:r>
+              <a:rPr lang="en-US" dirty="0" err="1">
+                <a:latin typeface="Georgia" panose="02040502050405020303" pitchFamily="18" charset="0"/>
+              </a:rPr>
+              <a:t>voor</a:t>
+            </a:r>
+            <a:r>
+              <a:rPr lang="en-US" dirty="0">
+                <a:latin typeface="Georgia" panose="02040502050405020303" pitchFamily="18" charset="0"/>
+              </a:rPr>
+              <a:t> matrices</a:t>
+            </a:r>
+          </a:p>
+          <a:p>
+            <a:pPr marL="800100" lvl="1" indent="-342900">
+              <a:buFont typeface="Arial" panose="020B0604020202020204" pitchFamily="34" charset="0"/>
+              <a:buChar char="•"/>
+            </a:pPr>
+            <a:r>
+              <a:rPr lang="en-US" b="1" dirty="0">
+                <a:latin typeface="Georgia" panose="02040502050405020303" pitchFamily="18" charset="0"/>
+              </a:rPr>
+              <a:t>Adaptive: </a:t>
+            </a:r>
+            <a:r>
+              <a:rPr lang="en-US" dirty="0" err="1">
+                <a:latin typeface="Georgia" panose="02040502050405020303" pitchFamily="18" charset="0"/>
+              </a:rPr>
+              <a:t>Focust</a:t>
+            </a:r>
+            <a:r>
+              <a:rPr lang="en-US" dirty="0">
+                <a:latin typeface="Georgia" panose="02040502050405020303" pitchFamily="18" charset="0"/>
+              </a:rPr>
+              <a:t> op </a:t>
+            </a:r>
+            <a:r>
+              <a:rPr lang="en-US" dirty="0" err="1">
+                <a:latin typeface="Georgia" panose="02040502050405020303" pitchFamily="18" charset="0"/>
+              </a:rPr>
+              <a:t>grootste</a:t>
+            </a:r>
+            <a:r>
+              <a:rPr lang="en-US" dirty="0">
+                <a:latin typeface="Georgia" panose="02040502050405020303" pitchFamily="18" charset="0"/>
+              </a:rPr>
+              <a:t> </a:t>
+            </a:r>
+            <a:r>
+              <a:rPr lang="en-US" dirty="0" err="1">
+                <a:latin typeface="Georgia" panose="02040502050405020303" pitchFamily="18" charset="0"/>
+              </a:rPr>
+              <a:t>en</a:t>
+            </a:r>
+            <a:r>
+              <a:rPr lang="en-US" dirty="0">
+                <a:latin typeface="Georgia" panose="02040502050405020303" pitchFamily="18" charset="0"/>
+              </a:rPr>
+              <a:t> </a:t>
+            </a:r>
+            <a:r>
+              <a:rPr lang="en-US" dirty="0" err="1">
+                <a:latin typeface="Georgia" panose="02040502050405020303" pitchFamily="18" charset="0"/>
+              </a:rPr>
+              <a:t>dus</a:t>
+            </a:r>
+            <a:r>
+              <a:rPr lang="en-US" dirty="0">
+                <a:latin typeface="Georgia" panose="02040502050405020303" pitchFamily="18" charset="0"/>
+              </a:rPr>
+              <a:t> </a:t>
+            </a:r>
+            <a:r>
+              <a:rPr lang="en-US" dirty="0" err="1">
+                <a:latin typeface="Georgia" panose="02040502050405020303" pitchFamily="18" charset="0"/>
+              </a:rPr>
+              <a:t>belangrijkste</a:t>
+            </a:r>
+            <a:r>
+              <a:rPr lang="en-US" dirty="0">
+                <a:latin typeface="Georgia" panose="02040502050405020303" pitchFamily="18" charset="0"/>
+              </a:rPr>
+              <a:t> </a:t>
+            </a:r>
+            <a:r>
+              <a:rPr lang="en-US" dirty="0" err="1">
+                <a:latin typeface="Georgia" panose="02040502050405020303" pitchFamily="18" charset="0"/>
+              </a:rPr>
+              <a:t>elementen</a:t>
+            </a:r>
+            <a:endParaRPr lang="en-US" dirty="0">
+              <a:latin typeface="Georgia" panose="02040502050405020303" pitchFamily="18" charset="0"/>
+            </a:endParaRPr>
+          </a:p>
+          <a:p>
+            <a:pPr marL="800100" lvl="1" indent="-342900">
+              <a:buFont typeface="Arial" panose="020B0604020202020204" pitchFamily="34" charset="0"/>
+              <a:buChar char="•"/>
+            </a:pPr>
+            <a:r>
+              <a:rPr lang="en-US" b="1" dirty="0">
+                <a:latin typeface="Georgia" panose="02040502050405020303" pitchFamily="18" charset="0"/>
+              </a:rPr>
+              <a:t>Cross: </a:t>
+            </a:r>
+            <a:r>
+              <a:rPr lang="en-US" dirty="0" err="1">
+                <a:latin typeface="Georgia" panose="02040502050405020303" pitchFamily="18" charset="0"/>
+              </a:rPr>
+              <a:t>Iteratief</a:t>
+            </a:r>
+            <a:r>
+              <a:rPr lang="en-US" dirty="0">
+                <a:latin typeface="Georgia" panose="02040502050405020303" pitchFamily="18" charset="0"/>
+              </a:rPr>
+              <a:t> </a:t>
+            </a:r>
+            <a:r>
+              <a:rPr lang="en-US" dirty="0" err="1">
+                <a:latin typeface="Georgia" panose="02040502050405020303" pitchFamily="18" charset="0"/>
+              </a:rPr>
+              <a:t>een</a:t>
+            </a:r>
+            <a:r>
+              <a:rPr lang="en-US" dirty="0">
+                <a:latin typeface="Georgia" panose="02040502050405020303" pitchFamily="18" charset="0"/>
+              </a:rPr>
+              <a:t> </a:t>
+            </a:r>
+            <a:r>
+              <a:rPr lang="en-US" dirty="0" err="1">
+                <a:latin typeface="Georgia" panose="02040502050405020303" pitchFamily="18" charset="0"/>
+              </a:rPr>
+              <a:t>rij</a:t>
+            </a:r>
+            <a:r>
+              <a:rPr lang="en-US" dirty="0">
+                <a:latin typeface="Georgia" panose="02040502050405020303" pitchFamily="18" charset="0"/>
+              </a:rPr>
+              <a:t> </a:t>
+            </a:r>
+            <a:r>
+              <a:rPr lang="en-US" dirty="0" err="1">
+                <a:latin typeface="Georgia" panose="02040502050405020303" pitchFamily="18" charset="0"/>
+              </a:rPr>
+              <a:t>en</a:t>
+            </a:r>
+            <a:r>
+              <a:rPr lang="en-US" dirty="0">
+                <a:latin typeface="Georgia" panose="02040502050405020303" pitchFamily="18" charset="0"/>
+              </a:rPr>
+              <a:t> </a:t>
+            </a:r>
+            <a:r>
+              <a:rPr lang="en-US" dirty="0" err="1">
+                <a:latin typeface="Georgia" panose="02040502050405020303" pitchFamily="18" charset="0"/>
+              </a:rPr>
+              <a:t>kolom</a:t>
+            </a:r>
+            <a:r>
+              <a:rPr lang="en-US" dirty="0">
+                <a:latin typeface="Georgia" panose="02040502050405020303" pitchFamily="18" charset="0"/>
+              </a:rPr>
+              <a:t> </a:t>
+            </a:r>
+            <a:r>
+              <a:rPr lang="en-US" dirty="0" err="1">
+                <a:latin typeface="Georgia" panose="02040502050405020303" pitchFamily="18" charset="0"/>
+              </a:rPr>
+              <a:t>aan</a:t>
+            </a:r>
+            <a:r>
+              <a:rPr lang="en-US" dirty="0">
+                <a:latin typeface="Georgia" panose="02040502050405020303" pitchFamily="18" charset="0"/>
+              </a:rPr>
+              <a:t> </a:t>
+            </a:r>
+            <a:r>
+              <a:rPr lang="en-US" dirty="0" err="1">
+                <a:latin typeface="Georgia" panose="02040502050405020303" pitchFamily="18" charset="0"/>
+              </a:rPr>
+              <a:t>decompositie</a:t>
+            </a:r>
+            <a:r>
+              <a:rPr lang="en-US" dirty="0">
+                <a:latin typeface="Georgia" panose="02040502050405020303" pitchFamily="18" charset="0"/>
+              </a:rPr>
+              <a:t> </a:t>
+            </a:r>
+            <a:r>
+              <a:rPr lang="en-US" dirty="0" err="1">
+                <a:latin typeface="Georgia" panose="02040502050405020303" pitchFamily="18" charset="0"/>
+              </a:rPr>
+              <a:t>toevoegen</a:t>
+            </a:r>
+            <a:endParaRPr lang="en-US" dirty="0">
+              <a:latin typeface="Georgia" panose="02040502050405020303" pitchFamily="18" charset="0"/>
+            </a:endParaRPr>
+          </a:p>
+          <a:p>
+            <a:pPr marL="800100" lvl="1" indent="-342900">
+              <a:buFont typeface="Arial" panose="020B0604020202020204" pitchFamily="34" charset="0"/>
+              <a:buChar char="•"/>
+            </a:pPr>
+            <a:r>
+              <a:rPr lang="en-US" dirty="0" err="1">
+                <a:latin typeface="Georgia" panose="02040502050405020303" pitchFamily="18" charset="0"/>
+              </a:rPr>
+              <a:t>Kleinere</a:t>
+            </a:r>
+            <a:r>
+              <a:rPr lang="en-US" dirty="0">
+                <a:latin typeface="Georgia" panose="02040502050405020303" pitchFamily="18" charset="0"/>
+              </a:rPr>
+              <a:t> </a:t>
+            </a:r>
+            <a:r>
+              <a:rPr lang="en-US" dirty="0" err="1">
+                <a:latin typeface="Georgia" panose="02040502050405020303" pitchFamily="18" charset="0"/>
+              </a:rPr>
+              <a:t>elementen</a:t>
+            </a:r>
+            <a:r>
+              <a:rPr lang="en-US" dirty="0">
+                <a:latin typeface="Georgia" panose="02040502050405020303" pitchFamily="18" charset="0"/>
+              </a:rPr>
+              <a:t> </a:t>
+            </a:r>
+            <a:r>
+              <a:rPr lang="en-US" dirty="0" err="1">
+                <a:latin typeface="Georgia" panose="02040502050405020303" pitchFamily="18" charset="0"/>
+              </a:rPr>
+              <a:t>niet</a:t>
+            </a:r>
+            <a:r>
+              <a:rPr lang="en-US" dirty="0">
+                <a:latin typeface="Georgia" panose="02040502050405020303" pitchFamily="18" charset="0"/>
+              </a:rPr>
+              <a:t> </a:t>
+            </a:r>
+            <a:r>
+              <a:rPr lang="en-US" dirty="0" err="1">
+                <a:latin typeface="Georgia" panose="02040502050405020303" pitchFamily="18" charset="0"/>
+              </a:rPr>
+              <a:t>nodig</a:t>
+            </a:r>
+            <a:endParaRPr lang="en-US" dirty="0">
+              <a:latin typeface="Georgia" panose="02040502050405020303" pitchFamily="18" charset="0"/>
+            </a:endParaRPr>
+          </a:p>
+          <a:p>
+            <a:pPr lvl="1"/>
+            <a:r>
+              <a:rPr lang="en-US" dirty="0">
+                <a:latin typeface="Georgia Pro Cond Semibold" panose="020F0502020204030204" pitchFamily="18" charset="0"/>
+              </a:rPr>
+              <a:t>	→ </a:t>
+            </a:r>
+            <a:r>
+              <a:rPr lang="en-US" dirty="0" err="1">
+                <a:latin typeface="Georgia" panose="02040502050405020303" pitchFamily="18" charset="0"/>
+              </a:rPr>
+              <a:t>Ideaal</a:t>
+            </a:r>
+            <a:r>
+              <a:rPr lang="en-US" dirty="0">
+                <a:latin typeface="Georgia" panose="02040502050405020303" pitchFamily="18" charset="0"/>
+              </a:rPr>
+              <a:t> </a:t>
+            </a:r>
+            <a:r>
+              <a:rPr lang="en-US" dirty="0" err="1">
+                <a:latin typeface="Georgia" panose="02040502050405020303" pitchFamily="18" charset="0"/>
+              </a:rPr>
+              <a:t>voor</a:t>
+            </a:r>
+            <a:r>
+              <a:rPr lang="en-US" dirty="0">
+                <a:latin typeface="Georgia" panose="02040502050405020303" pitchFamily="18" charset="0"/>
+              </a:rPr>
+              <a:t> </a:t>
+            </a:r>
+            <a:r>
+              <a:rPr lang="en-US" dirty="0" err="1">
+                <a:latin typeface="Georgia" panose="02040502050405020303" pitchFamily="18" charset="0"/>
+              </a:rPr>
+              <a:t>een</a:t>
+            </a:r>
+            <a:r>
+              <a:rPr lang="en-US" dirty="0">
+                <a:latin typeface="Georgia" panose="02040502050405020303" pitchFamily="18" charset="0"/>
+              </a:rPr>
+              <a:t> </a:t>
+            </a:r>
+            <a:r>
+              <a:rPr lang="en-US" dirty="0" err="1">
+                <a:latin typeface="Georgia" panose="02040502050405020303" pitchFamily="18" charset="0"/>
+              </a:rPr>
+              <a:t>decompositie</a:t>
+            </a:r>
+            <a:r>
+              <a:rPr lang="en-US" dirty="0">
+                <a:latin typeface="Georgia" panose="02040502050405020303" pitchFamily="18" charset="0"/>
+              </a:rPr>
+              <a:t> van de </a:t>
+            </a:r>
+            <a:r>
+              <a:rPr lang="en-US" dirty="0" err="1">
+                <a:latin typeface="Georgia" panose="02040502050405020303" pitchFamily="18" charset="0"/>
+              </a:rPr>
+              <a:t>afstandstensor</a:t>
+            </a:r>
+            <a:endParaRPr lang="en-US" dirty="0">
+              <a:latin typeface="Georgia" panose="02040502050405020303" pitchFamily="18" charset="0"/>
+            </a:endParaRPr>
+          </a:p>
+          <a:p>
+            <a:pPr lvl="3"/>
+            <a:r>
+              <a:rPr lang="en-US" dirty="0">
+                <a:latin typeface="Georgia" panose="02040502050405020303" pitchFamily="18" charset="0"/>
+              </a:rPr>
+              <a:t>→ ACA </a:t>
+            </a:r>
+            <a:r>
+              <a:rPr lang="en-US" dirty="0" err="1">
+                <a:latin typeface="Georgia" panose="02040502050405020303" pitchFamily="18" charset="0"/>
+              </a:rPr>
+              <a:t>methodes</a:t>
+            </a:r>
+            <a:r>
+              <a:rPr lang="en-US" dirty="0">
+                <a:latin typeface="Georgia" panose="02040502050405020303" pitchFamily="18" charset="0"/>
+              </a:rPr>
+              <a:t> </a:t>
+            </a:r>
+            <a:r>
+              <a:rPr lang="en-US" dirty="0" err="1">
+                <a:latin typeface="Georgia" panose="02040502050405020303" pitchFamily="18" charset="0"/>
+              </a:rPr>
+              <a:t>voor</a:t>
+            </a:r>
+            <a:r>
+              <a:rPr lang="en-US" dirty="0">
+                <a:latin typeface="Georgia" panose="02040502050405020303" pitchFamily="18" charset="0"/>
+              </a:rPr>
+              <a:t> </a:t>
+            </a:r>
+            <a:r>
+              <a:rPr lang="en-US" dirty="0" err="1">
+                <a:latin typeface="Georgia" panose="02040502050405020303" pitchFamily="18" charset="0"/>
+              </a:rPr>
+              <a:t>tensoren</a:t>
+            </a:r>
+            <a:r>
+              <a:rPr lang="en-US" dirty="0">
+                <a:latin typeface="Georgia" panose="02040502050405020303" pitchFamily="18" charset="0"/>
+              </a:rPr>
+              <a:t> </a:t>
+            </a:r>
+            <a:r>
+              <a:rPr lang="en-US" dirty="0" err="1">
+                <a:latin typeface="Georgia" panose="02040502050405020303" pitchFamily="18" charset="0"/>
+              </a:rPr>
+              <a:t>ontwikkelen</a:t>
+            </a:r>
+            <a:endParaRPr lang="en-US" dirty="0">
+              <a:latin typeface="Georgia" panose="02040502050405020303" pitchFamily="18" charset="0"/>
+            </a:endParaRPr>
+          </a:p>
+          <a:p>
+            <a:pPr lvl="1"/>
+            <a:endParaRPr lang="en-US" sz="1600" dirty="0">
+              <a:latin typeface="Georgia" panose="02040502050405020303" pitchFamily="18" charset="0"/>
+            </a:endParaRPr>
+          </a:p>
+        </p:txBody>
+      </p:sp>
+      <p:sp>
+        <p:nvSpPr>
+          <p:cNvPr id="22" name="Oval 21">
+            <a:extLst>
+              <a:ext uri="{FF2B5EF4-FFF2-40B4-BE49-F238E27FC236}">
+                <a16:creationId xmlns:a16="http://schemas.microsoft.com/office/drawing/2014/main" id="{76B0896A-49B8-FEC6-4019-CC8E7359EE23}"/>
+              </a:ext>
+            </a:extLst>
+          </p:cNvPr>
+          <p:cNvSpPr/>
+          <p:nvPr/>
+        </p:nvSpPr>
+        <p:spPr>
+          <a:xfrm>
+            <a:off x="421540" y="10370177"/>
+            <a:ext cx="682560" cy="682560"/>
+          </a:xfrm>
+          <a:prstGeom prst="ellipse">
+            <a:avLst/>
+          </a:prstGeom>
+          <a:solidFill>
+            <a:schemeClr val="accent5">
+              <a:lumMod val="20000"/>
+              <a:lumOff val="80000"/>
+            </a:schemeClr>
+          </a:solidFill>
+          <a:ln w="190500">
+            <a:solidFill>
+              <a:schemeClr val="accent1"/>
+            </a:solidFill>
+          </a:ln>
+        </p:spPr>
+        <p:style>
+          <a:lnRef idx="2">
+            <a:schemeClr val="accent1">
+              <a:shade val="15000"/>
+            </a:schemeClr>
+          </a:lnRef>
+          <a:fillRef idx="1">
+            <a:schemeClr val="accent1"/>
+          </a:fillRef>
+          <a:effectRef idx="0">
+            <a:schemeClr val="accent1"/>
+          </a:effectRef>
+          <a:fontRef idx="minor">
+            <a:schemeClr val="lt1"/>
+          </a:fontRef>
+        </p:style>
+        <p:txBody>
+          <a:bodyPr rtlCol="0" anchor="ctr"/>
+          <a:lstStyle/>
+          <a:p>
+            <a:pPr algn="ctr"/>
+            <a:endParaRPr lang="LID4096"/>
+          </a:p>
         </p:txBody>
       </p:sp>
       <p:pic>
         <p:nvPicPr>
-          <p:cNvPr id="66" name="Graphic 65">
+          <p:cNvPr id="29" name="Graphic 28">
             <a:extLst>
               <a:ext uri="{FF2B5EF4-FFF2-40B4-BE49-F238E27FC236}">
-                <a16:creationId xmlns:a16="http://schemas.microsoft.com/office/drawing/2014/main" id="{9F382A2D-94FA-3B8D-C406-F25D7FDED5C9}"/>
+                <a16:creationId xmlns:a16="http://schemas.microsoft.com/office/drawing/2014/main" id="{08AF906F-A800-1982-0517-3C4CA95BD654}"/>
               </a:ext>
             </a:extLst>
           </p:cNvPr>
@@ -6820,13 +7264,13 @@
           <p:nvPr/>
         </p:nvPicPr>
         <p:blipFill>
-          <a:blip r:embed="rId4">
+          <a:blip r:embed="rId6">
             <a:extLst>
               <a:ext uri="{28A0092B-C50C-407E-A947-70E740481C1C}">
                 <a14:useLocalDpi xmlns:a14="http://schemas.microsoft.com/office/drawing/2010/main" val="0"/>
               </a:ext>
               <a:ext uri="{96DAC541-7B7A-43D3-8B79-37D633B846F1}">
-                <asvg:svgBlip xmlns:asvg="http://schemas.microsoft.com/office/drawing/2016/SVG/main" r:embed="rId5"/>
+                <asvg:svgBlip xmlns:asvg="http://schemas.microsoft.com/office/drawing/2016/SVG/main" r:embed="rId7"/>
               </a:ext>
             </a:extLst>
           </a:blip>
@@ -6836,14 +7280,176 @@
         </p:blipFill>
         <p:spPr>
           <a:xfrm>
-            <a:off x="11989043" y="15100478"/>
-            <a:ext cx="6737272" cy="1243187"/>
+            <a:off x="11488449" y="15387829"/>
+            <a:ext cx="7691041" cy="1453795"/>
           </a:xfrm>
           <a:prstGeom prst="rect">
             <a:avLst/>
           </a:prstGeom>
         </p:spPr>
       </p:pic>
+      <p:cxnSp>
+        <p:nvCxnSpPr>
+          <p:cNvPr id="34" name="Straight Connector 33">
+            <a:extLst>
+              <a:ext uri="{FF2B5EF4-FFF2-40B4-BE49-F238E27FC236}">
+                <a16:creationId xmlns:a16="http://schemas.microsoft.com/office/drawing/2014/main" id="{743B6312-0013-18CB-429C-CAA3CC20B35C}"/>
+              </a:ext>
+            </a:extLst>
+          </p:cNvPr>
+          <p:cNvCxnSpPr>
+            <a:cxnSpLocks/>
+          </p:cNvCxnSpPr>
+          <p:nvPr/>
+        </p:nvCxnSpPr>
+        <p:spPr>
+          <a:xfrm flipH="1">
+            <a:off x="12475249" y="16841623"/>
+            <a:ext cx="1407795" cy="577974"/>
+          </a:xfrm>
+          <a:prstGeom prst="line">
+            <a:avLst/>
+          </a:prstGeom>
+        </p:spPr>
+        <p:style>
+          <a:lnRef idx="1">
+            <a:schemeClr val="dk1"/>
+          </a:lnRef>
+          <a:fillRef idx="0">
+            <a:schemeClr val="dk1"/>
+          </a:fillRef>
+          <a:effectRef idx="0">
+            <a:schemeClr val="dk1"/>
+          </a:effectRef>
+          <a:fontRef idx="minor">
+            <a:schemeClr val="tx1"/>
+          </a:fontRef>
+        </p:style>
+      </p:cxnSp>
+      <p:cxnSp>
+        <p:nvCxnSpPr>
+          <p:cNvPr id="40" name="Straight Connector 39">
+            <a:extLst>
+              <a:ext uri="{FF2B5EF4-FFF2-40B4-BE49-F238E27FC236}">
+                <a16:creationId xmlns:a16="http://schemas.microsoft.com/office/drawing/2014/main" id="{4842BBD8-A515-2CCD-65E0-572A50957918}"/>
+              </a:ext>
+            </a:extLst>
+          </p:cNvPr>
+          <p:cNvCxnSpPr>
+            <a:cxnSpLocks/>
+          </p:cNvCxnSpPr>
+          <p:nvPr/>
+        </p:nvCxnSpPr>
+        <p:spPr>
+          <a:xfrm>
+            <a:off x="14682266" y="16841623"/>
+            <a:ext cx="1877303" cy="577974"/>
+          </a:xfrm>
+          <a:prstGeom prst="line">
+            <a:avLst/>
+          </a:prstGeom>
+        </p:spPr>
+        <p:style>
+          <a:lnRef idx="1">
+            <a:schemeClr val="dk1"/>
+          </a:lnRef>
+          <a:fillRef idx="0">
+            <a:schemeClr val="dk1"/>
+          </a:fillRef>
+          <a:effectRef idx="0">
+            <a:schemeClr val="dk1"/>
+          </a:effectRef>
+          <a:fontRef idx="minor">
+            <a:schemeClr val="tx1"/>
+          </a:fontRef>
+        </p:style>
+      </p:cxnSp>
+      <p:pic>
+        <p:nvPicPr>
+          <p:cNvPr id="77" name="Graphic 76">
+            <a:extLst>
+              <a:ext uri="{FF2B5EF4-FFF2-40B4-BE49-F238E27FC236}">
+                <a16:creationId xmlns:a16="http://schemas.microsoft.com/office/drawing/2014/main" id="{133CE5B6-6832-8A39-2B6E-23984CEBF03E}"/>
+              </a:ext>
+            </a:extLst>
+          </p:cNvPr>
+          <p:cNvPicPr>
+            <a:picLocks noChangeAspect="1"/>
+          </p:cNvPicPr>
+          <p:nvPr/>
+        </p:nvPicPr>
+        <p:blipFill>
+          <a:blip r:embed="rId8">
+            <a:extLst>
+              <a:ext uri="{28A0092B-C50C-407E-A947-70E740481C1C}">
+                <a14:useLocalDpi xmlns:a14="http://schemas.microsoft.com/office/drawing/2010/main" val="0"/>
+              </a:ext>
+              <a:ext uri="{96DAC541-7B7A-43D3-8B79-37D633B846F1}">
+                <asvg:svgBlip xmlns:asvg="http://schemas.microsoft.com/office/drawing/2016/SVG/main" r:embed="rId9"/>
+              </a:ext>
+            </a:extLst>
+          </a:blip>
+          <a:stretch>
+            <a:fillRect/>
+          </a:stretch>
+        </p:blipFill>
+        <p:spPr>
+          <a:xfrm>
+            <a:off x="12267956" y="17419597"/>
+            <a:ext cx="4310613" cy="1031599"/>
+          </a:xfrm>
+          <a:prstGeom prst="rect">
+            <a:avLst/>
+          </a:prstGeom>
+        </p:spPr>
+      </p:pic>
+      <p:sp>
+        <p:nvSpPr>
+          <p:cNvPr id="80" name="TextBox 79">
+            <a:extLst>
+              <a:ext uri="{FF2B5EF4-FFF2-40B4-BE49-F238E27FC236}">
+                <a16:creationId xmlns:a16="http://schemas.microsoft.com/office/drawing/2014/main" id="{366C13C7-AF0F-5AF0-D239-DD4089AF54B7}"/>
+              </a:ext>
+            </a:extLst>
+          </p:cNvPr>
+          <p:cNvSpPr txBox="1"/>
+          <p:nvPr/>
+        </p:nvSpPr>
+        <p:spPr>
+          <a:xfrm>
+            <a:off x="14008735" y="18410155"/>
+            <a:ext cx="829054" cy="338554"/>
+          </a:xfrm>
+          <a:prstGeom prst="rect">
+            <a:avLst/>
+          </a:prstGeom>
+          <a:noFill/>
+        </p:spPr>
+        <p:txBody>
+          <a:bodyPr wrap="square" rtlCol="0">
+            <a:spAutoFit/>
+          </a:bodyPr>
+          <a:lstStyle/>
+          <a:p>
+            <a:pPr algn="ctr"/>
+            <a:r>
+              <a:rPr lang="en-US" sz="1600" i="1" dirty="0">
+                <a:latin typeface="Georgia" panose="02040502050405020303" pitchFamily="18" charset="0"/>
+              </a:rPr>
+              <a:t>k </a:t>
+            </a:r>
+            <a:r>
+              <a:rPr lang="en-US" sz="1600" i="1" dirty="0" err="1">
+                <a:latin typeface="Georgia" panose="02040502050405020303" pitchFamily="18" charset="0"/>
+              </a:rPr>
+              <a:t>keer</a:t>
+            </a:r>
+            <a:endParaRPr lang="en-US" sz="1600" i="1" dirty="0">
+              <a:latin typeface="Georgia" panose="02040502050405020303" pitchFamily="18" charset="0"/>
+            </a:endParaRPr>
+          </a:p>
+        </p:txBody>
+      </p:sp>
     </p:spTree>
     <p:extLst>
       <p:ext uri="{BB962C8B-B14F-4D97-AF65-F5344CB8AC3E}">

</xml_diff>

<commit_message>
Added cluster section to poster
</commit_message>
<xml_diff>
--- a/Poster.pptx
+++ b/Poster.pptx
@@ -7450,6 +7450,524 @@
           </a:p>
         </p:txBody>
       </p:sp>
+      <p:sp>
+        <p:nvSpPr>
+          <p:cNvPr id="21" name="TextBox 20">
+            <a:extLst>
+              <a:ext uri="{FF2B5EF4-FFF2-40B4-BE49-F238E27FC236}">
+                <a16:creationId xmlns:a16="http://schemas.microsoft.com/office/drawing/2014/main" id="{C7DFE0F1-1A2C-98CC-EB06-5E93E4118B46}"/>
+              </a:ext>
+            </a:extLst>
+          </p:cNvPr>
+          <p:cNvSpPr txBox="1"/>
+          <p:nvPr/>
+        </p:nvSpPr>
+        <p:spPr>
+          <a:xfrm>
+            <a:off x="20874338" y="12884610"/>
+            <a:ext cx="8522052" cy="1292662"/>
+          </a:xfrm>
+          <a:prstGeom prst="rect">
+            <a:avLst/>
+          </a:prstGeom>
+          <a:noFill/>
+        </p:spPr>
+        <p:txBody>
+          <a:bodyPr wrap="square" rtlCol="0">
+            <a:spAutoFit/>
+          </a:bodyPr>
+          <a:lstStyle/>
+          <a:p>
+            <a:r>
+              <a:rPr lang="en-US" sz="2400" b="1" dirty="0" err="1">
+                <a:latin typeface="Georgia" panose="02040502050405020303" pitchFamily="18" charset="0"/>
+              </a:rPr>
+              <a:t>Clusteren</a:t>
+            </a:r>
+            <a:r>
+              <a:rPr lang="en-US" sz="2400" b="1" dirty="0">
+                <a:latin typeface="Georgia" panose="02040502050405020303" pitchFamily="18" charset="0"/>
+              </a:rPr>
+              <a:t> in </a:t>
+            </a:r>
+            <a:r>
+              <a:rPr lang="en-US" sz="2400" b="1" dirty="0" err="1">
+                <a:latin typeface="Georgia" panose="02040502050405020303" pitchFamily="18" charset="0"/>
+              </a:rPr>
+              <a:t>specifieke</a:t>
+            </a:r>
+            <a:r>
+              <a:rPr lang="en-US" sz="2400" b="1" dirty="0">
+                <a:latin typeface="Georgia" panose="02040502050405020303" pitchFamily="18" charset="0"/>
+              </a:rPr>
+              <a:t> </a:t>
+            </a:r>
+            <a:r>
+              <a:rPr lang="en-US" sz="2400" b="1" dirty="0" err="1">
+                <a:latin typeface="Georgia" panose="02040502050405020303" pitchFamily="18" charset="0"/>
+              </a:rPr>
+              <a:t>dimensie</a:t>
+            </a:r>
+            <a:endParaRPr lang="en-US" sz="2400" b="1" dirty="0">
+              <a:latin typeface="Georgia" panose="02040502050405020303" pitchFamily="18" charset="0"/>
+            </a:endParaRPr>
+          </a:p>
+          <a:p>
+            <a:pPr marL="742950" lvl="1" indent="-285750">
+              <a:buFont typeface="Arial" panose="020B0604020202020204" pitchFamily="34" charset="0"/>
+              <a:buChar char="•"/>
+            </a:pPr>
+            <a:r>
+              <a:rPr lang="en-US" dirty="0" err="1">
+                <a:latin typeface="Georgia" panose="02040502050405020303" pitchFamily="18" charset="0"/>
+              </a:rPr>
+              <a:t>Rijen</a:t>
+            </a:r>
+            <a:r>
+              <a:rPr lang="en-US" dirty="0">
+                <a:latin typeface="Georgia" panose="02040502050405020303" pitchFamily="18" charset="0"/>
+              </a:rPr>
+              <a:t>/</a:t>
+            </a:r>
+            <a:r>
+              <a:rPr lang="en-US" dirty="0" err="1">
+                <a:latin typeface="Georgia" panose="02040502050405020303" pitchFamily="18" charset="0"/>
+              </a:rPr>
+              <a:t>kolommen</a:t>
+            </a:r>
+            <a:r>
+              <a:rPr lang="en-US" dirty="0">
+                <a:latin typeface="Georgia" panose="02040502050405020303" pitchFamily="18" charset="0"/>
+              </a:rPr>
+              <a:t>/tubes </a:t>
+            </a:r>
+            <a:r>
+              <a:rPr lang="en-US" dirty="0" err="1">
+                <a:latin typeface="Georgia" panose="02040502050405020303" pitchFamily="18" charset="0"/>
+              </a:rPr>
+              <a:t>uit</a:t>
+            </a:r>
+            <a:r>
+              <a:rPr lang="en-US" dirty="0">
+                <a:latin typeface="Georgia" panose="02040502050405020303" pitchFamily="18" charset="0"/>
+              </a:rPr>
+              <a:t> </a:t>
+            </a:r>
+            <a:r>
+              <a:rPr lang="en-US" dirty="0" err="1">
+                <a:latin typeface="Georgia" panose="02040502050405020303" pitchFamily="18" charset="0"/>
+              </a:rPr>
+              <a:t>decompositie</a:t>
+            </a:r>
+            <a:r>
+              <a:rPr lang="en-US" dirty="0">
+                <a:latin typeface="Georgia" panose="02040502050405020303" pitchFamily="18" charset="0"/>
+              </a:rPr>
+              <a:t> </a:t>
+            </a:r>
+            <a:r>
+              <a:rPr lang="en-US" dirty="0" err="1">
+                <a:latin typeface="Georgia" panose="02040502050405020303" pitchFamily="18" charset="0"/>
+              </a:rPr>
+              <a:t>als</a:t>
+            </a:r>
+            <a:r>
+              <a:rPr lang="en-US" dirty="0">
+                <a:latin typeface="Georgia" panose="02040502050405020303" pitchFamily="18" charset="0"/>
+              </a:rPr>
+              <a:t> feature </a:t>
+            </a:r>
+            <a:r>
+              <a:rPr lang="en-US" dirty="0" err="1">
+                <a:latin typeface="Georgia" panose="02040502050405020303" pitchFamily="18" charset="0"/>
+              </a:rPr>
+              <a:t>vectoren</a:t>
+            </a:r>
+            <a:r>
+              <a:rPr lang="en-US" dirty="0">
+                <a:latin typeface="Georgia" panose="02040502050405020303" pitchFamily="18" charset="0"/>
+              </a:rPr>
+              <a:t> </a:t>
+            </a:r>
+            <a:r>
+              <a:rPr lang="en-US" dirty="0" err="1">
+                <a:latin typeface="Georgia" panose="02040502050405020303" pitchFamily="18" charset="0"/>
+              </a:rPr>
+              <a:t>kiezen</a:t>
+            </a:r>
+            <a:endParaRPr lang="en-US" dirty="0">
+              <a:latin typeface="Georgia" panose="02040502050405020303" pitchFamily="18" charset="0"/>
+            </a:endParaRPr>
+          </a:p>
+          <a:p>
+            <a:pPr lvl="2"/>
+            <a:r>
+              <a:rPr lang="en-US" i="1" dirty="0">
+                <a:latin typeface="Georgia" panose="02040502050405020303" pitchFamily="18" charset="0"/>
+              </a:rPr>
+              <a:t>→ </a:t>
+            </a:r>
+            <a:r>
+              <a:rPr lang="en-US" i="1" dirty="0" err="1">
+                <a:latin typeface="Georgia" panose="02040502050405020303" pitchFamily="18" charset="0"/>
+              </a:rPr>
+              <a:t>Dimensie</a:t>
+            </a:r>
+            <a:r>
+              <a:rPr lang="en-US" i="1" dirty="0">
+                <a:latin typeface="Georgia" panose="02040502050405020303" pitchFamily="18" charset="0"/>
+              </a:rPr>
+              <a:t> </a:t>
+            </a:r>
+            <a:r>
+              <a:rPr lang="en-US" i="1" dirty="0" err="1">
+                <a:latin typeface="Georgia" panose="02040502050405020303" pitchFamily="18" charset="0"/>
+              </a:rPr>
+              <a:t>bepaald</a:t>
+            </a:r>
+            <a:r>
+              <a:rPr lang="en-US" i="1" dirty="0">
+                <a:latin typeface="Georgia" panose="02040502050405020303" pitchFamily="18" charset="0"/>
+              </a:rPr>
+              <a:t> wat we </a:t>
+            </a:r>
+            <a:r>
+              <a:rPr lang="en-US" i="1" dirty="0" err="1">
+                <a:latin typeface="Georgia" panose="02040502050405020303" pitchFamily="18" charset="0"/>
+              </a:rPr>
+              <a:t>clusteren</a:t>
+            </a:r>
+            <a:endParaRPr lang="en-US" i="1" dirty="0">
+              <a:latin typeface="Georgia" panose="02040502050405020303" pitchFamily="18" charset="0"/>
+            </a:endParaRPr>
+          </a:p>
+          <a:p>
+            <a:pPr lvl="2"/>
+            <a:r>
+              <a:rPr lang="en-US" i="1" dirty="0">
+                <a:latin typeface="Georgia" panose="02040502050405020303" pitchFamily="18" charset="0"/>
+              </a:rPr>
+              <a:t>→ </a:t>
+            </a:r>
+            <a:r>
+              <a:rPr lang="en-US" i="1" dirty="0" err="1">
+                <a:latin typeface="Georgia" panose="02040502050405020303" pitchFamily="18" charset="0"/>
+              </a:rPr>
+              <a:t>Bij</a:t>
+            </a:r>
+            <a:r>
+              <a:rPr lang="en-US" i="1" dirty="0">
+                <a:latin typeface="Georgia" panose="02040502050405020303" pitchFamily="18" charset="0"/>
+              </a:rPr>
+              <a:t> AMIE-dataset: </a:t>
+            </a:r>
+            <a:r>
+              <a:rPr lang="en-US" i="1" dirty="0" err="1">
+                <a:latin typeface="Georgia" panose="02040502050405020303" pitchFamily="18" charset="0"/>
+              </a:rPr>
+              <a:t>clusteren</a:t>
+            </a:r>
+            <a:r>
+              <a:rPr lang="en-US" i="1" dirty="0">
+                <a:latin typeface="Georgia" panose="02040502050405020303" pitchFamily="18" charset="0"/>
+              </a:rPr>
+              <a:t> op </a:t>
+            </a:r>
+            <a:r>
+              <a:rPr lang="en-US" i="1" dirty="0" err="1">
+                <a:latin typeface="Georgia" panose="02040502050405020303" pitchFamily="18" charset="0"/>
+              </a:rPr>
+              <a:t>sensoren</a:t>
+            </a:r>
+            <a:r>
+              <a:rPr lang="en-US" i="1" dirty="0">
+                <a:latin typeface="Georgia" panose="02040502050405020303" pitchFamily="18" charset="0"/>
+              </a:rPr>
+              <a:t>/</a:t>
+            </a:r>
+            <a:r>
+              <a:rPr lang="en-US" i="1" dirty="0" err="1">
+                <a:latin typeface="Georgia" panose="02040502050405020303" pitchFamily="18" charset="0"/>
+              </a:rPr>
+              <a:t>personen</a:t>
+            </a:r>
+            <a:r>
+              <a:rPr lang="en-US" dirty="0">
+                <a:latin typeface="Georgia" panose="02040502050405020303" pitchFamily="18" charset="0"/>
+              </a:rPr>
+              <a:t>	</a:t>
+            </a:r>
+          </a:p>
+        </p:txBody>
+      </p:sp>
+      <p:pic>
+        <p:nvPicPr>
+          <p:cNvPr id="20" name="Graphic 19">
+            <a:extLst>
+              <a:ext uri="{FF2B5EF4-FFF2-40B4-BE49-F238E27FC236}">
+                <a16:creationId xmlns:a16="http://schemas.microsoft.com/office/drawing/2014/main" id="{F06FD827-955E-28AA-1B44-3E77AB3D756F}"/>
+              </a:ext>
+            </a:extLst>
+          </p:cNvPr>
+          <p:cNvPicPr>
+            <a:picLocks noChangeAspect="1"/>
+          </p:cNvPicPr>
+          <p:nvPr/>
+        </p:nvPicPr>
+        <p:blipFill>
+          <a:blip r:embed="rId10">
+            <a:extLst>
+              <a:ext uri="{28A0092B-C50C-407E-A947-70E740481C1C}">
+                <a14:useLocalDpi xmlns:a14="http://schemas.microsoft.com/office/drawing/2010/main" val="0"/>
+              </a:ext>
+              <a:ext uri="{96DAC541-7B7A-43D3-8B79-37D633B846F1}">
+                <asvg:svgBlip xmlns:asvg="http://schemas.microsoft.com/office/drawing/2016/SVG/main" r:embed="rId11"/>
+              </a:ext>
+            </a:extLst>
+          </a:blip>
+          <a:stretch>
+            <a:fillRect/>
+          </a:stretch>
+        </p:blipFill>
+        <p:spPr>
+          <a:xfrm>
+            <a:off x="22126548" y="16100461"/>
+            <a:ext cx="5537868" cy="4157911"/>
+          </a:xfrm>
+          <a:prstGeom prst="rect">
+            <a:avLst/>
+          </a:prstGeom>
+        </p:spPr>
+      </p:pic>
+      <p:sp>
+        <p:nvSpPr>
+          <p:cNvPr id="23" name="TextBox 22">
+            <a:extLst>
+              <a:ext uri="{FF2B5EF4-FFF2-40B4-BE49-F238E27FC236}">
+                <a16:creationId xmlns:a16="http://schemas.microsoft.com/office/drawing/2014/main" id="{ACE7DA28-DEDD-F992-B1AA-FFEF82E5FC55}"/>
+              </a:ext>
+            </a:extLst>
+          </p:cNvPr>
+          <p:cNvSpPr txBox="1"/>
+          <p:nvPr/>
+        </p:nvSpPr>
+        <p:spPr>
+          <a:xfrm>
+            <a:off x="20886772" y="14404977"/>
+            <a:ext cx="8522052" cy="1292662"/>
+          </a:xfrm>
+          <a:prstGeom prst="rect">
+            <a:avLst/>
+          </a:prstGeom>
+          <a:noFill/>
+        </p:spPr>
+        <p:txBody>
+          <a:bodyPr wrap="square" rtlCol="0">
+            <a:spAutoFit/>
+          </a:bodyPr>
+          <a:lstStyle/>
+          <a:p>
+            <a:r>
+              <a:rPr lang="en-US" sz="2400" b="1" dirty="0" err="1">
+                <a:latin typeface="Georgia" panose="02040502050405020303" pitchFamily="18" charset="0"/>
+              </a:rPr>
+              <a:t>Visualiseren</a:t>
+            </a:r>
+            <a:r>
+              <a:rPr lang="en-US" sz="2400" b="1" dirty="0">
+                <a:latin typeface="Georgia" panose="02040502050405020303" pitchFamily="18" charset="0"/>
+              </a:rPr>
+              <a:t> van de clusters</a:t>
+            </a:r>
+          </a:p>
+          <a:p>
+            <a:pPr marL="742950" lvl="1" indent="-285750">
+              <a:buFont typeface="Arial" panose="020B0604020202020204" pitchFamily="34" charset="0"/>
+              <a:buChar char="•"/>
+            </a:pPr>
+            <a:r>
+              <a:rPr lang="en-US" dirty="0" err="1">
+                <a:latin typeface="Georgia" panose="02040502050405020303" pitchFamily="18" charset="0"/>
+              </a:rPr>
+              <a:t>Vectoren</a:t>
+            </a:r>
+            <a:r>
+              <a:rPr lang="en-US" dirty="0">
+                <a:latin typeface="Georgia" panose="02040502050405020303" pitchFamily="18" charset="0"/>
+              </a:rPr>
+              <a:t> </a:t>
+            </a:r>
+            <a:r>
+              <a:rPr lang="en-US" dirty="0" err="1">
+                <a:latin typeface="Georgia" panose="02040502050405020303" pitchFamily="18" charset="0"/>
+              </a:rPr>
+              <a:t>hebben</a:t>
+            </a:r>
+            <a:r>
+              <a:rPr lang="en-US" dirty="0">
+                <a:latin typeface="Georgia" panose="02040502050405020303" pitchFamily="18" charset="0"/>
+              </a:rPr>
+              <a:t> </a:t>
+            </a:r>
+            <a:r>
+              <a:rPr lang="en-US" dirty="0" err="1">
+                <a:latin typeface="Georgia" panose="02040502050405020303" pitchFamily="18" charset="0"/>
+              </a:rPr>
+              <a:t>hoge</a:t>
+            </a:r>
+            <a:r>
+              <a:rPr lang="en-US" dirty="0">
+                <a:latin typeface="Georgia" panose="02040502050405020303" pitchFamily="18" charset="0"/>
+              </a:rPr>
+              <a:t> </a:t>
+            </a:r>
+            <a:r>
+              <a:rPr lang="en-US" dirty="0" err="1">
+                <a:latin typeface="Georgia" panose="02040502050405020303" pitchFamily="18" charset="0"/>
+              </a:rPr>
+              <a:t>dimensie</a:t>
+            </a:r>
+            <a:r>
+              <a:rPr lang="en-US" dirty="0">
+                <a:latin typeface="Georgia" panose="02040502050405020303" pitchFamily="18" charset="0"/>
+              </a:rPr>
+              <a:t> (tot 186 </a:t>
+            </a:r>
+            <a:r>
+              <a:rPr lang="en-US" dirty="0" err="1">
+                <a:latin typeface="Georgia" panose="02040502050405020303" pitchFamily="18" charset="0"/>
+              </a:rPr>
+              <a:t>bij</a:t>
+            </a:r>
+            <a:r>
+              <a:rPr lang="en-US" dirty="0">
+                <a:latin typeface="Georgia" panose="02040502050405020303" pitchFamily="18" charset="0"/>
+              </a:rPr>
+              <a:t> AMIE)</a:t>
+            </a:r>
+          </a:p>
+          <a:p>
+            <a:pPr lvl="1"/>
+            <a:r>
+              <a:rPr lang="en-US" i="1" dirty="0">
+                <a:latin typeface="Georgia" panose="02040502050405020303" pitchFamily="18" charset="0"/>
+              </a:rPr>
+              <a:t>	→ Principal Component Analysis om de </a:t>
+            </a:r>
+            <a:r>
+              <a:rPr lang="en-US" i="1" dirty="0" err="1">
+                <a:latin typeface="Georgia" panose="02040502050405020303" pitchFamily="18" charset="0"/>
+              </a:rPr>
+              <a:t>dimensie</a:t>
+            </a:r>
+            <a:r>
+              <a:rPr lang="en-US" i="1" dirty="0">
+                <a:latin typeface="Georgia" panose="02040502050405020303" pitchFamily="18" charset="0"/>
+              </a:rPr>
+              <a:t> </a:t>
+            </a:r>
+            <a:r>
+              <a:rPr lang="en-US" i="1" dirty="0" err="1">
+                <a:latin typeface="Georgia" panose="02040502050405020303" pitchFamily="18" charset="0"/>
+              </a:rPr>
+              <a:t>te</a:t>
+            </a:r>
+            <a:r>
+              <a:rPr lang="en-US" i="1" dirty="0">
+                <a:latin typeface="Georgia" panose="02040502050405020303" pitchFamily="18" charset="0"/>
+              </a:rPr>
+              <a:t> </a:t>
+            </a:r>
+            <a:r>
+              <a:rPr lang="en-US" i="1" dirty="0" err="1">
+                <a:latin typeface="Georgia" panose="02040502050405020303" pitchFamily="18" charset="0"/>
+              </a:rPr>
+              <a:t>reduceren</a:t>
+            </a:r>
+            <a:endParaRPr lang="en-US" dirty="0">
+              <a:latin typeface="Georgia" panose="02040502050405020303" pitchFamily="18" charset="0"/>
+            </a:endParaRPr>
+          </a:p>
+          <a:p>
+            <a:pPr lvl="2"/>
+            <a:r>
+              <a:rPr lang="en-US" i="1" dirty="0">
+                <a:latin typeface="Georgia" panose="02040502050405020303" pitchFamily="18" charset="0"/>
+              </a:rPr>
+              <a:t>→ </a:t>
+            </a:r>
+            <a:r>
+              <a:rPr lang="en-US" i="1" dirty="0" err="1">
+                <a:latin typeface="Georgia" panose="02040502050405020303" pitchFamily="18" charset="0"/>
+              </a:rPr>
+              <a:t>Enkel</a:t>
+            </a:r>
+            <a:r>
+              <a:rPr lang="en-US" i="1" dirty="0">
+                <a:latin typeface="Georgia" panose="02040502050405020303" pitchFamily="18" charset="0"/>
+              </a:rPr>
+              <a:t> </a:t>
+            </a:r>
+            <a:r>
+              <a:rPr lang="en-US" i="1" dirty="0" err="1">
+                <a:latin typeface="Georgia" panose="02040502050405020303" pitchFamily="18" charset="0"/>
+              </a:rPr>
+              <a:t>voor</a:t>
+            </a:r>
+            <a:r>
+              <a:rPr lang="en-US" i="1" dirty="0">
+                <a:latin typeface="Georgia" panose="02040502050405020303" pitchFamily="18" charset="0"/>
+              </a:rPr>
+              <a:t> </a:t>
+            </a:r>
+            <a:r>
+              <a:rPr lang="en-US" i="1" dirty="0" err="1">
+                <a:latin typeface="Georgia" panose="02040502050405020303" pitchFamily="18" charset="0"/>
+              </a:rPr>
+              <a:t>visualisatie</a:t>
+            </a:r>
+            <a:r>
+              <a:rPr lang="en-US" i="1" dirty="0">
+                <a:latin typeface="Georgia" panose="02040502050405020303" pitchFamily="18" charset="0"/>
+              </a:rPr>
+              <a:t>, </a:t>
+            </a:r>
+            <a:r>
+              <a:rPr lang="en-US" i="1" dirty="0" err="1">
+                <a:latin typeface="Georgia" panose="02040502050405020303" pitchFamily="18" charset="0"/>
+              </a:rPr>
+              <a:t>verder</a:t>
+            </a:r>
+            <a:r>
+              <a:rPr lang="en-US" i="1" dirty="0">
+                <a:latin typeface="Georgia" panose="02040502050405020303" pitchFamily="18" charset="0"/>
+              </a:rPr>
+              <a:t> </a:t>
+            </a:r>
+            <a:r>
+              <a:rPr lang="en-US" i="1" dirty="0" err="1">
+                <a:latin typeface="Georgia" panose="02040502050405020303" pitchFamily="18" charset="0"/>
+              </a:rPr>
+              <a:t>geen</a:t>
+            </a:r>
+            <a:r>
+              <a:rPr lang="en-US" i="1" dirty="0">
+                <a:latin typeface="Georgia" panose="02040502050405020303" pitchFamily="18" charset="0"/>
+              </a:rPr>
+              <a:t> </a:t>
+            </a:r>
+            <a:r>
+              <a:rPr lang="en-US" i="1" dirty="0" err="1">
+                <a:latin typeface="Georgia" panose="02040502050405020303" pitchFamily="18" charset="0"/>
+              </a:rPr>
+              <a:t>belang</a:t>
+            </a:r>
+            <a:endParaRPr lang="en-US" i="1" dirty="0">
+              <a:latin typeface="Georgia" panose="02040502050405020303" pitchFamily="18" charset="0"/>
+            </a:endParaRPr>
+          </a:p>
+        </p:txBody>
+      </p:sp>
     </p:spTree>
     <p:extLst>
       <p:ext uri="{BB962C8B-B14F-4D97-AF65-F5344CB8AC3E}">

</xml_diff>

<commit_message>
made more figures and added to poster
</commit_message>
<xml_diff>
--- a/Poster.pptx
+++ b/Poster.pptx
@@ -243,7 +243,7 @@
           <a:p>
             <a:fld id="{91AE326B-1E28-4C22-A3D1-EDFB78E65B5C}" type="datetimeFigureOut">
               <a:rPr lang="LID4096" smtClean="0"/>
-              <a:t>02/29/2024</a:t>
+              <a:t>03/01/2024</a:t>
             </a:fld>
             <a:endParaRPr lang="LID4096"/>
           </a:p>
@@ -413,7 +413,7 @@
           <a:p>
             <a:fld id="{91AE326B-1E28-4C22-A3D1-EDFB78E65B5C}" type="datetimeFigureOut">
               <a:rPr lang="LID4096" smtClean="0"/>
-              <a:t>02/29/2024</a:t>
+              <a:t>03/01/2024</a:t>
             </a:fld>
             <a:endParaRPr lang="LID4096"/>
           </a:p>
@@ -593,7 +593,7 @@
           <a:p>
             <a:fld id="{91AE326B-1E28-4C22-A3D1-EDFB78E65B5C}" type="datetimeFigureOut">
               <a:rPr lang="LID4096" smtClean="0"/>
-              <a:t>02/29/2024</a:t>
+              <a:t>03/01/2024</a:t>
             </a:fld>
             <a:endParaRPr lang="LID4096"/>
           </a:p>
@@ -763,7 +763,7 @@
           <a:p>
             <a:fld id="{91AE326B-1E28-4C22-A3D1-EDFB78E65B5C}" type="datetimeFigureOut">
               <a:rPr lang="LID4096" smtClean="0"/>
-              <a:t>02/29/2024</a:t>
+              <a:t>03/01/2024</a:t>
             </a:fld>
             <a:endParaRPr lang="LID4096"/>
           </a:p>
@@ -1007,7 +1007,7 @@
           <a:p>
             <a:fld id="{91AE326B-1E28-4C22-A3D1-EDFB78E65B5C}" type="datetimeFigureOut">
               <a:rPr lang="LID4096" smtClean="0"/>
-              <a:t>02/29/2024</a:t>
+              <a:t>03/01/2024</a:t>
             </a:fld>
             <a:endParaRPr lang="LID4096"/>
           </a:p>
@@ -1239,7 +1239,7 @@
           <a:p>
             <a:fld id="{91AE326B-1E28-4C22-A3D1-EDFB78E65B5C}" type="datetimeFigureOut">
               <a:rPr lang="LID4096" smtClean="0"/>
-              <a:t>02/29/2024</a:t>
+              <a:t>03/01/2024</a:t>
             </a:fld>
             <a:endParaRPr lang="LID4096"/>
           </a:p>
@@ -1606,7 +1606,7 @@
           <a:p>
             <a:fld id="{91AE326B-1E28-4C22-A3D1-EDFB78E65B5C}" type="datetimeFigureOut">
               <a:rPr lang="LID4096" smtClean="0"/>
-              <a:t>02/29/2024</a:t>
+              <a:t>03/01/2024</a:t>
             </a:fld>
             <a:endParaRPr lang="LID4096"/>
           </a:p>
@@ -1724,7 +1724,7 @@
           <a:p>
             <a:fld id="{91AE326B-1E28-4C22-A3D1-EDFB78E65B5C}" type="datetimeFigureOut">
               <a:rPr lang="LID4096" smtClean="0"/>
-              <a:t>02/29/2024</a:t>
+              <a:t>03/01/2024</a:t>
             </a:fld>
             <a:endParaRPr lang="LID4096"/>
           </a:p>
@@ -1819,7 +1819,7 @@
           <a:p>
             <a:fld id="{91AE326B-1E28-4C22-A3D1-EDFB78E65B5C}" type="datetimeFigureOut">
               <a:rPr lang="LID4096" smtClean="0"/>
-              <a:t>02/29/2024</a:t>
+              <a:t>03/01/2024</a:t>
             </a:fld>
             <a:endParaRPr lang="LID4096"/>
           </a:p>
@@ -2096,7 +2096,7 @@
           <a:p>
             <a:fld id="{91AE326B-1E28-4C22-A3D1-EDFB78E65B5C}" type="datetimeFigureOut">
               <a:rPr lang="LID4096" smtClean="0"/>
-              <a:t>02/29/2024</a:t>
+              <a:t>03/01/2024</a:t>
             </a:fld>
             <a:endParaRPr lang="LID4096"/>
           </a:p>
@@ -2353,7 +2353,7 @@
           <a:p>
             <a:fld id="{91AE326B-1E28-4C22-A3D1-EDFB78E65B5C}" type="datetimeFigureOut">
               <a:rPr lang="LID4096" smtClean="0"/>
-              <a:t>02/29/2024</a:t>
+              <a:t>03/01/2024</a:t>
             </a:fld>
             <a:endParaRPr lang="LID4096"/>
           </a:p>
@@ -2566,7 +2566,7 @@
           <a:p>
             <a:fld id="{91AE326B-1E28-4C22-A3D1-EDFB78E65B5C}" type="datetimeFigureOut">
               <a:rPr lang="LID4096" smtClean="0"/>
-              <a:t>02/29/2024</a:t>
+              <a:t>03/01/2024</a:t>
             </a:fld>
             <a:endParaRPr lang="LID4096"/>
           </a:p>
@@ -7968,6 +7968,84 @@
           </a:p>
         </p:txBody>
       </p:sp>
+      <p:pic>
+        <p:nvPicPr>
+          <p:cNvPr id="5" name="Graphic 4">
+            <a:extLst>
+              <a:ext uri="{FF2B5EF4-FFF2-40B4-BE49-F238E27FC236}">
+                <a16:creationId xmlns:a16="http://schemas.microsoft.com/office/drawing/2014/main" id="{356C2334-E606-C72D-2884-96BB62BA94A7}"/>
+              </a:ext>
+            </a:extLst>
+          </p:cNvPr>
+          <p:cNvPicPr>
+            <a:picLocks noChangeAspect="1"/>
+          </p:cNvPicPr>
+          <p:nvPr/>
+        </p:nvPicPr>
+        <p:blipFill>
+          <a:blip r:embed="rId12">
+            <a:extLst>
+              <a:ext uri="{28A0092B-C50C-407E-A947-70E740481C1C}">
+                <a14:useLocalDpi xmlns:a14="http://schemas.microsoft.com/office/drawing/2010/main" val="0"/>
+              </a:ext>
+              <a:ext uri="{96DAC541-7B7A-43D3-8B79-37D633B846F1}">
+                <asvg:svgBlip xmlns:asvg="http://schemas.microsoft.com/office/drawing/2016/SVG/main" r:embed="rId13"/>
+              </a:ext>
+            </a:extLst>
+          </a:blip>
+          <a:stretch>
+            <a:fillRect/>
+          </a:stretch>
+        </p:blipFill>
+        <p:spPr>
+          <a:xfrm>
+            <a:off x="20290033" y="6186464"/>
+            <a:ext cx="6635244" cy="3556800"/>
+          </a:xfrm>
+          <a:prstGeom prst="rect">
+            <a:avLst/>
+          </a:prstGeom>
+        </p:spPr>
+      </p:pic>
+      <p:pic>
+        <p:nvPicPr>
+          <p:cNvPr id="28" name="Graphic 27">
+            <a:extLst>
+              <a:ext uri="{FF2B5EF4-FFF2-40B4-BE49-F238E27FC236}">
+                <a16:creationId xmlns:a16="http://schemas.microsoft.com/office/drawing/2014/main" id="{874ACF7F-6025-43DF-A3E3-C04EBCAF7E04}"/>
+              </a:ext>
+            </a:extLst>
+          </p:cNvPr>
+          <p:cNvPicPr>
+            <a:picLocks noChangeAspect="1"/>
+          </p:cNvPicPr>
+          <p:nvPr/>
+        </p:nvPicPr>
+        <p:blipFill>
+          <a:blip r:embed="rId14">
+            <a:extLst>
+              <a:ext uri="{28A0092B-C50C-407E-A947-70E740481C1C}">
+                <a14:useLocalDpi xmlns:a14="http://schemas.microsoft.com/office/drawing/2010/main" val="0"/>
+              </a:ext>
+              <a:ext uri="{96DAC541-7B7A-43D3-8B79-37D633B846F1}">
+                <asvg:svgBlip xmlns:asvg="http://schemas.microsoft.com/office/drawing/2016/SVG/main" r:embed="rId15"/>
+              </a:ext>
+            </a:extLst>
+          </a:blip>
+          <a:stretch>
+            <a:fillRect/>
+          </a:stretch>
+        </p:blipFill>
+        <p:spPr>
+          <a:xfrm>
+            <a:off x="20011973" y="2515414"/>
+            <a:ext cx="9182354" cy="3557198"/>
+          </a:xfrm>
+          <a:prstGeom prst="rect">
+            <a:avLst/>
+          </a:prstGeom>
+        </p:spPr>
+      </p:pic>
     </p:spTree>
     <p:extLst>
       <p:ext uri="{BB962C8B-B14F-4D97-AF65-F5344CB8AC3E}">

</xml_diff>

<commit_message>
Completed cluster section of poster
</commit_message>
<xml_diff>
--- a/Poster.pptx
+++ b/Poster.pptx
@@ -3078,7 +3078,7 @@
         </p:nvSpPr>
         <p:spPr>
           <a:xfrm>
-            <a:off x="735806" y="20486077"/>
+            <a:off x="879232" y="20484474"/>
             <a:ext cx="28803600" cy="545123"/>
           </a:xfrm>
           <a:prstGeom prst="rightArrow">
@@ -4932,7 +4932,7 @@
         </p:nvSpPr>
         <p:spPr>
           <a:xfrm>
-            <a:off x="1136991" y="11960287"/>
+            <a:off x="762820" y="11115955"/>
             <a:ext cx="9267412" cy="707886"/>
           </a:xfrm>
           <a:prstGeom prst="rect">
@@ -4979,8 +4979,8 @@
         </p:nvSpPr>
         <p:spPr>
           <a:xfrm>
-            <a:off x="1104100" y="12674892"/>
-            <a:ext cx="9267409" cy="3323987"/>
+            <a:off x="1388547" y="11829489"/>
+            <a:ext cx="9267409" cy="2400657"/>
           </a:xfrm>
           <a:prstGeom prst="rect">
             <a:avLst/>
@@ -5304,80 +5304,6 @@
                 <a:latin typeface="Georgia" panose="02040502050405020303" pitchFamily="18" charset="0"/>
               </a:rPr>
               <a:t>vectoren</a:t>
-            </a:r>
-            <a:endParaRPr lang="en-US" dirty="0">
-              <a:latin typeface="Georgia" panose="02040502050405020303" pitchFamily="18" charset="0"/>
-            </a:endParaRPr>
-          </a:p>
-          <a:p>
-            <a:pPr marL="742950" lvl="1" indent="-285750">
-              <a:buFont typeface="Arial" panose="020B0604020202020204" pitchFamily="34" charset="0"/>
-              <a:buChar char="•"/>
-            </a:pPr>
-            <a:endParaRPr lang="en-US" dirty="0">
-              <a:latin typeface="Georgia" panose="02040502050405020303" pitchFamily="18" charset="0"/>
-            </a:endParaRPr>
-          </a:p>
-          <a:p>
-            <a:pPr lvl="1"/>
-            <a:endParaRPr lang="en-US" dirty="0">
-              <a:latin typeface="Georgia" panose="02040502050405020303" pitchFamily="18" charset="0"/>
-            </a:endParaRPr>
-          </a:p>
-          <a:p>
-            <a:r>
-              <a:rPr lang="en-US" sz="2400" b="1" dirty="0">
-                <a:latin typeface="Georgia" panose="02040502050405020303" pitchFamily="18" charset="0"/>
-              </a:rPr>
-              <a:t>DTW </a:t>
-            </a:r>
-            <a:r>
-              <a:rPr lang="en-US" sz="2400" b="1" dirty="0" err="1">
-                <a:latin typeface="Georgia" panose="02040502050405020303" pitchFamily="18" charset="0"/>
-              </a:rPr>
-              <a:t>operaties</a:t>
-            </a:r>
-            <a:r>
-              <a:rPr lang="en-US" sz="2400" b="1" dirty="0">
-                <a:latin typeface="Georgia" panose="02040502050405020303" pitchFamily="18" charset="0"/>
-              </a:rPr>
-              <a:t> van </a:t>
-            </a:r>
-            <a:r>
-              <a:rPr lang="en-US" sz="2400" b="1" dirty="0" err="1">
-                <a:latin typeface="Georgia" panose="02040502050405020303" pitchFamily="18" charset="0"/>
-              </a:rPr>
-              <a:t>decompositie</a:t>
-            </a:r>
-            <a:r>
-              <a:rPr lang="en-US" sz="2400" b="1" dirty="0">
-                <a:latin typeface="Georgia" panose="02040502050405020303" pitchFamily="18" charset="0"/>
-              </a:rPr>
-              <a:t> </a:t>
-            </a:r>
-            <a:r>
-              <a:rPr lang="en-US" sz="2400" b="1" dirty="0" err="1">
-                <a:latin typeface="Georgia" panose="02040502050405020303" pitchFamily="18" charset="0"/>
-              </a:rPr>
-              <a:t>laag</a:t>
-            </a:r>
-            <a:r>
-              <a:rPr lang="en-US" sz="2400" b="1" dirty="0">
-                <a:latin typeface="Georgia" panose="02040502050405020303" pitchFamily="18" charset="0"/>
-              </a:rPr>
-              <a:t> </a:t>
-            </a:r>
-            <a:r>
-              <a:rPr lang="en-US" sz="2400" b="1" dirty="0" err="1">
-                <a:latin typeface="Georgia" panose="02040502050405020303" pitchFamily="18" charset="0"/>
-              </a:rPr>
-              <a:t>houden</a:t>
-            </a:r>
-            <a:r>
-              <a:rPr lang="en-US" sz="2400" b="1" dirty="0">
-                <a:latin typeface="Georgia" panose="02040502050405020303" pitchFamily="18" charset="0"/>
-              </a:rPr>
-              <a:t> </a:t>
             </a:r>
             <a:endParaRPr lang="en-US" dirty="0">
               <a:latin typeface="Georgia" panose="02040502050405020303" pitchFamily="18" charset="0"/>
@@ -5568,7 +5494,7 @@
         </p:nvSpPr>
         <p:spPr>
           <a:xfrm>
-            <a:off x="20374410" y="11964305"/>
+            <a:off x="20376091" y="11796380"/>
             <a:ext cx="9521908" cy="707886"/>
           </a:xfrm>
           <a:prstGeom prst="rect">
@@ -5650,7 +5576,7 @@
         </p:nvSpPr>
         <p:spPr>
           <a:xfrm>
-            <a:off x="10982425" y="18877771"/>
+            <a:off x="11070397" y="12719860"/>
             <a:ext cx="8750508" cy="1200329"/>
           </a:xfrm>
           <a:prstGeom prst="rect">
@@ -5864,7 +5790,7 @@
         </p:nvSpPr>
         <p:spPr>
           <a:xfrm>
-            <a:off x="11107231" y="12662504"/>
+            <a:off x="11083998" y="14141382"/>
             <a:ext cx="8522052" cy="2677656"/>
           </a:xfrm>
           <a:prstGeom prst="rect">
@@ -6755,7 +6681,7 @@
         </p:nvSpPr>
         <p:spPr>
           <a:xfrm>
-            <a:off x="1115852" y="18153616"/>
+            <a:off x="1410015" y="18186073"/>
             <a:ext cx="9141234" cy="2369880"/>
           </a:xfrm>
           <a:prstGeom prst="rect">
@@ -7280,7 +7206,7 @@
         </p:blipFill>
         <p:spPr>
           <a:xfrm>
-            <a:off x="11488449" y="15387829"/>
+            <a:off x="11465216" y="16866707"/>
             <a:ext cx="7691041" cy="1453795"/>
           </a:xfrm>
           <a:prstGeom prst="rect">
@@ -7304,7 +7230,7 @@
         </p:nvCxnSpPr>
         <p:spPr>
           <a:xfrm flipH="1">
-            <a:off x="12475249" y="16841623"/>
+            <a:off x="12452016" y="18320501"/>
             <a:ext cx="1407795" cy="577974"/>
           </a:xfrm>
           <a:prstGeom prst="line">
@@ -7342,7 +7268,7 @@
         </p:nvCxnSpPr>
         <p:spPr>
           <a:xfrm>
-            <a:off x="14682266" y="16841623"/>
+            <a:off x="14659033" y="18320501"/>
             <a:ext cx="1877303" cy="577974"/>
           </a:xfrm>
           <a:prstGeom prst="line">
@@ -7395,7 +7321,7 @@
         </p:blipFill>
         <p:spPr>
           <a:xfrm>
-            <a:off x="12267956" y="17419597"/>
+            <a:off x="12244723" y="18898475"/>
             <a:ext cx="4310613" cy="1031599"/>
           </a:xfrm>
           <a:prstGeom prst="rect">
@@ -7417,7 +7343,7 @@
         </p:nvSpPr>
         <p:spPr>
           <a:xfrm>
-            <a:off x="14008735" y="18410155"/>
+            <a:off x="13985502" y="19889033"/>
             <a:ext cx="829054" cy="338554"/>
           </a:xfrm>
           <a:prstGeom prst="rect">
@@ -7464,7 +7390,7 @@
         </p:nvSpPr>
         <p:spPr>
           <a:xfrm>
-            <a:off x="20874338" y="12884610"/>
+            <a:off x="1410310" y="14399304"/>
             <a:ext cx="8522052" cy="1292662"/>
           </a:xfrm>
           <a:prstGeom prst="rect">
@@ -7700,12 +7626,188 @@
           </a:p>
         </p:txBody>
       </p:sp>
+      <p:sp>
+        <p:nvSpPr>
+          <p:cNvPr id="23" name="TextBox 22">
+            <a:extLst>
+              <a:ext uri="{FF2B5EF4-FFF2-40B4-BE49-F238E27FC236}">
+                <a16:creationId xmlns:a16="http://schemas.microsoft.com/office/drawing/2014/main" id="{ACE7DA28-DEDD-F992-B1AA-FFEF82E5FC55}"/>
+              </a:ext>
+            </a:extLst>
+          </p:cNvPr>
+          <p:cNvSpPr txBox="1"/>
+          <p:nvPr/>
+        </p:nvSpPr>
+        <p:spPr>
+          <a:xfrm>
+            <a:off x="20171690" y="19478659"/>
+            <a:ext cx="10010767" cy="523220"/>
+          </a:xfrm>
+          <a:prstGeom prst="rect">
+            <a:avLst/>
+          </a:prstGeom>
+          <a:noFill/>
+        </p:spPr>
+        <p:txBody>
+          <a:bodyPr wrap="square" rtlCol="0">
+            <a:spAutoFit/>
+          </a:bodyPr>
+          <a:lstStyle/>
+          <a:p>
+            <a:pPr lvl="1"/>
+            <a:r>
+              <a:rPr lang="en-US" sz="1400" dirty="0" err="1">
+                <a:latin typeface="Georgia" panose="02040502050405020303" pitchFamily="18" charset="0"/>
+              </a:rPr>
+              <a:t>Visualisatie</a:t>
+            </a:r>
+            <a:r>
+              <a:rPr lang="en-US" sz="1400" dirty="0">
+                <a:latin typeface="Georgia" panose="02040502050405020303" pitchFamily="18" charset="0"/>
+              </a:rPr>
+              <a:t> van de </a:t>
+            </a:r>
+            <a:r>
+              <a:rPr lang="en-US" sz="1400" dirty="0" err="1">
+                <a:latin typeface="Georgia" panose="02040502050405020303" pitchFamily="18" charset="0"/>
+              </a:rPr>
+              <a:t>resulterende</a:t>
+            </a:r>
+            <a:r>
+              <a:rPr lang="en-US" sz="1400" dirty="0">
+                <a:latin typeface="Georgia" panose="02040502050405020303" pitchFamily="18" charset="0"/>
+              </a:rPr>
+              <a:t> clusters door </a:t>
+            </a:r>
+            <a:r>
+              <a:rPr lang="en-US" sz="1400" dirty="0" err="1">
+                <a:latin typeface="Georgia" panose="02040502050405020303" pitchFamily="18" charset="0"/>
+              </a:rPr>
+              <a:t>middel</a:t>
+            </a:r>
+            <a:r>
+              <a:rPr lang="en-US" sz="1400" dirty="0">
+                <a:latin typeface="Georgia" panose="02040502050405020303" pitchFamily="18" charset="0"/>
+              </a:rPr>
+              <a:t> van </a:t>
+            </a:r>
+            <a:r>
+              <a:rPr lang="en-US" sz="1400" i="1" dirty="0">
+                <a:latin typeface="Georgia" panose="02040502050405020303" pitchFamily="18" charset="0"/>
+              </a:rPr>
+              <a:t>Principal Component Analysis </a:t>
+            </a:r>
+            <a:r>
+              <a:rPr lang="en-US" sz="1400" dirty="0">
+                <a:latin typeface="Georgia" panose="02040502050405020303" pitchFamily="18" charset="0"/>
+              </a:rPr>
+              <a:t>om de </a:t>
+            </a:r>
+            <a:r>
+              <a:rPr lang="en-US" sz="1400" dirty="0" err="1">
+                <a:latin typeface="Georgia" panose="02040502050405020303" pitchFamily="18" charset="0"/>
+              </a:rPr>
+              <a:t>dimensie</a:t>
+            </a:r>
+            <a:r>
+              <a:rPr lang="en-US" sz="1400" dirty="0">
+                <a:latin typeface="Georgia" panose="02040502050405020303" pitchFamily="18" charset="0"/>
+              </a:rPr>
+              <a:t> </a:t>
+            </a:r>
+            <a:r>
+              <a:rPr lang="en-US" sz="1400" dirty="0" err="1">
+                <a:latin typeface="Georgia" panose="02040502050405020303" pitchFamily="18" charset="0"/>
+              </a:rPr>
+              <a:t>te</a:t>
+            </a:r>
+            <a:r>
+              <a:rPr lang="en-US" sz="1400" dirty="0">
+                <a:latin typeface="Georgia" panose="02040502050405020303" pitchFamily="18" charset="0"/>
+              </a:rPr>
+              <a:t> </a:t>
+            </a:r>
+            <a:r>
+              <a:rPr lang="en-US" sz="1400" dirty="0" err="1">
+                <a:latin typeface="Georgia" panose="02040502050405020303" pitchFamily="18" charset="0"/>
+              </a:rPr>
+              <a:t>reduceren</a:t>
+            </a:r>
+            <a:r>
+              <a:rPr lang="en-US" sz="1400" dirty="0">
+                <a:latin typeface="Georgia" panose="02040502050405020303" pitchFamily="18" charset="0"/>
+              </a:rPr>
+              <a:t>, </a:t>
+            </a:r>
+            <a:r>
+              <a:rPr lang="en-US" sz="1400" dirty="0" err="1">
+                <a:latin typeface="Georgia" panose="02040502050405020303" pitchFamily="18" charset="0"/>
+              </a:rPr>
+              <a:t>waarbij</a:t>
+            </a:r>
+            <a:r>
+              <a:rPr lang="en-US" sz="1400" dirty="0">
+                <a:latin typeface="Georgia" panose="02040502050405020303" pitchFamily="18" charset="0"/>
+              </a:rPr>
+              <a:t> we de </a:t>
+            </a:r>
+            <a:r>
+              <a:rPr lang="en-US" sz="1400" dirty="0" err="1">
+                <a:latin typeface="Georgia" panose="02040502050405020303" pitchFamily="18" charset="0"/>
+              </a:rPr>
+              <a:t>rijen</a:t>
+            </a:r>
+            <a:r>
+              <a:rPr lang="en-US" sz="1400" dirty="0">
+                <a:latin typeface="Georgia" panose="02040502050405020303" pitchFamily="18" charset="0"/>
+              </a:rPr>
+              <a:t> </a:t>
+            </a:r>
+            <a:r>
+              <a:rPr lang="en-US" sz="1400" dirty="0" err="1">
+                <a:latin typeface="Georgia" panose="02040502050405020303" pitchFamily="18" charset="0"/>
+              </a:rPr>
+              <a:t>als</a:t>
+            </a:r>
+            <a:r>
+              <a:rPr lang="en-US" sz="1400" dirty="0">
+                <a:latin typeface="Georgia" panose="02040502050405020303" pitchFamily="18" charset="0"/>
+              </a:rPr>
+              <a:t> feature-</a:t>
+            </a:r>
+            <a:r>
+              <a:rPr lang="en-US" sz="1400" dirty="0" err="1">
+                <a:latin typeface="Georgia" panose="02040502050405020303" pitchFamily="18" charset="0"/>
+              </a:rPr>
+              <a:t>vectoren</a:t>
+            </a:r>
+            <a:r>
+              <a:rPr lang="en-US" sz="1400" dirty="0">
+                <a:latin typeface="Georgia" panose="02040502050405020303" pitchFamily="18" charset="0"/>
+              </a:rPr>
+              <a:t> </a:t>
+            </a:r>
+            <a:r>
+              <a:rPr lang="en-US" sz="1400" dirty="0" err="1">
+                <a:latin typeface="Georgia" panose="02040502050405020303" pitchFamily="18" charset="0"/>
+              </a:rPr>
+              <a:t>nemen</a:t>
+            </a:r>
+            <a:r>
+              <a:rPr lang="en-US" sz="1400" dirty="0">
+                <a:latin typeface="Georgia" panose="02040502050405020303" pitchFamily="18" charset="0"/>
+              </a:rPr>
+              <a:t>.</a:t>
+            </a:r>
+          </a:p>
+        </p:txBody>
+      </p:sp>
       <p:pic>
         <p:nvPicPr>
-          <p:cNvPr id="20" name="Graphic 19">
+          <p:cNvPr id="5" name="Graphic 4">
             <a:extLst>
               <a:ext uri="{FF2B5EF4-FFF2-40B4-BE49-F238E27FC236}">
-                <a16:creationId xmlns:a16="http://schemas.microsoft.com/office/drawing/2014/main" id="{F06FD827-955E-28AA-1B44-3E77AB3D756F}"/>
+                <a16:creationId xmlns:a16="http://schemas.microsoft.com/office/drawing/2014/main" id="{356C2334-E606-C72D-2884-96BB62BA94A7}"/>
               </a:ext>
             </a:extLst>
           </p:cNvPr>
@@ -7722,274 +7824,6 @@
               </a:ext>
               <a:ext uri="{96DAC541-7B7A-43D3-8B79-37D633B846F1}">
                 <asvg:svgBlip xmlns:asvg="http://schemas.microsoft.com/office/drawing/2016/SVG/main" r:embed="rId11"/>
-              </a:ext>
-            </a:extLst>
-          </a:blip>
-          <a:stretch>
-            <a:fillRect/>
-          </a:stretch>
-        </p:blipFill>
-        <p:spPr>
-          <a:xfrm>
-            <a:off x="22126548" y="16100461"/>
-            <a:ext cx="5537868" cy="4157911"/>
-          </a:xfrm>
-          <a:prstGeom prst="rect">
-            <a:avLst/>
-          </a:prstGeom>
-        </p:spPr>
-      </p:pic>
-      <p:sp>
-        <p:nvSpPr>
-          <p:cNvPr id="23" name="TextBox 22">
-            <a:extLst>
-              <a:ext uri="{FF2B5EF4-FFF2-40B4-BE49-F238E27FC236}">
-                <a16:creationId xmlns:a16="http://schemas.microsoft.com/office/drawing/2014/main" id="{ACE7DA28-DEDD-F992-B1AA-FFEF82E5FC55}"/>
-              </a:ext>
-            </a:extLst>
-          </p:cNvPr>
-          <p:cNvSpPr txBox="1"/>
-          <p:nvPr/>
-        </p:nvSpPr>
-        <p:spPr>
-          <a:xfrm>
-            <a:off x="20886772" y="14404977"/>
-            <a:ext cx="8522052" cy="1292662"/>
-          </a:xfrm>
-          <a:prstGeom prst="rect">
-            <a:avLst/>
-          </a:prstGeom>
-          <a:noFill/>
-        </p:spPr>
-        <p:txBody>
-          <a:bodyPr wrap="square" rtlCol="0">
-            <a:spAutoFit/>
-          </a:bodyPr>
-          <a:lstStyle/>
-          <a:p>
-            <a:r>
-              <a:rPr lang="en-US" sz="2400" b="1" dirty="0" err="1">
-                <a:latin typeface="Georgia" panose="02040502050405020303" pitchFamily="18" charset="0"/>
-              </a:rPr>
-              <a:t>Visualiseren</a:t>
-            </a:r>
-            <a:r>
-              <a:rPr lang="en-US" sz="2400" b="1" dirty="0">
-                <a:latin typeface="Georgia" panose="02040502050405020303" pitchFamily="18" charset="0"/>
-              </a:rPr>
-              <a:t> van de clusters</a:t>
-            </a:r>
-          </a:p>
-          <a:p>
-            <a:pPr marL="742950" lvl="1" indent="-285750">
-              <a:buFont typeface="Arial" panose="020B0604020202020204" pitchFamily="34" charset="0"/>
-              <a:buChar char="•"/>
-            </a:pPr>
-            <a:r>
-              <a:rPr lang="en-US" dirty="0" err="1">
-                <a:latin typeface="Georgia" panose="02040502050405020303" pitchFamily="18" charset="0"/>
-              </a:rPr>
-              <a:t>Vectoren</a:t>
-            </a:r>
-            <a:r>
-              <a:rPr lang="en-US" dirty="0">
-                <a:latin typeface="Georgia" panose="02040502050405020303" pitchFamily="18" charset="0"/>
-              </a:rPr>
-              <a:t> </a:t>
-            </a:r>
-            <a:r>
-              <a:rPr lang="en-US" dirty="0" err="1">
-                <a:latin typeface="Georgia" panose="02040502050405020303" pitchFamily="18" charset="0"/>
-              </a:rPr>
-              <a:t>hebben</a:t>
-            </a:r>
-            <a:r>
-              <a:rPr lang="en-US" dirty="0">
-                <a:latin typeface="Georgia" panose="02040502050405020303" pitchFamily="18" charset="0"/>
-              </a:rPr>
-              <a:t> </a:t>
-            </a:r>
-            <a:r>
-              <a:rPr lang="en-US" dirty="0" err="1">
-                <a:latin typeface="Georgia" panose="02040502050405020303" pitchFamily="18" charset="0"/>
-              </a:rPr>
-              <a:t>hoge</a:t>
-            </a:r>
-            <a:r>
-              <a:rPr lang="en-US" dirty="0">
-                <a:latin typeface="Georgia" panose="02040502050405020303" pitchFamily="18" charset="0"/>
-              </a:rPr>
-              <a:t> </a:t>
-            </a:r>
-            <a:r>
-              <a:rPr lang="en-US" dirty="0" err="1">
-                <a:latin typeface="Georgia" panose="02040502050405020303" pitchFamily="18" charset="0"/>
-              </a:rPr>
-              <a:t>dimensie</a:t>
-            </a:r>
-            <a:r>
-              <a:rPr lang="en-US" dirty="0">
-                <a:latin typeface="Georgia" panose="02040502050405020303" pitchFamily="18" charset="0"/>
-              </a:rPr>
-              <a:t> (tot 186 </a:t>
-            </a:r>
-            <a:r>
-              <a:rPr lang="en-US" dirty="0" err="1">
-                <a:latin typeface="Georgia" panose="02040502050405020303" pitchFamily="18" charset="0"/>
-              </a:rPr>
-              <a:t>bij</a:t>
-            </a:r>
-            <a:r>
-              <a:rPr lang="en-US" dirty="0">
-                <a:latin typeface="Georgia" panose="02040502050405020303" pitchFamily="18" charset="0"/>
-              </a:rPr>
-              <a:t> AMIE)</a:t>
-            </a:r>
-          </a:p>
-          <a:p>
-            <a:pPr lvl="1"/>
-            <a:r>
-              <a:rPr lang="en-US" i="1" dirty="0">
-                <a:latin typeface="Georgia" panose="02040502050405020303" pitchFamily="18" charset="0"/>
-              </a:rPr>
-              <a:t>	→ Principal Component Analysis om de </a:t>
-            </a:r>
-            <a:r>
-              <a:rPr lang="en-US" i="1" dirty="0" err="1">
-                <a:latin typeface="Georgia" panose="02040502050405020303" pitchFamily="18" charset="0"/>
-              </a:rPr>
-              <a:t>dimensie</a:t>
-            </a:r>
-            <a:r>
-              <a:rPr lang="en-US" i="1" dirty="0">
-                <a:latin typeface="Georgia" panose="02040502050405020303" pitchFamily="18" charset="0"/>
-              </a:rPr>
-              <a:t> </a:t>
-            </a:r>
-            <a:r>
-              <a:rPr lang="en-US" i="1" dirty="0" err="1">
-                <a:latin typeface="Georgia" panose="02040502050405020303" pitchFamily="18" charset="0"/>
-              </a:rPr>
-              <a:t>te</a:t>
-            </a:r>
-            <a:r>
-              <a:rPr lang="en-US" i="1" dirty="0">
-                <a:latin typeface="Georgia" panose="02040502050405020303" pitchFamily="18" charset="0"/>
-              </a:rPr>
-              <a:t> </a:t>
-            </a:r>
-            <a:r>
-              <a:rPr lang="en-US" i="1" dirty="0" err="1">
-                <a:latin typeface="Georgia" panose="02040502050405020303" pitchFamily="18" charset="0"/>
-              </a:rPr>
-              <a:t>reduceren</a:t>
-            </a:r>
-            <a:endParaRPr lang="en-US" dirty="0">
-              <a:latin typeface="Georgia" panose="02040502050405020303" pitchFamily="18" charset="0"/>
-            </a:endParaRPr>
-          </a:p>
-          <a:p>
-            <a:pPr lvl="2"/>
-            <a:r>
-              <a:rPr lang="en-US" i="1" dirty="0">
-                <a:latin typeface="Georgia" panose="02040502050405020303" pitchFamily="18" charset="0"/>
-              </a:rPr>
-              <a:t>→ </a:t>
-            </a:r>
-            <a:r>
-              <a:rPr lang="en-US" i="1" dirty="0" err="1">
-                <a:latin typeface="Georgia" panose="02040502050405020303" pitchFamily="18" charset="0"/>
-              </a:rPr>
-              <a:t>Enkel</a:t>
-            </a:r>
-            <a:r>
-              <a:rPr lang="en-US" i="1" dirty="0">
-                <a:latin typeface="Georgia" panose="02040502050405020303" pitchFamily="18" charset="0"/>
-              </a:rPr>
-              <a:t> </a:t>
-            </a:r>
-            <a:r>
-              <a:rPr lang="en-US" i="1" dirty="0" err="1">
-                <a:latin typeface="Georgia" panose="02040502050405020303" pitchFamily="18" charset="0"/>
-              </a:rPr>
-              <a:t>voor</a:t>
-            </a:r>
-            <a:r>
-              <a:rPr lang="en-US" i="1" dirty="0">
-                <a:latin typeface="Georgia" panose="02040502050405020303" pitchFamily="18" charset="0"/>
-              </a:rPr>
-              <a:t> </a:t>
-            </a:r>
-            <a:r>
-              <a:rPr lang="en-US" i="1" dirty="0" err="1">
-                <a:latin typeface="Georgia" panose="02040502050405020303" pitchFamily="18" charset="0"/>
-              </a:rPr>
-              <a:t>visualisatie</a:t>
-            </a:r>
-            <a:r>
-              <a:rPr lang="en-US" i="1" dirty="0">
-                <a:latin typeface="Georgia" panose="02040502050405020303" pitchFamily="18" charset="0"/>
-              </a:rPr>
-              <a:t>, </a:t>
-            </a:r>
-            <a:r>
-              <a:rPr lang="en-US" i="1" dirty="0" err="1">
-                <a:latin typeface="Georgia" panose="02040502050405020303" pitchFamily="18" charset="0"/>
-              </a:rPr>
-              <a:t>verder</a:t>
-            </a:r>
-            <a:r>
-              <a:rPr lang="en-US" i="1" dirty="0">
-                <a:latin typeface="Georgia" panose="02040502050405020303" pitchFamily="18" charset="0"/>
-              </a:rPr>
-              <a:t> </a:t>
-            </a:r>
-            <a:r>
-              <a:rPr lang="en-US" i="1" dirty="0" err="1">
-                <a:latin typeface="Georgia" panose="02040502050405020303" pitchFamily="18" charset="0"/>
-              </a:rPr>
-              <a:t>geen</a:t>
-            </a:r>
-            <a:r>
-              <a:rPr lang="en-US" i="1" dirty="0">
-                <a:latin typeface="Georgia" panose="02040502050405020303" pitchFamily="18" charset="0"/>
-              </a:rPr>
-              <a:t> </a:t>
-            </a:r>
-            <a:r>
-              <a:rPr lang="en-US" i="1" dirty="0" err="1">
-                <a:latin typeface="Georgia" panose="02040502050405020303" pitchFamily="18" charset="0"/>
-              </a:rPr>
-              <a:t>belang</a:t>
-            </a:r>
-            <a:endParaRPr lang="en-US" i="1" dirty="0">
-              <a:latin typeface="Georgia" panose="02040502050405020303" pitchFamily="18" charset="0"/>
-            </a:endParaRPr>
-          </a:p>
-        </p:txBody>
-      </p:sp>
-      <p:pic>
-        <p:nvPicPr>
-          <p:cNvPr id="5" name="Graphic 4">
-            <a:extLst>
-              <a:ext uri="{FF2B5EF4-FFF2-40B4-BE49-F238E27FC236}">
-                <a16:creationId xmlns:a16="http://schemas.microsoft.com/office/drawing/2014/main" id="{356C2334-E606-C72D-2884-96BB62BA94A7}"/>
-              </a:ext>
-            </a:extLst>
-          </p:cNvPr>
-          <p:cNvPicPr>
-            <a:picLocks noChangeAspect="1"/>
-          </p:cNvPicPr>
-          <p:nvPr/>
-        </p:nvPicPr>
-        <p:blipFill>
-          <a:blip r:embed="rId12">
-            <a:extLst>
-              <a:ext uri="{28A0092B-C50C-407E-A947-70E740481C1C}">
-                <a14:useLocalDpi xmlns:a14="http://schemas.microsoft.com/office/drawing/2010/main" val="0"/>
-              </a:ext>
-              <a:ext uri="{96DAC541-7B7A-43D3-8B79-37D633B846F1}">
-                <asvg:svgBlip xmlns:asvg="http://schemas.microsoft.com/office/drawing/2016/SVG/main" r:embed="rId13"/>
               </a:ext>
             </a:extLst>
           </a:blip>
@@ -8022,6 +7856,170 @@
           <p:nvPr/>
         </p:nvPicPr>
         <p:blipFill>
+          <a:blip r:embed="rId12">
+            <a:extLst>
+              <a:ext uri="{28A0092B-C50C-407E-A947-70E740481C1C}">
+                <a14:useLocalDpi xmlns:a14="http://schemas.microsoft.com/office/drawing/2010/main" val="0"/>
+              </a:ext>
+              <a:ext uri="{96DAC541-7B7A-43D3-8B79-37D633B846F1}">
+                <asvg:svgBlip xmlns:asvg="http://schemas.microsoft.com/office/drawing/2016/SVG/main" r:embed="rId13"/>
+              </a:ext>
+            </a:extLst>
+          </a:blip>
+          <a:stretch>
+            <a:fillRect/>
+          </a:stretch>
+        </p:blipFill>
+        <p:spPr>
+          <a:xfrm>
+            <a:off x="20011973" y="2515414"/>
+            <a:ext cx="9182354" cy="3557198"/>
+          </a:xfrm>
+          <a:prstGeom prst="rect">
+            <a:avLst/>
+          </a:prstGeom>
+        </p:spPr>
+      </p:pic>
+      <p:sp>
+        <p:nvSpPr>
+          <p:cNvPr id="15" name="TextBox 14">
+            <a:extLst>
+              <a:ext uri="{FF2B5EF4-FFF2-40B4-BE49-F238E27FC236}">
+                <a16:creationId xmlns:a16="http://schemas.microsoft.com/office/drawing/2014/main" id="{8C8B9839-4C05-5BD2-AC06-C6FA4E8D6A87}"/>
+              </a:ext>
+            </a:extLst>
+          </p:cNvPr>
+          <p:cNvSpPr txBox="1"/>
+          <p:nvPr/>
+        </p:nvSpPr>
+        <p:spPr>
+          <a:xfrm>
+            <a:off x="930901" y="15789049"/>
+            <a:ext cx="7851106" cy="461665"/>
+          </a:xfrm>
+          <a:prstGeom prst="rect">
+            <a:avLst/>
+          </a:prstGeom>
+          <a:noFill/>
+        </p:spPr>
+        <p:txBody>
+          <a:bodyPr wrap="square" rtlCol="0">
+            <a:spAutoFit/>
+          </a:bodyPr>
+          <a:lstStyle/>
+          <a:p>
+            <a:pPr lvl="1"/>
+            <a:r>
+              <a:rPr lang="en-US" sz="2400" b="1" dirty="0">
+                <a:latin typeface="Georgia" panose="02040502050405020303" pitchFamily="18" charset="0"/>
+              </a:rPr>
+              <a:t>DTW </a:t>
+            </a:r>
+            <a:r>
+              <a:rPr lang="en-US" sz="2400" b="1" dirty="0" err="1">
+                <a:latin typeface="Georgia" panose="02040502050405020303" pitchFamily="18" charset="0"/>
+              </a:rPr>
+              <a:t>operaties</a:t>
+            </a:r>
+            <a:r>
+              <a:rPr lang="en-US" sz="2400" b="1" dirty="0">
+                <a:latin typeface="Georgia" panose="02040502050405020303" pitchFamily="18" charset="0"/>
+              </a:rPr>
+              <a:t> van </a:t>
+            </a:r>
+            <a:r>
+              <a:rPr lang="en-US" sz="2400" b="1" dirty="0" err="1">
+                <a:latin typeface="Georgia" panose="02040502050405020303" pitchFamily="18" charset="0"/>
+              </a:rPr>
+              <a:t>decompositie</a:t>
+            </a:r>
+            <a:r>
+              <a:rPr lang="en-US" sz="2400" b="1" dirty="0">
+                <a:latin typeface="Georgia" panose="02040502050405020303" pitchFamily="18" charset="0"/>
+              </a:rPr>
+              <a:t> </a:t>
+            </a:r>
+            <a:r>
+              <a:rPr lang="en-US" sz="2400" b="1" dirty="0" err="1">
+                <a:latin typeface="Georgia" panose="02040502050405020303" pitchFamily="18" charset="0"/>
+              </a:rPr>
+              <a:t>laag</a:t>
+            </a:r>
+            <a:r>
+              <a:rPr lang="en-US" sz="2400" b="1" dirty="0">
+                <a:latin typeface="Georgia" panose="02040502050405020303" pitchFamily="18" charset="0"/>
+              </a:rPr>
+              <a:t> </a:t>
+            </a:r>
+            <a:r>
+              <a:rPr lang="en-US" sz="2400" b="1" dirty="0" err="1">
+                <a:latin typeface="Georgia" panose="02040502050405020303" pitchFamily="18" charset="0"/>
+              </a:rPr>
+              <a:t>houden</a:t>
+            </a:r>
+            <a:r>
+              <a:rPr lang="en-US" sz="2400" b="1" dirty="0">
+                <a:latin typeface="Georgia" panose="02040502050405020303" pitchFamily="18" charset="0"/>
+              </a:rPr>
+              <a:t> </a:t>
+            </a:r>
+            <a:endParaRPr lang="en-US" sz="2400" dirty="0">
+              <a:latin typeface="Georgia" panose="02040502050405020303" pitchFamily="18" charset="0"/>
+            </a:endParaRPr>
+          </a:p>
+        </p:txBody>
+      </p:sp>
+      <p:sp>
+        <p:nvSpPr>
+          <p:cNvPr id="51" name="TextBox 50">
+            <a:extLst>
+              <a:ext uri="{FF2B5EF4-FFF2-40B4-BE49-F238E27FC236}">
+                <a16:creationId xmlns:a16="http://schemas.microsoft.com/office/drawing/2014/main" id="{D535D704-77A8-F599-D108-3478B11D5D08}"/>
+              </a:ext>
+            </a:extLst>
+          </p:cNvPr>
+          <p:cNvSpPr txBox="1"/>
+          <p:nvPr/>
+        </p:nvSpPr>
+        <p:spPr>
+          <a:xfrm>
+            <a:off x="21974629" y="15192904"/>
+            <a:ext cx="6748225" cy="307777"/>
+          </a:xfrm>
+          <a:prstGeom prst="rect">
+            <a:avLst/>
+          </a:prstGeom>
+          <a:noFill/>
+        </p:spPr>
+        <p:txBody>
+          <a:bodyPr wrap="square" rtlCol="0">
+            <a:spAutoFit/>
+          </a:bodyPr>
+          <a:lstStyle/>
+          <a:p>
+            <a:r>
+              <a:rPr lang="nl-NL" sz="1400" dirty="0"/>
+              <a:t>Resultaten clusteren (k = 3 en k=7 resp.) met uitgebreide vectoren methode rang 25 type 3</a:t>
+            </a:r>
+            <a:endParaRPr lang="LID4096" sz="1400" dirty="0"/>
+          </a:p>
+        </p:txBody>
+      </p:sp>
+      <p:pic>
+        <p:nvPicPr>
+          <p:cNvPr id="66" name="Graphic 65">
+            <a:extLst>
+              <a:ext uri="{FF2B5EF4-FFF2-40B4-BE49-F238E27FC236}">
+                <a16:creationId xmlns:a16="http://schemas.microsoft.com/office/drawing/2014/main" id="{66051148-45AD-C8A0-4530-E814C4E3CE40}"/>
+              </a:ext>
+            </a:extLst>
+          </p:cNvPr>
+          <p:cNvPicPr>
+            <a:picLocks noChangeAspect="1"/>
+          </p:cNvPicPr>
+          <p:nvPr/>
+        </p:nvPicPr>
+        <p:blipFill>
           <a:blip r:embed="rId14">
             <a:extLst>
               <a:ext uri="{28A0092B-C50C-407E-A947-70E740481C1C}">
@@ -8038,8 +8036,107 @@
         </p:blipFill>
         <p:spPr>
           <a:xfrm>
-            <a:off x="20011973" y="2515414"/>
-            <a:ext cx="9182354" cy="3557198"/>
+            <a:off x="20171690" y="15479359"/>
+            <a:ext cx="5326617" cy="3999300"/>
+          </a:xfrm>
+          <a:prstGeom prst="rect">
+            <a:avLst/>
+          </a:prstGeom>
+        </p:spPr>
+      </p:pic>
+      <p:pic>
+        <p:nvPicPr>
+          <p:cNvPr id="68" name="Graphic 67">
+            <a:extLst>
+              <a:ext uri="{FF2B5EF4-FFF2-40B4-BE49-F238E27FC236}">
+                <a16:creationId xmlns:a16="http://schemas.microsoft.com/office/drawing/2014/main" id="{562DC5ED-6478-EB89-92F9-C7BFC19188FB}"/>
+              </a:ext>
+            </a:extLst>
+          </p:cNvPr>
+          <p:cNvPicPr>
+            <a:picLocks noChangeAspect="1"/>
+          </p:cNvPicPr>
+          <p:nvPr/>
+        </p:nvPicPr>
+        <p:blipFill>
+          <a:blip r:embed="rId16">
+            <a:extLst>
+              <a:ext uri="{28A0092B-C50C-407E-A947-70E740481C1C}">
+                <a14:useLocalDpi xmlns:a14="http://schemas.microsoft.com/office/drawing/2010/main" val="0"/>
+              </a:ext>
+              <a:ext uri="{96DAC541-7B7A-43D3-8B79-37D633B846F1}">
+                <asvg:svgBlip xmlns:asvg="http://schemas.microsoft.com/office/drawing/2016/SVG/main" r:embed="rId17"/>
+              </a:ext>
+            </a:extLst>
+          </a:blip>
+          <a:stretch>
+            <a:fillRect/>
+          </a:stretch>
+        </p:blipFill>
+        <p:spPr>
+          <a:xfrm>
+            <a:off x="24961872" y="15470658"/>
+            <a:ext cx="5326617" cy="3999300"/>
+          </a:xfrm>
+          <a:prstGeom prst="rect">
+            <a:avLst/>
+          </a:prstGeom>
+        </p:spPr>
+      </p:pic>
+      <p:pic>
+        <p:nvPicPr>
+          <p:cNvPr id="70" name="Picture 69">
+            <a:extLst>
+              <a:ext uri="{FF2B5EF4-FFF2-40B4-BE49-F238E27FC236}">
+                <a16:creationId xmlns:a16="http://schemas.microsoft.com/office/drawing/2014/main" id="{02C2E2ED-A737-35AC-75FE-CDABB22D4A2D}"/>
+              </a:ext>
+            </a:extLst>
+          </p:cNvPr>
+          <p:cNvPicPr>
+            <a:picLocks noChangeAspect="1"/>
+          </p:cNvPicPr>
+          <p:nvPr/>
+        </p:nvPicPr>
+        <p:blipFill>
+          <a:blip r:embed="rId18"/>
+          <a:stretch>
+            <a:fillRect/>
+          </a:stretch>
+        </p:blipFill>
+        <p:spPr>
+          <a:xfrm>
+            <a:off x="22531544" y="12431902"/>
+            <a:ext cx="2316509" cy="2823992"/>
+          </a:xfrm>
+          <a:prstGeom prst="rect">
+            <a:avLst/>
+          </a:prstGeom>
+        </p:spPr>
+      </p:pic>
+      <p:pic>
+        <p:nvPicPr>
+          <p:cNvPr id="72" name="Picture 71">
+            <a:extLst>
+              <a:ext uri="{FF2B5EF4-FFF2-40B4-BE49-F238E27FC236}">
+                <a16:creationId xmlns:a16="http://schemas.microsoft.com/office/drawing/2014/main" id="{81C2F151-80A9-879C-FE08-D164E67513DF}"/>
+              </a:ext>
+            </a:extLst>
+          </p:cNvPr>
+          <p:cNvPicPr>
+            <a:picLocks noChangeAspect="1"/>
+          </p:cNvPicPr>
+          <p:nvPr/>
+        </p:nvPicPr>
+        <p:blipFill>
+          <a:blip r:embed="rId19"/>
+          <a:stretch>
+            <a:fillRect/>
+          </a:stretch>
+        </p:blipFill>
+        <p:spPr>
+          <a:xfrm>
+            <a:off x="25500357" y="12449199"/>
+            <a:ext cx="2247528" cy="2781407"/>
           </a:xfrm>
           <a:prstGeom prst="rect">
             <a:avLst/>

</xml_diff>

<commit_message>
Poster added time series example and figure text
</commit_message>
<xml_diff>
--- a/Poster.pptx
+++ b/Poster.pptx
@@ -8,7 +8,7 @@
     <p:sldId id="256" r:id="rId2"/>
   </p:sldIdLst>
   <p:sldSz cx="30275213" cy="21383625"/>
-  <p:notesSz cx="6858000" cy="9144000"/>
+  <p:notesSz cx="8794750" cy="12646025"/>
   <p:defaultTextStyle>
     <a:defPPr>
       <a:defRPr lang="en-US"/>
@@ -4073,42 +4073,6 @@
           </a:p>
         </p:txBody>
       </p:sp>
-      <p:pic>
-        <p:nvPicPr>
-          <p:cNvPr id="32" name="Picture 31" descr="A graph showing the temperature">
-            <a:extLst>
-              <a:ext uri="{FF2B5EF4-FFF2-40B4-BE49-F238E27FC236}">
-                <a16:creationId xmlns:a16="http://schemas.microsoft.com/office/drawing/2014/main" id="{85487C62-8C4F-03C8-7003-0C2A286E28D2}"/>
-              </a:ext>
-            </a:extLst>
-          </p:cNvPr>
-          <p:cNvPicPr>
-            <a:picLocks noChangeAspect="1"/>
-          </p:cNvPicPr>
-          <p:nvPr/>
-        </p:nvPicPr>
-        <p:blipFill>
-          <a:blip r:embed="rId2">
-            <a:extLst>
-              <a:ext uri="{28A0092B-C50C-407E-A947-70E740481C1C}">
-                <a14:useLocalDpi xmlns:a14="http://schemas.microsoft.com/office/drawing/2010/main" val="0"/>
-              </a:ext>
-            </a:extLst>
-          </a:blip>
-          <a:stretch>
-            <a:fillRect/>
-          </a:stretch>
-        </p:blipFill>
-        <p:spPr>
-          <a:xfrm>
-            <a:off x="1591589" y="5084054"/>
-            <a:ext cx="4677569" cy="1671451"/>
-          </a:xfrm>
-          <a:prstGeom prst="rect">
-            <a:avLst/>
-          </a:prstGeom>
-        </p:spPr>
-      </p:pic>
       <p:sp>
         <p:nvSpPr>
           <p:cNvPr id="33" name="TextBox 32">
@@ -4353,42 +4317,6 @@
           </a:p>
         </p:txBody>
       </p:sp>
-      <p:pic>
-        <p:nvPicPr>
-          <p:cNvPr id="35" name="Picture 34" descr="A person with their arms out&#10;&#10;Description automatically generated with medium confidence">
-            <a:extLst>
-              <a:ext uri="{FF2B5EF4-FFF2-40B4-BE49-F238E27FC236}">
-                <a16:creationId xmlns:a16="http://schemas.microsoft.com/office/drawing/2014/main" id="{4E77B1EC-B406-80EC-E3CC-8602FC5BB3B2}"/>
-              </a:ext>
-            </a:extLst>
-          </p:cNvPr>
-          <p:cNvPicPr>
-            <a:picLocks noChangeAspect="1"/>
-          </p:cNvPicPr>
-          <p:nvPr/>
-        </p:nvPicPr>
-        <p:blipFill>
-          <a:blip r:embed="rId3">
-            <a:extLst>
-              <a:ext uri="{28A0092B-C50C-407E-A947-70E740481C1C}">
-                <a14:useLocalDpi xmlns:a14="http://schemas.microsoft.com/office/drawing/2010/main" val="0"/>
-              </a:ext>
-            </a:extLst>
-          </a:blip>
-          <a:stretch>
-            <a:fillRect/>
-          </a:stretch>
-        </p:blipFill>
-        <p:spPr>
-          <a:xfrm>
-            <a:off x="7463071" y="5084053"/>
-            <a:ext cx="1553676" cy="1671452"/>
-          </a:xfrm>
-          <a:prstGeom prst="rect">
-            <a:avLst/>
-          </a:prstGeom>
-        </p:spPr>
-      </p:pic>
       <p:sp>
         <p:nvSpPr>
           <p:cNvPr id="41" name="TextBox 40">
@@ -4855,13 +4783,13 @@
           <p:nvPr/>
         </p:nvPicPr>
         <p:blipFill>
-          <a:blip r:embed="rId4">
+          <a:blip r:embed="rId2">
             <a:extLst>
               <a:ext uri="{28A0092B-C50C-407E-A947-70E740481C1C}">
                 <a14:useLocalDpi xmlns:a14="http://schemas.microsoft.com/office/drawing/2010/main" val="0"/>
               </a:ext>
               <a:ext uri="{96DAC541-7B7A-43D3-8B79-37D633B846F1}">
-                <asvg:svgBlip xmlns:asvg="http://schemas.microsoft.com/office/drawing/2016/SVG/main" r:embed="rId5"/>
+                <asvg:svgBlip xmlns:asvg="http://schemas.microsoft.com/office/drawing/2016/SVG/main" r:embed="rId3"/>
               </a:ext>
             </a:extLst>
           </a:blip>
@@ -4894,13 +4822,13 @@
           <p:nvPr/>
         </p:nvPicPr>
         <p:blipFill>
-          <a:blip r:embed="rId6">
+          <a:blip r:embed="rId4">
             <a:extLst>
               <a:ext uri="{28A0092B-C50C-407E-A947-70E740481C1C}">
                 <a14:useLocalDpi xmlns:a14="http://schemas.microsoft.com/office/drawing/2010/main" val="0"/>
               </a:ext>
               <a:ext uri="{96DAC541-7B7A-43D3-8B79-37D633B846F1}">
-                <asvg:svgBlip xmlns:asvg="http://schemas.microsoft.com/office/drawing/2016/SVG/main" r:embed="rId7"/>
+                <asvg:svgBlip xmlns:asvg="http://schemas.microsoft.com/office/drawing/2016/SVG/main" r:embed="rId5"/>
               </a:ext>
             </a:extLst>
           </a:blip>
@@ -4932,8 +4860,8 @@
         </p:nvSpPr>
         <p:spPr>
           <a:xfrm>
-            <a:off x="762820" y="11115955"/>
-            <a:ext cx="9267412" cy="707886"/>
+            <a:off x="1135319" y="11964305"/>
+            <a:ext cx="9267409" cy="707886"/>
           </a:xfrm>
           <a:prstGeom prst="rect">
             <a:avLst/>
@@ -4979,8 +4907,8 @@
         </p:nvSpPr>
         <p:spPr>
           <a:xfrm>
-            <a:off x="1388547" y="11829489"/>
-            <a:ext cx="9267409" cy="2400657"/>
+            <a:off x="1341554" y="12659813"/>
+            <a:ext cx="9267409" cy="2954655"/>
           </a:xfrm>
           <a:prstGeom prst="rect">
             <a:avLst/>
@@ -5054,54 +4982,54 @@
               <a:buChar char="•"/>
             </a:pPr>
             <a:r>
-              <a:rPr lang="en-US" dirty="0">
+              <a:rPr lang="en-US" i="1" dirty="0">
                 <a:latin typeface="Georgia" panose="02040502050405020303" pitchFamily="18" charset="0"/>
               </a:rPr>
               <a:t>CP </a:t>
             </a:r>
             <a:r>
-              <a:rPr lang="en-US" dirty="0" err="1">
+              <a:rPr lang="en-US" i="1" dirty="0" err="1">
                 <a:latin typeface="Georgia" panose="02040502050405020303" pitchFamily="18" charset="0"/>
               </a:rPr>
               <a:t>decompositie</a:t>
             </a:r>
             <a:r>
-              <a:rPr lang="en-US" dirty="0">
+              <a:rPr lang="en-US" i="1" dirty="0">
                 <a:latin typeface="Georgia" panose="02040502050405020303" pitchFamily="18" charset="0"/>
               </a:rPr>
               <a:t>: </a:t>
             </a:r>
             <a:r>
-              <a:rPr lang="en-US" dirty="0" err="1">
+              <a:rPr lang="en-US" i="1" dirty="0" err="1">
                 <a:latin typeface="Georgia" panose="02040502050405020303" pitchFamily="18" charset="0"/>
               </a:rPr>
               <a:t>benadert</a:t>
             </a:r>
             <a:r>
-              <a:rPr lang="en-US" dirty="0">
+              <a:rPr lang="en-US" i="1" dirty="0">
                 <a:latin typeface="Georgia" panose="02040502050405020303" pitchFamily="18" charset="0"/>
               </a:rPr>
               <a:t> tensor </a:t>
             </a:r>
             <a:r>
-              <a:rPr lang="en-US" dirty="0" err="1">
+              <a:rPr lang="en-US" i="1" dirty="0" err="1">
                 <a:latin typeface="Georgia" panose="02040502050405020303" pitchFamily="18" charset="0"/>
               </a:rPr>
               <a:t>zeer</a:t>
             </a:r>
             <a:r>
-              <a:rPr lang="en-US" dirty="0">
-                <a:latin typeface="Georgia" panose="02040502050405020303" pitchFamily="18" charset="0"/>
-              </a:rPr>
-              <a:t> </a:t>
-            </a:r>
-            <a:r>
-              <a:rPr lang="en-US" dirty="0" err="1">
+              <a:rPr lang="en-US" i="1" dirty="0">
+                <a:latin typeface="Georgia" panose="02040502050405020303" pitchFamily="18" charset="0"/>
+              </a:rPr>
+              <a:t> </a:t>
+            </a:r>
+            <a:r>
+              <a:rPr lang="en-US" i="1" dirty="0" err="1">
                 <a:latin typeface="Georgia" panose="02040502050405020303" pitchFamily="18" charset="0"/>
               </a:rPr>
               <a:t>goed</a:t>
             </a:r>
-            <a:endParaRPr lang="en-US" dirty="0">
+            <a:endParaRPr lang="en-US" i="1" dirty="0">
               <a:latin typeface="Georgia" panose="02040502050405020303" pitchFamily="18" charset="0"/>
             </a:endParaRPr>
           </a:p>
@@ -5111,55 +5039,55 @@
               <a:buChar char="•"/>
             </a:pPr>
             <a:r>
-              <a:rPr lang="en-US" dirty="0" err="1">
+              <a:rPr lang="en-US" i="1" dirty="0" err="1">
                 <a:latin typeface="Georgia" panose="02040502050405020303" pitchFamily="18" charset="0"/>
               </a:rPr>
               <a:t>Adaptieve</a:t>
             </a:r>
             <a:r>
-              <a:rPr lang="en-US" dirty="0">
-                <a:latin typeface="Georgia" panose="02040502050405020303" pitchFamily="18" charset="0"/>
-              </a:rPr>
-              <a:t> </a:t>
-            </a:r>
-            <a:r>
-              <a:rPr lang="en-US" dirty="0" err="1">
+              <a:rPr lang="en-US" i="1" dirty="0">
+                <a:latin typeface="Georgia" panose="02040502050405020303" pitchFamily="18" charset="0"/>
+              </a:rPr>
+              <a:t> </a:t>
+            </a:r>
+            <a:r>
+              <a:rPr lang="en-US" i="1" dirty="0" err="1">
                 <a:latin typeface="Georgia" panose="02040502050405020303" pitchFamily="18" charset="0"/>
               </a:rPr>
               <a:t>methodes</a:t>
             </a:r>
             <a:r>
-              <a:rPr lang="en-US" dirty="0">
+              <a:rPr lang="en-US" i="1" dirty="0">
                 <a:latin typeface="Georgia" panose="02040502050405020303" pitchFamily="18" charset="0"/>
               </a:rPr>
               <a:t>: </a:t>
             </a:r>
             <a:r>
-              <a:rPr lang="en-US" dirty="0" err="1">
+              <a:rPr lang="en-US" i="1" dirty="0" err="1">
                 <a:latin typeface="Georgia" panose="02040502050405020303" pitchFamily="18" charset="0"/>
               </a:rPr>
               <a:t>steunen</a:t>
             </a:r>
             <a:r>
-              <a:rPr lang="en-US" dirty="0">
-                <a:latin typeface="Georgia" panose="02040502050405020303" pitchFamily="18" charset="0"/>
-              </a:rPr>
-              <a:t> op ACA </a:t>
-            </a:r>
-            <a:r>
-              <a:rPr lang="en-US" dirty="0" err="1">
+              <a:rPr lang="en-US" i="1" dirty="0">
+                <a:latin typeface="Georgia" panose="02040502050405020303" pitchFamily="18" charset="0"/>
+              </a:rPr>
+              <a:t> op het ACA </a:t>
+            </a:r>
+            <a:r>
+              <a:rPr lang="en-US" i="1" dirty="0" err="1">
                 <a:latin typeface="Georgia" panose="02040502050405020303" pitchFamily="18" charset="0"/>
               </a:rPr>
               <a:t>algoritme</a:t>
             </a:r>
-            <a:endParaRPr lang="en-US" dirty="0">
+            <a:endParaRPr lang="en-US" i="1" dirty="0">
               <a:latin typeface="Georgia" panose="02040502050405020303" pitchFamily="18" charset="0"/>
             </a:endParaRPr>
           </a:p>
           <a:p>
             <a:pPr marL="1257300" lvl="2" indent="-342900">
-              <a:buFont typeface="Arial" panose="020B0604020202020204" pitchFamily="34" charset="0"/>
-              <a:buChar char="•"/>
+              <a:buFont typeface="+mj-lt"/>
+              <a:buAutoNum type="arabicParenR"/>
             </a:pPr>
             <a:endParaRPr lang="en-US" dirty="0">
               <a:latin typeface="Georgia" panose="02040502050405020303" pitchFamily="18" charset="0"/>
@@ -5174,25 +5102,37 @@
               <a:rPr lang="en-US" dirty="0" err="1">
                 <a:latin typeface="Georgia" panose="02040502050405020303" pitchFamily="18" charset="0"/>
               </a:rPr>
-              <a:t>Vectoren</a:t>
+              <a:t>Rijen</a:t>
             </a:r>
             <a:r>
               <a:rPr lang="en-US" dirty="0">
                 <a:latin typeface="Georgia" panose="02040502050405020303" pitchFamily="18" charset="0"/>
               </a:rPr>
-              <a:t> </a:t>
+              <a:t>/</a:t>
             </a:r>
             <a:r>
               <a:rPr lang="en-US" dirty="0" err="1">
                 <a:latin typeface="Georgia" panose="02040502050405020303" pitchFamily="18" charset="0"/>
               </a:rPr>
+              <a:t>kolommen</a:t>
+            </a:r>
+            <a:r>
+              <a:rPr lang="en-US" dirty="0">
+                <a:latin typeface="Georgia" panose="02040502050405020303" pitchFamily="18" charset="0"/>
+              </a:rPr>
+              <a:t>/tubes </a:t>
+            </a:r>
+            <a:r>
+              <a:rPr lang="en-US" dirty="0" err="1">
+                <a:latin typeface="Georgia" panose="02040502050405020303" pitchFamily="18" charset="0"/>
+              </a:rPr>
               <a:t>uit</a:t>
             </a:r>
             <a:r>
               <a:rPr lang="en-US" dirty="0">
                 <a:latin typeface="Georgia" panose="02040502050405020303" pitchFamily="18" charset="0"/>
               </a:rPr>
-              <a:t> termen van de </a:t>
+              <a:t> </a:t>
             </a:r>
             <a:r>
               <a:rPr lang="en-US" dirty="0" err="1">
@@ -5210,38 +5150,137 @@
               <a:rPr lang="en-US" dirty="0" err="1">
                 <a:latin typeface="Georgia" panose="02040502050405020303" pitchFamily="18" charset="0"/>
               </a:rPr>
-              <a:t>verzamelen</a:t>
+              <a:t>als</a:t>
             </a:r>
             <a:r>
               <a:rPr lang="en-US" dirty="0">
                 <a:latin typeface="Georgia" panose="02040502050405020303" pitchFamily="18" charset="0"/>
               </a:rPr>
-              <a:t> </a:t>
+              <a:t> feature </a:t>
             </a:r>
             <a:r>
               <a:rPr lang="en-US" dirty="0" err="1">
                 <a:latin typeface="Georgia" panose="02040502050405020303" pitchFamily="18" charset="0"/>
               </a:rPr>
-              <a:t>als</a:t>
+              <a:t>vectoren</a:t>
             </a:r>
             <a:r>
               <a:rPr lang="en-US" dirty="0">
                 <a:latin typeface="Georgia" panose="02040502050405020303" pitchFamily="18" charset="0"/>
               </a:rPr>
-              <a:t> ‘feature </a:t>
+              <a:t> </a:t>
             </a:r>
             <a:r>
               <a:rPr lang="en-US" dirty="0" err="1">
                 <a:latin typeface="Georgia" panose="02040502050405020303" pitchFamily="18" charset="0"/>
               </a:rPr>
-              <a:t>vectoren</a:t>
-            </a:r>
-            <a:r>
-              <a:rPr lang="en-US" dirty="0">
-                <a:latin typeface="Georgia" panose="02040502050405020303" pitchFamily="18" charset="0"/>
-              </a:rPr>
-              <a:t>’</a:t>
-            </a:r>
+              <a:t>kiezen</a:t>
+            </a:r>
+            <a:endParaRPr lang="en-US" dirty="0">
+              <a:latin typeface="Georgia" panose="02040502050405020303" pitchFamily="18" charset="0"/>
+            </a:endParaRPr>
+          </a:p>
+          <a:p>
+            <a:pPr marL="1200150" lvl="2" indent="-285750">
+              <a:buFont typeface="Arial" panose="020B0604020202020204" pitchFamily="34" charset="0"/>
+              <a:buChar char="•"/>
+            </a:pPr>
+            <a:r>
+              <a:rPr lang="en-US" i="1" dirty="0">
+                <a:latin typeface="Georgia" panose="02040502050405020303" pitchFamily="18" charset="0"/>
+              </a:rPr>
+              <a:t> </a:t>
+            </a:r>
+            <a:r>
+              <a:rPr lang="en-US" i="1" dirty="0" err="1">
+                <a:latin typeface="Georgia" panose="02040502050405020303" pitchFamily="18" charset="0"/>
+              </a:rPr>
+              <a:t>Dimensie</a:t>
+            </a:r>
+            <a:r>
+              <a:rPr lang="en-US" i="1" dirty="0">
+                <a:latin typeface="Georgia" panose="02040502050405020303" pitchFamily="18" charset="0"/>
+              </a:rPr>
+              <a:t> </a:t>
+            </a:r>
+            <a:r>
+              <a:rPr lang="en-US" i="1" dirty="0" err="1">
+                <a:latin typeface="Georgia" panose="02040502050405020303" pitchFamily="18" charset="0"/>
+              </a:rPr>
+              <a:t>bepaald</a:t>
+            </a:r>
+            <a:r>
+              <a:rPr lang="en-US" i="1" dirty="0">
+                <a:latin typeface="Georgia" panose="02040502050405020303" pitchFamily="18" charset="0"/>
+              </a:rPr>
+              <a:t> wat we </a:t>
+            </a:r>
+            <a:r>
+              <a:rPr lang="en-US" i="1" dirty="0" err="1">
+                <a:latin typeface="Georgia" panose="02040502050405020303" pitchFamily="18" charset="0"/>
+              </a:rPr>
+              <a:t>clusteren</a:t>
+            </a:r>
+            <a:endParaRPr lang="en-US" i="1" dirty="0">
+              <a:latin typeface="Georgia" panose="02040502050405020303" pitchFamily="18" charset="0"/>
+            </a:endParaRPr>
+          </a:p>
+          <a:p>
+            <a:pPr marL="1200150" lvl="2" indent="-285750">
+              <a:buFont typeface="Arial" panose="020B0604020202020204" pitchFamily="34" charset="0"/>
+              <a:buChar char="•"/>
+            </a:pPr>
+            <a:r>
+              <a:rPr lang="en-US" i="1" dirty="0">
+                <a:latin typeface="Georgia" panose="02040502050405020303" pitchFamily="18" charset="0"/>
+              </a:rPr>
+              <a:t> </a:t>
+            </a:r>
+            <a:r>
+              <a:rPr lang="en-US" i="1" dirty="0" err="1">
+                <a:latin typeface="Georgia" panose="02040502050405020303" pitchFamily="18" charset="0"/>
+              </a:rPr>
+              <a:t>Bij</a:t>
+            </a:r>
+            <a:r>
+              <a:rPr lang="en-US" i="1" dirty="0">
+                <a:latin typeface="Georgia" panose="02040502050405020303" pitchFamily="18" charset="0"/>
+              </a:rPr>
+              <a:t> AMIE-dataset: </a:t>
+            </a:r>
+            <a:r>
+              <a:rPr lang="en-US" i="1" dirty="0" err="1">
+                <a:latin typeface="Georgia" panose="02040502050405020303" pitchFamily="18" charset="0"/>
+              </a:rPr>
+              <a:t>clusteren</a:t>
+            </a:r>
+            <a:r>
+              <a:rPr lang="en-US" i="1" dirty="0">
+                <a:latin typeface="Georgia" panose="02040502050405020303" pitchFamily="18" charset="0"/>
+              </a:rPr>
+              <a:t> op </a:t>
+            </a:r>
+            <a:r>
+              <a:rPr lang="en-US" i="1" dirty="0" err="1">
+                <a:latin typeface="Georgia" panose="02040502050405020303" pitchFamily="18" charset="0"/>
+              </a:rPr>
+              <a:t>sensoren</a:t>
+            </a:r>
+            <a:r>
+              <a:rPr lang="en-US" i="1" dirty="0">
+                <a:latin typeface="Georgia" panose="02040502050405020303" pitchFamily="18" charset="0"/>
+              </a:rPr>
+              <a:t> of </a:t>
+            </a:r>
+            <a:r>
+              <a:rPr lang="en-US" i="1" dirty="0" err="1">
+                <a:latin typeface="Georgia" panose="02040502050405020303" pitchFamily="18" charset="0"/>
+              </a:rPr>
+              <a:t>personen</a:t>
+            </a:r>
+            <a:endParaRPr lang="en-US" i="1" dirty="0">
+              <a:latin typeface="Georgia" panose="02040502050405020303" pitchFamily="18" charset="0"/>
+            </a:endParaRPr>
           </a:p>
           <a:p>
             <a:pPr marL="800100" lvl="1" indent="-342900">
@@ -5961,7 +6000,19 @@
               <a:rPr lang="en-US" dirty="0">
                 <a:latin typeface="Georgia" panose="02040502050405020303" pitchFamily="18" charset="0"/>
               </a:rPr>
-              <a:t>= k termen in </a:t>
+              <a:t>= er </a:t>
+            </a:r>
+            <a:r>
+              <a:rPr lang="en-US" dirty="0" err="1">
+                <a:latin typeface="Georgia" panose="02040502050405020303" pitchFamily="18" charset="0"/>
+              </a:rPr>
+              <a:t>zijn</a:t>
+            </a:r>
+            <a:r>
+              <a:rPr lang="en-US" dirty="0">
+                <a:latin typeface="Georgia" panose="02040502050405020303" pitchFamily="18" charset="0"/>
+              </a:rPr>
+              <a:t> k termen in </a:t>
             </a:r>
             <a:r>
               <a:rPr lang="en-US" dirty="0" err="1">
@@ -6915,7 +6966,7 @@
               <a:rPr lang="en-US" dirty="0">
                 <a:latin typeface="Georgia" panose="02040502050405020303" pitchFamily="18" charset="0"/>
               </a:rPr>
-              <a:t> </a:t>
+              <a:t> de </a:t>
             </a:r>
             <a:r>
               <a:rPr lang="en-US" dirty="0" err="1">
@@ -6996,117 +7047,123 @@
               <a:rPr lang="en-US" dirty="0">
                 <a:latin typeface="Georgia Pro Cond Semibold" panose="020F0502020204030204" pitchFamily="18" charset="0"/>
               </a:rPr>
-              <a:t>	→ </a:t>
-            </a:r>
-            <a:r>
-              <a:rPr lang="en-US" dirty="0" err="1">
+              <a:t>	</a:t>
+            </a:r>
+            <a:r>
+              <a:rPr lang="en-US" i="1" dirty="0">
+                <a:latin typeface="Georgia Pro Cond Semibold" panose="020F0502020204030204" pitchFamily="18" charset="0"/>
+              </a:rPr>
+              <a:t>→ </a:t>
+            </a:r>
+            <a:r>
+              <a:rPr lang="en-US" i="1" dirty="0" err="1">
                 <a:latin typeface="Georgia" panose="02040502050405020303" pitchFamily="18" charset="0"/>
               </a:rPr>
               <a:t>Ideaal</a:t>
             </a:r>
             <a:r>
-              <a:rPr lang="en-US" dirty="0">
-                <a:latin typeface="Georgia" panose="02040502050405020303" pitchFamily="18" charset="0"/>
-              </a:rPr>
-              <a:t> </a:t>
-            </a:r>
-            <a:r>
-              <a:rPr lang="en-US" dirty="0" err="1">
+              <a:rPr lang="en-US" i="1" dirty="0">
+                <a:latin typeface="Georgia" panose="02040502050405020303" pitchFamily="18" charset="0"/>
+              </a:rPr>
+              <a:t> </a:t>
+            </a:r>
+            <a:r>
+              <a:rPr lang="en-US" i="1" dirty="0" err="1">
                 <a:latin typeface="Georgia" panose="02040502050405020303" pitchFamily="18" charset="0"/>
               </a:rPr>
               <a:t>voor</a:t>
             </a:r>
             <a:r>
-              <a:rPr lang="en-US" dirty="0">
-                <a:latin typeface="Georgia" panose="02040502050405020303" pitchFamily="18" charset="0"/>
-              </a:rPr>
-              <a:t> </a:t>
-            </a:r>
-            <a:r>
-              <a:rPr lang="en-US" dirty="0" err="1">
+              <a:rPr lang="en-US" i="1" dirty="0">
+                <a:latin typeface="Georgia" panose="02040502050405020303" pitchFamily="18" charset="0"/>
+              </a:rPr>
+              <a:t> </a:t>
+            </a:r>
+            <a:r>
+              <a:rPr lang="en-US" i="1" dirty="0" err="1">
                 <a:latin typeface="Georgia" panose="02040502050405020303" pitchFamily="18" charset="0"/>
               </a:rPr>
               <a:t>een</a:t>
             </a:r>
             <a:r>
-              <a:rPr lang="en-US" dirty="0">
-                <a:latin typeface="Georgia" panose="02040502050405020303" pitchFamily="18" charset="0"/>
-              </a:rPr>
-              <a:t> </a:t>
-            </a:r>
-            <a:r>
-              <a:rPr lang="en-US" dirty="0" err="1">
+              <a:rPr lang="en-US" i="1" dirty="0">
+                <a:latin typeface="Georgia" panose="02040502050405020303" pitchFamily="18" charset="0"/>
+              </a:rPr>
+              <a:t> </a:t>
+            </a:r>
+            <a:r>
+              <a:rPr lang="en-US" i="1" dirty="0" err="1">
                 <a:latin typeface="Georgia" panose="02040502050405020303" pitchFamily="18" charset="0"/>
               </a:rPr>
               <a:t>decompositie</a:t>
             </a:r>
             <a:r>
-              <a:rPr lang="en-US" dirty="0">
+              <a:rPr lang="en-US" i="1" dirty="0">
                 <a:latin typeface="Georgia" panose="02040502050405020303" pitchFamily="18" charset="0"/>
               </a:rPr>
               <a:t> van de </a:t>
             </a:r>
             <a:r>
-              <a:rPr lang="en-US" dirty="0" err="1">
+              <a:rPr lang="en-US" i="1" dirty="0" err="1">
                 <a:latin typeface="Georgia" panose="02040502050405020303" pitchFamily="18" charset="0"/>
               </a:rPr>
               <a:t>afstandstensor</a:t>
             </a:r>
-            <a:endParaRPr lang="en-US" dirty="0">
+            <a:endParaRPr lang="en-US" i="1" dirty="0">
               <a:latin typeface="Georgia" panose="02040502050405020303" pitchFamily="18" charset="0"/>
             </a:endParaRPr>
           </a:p>
           <a:p>
             <a:pPr lvl="3"/>
             <a:r>
-              <a:rPr lang="en-US" dirty="0">
+              <a:rPr lang="en-US" i="1" dirty="0">
                 <a:latin typeface="Georgia" panose="02040502050405020303" pitchFamily="18" charset="0"/>
               </a:rPr>
               <a:t>→ ACA </a:t>
             </a:r>
             <a:r>
-              <a:rPr lang="en-US" dirty="0" err="1">
+              <a:rPr lang="en-US" i="1" dirty="0" err="1">
                 <a:latin typeface="Georgia" panose="02040502050405020303" pitchFamily="18" charset="0"/>
               </a:rPr>
               <a:t>methodes</a:t>
             </a:r>
             <a:r>
-              <a:rPr lang="en-US" dirty="0">
-                <a:latin typeface="Georgia" panose="02040502050405020303" pitchFamily="18" charset="0"/>
-              </a:rPr>
-              <a:t> </a:t>
-            </a:r>
-            <a:r>
-              <a:rPr lang="en-US" dirty="0" err="1">
+              <a:rPr lang="en-US" i="1" dirty="0">
+                <a:latin typeface="Georgia" panose="02040502050405020303" pitchFamily="18" charset="0"/>
+              </a:rPr>
+              <a:t> </a:t>
+            </a:r>
+            <a:r>
+              <a:rPr lang="en-US" i="1" dirty="0" err="1">
                 <a:latin typeface="Georgia" panose="02040502050405020303" pitchFamily="18" charset="0"/>
               </a:rPr>
               <a:t>voor</a:t>
             </a:r>
             <a:r>
-              <a:rPr lang="en-US" dirty="0">
-                <a:latin typeface="Georgia" panose="02040502050405020303" pitchFamily="18" charset="0"/>
-              </a:rPr>
-              <a:t> </a:t>
-            </a:r>
-            <a:r>
-              <a:rPr lang="en-US" dirty="0" err="1">
+              <a:rPr lang="en-US" i="1" dirty="0">
+                <a:latin typeface="Georgia" panose="02040502050405020303" pitchFamily="18" charset="0"/>
+              </a:rPr>
+              <a:t> </a:t>
+            </a:r>
+            <a:r>
+              <a:rPr lang="en-US" i="1" dirty="0" err="1">
                 <a:latin typeface="Georgia" panose="02040502050405020303" pitchFamily="18" charset="0"/>
               </a:rPr>
               <a:t>tensoren</a:t>
             </a:r>
             <a:r>
-              <a:rPr lang="en-US" dirty="0">
-                <a:latin typeface="Georgia" panose="02040502050405020303" pitchFamily="18" charset="0"/>
-              </a:rPr>
-              <a:t> </a:t>
-            </a:r>
-            <a:r>
-              <a:rPr lang="en-US" dirty="0" err="1">
+              <a:rPr lang="en-US" i="1" dirty="0">
+                <a:latin typeface="Georgia" panose="02040502050405020303" pitchFamily="18" charset="0"/>
+              </a:rPr>
+              <a:t> </a:t>
+            </a:r>
+            <a:r>
+              <a:rPr lang="en-US" i="1" dirty="0" err="1">
                 <a:latin typeface="Georgia" panose="02040502050405020303" pitchFamily="18" charset="0"/>
               </a:rPr>
               <a:t>ontwikkelen</a:t>
             </a:r>
-            <a:endParaRPr lang="en-US" dirty="0">
+            <a:endParaRPr lang="en-US" i="1" dirty="0">
               <a:latin typeface="Georgia" panose="02040502050405020303" pitchFamily="18" charset="0"/>
             </a:endParaRPr>
           </a:p>
@@ -7190,13 +7247,13 @@
           <p:nvPr/>
         </p:nvPicPr>
         <p:blipFill>
-          <a:blip r:embed="rId6">
+          <a:blip r:embed="rId4">
             <a:extLst>
               <a:ext uri="{28A0092B-C50C-407E-A947-70E740481C1C}">
                 <a14:useLocalDpi xmlns:a14="http://schemas.microsoft.com/office/drawing/2010/main" val="0"/>
               </a:ext>
               <a:ext uri="{96DAC541-7B7A-43D3-8B79-37D633B846F1}">
-                <asvg:svgBlip xmlns:asvg="http://schemas.microsoft.com/office/drawing/2016/SVG/main" r:embed="rId7"/>
+                <asvg:svgBlip xmlns:asvg="http://schemas.microsoft.com/office/drawing/2016/SVG/main" r:embed="rId5"/>
               </a:ext>
             </a:extLst>
           </a:blip>
@@ -7305,13 +7362,13 @@
           <p:nvPr/>
         </p:nvPicPr>
         <p:blipFill>
-          <a:blip r:embed="rId8">
+          <a:blip r:embed="rId6">
             <a:extLst>
               <a:ext uri="{28A0092B-C50C-407E-A947-70E740481C1C}">
                 <a14:useLocalDpi xmlns:a14="http://schemas.microsoft.com/office/drawing/2010/main" val="0"/>
               </a:ext>
               <a:ext uri="{96DAC541-7B7A-43D3-8B79-37D633B846F1}">
-                <asvg:svgBlip xmlns:asvg="http://schemas.microsoft.com/office/drawing/2016/SVG/main" r:embed="rId9"/>
+                <asvg:svgBlip xmlns:asvg="http://schemas.microsoft.com/office/drawing/2016/SVG/main" r:embed="rId7"/>
               </a:ext>
             </a:extLst>
           </a:blip>
@@ -7378,256 +7435,6 @@
       </p:sp>
       <p:sp>
         <p:nvSpPr>
-          <p:cNvPr id="21" name="TextBox 20">
-            <a:extLst>
-              <a:ext uri="{FF2B5EF4-FFF2-40B4-BE49-F238E27FC236}">
-                <a16:creationId xmlns:a16="http://schemas.microsoft.com/office/drawing/2014/main" id="{C7DFE0F1-1A2C-98CC-EB06-5E93E4118B46}"/>
-              </a:ext>
-            </a:extLst>
-          </p:cNvPr>
-          <p:cNvSpPr txBox="1"/>
-          <p:nvPr/>
-        </p:nvSpPr>
-        <p:spPr>
-          <a:xfrm>
-            <a:off x="1410310" y="14399304"/>
-            <a:ext cx="8522052" cy="1292662"/>
-          </a:xfrm>
-          <a:prstGeom prst="rect">
-            <a:avLst/>
-          </a:prstGeom>
-          <a:noFill/>
-        </p:spPr>
-        <p:txBody>
-          <a:bodyPr wrap="square" rtlCol="0">
-            <a:spAutoFit/>
-          </a:bodyPr>
-          <a:lstStyle/>
-          <a:p>
-            <a:r>
-              <a:rPr lang="en-US" sz="2400" b="1" dirty="0" err="1">
-                <a:latin typeface="Georgia" panose="02040502050405020303" pitchFamily="18" charset="0"/>
-              </a:rPr>
-              <a:t>Clusteren</a:t>
-            </a:r>
-            <a:r>
-              <a:rPr lang="en-US" sz="2400" b="1" dirty="0">
-                <a:latin typeface="Georgia" panose="02040502050405020303" pitchFamily="18" charset="0"/>
-              </a:rPr>
-              <a:t> in </a:t>
-            </a:r>
-            <a:r>
-              <a:rPr lang="en-US" sz="2400" b="1" dirty="0" err="1">
-                <a:latin typeface="Georgia" panose="02040502050405020303" pitchFamily="18" charset="0"/>
-              </a:rPr>
-              <a:t>specifieke</a:t>
-            </a:r>
-            <a:r>
-              <a:rPr lang="en-US" sz="2400" b="1" dirty="0">
-                <a:latin typeface="Georgia" panose="02040502050405020303" pitchFamily="18" charset="0"/>
-              </a:rPr>
-              <a:t> </a:t>
-            </a:r>
-            <a:r>
-              <a:rPr lang="en-US" sz="2400" b="1" dirty="0" err="1">
-                <a:latin typeface="Georgia" panose="02040502050405020303" pitchFamily="18" charset="0"/>
-              </a:rPr>
-              <a:t>dimensie</a:t>
-            </a:r>
-            <a:endParaRPr lang="en-US" sz="2400" b="1" dirty="0">
-              <a:latin typeface="Georgia" panose="02040502050405020303" pitchFamily="18" charset="0"/>
-            </a:endParaRPr>
-          </a:p>
-          <a:p>
-            <a:pPr marL="742950" lvl="1" indent="-285750">
-              <a:buFont typeface="Arial" panose="020B0604020202020204" pitchFamily="34" charset="0"/>
-              <a:buChar char="•"/>
-            </a:pPr>
-            <a:r>
-              <a:rPr lang="en-US" dirty="0" err="1">
-                <a:latin typeface="Georgia" panose="02040502050405020303" pitchFamily="18" charset="0"/>
-              </a:rPr>
-              <a:t>Rijen</a:t>
-            </a:r>
-            <a:r>
-              <a:rPr lang="en-US" dirty="0">
-                <a:latin typeface="Georgia" panose="02040502050405020303" pitchFamily="18" charset="0"/>
-              </a:rPr>
-              <a:t>/</a:t>
-            </a:r>
-            <a:r>
-              <a:rPr lang="en-US" dirty="0" err="1">
-                <a:latin typeface="Georgia" panose="02040502050405020303" pitchFamily="18" charset="0"/>
-              </a:rPr>
-              <a:t>kolommen</a:t>
-            </a:r>
-            <a:r>
-              <a:rPr lang="en-US" dirty="0">
-                <a:latin typeface="Georgia" panose="02040502050405020303" pitchFamily="18" charset="0"/>
-              </a:rPr>
-              <a:t>/tubes </a:t>
-            </a:r>
-            <a:r>
-              <a:rPr lang="en-US" dirty="0" err="1">
-                <a:latin typeface="Georgia" panose="02040502050405020303" pitchFamily="18" charset="0"/>
-              </a:rPr>
-              <a:t>uit</a:t>
-            </a:r>
-            <a:r>
-              <a:rPr lang="en-US" dirty="0">
-                <a:latin typeface="Georgia" panose="02040502050405020303" pitchFamily="18" charset="0"/>
-              </a:rPr>
-              <a:t> </a:t>
-            </a:r>
-            <a:r>
-              <a:rPr lang="en-US" dirty="0" err="1">
-                <a:latin typeface="Georgia" panose="02040502050405020303" pitchFamily="18" charset="0"/>
-              </a:rPr>
-              <a:t>decompositie</a:t>
-            </a:r>
-            <a:r>
-              <a:rPr lang="en-US" dirty="0">
-                <a:latin typeface="Georgia" panose="02040502050405020303" pitchFamily="18" charset="0"/>
-              </a:rPr>
-              <a:t> </a:t>
-            </a:r>
-            <a:r>
-              <a:rPr lang="en-US" dirty="0" err="1">
-                <a:latin typeface="Georgia" panose="02040502050405020303" pitchFamily="18" charset="0"/>
-              </a:rPr>
-              <a:t>als</a:t>
-            </a:r>
-            <a:r>
-              <a:rPr lang="en-US" dirty="0">
-                <a:latin typeface="Georgia" panose="02040502050405020303" pitchFamily="18" charset="0"/>
-              </a:rPr>
-              <a:t> feature </a:t>
-            </a:r>
-            <a:r>
-              <a:rPr lang="en-US" dirty="0" err="1">
-                <a:latin typeface="Georgia" panose="02040502050405020303" pitchFamily="18" charset="0"/>
-              </a:rPr>
-              <a:t>vectoren</a:t>
-            </a:r>
-            <a:r>
-              <a:rPr lang="en-US" dirty="0">
-                <a:latin typeface="Georgia" panose="02040502050405020303" pitchFamily="18" charset="0"/>
-              </a:rPr>
-              <a:t> </a:t>
-            </a:r>
-            <a:r>
-              <a:rPr lang="en-US" dirty="0" err="1">
-                <a:latin typeface="Georgia" panose="02040502050405020303" pitchFamily="18" charset="0"/>
-              </a:rPr>
-              <a:t>kiezen</a:t>
-            </a:r>
-            <a:endParaRPr lang="en-US" dirty="0">
-              <a:latin typeface="Georgia" panose="02040502050405020303" pitchFamily="18" charset="0"/>
-            </a:endParaRPr>
-          </a:p>
-          <a:p>
-            <a:pPr lvl="2"/>
-            <a:r>
-              <a:rPr lang="en-US" i="1" dirty="0">
-                <a:latin typeface="Georgia" panose="02040502050405020303" pitchFamily="18" charset="0"/>
-              </a:rPr>
-              <a:t>→ </a:t>
-            </a:r>
-            <a:r>
-              <a:rPr lang="en-US" i="1" dirty="0" err="1">
-                <a:latin typeface="Georgia" panose="02040502050405020303" pitchFamily="18" charset="0"/>
-              </a:rPr>
-              <a:t>Dimensie</a:t>
-            </a:r>
-            <a:r>
-              <a:rPr lang="en-US" i="1" dirty="0">
-                <a:latin typeface="Georgia" panose="02040502050405020303" pitchFamily="18" charset="0"/>
-              </a:rPr>
-              <a:t> </a:t>
-            </a:r>
-            <a:r>
-              <a:rPr lang="en-US" i="1" dirty="0" err="1">
-                <a:latin typeface="Georgia" panose="02040502050405020303" pitchFamily="18" charset="0"/>
-              </a:rPr>
-              <a:t>bepaald</a:t>
-            </a:r>
-            <a:r>
-              <a:rPr lang="en-US" i="1" dirty="0">
-                <a:latin typeface="Georgia" panose="02040502050405020303" pitchFamily="18" charset="0"/>
-              </a:rPr>
-              <a:t> wat we </a:t>
-            </a:r>
-            <a:r>
-              <a:rPr lang="en-US" i="1" dirty="0" err="1">
-                <a:latin typeface="Georgia" panose="02040502050405020303" pitchFamily="18" charset="0"/>
-              </a:rPr>
-              <a:t>clusteren</a:t>
-            </a:r>
-            <a:endParaRPr lang="en-US" i="1" dirty="0">
-              <a:latin typeface="Georgia" panose="02040502050405020303" pitchFamily="18" charset="0"/>
-            </a:endParaRPr>
-          </a:p>
-          <a:p>
-            <a:pPr lvl="2"/>
-            <a:r>
-              <a:rPr lang="en-US" i="1" dirty="0">
-                <a:latin typeface="Georgia" panose="02040502050405020303" pitchFamily="18" charset="0"/>
-              </a:rPr>
-              <a:t>→ </a:t>
-            </a:r>
-            <a:r>
-              <a:rPr lang="en-US" i="1" dirty="0" err="1">
-                <a:latin typeface="Georgia" panose="02040502050405020303" pitchFamily="18" charset="0"/>
-              </a:rPr>
-              <a:t>Bij</a:t>
-            </a:r>
-            <a:r>
-              <a:rPr lang="en-US" i="1" dirty="0">
-                <a:latin typeface="Georgia" panose="02040502050405020303" pitchFamily="18" charset="0"/>
-              </a:rPr>
-              <a:t> AMIE-dataset: </a:t>
-            </a:r>
-            <a:r>
-              <a:rPr lang="en-US" i="1" dirty="0" err="1">
-                <a:latin typeface="Georgia" panose="02040502050405020303" pitchFamily="18" charset="0"/>
-              </a:rPr>
-              <a:t>clusteren</a:t>
-            </a:r>
-            <a:r>
-              <a:rPr lang="en-US" i="1" dirty="0">
-                <a:latin typeface="Georgia" panose="02040502050405020303" pitchFamily="18" charset="0"/>
-              </a:rPr>
-              <a:t> op </a:t>
-            </a:r>
-            <a:r>
-              <a:rPr lang="en-US" i="1" dirty="0" err="1">
-                <a:latin typeface="Georgia" panose="02040502050405020303" pitchFamily="18" charset="0"/>
-              </a:rPr>
-              <a:t>sensoren</a:t>
-            </a:r>
-            <a:r>
-              <a:rPr lang="en-US" i="1" dirty="0">
-                <a:latin typeface="Georgia" panose="02040502050405020303" pitchFamily="18" charset="0"/>
-              </a:rPr>
-              <a:t>/</a:t>
-            </a:r>
-            <a:r>
-              <a:rPr lang="en-US" i="1" dirty="0" err="1">
-                <a:latin typeface="Georgia" panose="02040502050405020303" pitchFamily="18" charset="0"/>
-              </a:rPr>
-              <a:t>personen</a:t>
-            </a:r>
-            <a:r>
-              <a:rPr lang="en-US" dirty="0">
-                <a:latin typeface="Georgia" panose="02040502050405020303" pitchFamily="18" charset="0"/>
-              </a:rPr>
-              <a:t>	</a:t>
-            </a:r>
-          </a:p>
-        </p:txBody>
-      </p:sp>
-      <p:sp>
-        <p:nvSpPr>
           <p:cNvPr id="23" name="TextBox 22">
             <a:extLst>
               <a:ext uri="{FF2B5EF4-FFF2-40B4-BE49-F238E27FC236}">
@@ -7808,6 +7615,45 @@
             <a:extLst>
               <a:ext uri="{FF2B5EF4-FFF2-40B4-BE49-F238E27FC236}">
                 <a16:creationId xmlns:a16="http://schemas.microsoft.com/office/drawing/2014/main" id="{356C2334-E606-C72D-2884-96BB62BA94A7}"/>
+              </a:ext>
+            </a:extLst>
+          </p:cNvPr>
+          <p:cNvPicPr>
+            <a:picLocks noChangeAspect="1"/>
+          </p:cNvPicPr>
+          <p:nvPr/>
+        </p:nvPicPr>
+        <p:blipFill>
+          <a:blip r:embed="rId8">
+            <a:extLst>
+              <a:ext uri="{28A0092B-C50C-407E-A947-70E740481C1C}">
+                <a14:useLocalDpi xmlns:a14="http://schemas.microsoft.com/office/drawing/2010/main" val="0"/>
+              </a:ext>
+              <a:ext uri="{96DAC541-7B7A-43D3-8B79-37D633B846F1}">
+                <asvg:svgBlip xmlns:asvg="http://schemas.microsoft.com/office/drawing/2016/SVG/main" r:embed="rId9"/>
+              </a:ext>
+            </a:extLst>
+          </a:blip>
+          <a:stretch>
+            <a:fillRect/>
+          </a:stretch>
+        </p:blipFill>
+        <p:spPr>
+          <a:xfrm>
+            <a:off x="20011973" y="6846518"/>
+            <a:ext cx="6635244" cy="3556800"/>
+          </a:xfrm>
+          <a:prstGeom prst="rect">
+            <a:avLst/>
+          </a:prstGeom>
+        </p:spPr>
+      </p:pic>
+      <p:pic>
+        <p:nvPicPr>
+          <p:cNvPr id="28" name="Graphic 27">
+            <a:extLst>
+              <a:ext uri="{FF2B5EF4-FFF2-40B4-BE49-F238E27FC236}">
+                <a16:creationId xmlns:a16="http://schemas.microsoft.com/office/drawing/2014/main" id="{874ACF7F-6025-43DF-A3E3-C04EBCAF7E04}"/>
               </a:ext>
             </a:extLst>
           </p:cNvPr>
@@ -7833,20 +7679,145 @@
         </p:blipFill>
         <p:spPr>
           <a:xfrm>
-            <a:off x="20290033" y="6186464"/>
-            <a:ext cx="6635244" cy="3556800"/>
+            <a:off x="19701458" y="2387405"/>
+            <a:ext cx="9182354" cy="3557198"/>
           </a:xfrm>
           <a:prstGeom prst="rect">
             <a:avLst/>
           </a:prstGeom>
         </p:spPr>
       </p:pic>
+      <p:sp>
+        <p:nvSpPr>
+          <p:cNvPr id="15" name="TextBox 14">
+            <a:extLst>
+              <a:ext uri="{FF2B5EF4-FFF2-40B4-BE49-F238E27FC236}">
+                <a16:creationId xmlns:a16="http://schemas.microsoft.com/office/drawing/2014/main" id="{8C8B9839-4C05-5BD2-AC06-C6FA4E8D6A87}"/>
+              </a:ext>
+            </a:extLst>
+          </p:cNvPr>
+          <p:cNvSpPr txBox="1"/>
+          <p:nvPr/>
+        </p:nvSpPr>
+        <p:spPr>
+          <a:xfrm>
+            <a:off x="930901" y="15789049"/>
+            <a:ext cx="7851106" cy="461665"/>
+          </a:xfrm>
+          <a:prstGeom prst="rect">
+            <a:avLst/>
+          </a:prstGeom>
+          <a:noFill/>
+        </p:spPr>
+        <p:txBody>
+          <a:bodyPr wrap="square" rtlCol="0">
+            <a:spAutoFit/>
+          </a:bodyPr>
+          <a:lstStyle/>
+          <a:p>
+            <a:pPr lvl="1"/>
+            <a:r>
+              <a:rPr lang="en-US" sz="2400" b="1" dirty="0">
+                <a:latin typeface="Georgia" panose="02040502050405020303" pitchFamily="18" charset="0"/>
+              </a:rPr>
+              <a:t>DTW </a:t>
+            </a:r>
+            <a:r>
+              <a:rPr lang="en-US" sz="2400" b="1" dirty="0" err="1">
+                <a:latin typeface="Georgia" panose="02040502050405020303" pitchFamily="18" charset="0"/>
+              </a:rPr>
+              <a:t>operaties</a:t>
+            </a:r>
+            <a:r>
+              <a:rPr lang="en-US" sz="2400" b="1" dirty="0">
+                <a:latin typeface="Georgia" panose="02040502050405020303" pitchFamily="18" charset="0"/>
+              </a:rPr>
+              <a:t> van </a:t>
+            </a:r>
+            <a:r>
+              <a:rPr lang="en-US" sz="2400" b="1" dirty="0" err="1">
+                <a:latin typeface="Georgia" panose="02040502050405020303" pitchFamily="18" charset="0"/>
+              </a:rPr>
+              <a:t>decompositie</a:t>
+            </a:r>
+            <a:r>
+              <a:rPr lang="en-US" sz="2400" b="1" dirty="0">
+                <a:latin typeface="Georgia" panose="02040502050405020303" pitchFamily="18" charset="0"/>
+              </a:rPr>
+              <a:t> </a:t>
+            </a:r>
+            <a:r>
+              <a:rPr lang="en-US" sz="2400" b="1" dirty="0" err="1">
+                <a:latin typeface="Georgia" panose="02040502050405020303" pitchFamily="18" charset="0"/>
+              </a:rPr>
+              <a:t>laag</a:t>
+            </a:r>
+            <a:r>
+              <a:rPr lang="en-US" sz="2400" b="1" dirty="0">
+                <a:latin typeface="Georgia" panose="02040502050405020303" pitchFamily="18" charset="0"/>
+              </a:rPr>
+              <a:t> </a:t>
+            </a:r>
+            <a:r>
+              <a:rPr lang="en-US" sz="2400" b="1" dirty="0" err="1">
+                <a:latin typeface="Georgia" panose="02040502050405020303" pitchFamily="18" charset="0"/>
+              </a:rPr>
+              <a:t>houden</a:t>
+            </a:r>
+            <a:r>
+              <a:rPr lang="en-US" sz="2400" b="1" dirty="0">
+                <a:latin typeface="Georgia" panose="02040502050405020303" pitchFamily="18" charset="0"/>
+              </a:rPr>
+              <a:t> </a:t>
+            </a:r>
+            <a:endParaRPr lang="en-US" sz="2400" dirty="0">
+              <a:latin typeface="Georgia" panose="02040502050405020303" pitchFamily="18" charset="0"/>
+            </a:endParaRPr>
+          </a:p>
+        </p:txBody>
+      </p:sp>
+      <p:sp>
+        <p:nvSpPr>
+          <p:cNvPr id="51" name="TextBox 50">
+            <a:extLst>
+              <a:ext uri="{FF2B5EF4-FFF2-40B4-BE49-F238E27FC236}">
+                <a16:creationId xmlns:a16="http://schemas.microsoft.com/office/drawing/2014/main" id="{D535D704-77A8-F599-D108-3478B11D5D08}"/>
+              </a:ext>
+            </a:extLst>
+          </p:cNvPr>
+          <p:cNvSpPr txBox="1"/>
+          <p:nvPr/>
+        </p:nvSpPr>
+        <p:spPr>
+          <a:xfrm>
+            <a:off x="21974629" y="15192904"/>
+            <a:ext cx="6748225" cy="307777"/>
+          </a:xfrm>
+          <a:prstGeom prst="rect">
+            <a:avLst/>
+          </a:prstGeom>
+          <a:noFill/>
+        </p:spPr>
+        <p:txBody>
+          <a:bodyPr wrap="square" rtlCol="0">
+            <a:spAutoFit/>
+          </a:bodyPr>
+          <a:lstStyle/>
+          <a:p>
+            <a:r>
+              <a:rPr lang="nl-NL" sz="1400" dirty="0"/>
+              <a:t>Resultaten clusteren (k = 3 en k=7 resp.) met uitgebreide vectoren methode rang 25 type 3</a:t>
+            </a:r>
+            <a:endParaRPr lang="LID4096" sz="1400" dirty="0"/>
+          </a:p>
+        </p:txBody>
+      </p:sp>
       <p:pic>
         <p:nvPicPr>
-          <p:cNvPr id="28" name="Graphic 27">
+          <p:cNvPr id="66" name="Graphic 65">
             <a:extLst>
               <a:ext uri="{FF2B5EF4-FFF2-40B4-BE49-F238E27FC236}">
-                <a16:creationId xmlns:a16="http://schemas.microsoft.com/office/drawing/2014/main" id="{874ACF7F-6025-43DF-A3E3-C04EBCAF7E04}"/>
+                <a16:creationId xmlns:a16="http://schemas.microsoft.com/office/drawing/2014/main" id="{66051148-45AD-C8A0-4530-E814C4E3CE40}"/>
               </a:ext>
             </a:extLst>
           </p:cNvPr>
@@ -7863,170 +7834,6 @@
               </a:ext>
               <a:ext uri="{96DAC541-7B7A-43D3-8B79-37D633B846F1}">
                 <asvg:svgBlip xmlns:asvg="http://schemas.microsoft.com/office/drawing/2016/SVG/main" r:embed="rId13"/>
-              </a:ext>
-            </a:extLst>
-          </a:blip>
-          <a:stretch>
-            <a:fillRect/>
-          </a:stretch>
-        </p:blipFill>
-        <p:spPr>
-          <a:xfrm>
-            <a:off x="20011973" y="2515414"/>
-            <a:ext cx="9182354" cy="3557198"/>
-          </a:xfrm>
-          <a:prstGeom prst="rect">
-            <a:avLst/>
-          </a:prstGeom>
-        </p:spPr>
-      </p:pic>
-      <p:sp>
-        <p:nvSpPr>
-          <p:cNvPr id="15" name="TextBox 14">
-            <a:extLst>
-              <a:ext uri="{FF2B5EF4-FFF2-40B4-BE49-F238E27FC236}">
-                <a16:creationId xmlns:a16="http://schemas.microsoft.com/office/drawing/2014/main" id="{8C8B9839-4C05-5BD2-AC06-C6FA4E8D6A87}"/>
-              </a:ext>
-            </a:extLst>
-          </p:cNvPr>
-          <p:cNvSpPr txBox="1"/>
-          <p:nvPr/>
-        </p:nvSpPr>
-        <p:spPr>
-          <a:xfrm>
-            <a:off x="930901" y="15789049"/>
-            <a:ext cx="7851106" cy="461665"/>
-          </a:xfrm>
-          <a:prstGeom prst="rect">
-            <a:avLst/>
-          </a:prstGeom>
-          <a:noFill/>
-        </p:spPr>
-        <p:txBody>
-          <a:bodyPr wrap="square" rtlCol="0">
-            <a:spAutoFit/>
-          </a:bodyPr>
-          <a:lstStyle/>
-          <a:p>
-            <a:pPr lvl="1"/>
-            <a:r>
-              <a:rPr lang="en-US" sz="2400" b="1" dirty="0">
-                <a:latin typeface="Georgia" panose="02040502050405020303" pitchFamily="18" charset="0"/>
-              </a:rPr>
-              <a:t>DTW </a:t>
-            </a:r>
-            <a:r>
-              <a:rPr lang="en-US" sz="2400" b="1" dirty="0" err="1">
-                <a:latin typeface="Georgia" panose="02040502050405020303" pitchFamily="18" charset="0"/>
-              </a:rPr>
-              <a:t>operaties</a:t>
-            </a:r>
-            <a:r>
-              <a:rPr lang="en-US" sz="2400" b="1" dirty="0">
-                <a:latin typeface="Georgia" panose="02040502050405020303" pitchFamily="18" charset="0"/>
-              </a:rPr>
-              <a:t> van </a:t>
-            </a:r>
-            <a:r>
-              <a:rPr lang="en-US" sz="2400" b="1" dirty="0" err="1">
-                <a:latin typeface="Georgia" panose="02040502050405020303" pitchFamily="18" charset="0"/>
-              </a:rPr>
-              <a:t>decompositie</a:t>
-            </a:r>
-            <a:r>
-              <a:rPr lang="en-US" sz="2400" b="1" dirty="0">
-                <a:latin typeface="Georgia" panose="02040502050405020303" pitchFamily="18" charset="0"/>
-              </a:rPr>
-              <a:t> </a:t>
-            </a:r>
-            <a:r>
-              <a:rPr lang="en-US" sz="2400" b="1" dirty="0" err="1">
-                <a:latin typeface="Georgia" panose="02040502050405020303" pitchFamily="18" charset="0"/>
-              </a:rPr>
-              <a:t>laag</a:t>
-            </a:r>
-            <a:r>
-              <a:rPr lang="en-US" sz="2400" b="1" dirty="0">
-                <a:latin typeface="Georgia" panose="02040502050405020303" pitchFamily="18" charset="0"/>
-              </a:rPr>
-              <a:t> </a:t>
-            </a:r>
-            <a:r>
-              <a:rPr lang="en-US" sz="2400" b="1" dirty="0" err="1">
-                <a:latin typeface="Georgia" panose="02040502050405020303" pitchFamily="18" charset="0"/>
-              </a:rPr>
-              <a:t>houden</a:t>
-            </a:r>
-            <a:r>
-              <a:rPr lang="en-US" sz="2400" b="1" dirty="0">
-                <a:latin typeface="Georgia" panose="02040502050405020303" pitchFamily="18" charset="0"/>
-              </a:rPr>
-              <a:t> </a:t>
-            </a:r>
-            <a:endParaRPr lang="en-US" sz="2400" dirty="0">
-              <a:latin typeface="Georgia" panose="02040502050405020303" pitchFamily="18" charset="0"/>
-            </a:endParaRPr>
-          </a:p>
-        </p:txBody>
-      </p:sp>
-      <p:sp>
-        <p:nvSpPr>
-          <p:cNvPr id="51" name="TextBox 50">
-            <a:extLst>
-              <a:ext uri="{FF2B5EF4-FFF2-40B4-BE49-F238E27FC236}">
-                <a16:creationId xmlns:a16="http://schemas.microsoft.com/office/drawing/2014/main" id="{D535D704-77A8-F599-D108-3478B11D5D08}"/>
-              </a:ext>
-            </a:extLst>
-          </p:cNvPr>
-          <p:cNvSpPr txBox="1"/>
-          <p:nvPr/>
-        </p:nvSpPr>
-        <p:spPr>
-          <a:xfrm>
-            <a:off x="21974629" y="15192904"/>
-            <a:ext cx="6748225" cy="307777"/>
-          </a:xfrm>
-          <a:prstGeom prst="rect">
-            <a:avLst/>
-          </a:prstGeom>
-          <a:noFill/>
-        </p:spPr>
-        <p:txBody>
-          <a:bodyPr wrap="square" rtlCol="0">
-            <a:spAutoFit/>
-          </a:bodyPr>
-          <a:lstStyle/>
-          <a:p>
-            <a:r>
-              <a:rPr lang="nl-NL" sz="1400" dirty="0"/>
-              <a:t>Resultaten clusteren (k = 3 en k=7 resp.) met uitgebreide vectoren methode rang 25 type 3</a:t>
-            </a:r>
-            <a:endParaRPr lang="LID4096" sz="1400" dirty="0"/>
-          </a:p>
-        </p:txBody>
-      </p:sp>
-      <p:pic>
-        <p:nvPicPr>
-          <p:cNvPr id="66" name="Graphic 65">
-            <a:extLst>
-              <a:ext uri="{FF2B5EF4-FFF2-40B4-BE49-F238E27FC236}">
-                <a16:creationId xmlns:a16="http://schemas.microsoft.com/office/drawing/2014/main" id="{66051148-45AD-C8A0-4530-E814C4E3CE40}"/>
-              </a:ext>
-            </a:extLst>
-          </p:cNvPr>
-          <p:cNvPicPr>
-            <a:picLocks noChangeAspect="1"/>
-          </p:cNvPicPr>
-          <p:nvPr/>
-        </p:nvPicPr>
-        <p:blipFill>
-          <a:blip r:embed="rId14">
-            <a:extLst>
-              <a:ext uri="{28A0092B-C50C-407E-A947-70E740481C1C}">
-                <a14:useLocalDpi xmlns:a14="http://schemas.microsoft.com/office/drawing/2010/main" val="0"/>
-              </a:ext>
-              <a:ext uri="{96DAC541-7B7A-43D3-8B79-37D633B846F1}">
-                <asvg:svgBlip xmlns:asvg="http://schemas.microsoft.com/office/drawing/2016/SVG/main" r:embed="rId15"/>
               </a:ext>
             </a:extLst>
           </a:blip>
@@ -8059,13 +7866,13 @@
           <p:nvPr/>
         </p:nvPicPr>
         <p:blipFill>
-          <a:blip r:embed="rId16">
+          <a:blip r:embed="rId14">
             <a:extLst>
               <a:ext uri="{28A0092B-C50C-407E-A947-70E740481C1C}">
                 <a14:useLocalDpi xmlns:a14="http://schemas.microsoft.com/office/drawing/2010/main" val="0"/>
               </a:ext>
               <a:ext uri="{96DAC541-7B7A-43D3-8B79-37D633B846F1}">
-                <asvg:svgBlip xmlns:asvg="http://schemas.microsoft.com/office/drawing/2016/SVG/main" r:embed="rId17"/>
+                <asvg:svgBlip xmlns:asvg="http://schemas.microsoft.com/office/drawing/2016/SVG/main" r:embed="rId15"/>
               </a:ext>
             </a:extLst>
           </a:blip>
@@ -8098,7 +7905,7 @@
           <p:nvPr/>
         </p:nvPicPr>
         <p:blipFill>
-          <a:blip r:embed="rId18"/>
+          <a:blip r:embed="rId16"/>
           <a:stretch>
             <a:fillRect/>
           </a:stretch>
@@ -8128,7 +7935,7 @@
           <p:nvPr/>
         </p:nvPicPr>
         <p:blipFill>
-          <a:blip r:embed="rId19"/>
+          <a:blip r:embed="rId17"/>
           <a:stretch>
             <a:fillRect/>
           </a:stretch>
@@ -8137,6 +7944,1023 @@
           <a:xfrm>
             <a:off x="25500357" y="12449199"/>
             <a:ext cx="2247528" cy="2781407"/>
+          </a:xfrm>
+          <a:prstGeom prst="rect">
+            <a:avLst/>
+          </a:prstGeom>
+        </p:spPr>
+      </p:pic>
+      <p:sp>
+        <p:nvSpPr>
+          <p:cNvPr id="2" name="TextBox 1">
+            <a:extLst>
+              <a:ext uri="{FF2B5EF4-FFF2-40B4-BE49-F238E27FC236}">
+                <a16:creationId xmlns:a16="http://schemas.microsoft.com/office/drawing/2014/main" id="{E5A0B001-3F1B-C8CA-EFE0-F99FCA152E4C}"/>
+              </a:ext>
+            </a:extLst>
+          </p:cNvPr>
+          <p:cNvSpPr txBox="1"/>
+          <p:nvPr/>
+        </p:nvSpPr>
+        <p:spPr>
+          <a:xfrm>
+            <a:off x="20763472" y="5845638"/>
+            <a:ext cx="9190748" cy="954107"/>
+          </a:xfrm>
+          <a:prstGeom prst="rect">
+            <a:avLst/>
+          </a:prstGeom>
+          <a:noFill/>
+        </p:spPr>
+        <p:txBody>
+          <a:bodyPr wrap="square" rtlCol="0">
+            <a:spAutoFit/>
+          </a:bodyPr>
+          <a:lstStyle/>
+          <a:p>
+            <a:pPr algn="just"/>
+            <a:r>
+              <a:rPr lang="en-US" sz="1400" dirty="0">
+                <a:latin typeface="Georgia" panose="02040502050405020303" pitchFamily="18" charset="0"/>
+              </a:rPr>
+              <a:t>De </a:t>
+            </a:r>
+            <a:r>
+              <a:rPr lang="en-US" sz="1400" dirty="0" err="1">
+                <a:latin typeface="Georgia" panose="02040502050405020303" pitchFamily="18" charset="0"/>
+              </a:rPr>
+              <a:t>relatieve</a:t>
+            </a:r>
+            <a:r>
+              <a:rPr lang="en-US" sz="1400" dirty="0">
+                <a:latin typeface="Georgia" panose="02040502050405020303" pitchFamily="18" charset="0"/>
+              </a:rPr>
+              <a:t> </a:t>
+            </a:r>
+            <a:r>
+              <a:rPr lang="en-US" sz="1400" dirty="0" err="1">
+                <a:latin typeface="Georgia" panose="02040502050405020303" pitchFamily="18" charset="0"/>
+              </a:rPr>
+              <a:t>fout</a:t>
+            </a:r>
+            <a:r>
+              <a:rPr lang="en-US" sz="1400" dirty="0">
+                <a:latin typeface="Georgia" panose="02040502050405020303" pitchFamily="18" charset="0"/>
+              </a:rPr>
+              <a:t> van </a:t>
+            </a:r>
+            <a:r>
+              <a:rPr lang="en-US" sz="1400" dirty="0" err="1">
+                <a:latin typeface="Georgia" panose="02040502050405020303" pitchFamily="18" charset="0"/>
+              </a:rPr>
+              <a:t>enkele</a:t>
+            </a:r>
+            <a:r>
+              <a:rPr lang="en-US" sz="1400" dirty="0">
+                <a:latin typeface="Georgia" panose="02040502050405020303" pitchFamily="18" charset="0"/>
+              </a:rPr>
+              <a:t> types van de </a:t>
+            </a:r>
+            <a:r>
+              <a:rPr lang="en-US" sz="1400" dirty="0" err="1">
+                <a:latin typeface="Georgia" panose="02040502050405020303" pitchFamily="18" charset="0"/>
+              </a:rPr>
+              <a:t>uitgebreide</a:t>
+            </a:r>
+            <a:r>
+              <a:rPr lang="en-US" sz="1400" dirty="0">
+                <a:latin typeface="Georgia" panose="02040502050405020303" pitchFamily="18" charset="0"/>
+              </a:rPr>
+              <a:t> </a:t>
+            </a:r>
+            <a:r>
+              <a:rPr lang="en-US" sz="1400" dirty="0" err="1">
+                <a:latin typeface="Georgia" panose="02040502050405020303" pitchFamily="18" charset="0"/>
+              </a:rPr>
+              <a:t>vectoren</a:t>
+            </a:r>
+            <a:r>
+              <a:rPr lang="en-US" sz="1400" dirty="0">
+                <a:latin typeface="Georgia" panose="02040502050405020303" pitchFamily="18" charset="0"/>
+              </a:rPr>
+              <a:t> </a:t>
+            </a:r>
+            <a:r>
+              <a:rPr lang="en-US" sz="1400" dirty="0" err="1">
+                <a:latin typeface="Georgia" panose="02040502050405020303" pitchFamily="18" charset="0"/>
+              </a:rPr>
+              <a:t>methode</a:t>
+            </a:r>
+            <a:r>
+              <a:rPr lang="en-US" sz="1400" dirty="0">
+                <a:latin typeface="Georgia" panose="02040502050405020303" pitchFamily="18" charset="0"/>
+              </a:rPr>
+              <a:t> per rang. De bar is het </a:t>
+            </a:r>
+            <a:r>
+              <a:rPr lang="en-US" sz="1400" dirty="0" err="1">
+                <a:latin typeface="Georgia" panose="02040502050405020303" pitchFamily="18" charset="0"/>
+              </a:rPr>
+              <a:t>gemiddelde</a:t>
+            </a:r>
+            <a:r>
+              <a:rPr lang="en-US" sz="1400" dirty="0">
+                <a:latin typeface="Georgia" panose="02040502050405020303" pitchFamily="18" charset="0"/>
+              </a:rPr>
+              <a:t> </a:t>
+            </a:r>
+            <a:r>
+              <a:rPr lang="en-US" sz="1400" dirty="0" err="1">
+                <a:latin typeface="Georgia" panose="02040502050405020303" pitchFamily="18" charset="0"/>
+              </a:rPr>
+              <a:t>en</a:t>
+            </a:r>
+            <a:r>
+              <a:rPr lang="en-US" sz="1400" dirty="0">
+                <a:latin typeface="Georgia" panose="02040502050405020303" pitchFamily="18" charset="0"/>
+              </a:rPr>
+              <a:t> de </a:t>
+            </a:r>
+            <a:r>
+              <a:rPr lang="en-US" sz="1400" dirty="0" err="1">
+                <a:latin typeface="Georgia" panose="02040502050405020303" pitchFamily="18" charset="0"/>
+              </a:rPr>
+              <a:t>zwarte</a:t>
+            </a:r>
+            <a:r>
+              <a:rPr lang="en-US" sz="1400" dirty="0">
+                <a:latin typeface="Georgia" panose="02040502050405020303" pitchFamily="18" charset="0"/>
+              </a:rPr>
+              <a:t> </a:t>
+            </a:r>
+            <a:r>
+              <a:rPr lang="en-US" sz="1400" dirty="0" err="1">
+                <a:latin typeface="Georgia" panose="02040502050405020303" pitchFamily="18" charset="0"/>
+              </a:rPr>
+              <a:t>streep</a:t>
+            </a:r>
+            <a:r>
+              <a:rPr lang="en-US" sz="1400" dirty="0">
+                <a:latin typeface="Georgia" panose="02040502050405020303" pitchFamily="18" charset="0"/>
+              </a:rPr>
+              <a:t> de </a:t>
+            </a:r>
+            <a:r>
+              <a:rPr lang="en-US" sz="1400" dirty="0" err="1">
+                <a:latin typeface="Georgia" panose="02040502050405020303" pitchFamily="18" charset="0"/>
+              </a:rPr>
+              <a:t>standaard</a:t>
+            </a:r>
+            <a:r>
+              <a:rPr lang="en-US" sz="1400" dirty="0">
+                <a:latin typeface="Georgia" panose="02040502050405020303" pitchFamily="18" charset="0"/>
+              </a:rPr>
+              <a:t> </a:t>
+            </a:r>
+            <a:r>
+              <a:rPr lang="en-US" sz="1400" dirty="0" err="1">
+                <a:latin typeface="Georgia" panose="02040502050405020303" pitchFamily="18" charset="0"/>
+              </a:rPr>
+              <a:t>afwijking</a:t>
+            </a:r>
+            <a:r>
+              <a:rPr lang="en-US" sz="1400" dirty="0">
+                <a:latin typeface="Georgia" panose="02040502050405020303" pitchFamily="18" charset="0"/>
+              </a:rPr>
+              <a:t> (n = 50). De rang van </a:t>
+            </a:r>
+            <a:r>
+              <a:rPr lang="en-US" sz="1400" dirty="0" err="1">
+                <a:latin typeface="Georgia" panose="02040502050405020303" pitchFamily="18" charset="0"/>
+              </a:rPr>
+              <a:t>een</a:t>
+            </a:r>
+            <a:r>
+              <a:rPr lang="en-US" sz="1400" dirty="0">
+                <a:latin typeface="Georgia" panose="02040502050405020303" pitchFamily="18" charset="0"/>
+              </a:rPr>
+              <a:t> </a:t>
+            </a:r>
+            <a:r>
+              <a:rPr lang="en-US" sz="1400" dirty="0" err="1">
+                <a:latin typeface="Georgia" panose="02040502050405020303" pitchFamily="18" charset="0"/>
+              </a:rPr>
+              <a:t>decompositie</a:t>
+            </a:r>
+            <a:r>
+              <a:rPr lang="en-US" sz="1400" dirty="0">
+                <a:latin typeface="Georgia" panose="02040502050405020303" pitchFamily="18" charset="0"/>
+              </a:rPr>
+              <a:t> is </a:t>
+            </a:r>
+            <a:r>
+              <a:rPr lang="en-US" sz="1400" dirty="0" err="1">
+                <a:latin typeface="Georgia" panose="02040502050405020303" pitchFamily="18" charset="0"/>
+              </a:rPr>
+              <a:t>gelijk</a:t>
+            </a:r>
+            <a:r>
+              <a:rPr lang="en-US" sz="1400" dirty="0">
+                <a:latin typeface="Georgia" panose="02040502050405020303" pitchFamily="18" charset="0"/>
+              </a:rPr>
+              <a:t> </a:t>
+            </a:r>
+            <a:r>
+              <a:rPr lang="en-US" sz="1400" dirty="0" err="1">
+                <a:latin typeface="Georgia" panose="02040502050405020303" pitchFamily="18" charset="0"/>
+              </a:rPr>
+              <a:t>aan</a:t>
+            </a:r>
+            <a:r>
+              <a:rPr lang="en-US" sz="1400" dirty="0">
+                <a:latin typeface="Georgia" panose="02040502050405020303" pitchFamily="18" charset="0"/>
+              </a:rPr>
+              <a:t> het </a:t>
+            </a:r>
+            <a:r>
+              <a:rPr lang="en-US" sz="1400" dirty="0" err="1">
+                <a:latin typeface="Georgia" panose="02040502050405020303" pitchFamily="18" charset="0"/>
+              </a:rPr>
+              <a:t>aantal</a:t>
+            </a:r>
+            <a:r>
+              <a:rPr lang="en-US" sz="1400" dirty="0">
+                <a:latin typeface="Georgia" panose="02040502050405020303" pitchFamily="18" charset="0"/>
+              </a:rPr>
+              <a:t> termen. </a:t>
+            </a:r>
+            <a:r>
+              <a:rPr lang="en-US" sz="1400" b="1" dirty="0" err="1">
+                <a:latin typeface="Georgia" panose="02040502050405020303" pitchFamily="18" charset="0"/>
+              </a:rPr>
+              <a:t>Opmerkelijk</a:t>
+            </a:r>
+            <a:r>
+              <a:rPr lang="en-US" sz="1400" b="1" dirty="0">
+                <a:latin typeface="Georgia" panose="02040502050405020303" pitchFamily="18" charset="0"/>
+              </a:rPr>
+              <a:t>:</a:t>
+            </a:r>
+            <a:r>
+              <a:rPr lang="en-US" sz="1400" dirty="0">
+                <a:latin typeface="Georgia" panose="02040502050405020303" pitchFamily="18" charset="0"/>
+              </a:rPr>
+              <a:t> </a:t>
+            </a:r>
+            <a:r>
+              <a:rPr lang="en-US" sz="1400" dirty="0" err="1">
+                <a:latin typeface="Georgia" panose="02040502050405020303" pitchFamily="18" charset="0"/>
+              </a:rPr>
+              <a:t>Hogere</a:t>
+            </a:r>
+            <a:r>
+              <a:rPr lang="en-US" sz="1400" dirty="0">
+                <a:latin typeface="Georgia" panose="02040502050405020303" pitchFamily="18" charset="0"/>
+              </a:rPr>
+              <a:t> types </a:t>
+            </a:r>
+            <a:r>
+              <a:rPr lang="en-US" sz="1400" dirty="0" err="1">
+                <a:latin typeface="Georgia" panose="02040502050405020303" pitchFamily="18" charset="0"/>
+              </a:rPr>
+              <a:t>liggen</a:t>
+            </a:r>
+            <a:r>
+              <a:rPr lang="en-US" sz="1400" dirty="0">
+                <a:latin typeface="Georgia" panose="02040502050405020303" pitchFamily="18" charset="0"/>
+              </a:rPr>
+              <a:t> </a:t>
+            </a:r>
+            <a:r>
+              <a:rPr lang="en-US" sz="1400" dirty="0" err="1">
+                <a:latin typeface="Georgia" panose="02040502050405020303" pitchFamily="18" charset="0"/>
+              </a:rPr>
+              <a:t>dichter</a:t>
+            </a:r>
+            <a:r>
+              <a:rPr lang="en-US" sz="1400" dirty="0">
+                <a:latin typeface="Georgia" panose="02040502050405020303" pitchFamily="18" charset="0"/>
+              </a:rPr>
+              <a:t> de matrix </a:t>
+            </a:r>
+            <a:r>
+              <a:rPr lang="en-US" sz="1400" dirty="0" err="1">
+                <a:latin typeface="Georgia" panose="02040502050405020303" pitchFamily="18" charset="0"/>
+              </a:rPr>
+              <a:t>methode</a:t>
+            </a:r>
+            <a:r>
+              <a:rPr lang="en-US" sz="1400" dirty="0">
+                <a:latin typeface="Georgia" panose="02040502050405020303" pitchFamily="18" charset="0"/>
+              </a:rPr>
+              <a:t> </a:t>
+            </a:r>
+            <a:r>
+              <a:rPr lang="en-US" sz="1400" dirty="0" err="1">
+                <a:latin typeface="Georgia" panose="02040502050405020303" pitchFamily="18" charset="0"/>
+              </a:rPr>
+              <a:t>bij</a:t>
+            </a:r>
+            <a:r>
+              <a:rPr lang="en-US" sz="1400" dirty="0">
+                <a:latin typeface="Georgia" panose="02040502050405020303" pitchFamily="18" charset="0"/>
+              </a:rPr>
+              <a:t> </a:t>
+            </a:r>
+            <a:r>
+              <a:rPr lang="en-US" sz="1400" dirty="0" err="1">
+                <a:latin typeface="Georgia" panose="02040502050405020303" pitchFamily="18" charset="0"/>
+              </a:rPr>
+              <a:t>lage</a:t>
+            </a:r>
+            <a:r>
+              <a:rPr lang="en-US" sz="1400" dirty="0">
+                <a:latin typeface="Georgia" panose="02040502050405020303" pitchFamily="18" charset="0"/>
+              </a:rPr>
+              <a:t> rang, </a:t>
+            </a:r>
+            <a:r>
+              <a:rPr lang="en-US" sz="1400" dirty="0" err="1">
+                <a:latin typeface="Georgia" panose="02040502050405020303" pitchFamily="18" charset="0"/>
+              </a:rPr>
+              <a:t>en</a:t>
+            </a:r>
+            <a:r>
+              <a:rPr lang="en-US" sz="1400" dirty="0">
+                <a:latin typeface="Georgia" panose="02040502050405020303" pitchFamily="18" charset="0"/>
+              </a:rPr>
+              <a:t> </a:t>
+            </a:r>
+            <a:r>
+              <a:rPr lang="en-US" sz="1400" dirty="0" err="1">
+                <a:latin typeface="Georgia" panose="02040502050405020303" pitchFamily="18" charset="0"/>
+              </a:rPr>
+              <a:t>dichter</a:t>
+            </a:r>
+            <a:r>
+              <a:rPr lang="en-US" sz="1400" dirty="0">
+                <a:latin typeface="Georgia" panose="02040502050405020303" pitchFamily="18" charset="0"/>
+              </a:rPr>
+              <a:t> </a:t>
+            </a:r>
+            <a:r>
+              <a:rPr lang="en-US" sz="1400" dirty="0" err="1">
+                <a:latin typeface="Georgia" panose="02040502050405020303" pitchFamily="18" charset="0"/>
+              </a:rPr>
+              <a:t>bij</a:t>
+            </a:r>
+            <a:r>
+              <a:rPr lang="en-US" sz="1400" dirty="0">
+                <a:latin typeface="Georgia" panose="02040502050405020303" pitchFamily="18" charset="0"/>
+              </a:rPr>
+              <a:t> de </a:t>
+            </a:r>
+            <a:r>
+              <a:rPr lang="en-US" sz="1400" dirty="0" err="1">
+                <a:latin typeface="Georgia" panose="02040502050405020303" pitchFamily="18" charset="0"/>
+              </a:rPr>
+              <a:t>vectoren</a:t>
+            </a:r>
+            <a:r>
+              <a:rPr lang="en-US" sz="1400" dirty="0">
+                <a:latin typeface="Georgia" panose="02040502050405020303" pitchFamily="18" charset="0"/>
+              </a:rPr>
+              <a:t> </a:t>
+            </a:r>
+            <a:r>
+              <a:rPr lang="en-US" sz="1400" dirty="0" err="1">
+                <a:latin typeface="Georgia" panose="02040502050405020303" pitchFamily="18" charset="0"/>
+              </a:rPr>
+              <a:t>methode</a:t>
+            </a:r>
+            <a:r>
+              <a:rPr lang="en-US" sz="1400" dirty="0">
+                <a:latin typeface="Georgia" panose="02040502050405020303" pitchFamily="18" charset="0"/>
+              </a:rPr>
+              <a:t> (type 1) </a:t>
+            </a:r>
+            <a:r>
+              <a:rPr lang="en-US" sz="1400" dirty="0" err="1">
+                <a:latin typeface="Georgia" panose="02040502050405020303" pitchFamily="18" charset="0"/>
+              </a:rPr>
+              <a:t>bij</a:t>
+            </a:r>
+            <a:r>
+              <a:rPr lang="en-US" sz="1400" dirty="0">
+                <a:latin typeface="Georgia" panose="02040502050405020303" pitchFamily="18" charset="0"/>
+              </a:rPr>
+              <a:t> </a:t>
+            </a:r>
+            <a:r>
+              <a:rPr lang="en-US" sz="1400" dirty="0" err="1">
+                <a:latin typeface="Georgia" panose="02040502050405020303" pitchFamily="18" charset="0"/>
+              </a:rPr>
+              <a:t>hoge</a:t>
+            </a:r>
+            <a:r>
+              <a:rPr lang="en-US" sz="1400" dirty="0">
+                <a:latin typeface="Georgia" panose="02040502050405020303" pitchFamily="18" charset="0"/>
+              </a:rPr>
+              <a:t> rang.</a:t>
+            </a:r>
+          </a:p>
+        </p:txBody>
+      </p:sp>
+      <p:sp>
+        <p:nvSpPr>
+          <p:cNvPr id="20" name="TextBox 19">
+            <a:extLst>
+              <a:ext uri="{FF2B5EF4-FFF2-40B4-BE49-F238E27FC236}">
+                <a16:creationId xmlns:a16="http://schemas.microsoft.com/office/drawing/2014/main" id="{FD70BFF3-7724-9463-DE6B-CC25D4C64AC1}"/>
+              </a:ext>
+            </a:extLst>
+          </p:cNvPr>
+          <p:cNvSpPr txBox="1"/>
+          <p:nvPr/>
+        </p:nvSpPr>
+        <p:spPr>
+          <a:xfrm>
+            <a:off x="26018950" y="7037329"/>
+            <a:ext cx="3733800" cy="2677656"/>
+          </a:xfrm>
+          <a:prstGeom prst="rect">
+            <a:avLst/>
+          </a:prstGeom>
+          <a:noFill/>
+        </p:spPr>
+        <p:txBody>
+          <a:bodyPr wrap="square" rtlCol="0">
+            <a:spAutoFit/>
+          </a:bodyPr>
+          <a:lstStyle/>
+          <a:p>
+            <a:pPr marL="285750" indent="-285750" algn="just">
+              <a:buFont typeface="Arial" panose="020B0604020202020204" pitchFamily="34" charset="0"/>
+              <a:buChar char="•"/>
+            </a:pPr>
+            <a:r>
+              <a:rPr lang="en-US" sz="1400" dirty="0">
+                <a:latin typeface="Georgia" panose="02040502050405020303" pitchFamily="18" charset="0"/>
+              </a:rPr>
+              <a:t>De y-as </a:t>
+            </a:r>
+            <a:r>
+              <a:rPr lang="en-US" sz="1400" dirty="0" err="1">
+                <a:latin typeface="Georgia" panose="02040502050405020303" pitchFamily="18" charset="0"/>
+              </a:rPr>
+              <a:t>bevat</a:t>
+            </a:r>
+            <a:r>
+              <a:rPr lang="en-US" sz="1400" dirty="0">
+                <a:latin typeface="Georgia" panose="02040502050405020303" pitchFamily="18" charset="0"/>
+              </a:rPr>
+              <a:t> </a:t>
+            </a:r>
+            <a:r>
+              <a:rPr lang="en-US" sz="1400" dirty="0" err="1">
+                <a:latin typeface="Georgia" panose="02040502050405020303" pitchFamily="18" charset="0"/>
+              </a:rPr>
+              <a:t>opnieuw</a:t>
+            </a:r>
+            <a:r>
+              <a:rPr lang="en-US" sz="1400" dirty="0">
+                <a:latin typeface="Georgia" panose="02040502050405020303" pitchFamily="18" charset="0"/>
+              </a:rPr>
+              <a:t> het </a:t>
+            </a:r>
+            <a:r>
+              <a:rPr lang="en-US" sz="1400" dirty="0" err="1">
+                <a:latin typeface="Georgia" panose="02040502050405020303" pitchFamily="18" charset="0"/>
+              </a:rPr>
+              <a:t>gemiddelde</a:t>
+            </a:r>
+            <a:r>
+              <a:rPr lang="en-US" sz="1400" dirty="0">
+                <a:latin typeface="Georgia" panose="02040502050405020303" pitchFamily="18" charset="0"/>
+              </a:rPr>
+              <a:t> van de </a:t>
+            </a:r>
+            <a:r>
+              <a:rPr lang="en-US" sz="1400" dirty="0" err="1">
+                <a:latin typeface="Georgia" panose="02040502050405020303" pitchFamily="18" charset="0"/>
+              </a:rPr>
+              <a:t>relatieve</a:t>
+            </a:r>
+            <a:r>
+              <a:rPr lang="en-US" sz="1400" dirty="0">
+                <a:latin typeface="Georgia" panose="02040502050405020303" pitchFamily="18" charset="0"/>
+              </a:rPr>
+              <a:t> </a:t>
+            </a:r>
+            <a:r>
+              <a:rPr lang="en-US" sz="1400" dirty="0" err="1">
+                <a:latin typeface="Georgia" panose="02040502050405020303" pitchFamily="18" charset="0"/>
+              </a:rPr>
+              <a:t>fout</a:t>
+            </a:r>
+            <a:r>
+              <a:rPr lang="en-US" sz="1400" dirty="0">
+                <a:latin typeface="Georgia" panose="02040502050405020303" pitchFamily="18" charset="0"/>
+              </a:rPr>
+              <a:t> </a:t>
+            </a:r>
+            <a:r>
+              <a:rPr lang="en-US" sz="1400" dirty="0" err="1">
+                <a:latin typeface="Georgia" panose="02040502050405020303" pitchFamily="18" charset="0"/>
+              </a:rPr>
+              <a:t>zoals</a:t>
+            </a:r>
+            <a:r>
+              <a:rPr lang="en-US" sz="1400" dirty="0">
+                <a:latin typeface="Georgia" panose="02040502050405020303" pitchFamily="18" charset="0"/>
+              </a:rPr>
+              <a:t> in </a:t>
+            </a:r>
+            <a:r>
+              <a:rPr lang="en-US" sz="1400" dirty="0" err="1">
+                <a:latin typeface="Georgia" panose="02040502050405020303" pitchFamily="18" charset="0"/>
+              </a:rPr>
+              <a:t>bovenstaande</a:t>
+            </a:r>
+            <a:r>
+              <a:rPr lang="en-US" sz="1400" dirty="0">
+                <a:latin typeface="Georgia" panose="02040502050405020303" pitchFamily="18" charset="0"/>
+              </a:rPr>
+              <a:t> </a:t>
+            </a:r>
+            <a:r>
+              <a:rPr lang="en-US" sz="1400" dirty="0" err="1">
+                <a:latin typeface="Georgia" panose="02040502050405020303" pitchFamily="18" charset="0"/>
+              </a:rPr>
+              <a:t>figuur</a:t>
+            </a:r>
+            <a:r>
+              <a:rPr lang="en-US" sz="1400" dirty="0">
+                <a:latin typeface="Georgia" panose="02040502050405020303" pitchFamily="18" charset="0"/>
+              </a:rPr>
+              <a:t> (</a:t>
+            </a:r>
+            <a:r>
+              <a:rPr lang="en-US" sz="1400" dirty="0" err="1">
+                <a:latin typeface="Georgia" panose="02040502050405020303" pitchFamily="18" charset="0"/>
+              </a:rPr>
+              <a:t>zonder</a:t>
+            </a:r>
+            <a:r>
+              <a:rPr lang="en-US" sz="1400" dirty="0">
+                <a:latin typeface="Georgia" panose="02040502050405020303" pitchFamily="18" charset="0"/>
+              </a:rPr>
+              <a:t> </a:t>
+            </a:r>
+            <a:r>
+              <a:rPr lang="en-US" sz="1400" dirty="0" err="1">
+                <a:latin typeface="Georgia" panose="02040502050405020303" pitchFamily="18" charset="0"/>
+              </a:rPr>
+              <a:t>standaard</a:t>
+            </a:r>
+            <a:r>
+              <a:rPr lang="en-US" sz="1400" dirty="0">
+                <a:latin typeface="Georgia" panose="02040502050405020303" pitchFamily="18" charset="0"/>
+              </a:rPr>
+              <a:t> </a:t>
+            </a:r>
+            <a:r>
+              <a:rPr lang="en-US" sz="1400" dirty="0" err="1">
+                <a:latin typeface="Georgia" panose="02040502050405020303" pitchFamily="18" charset="0"/>
+              </a:rPr>
+              <a:t>afwijking</a:t>
+            </a:r>
+            <a:r>
+              <a:rPr lang="en-US" sz="1400" dirty="0">
+                <a:latin typeface="Georgia" panose="02040502050405020303" pitchFamily="18" charset="0"/>
+              </a:rPr>
+              <a:t>)</a:t>
+            </a:r>
+          </a:p>
+          <a:p>
+            <a:pPr marL="285750" indent="-285750" algn="just">
+              <a:buFont typeface="Arial" panose="020B0604020202020204" pitchFamily="34" charset="0"/>
+              <a:buChar char="•"/>
+            </a:pPr>
+            <a:endParaRPr lang="en-US" sz="1400" dirty="0">
+              <a:latin typeface="Georgia" panose="02040502050405020303" pitchFamily="18" charset="0"/>
+            </a:endParaRPr>
+          </a:p>
+          <a:p>
+            <a:pPr marL="285750" indent="-285750" algn="just">
+              <a:buFont typeface="Arial" panose="020B0604020202020204" pitchFamily="34" charset="0"/>
+              <a:buChar char="•"/>
+            </a:pPr>
+            <a:r>
+              <a:rPr lang="en-US" sz="1400" dirty="0">
+                <a:latin typeface="Georgia" panose="02040502050405020303" pitchFamily="18" charset="0"/>
+              </a:rPr>
+              <a:t>Op de x-as </a:t>
+            </a:r>
+            <a:r>
+              <a:rPr lang="en-US" sz="1400" dirty="0" err="1">
+                <a:latin typeface="Georgia" panose="02040502050405020303" pitchFamily="18" charset="0"/>
+              </a:rPr>
+              <a:t>staat</a:t>
+            </a:r>
+            <a:r>
+              <a:rPr lang="en-US" sz="1400" dirty="0">
+                <a:latin typeface="Georgia" panose="02040502050405020303" pitchFamily="18" charset="0"/>
+              </a:rPr>
+              <a:t> het percentage DTW </a:t>
+            </a:r>
+            <a:r>
+              <a:rPr lang="en-US" sz="1400" dirty="0" err="1">
+                <a:latin typeface="Georgia" panose="02040502050405020303" pitchFamily="18" charset="0"/>
+              </a:rPr>
+              <a:t>operaties</a:t>
+            </a:r>
+            <a:r>
+              <a:rPr lang="en-US" sz="1400" dirty="0">
+                <a:latin typeface="Georgia" panose="02040502050405020303" pitchFamily="18" charset="0"/>
+              </a:rPr>
+              <a:t> </a:t>
+            </a:r>
+            <a:r>
+              <a:rPr lang="en-US" sz="1400" dirty="0" err="1">
+                <a:latin typeface="Georgia" panose="02040502050405020303" pitchFamily="18" charset="0"/>
+              </a:rPr>
+              <a:t>nodig</a:t>
+            </a:r>
+            <a:r>
+              <a:rPr lang="en-US" sz="1400" dirty="0">
+                <a:latin typeface="Georgia" panose="02040502050405020303" pitchFamily="18" charset="0"/>
+              </a:rPr>
+              <a:t> om </a:t>
+            </a:r>
+            <a:r>
+              <a:rPr lang="en-US" sz="1400" dirty="0" err="1">
+                <a:latin typeface="Georgia" panose="02040502050405020303" pitchFamily="18" charset="0"/>
+              </a:rPr>
+              <a:t>deze</a:t>
+            </a:r>
+            <a:r>
+              <a:rPr lang="en-US" sz="1400" dirty="0">
+                <a:latin typeface="Georgia" panose="02040502050405020303" pitchFamily="18" charset="0"/>
+              </a:rPr>
+              <a:t> </a:t>
+            </a:r>
+            <a:r>
+              <a:rPr lang="en-US" sz="1400" dirty="0" err="1">
+                <a:latin typeface="Georgia" panose="02040502050405020303" pitchFamily="18" charset="0"/>
+              </a:rPr>
+              <a:t>relatieve</a:t>
+            </a:r>
+            <a:r>
+              <a:rPr lang="en-US" sz="1400" dirty="0">
+                <a:latin typeface="Georgia" panose="02040502050405020303" pitchFamily="18" charset="0"/>
+              </a:rPr>
+              <a:t> </a:t>
+            </a:r>
+            <a:r>
+              <a:rPr lang="en-US" sz="1400" dirty="0" err="1">
+                <a:latin typeface="Georgia" panose="02040502050405020303" pitchFamily="18" charset="0"/>
+              </a:rPr>
+              <a:t>fout</a:t>
+            </a:r>
+            <a:r>
+              <a:rPr lang="en-US" sz="1400" dirty="0">
+                <a:latin typeface="Georgia" panose="02040502050405020303" pitchFamily="18" charset="0"/>
+              </a:rPr>
+              <a:t> </a:t>
+            </a:r>
+            <a:r>
+              <a:rPr lang="en-US" sz="1400" dirty="0" err="1">
+                <a:latin typeface="Georgia" panose="02040502050405020303" pitchFamily="18" charset="0"/>
+              </a:rPr>
+              <a:t>te</a:t>
+            </a:r>
+            <a:r>
+              <a:rPr lang="en-US" sz="1400" dirty="0">
+                <a:latin typeface="Georgia" panose="02040502050405020303" pitchFamily="18" charset="0"/>
+              </a:rPr>
+              <a:t> </a:t>
+            </a:r>
+            <a:r>
+              <a:rPr lang="en-US" sz="1400" dirty="0" err="1">
+                <a:latin typeface="Georgia" panose="02040502050405020303" pitchFamily="18" charset="0"/>
+              </a:rPr>
+              <a:t>verkijgen</a:t>
+            </a:r>
+            <a:r>
+              <a:rPr lang="en-US" sz="1400" dirty="0">
+                <a:latin typeface="Georgia" panose="02040502050405020303" pitchFamily="18" charset="0"/>
+              </a:rPr>
+              <a:t>. 100% </a:t>
+            </a:r>
+            <a:r>
+              <a:rPr lang="en-US" sz="1400" dirty="0" err="1">
+                <a:latin typeface="Georgia" panose="02040502050405020303" pitchFamily="18" charset="0"/>
+              </a:rPr>
+              <a:t>betekent</a:t>
+            </a:r>
+            <a:r>
+              <a:rPr lang="en-US" sz="1400" dirty="0">
+                <a:latin typeface="Georgia" panose="02040502050405020303" pitchFamily="18" charset="0"/>
+              </a:rPr>
+              <a:t> </a:t>
+            </a:r>
+            <a:r>
+              <a:rPr lang="en-US" sz="1400" dirty="0" err="1">
+                <a:latin typeface="Georgia" panose="02040502050405020303" pitchFamily="18" charset="0"/>
+              </a:rPr>
+              <a:t>dat</a:t>
+            </a:r>
+            <a:r>
+              <a:rPr lang="en-US" sz="1400" dirty="0">
+                <a:latin typeface="Georgia" panose="02040502050405020303" pitchFamily="18" charset="0"/>
+              </a:rPr>
+              <a:t> we de </a:t>
+            </a:r>
+            <a:r>
+              <a:rPr lang="en-US" sz="1400" dirty="0" err="1">
+                <a:latin typeface="Georgia" panose="02040502050405020303" pitchFamily="18" charset="0"/>
+              </a:rPr>
+              <a:t>volledige</a:t>
+            </a:r>
+            <a:r>
+              <a:rPr lang="en-US" sz="1400" dirty="0">
+                <a:latin typeface="Georgia" panose="02040502050405020303" pitchFamily="18" charset="0"/>
+              </a:rPr>
+              <a:t> tensor </a:t>
+            </a:r>
+            <a:r>
+              <a:rPr lang="en-US" sz="1400" dirty="0" err="1">
+                <a:latin typeface="Georgia" panose="02040502050405020303" pitchFamily="18" charset="0"/>
+              </a:rPr>
+              <a:t>hebben</a:t>
+            </a:r>
+            <a:r>
+              <a:rPr lang="en-US" sz="1400" dirty="0">
+                <a:latin typeface="Georgia" panose="02040502050405020303" pitchFamily="18" charset="0"/>
+              </a:rPr>
+              <a:t> </a:t>
+            </a:r>
+            <a:r>
+              <a:rPr lang="en-US" sz="1400" dirty="0" err="1">
+                <a:latin typeface="Georgia" panose="02040502050405020303" pitchFamily="18" charset="0"/>
+              </a:rPr>
+              <a:t>berekent</a:t>
+            </a:r>
+            <a:r>
+              <a:rPr lang="en-US" sz="1400" dirty="0">
+                <a:latin typeface="Georgia" panose="02040502050405020303" pitchFamily="18" charset="0"/>
+              </a:rPr>
+              <a:t>. </a:t>
+            </a:r>
+          </a:p>
+          <a:p>
+            <a:pPr marL="285750" indent="-285750" algn="just">
+              <a:buFont typeface="Arial" panose="020B0604020202020204" pitchFamily="34" charset="0"/>
+              <a:buChar char="•"/>
+            </a:pPr>
+            <a:endParaRPr lang="en-US" sz="1400" dirty="0">
+              <a:latin typeface="Georgia" panose="02040502050405020303" pitchFamily="18" charset="0"/>
+            </a:endParaRPr>
+          </a:p>
+          <a:p>
+            <a:pPr marL="285750" indent="-285750" algn="just">
+              <a:buFont typeface="Arial" panose="020B0604020202020204" pitchFamily="34" charset="0"/>
+              <a:buChar char="•"/>
+            </a:pPr>
+            <a:r>
+              <a:rPr lang="en-US" sz="1400" dirty="0">
+                <a:latin typeface="Georgia" panose="02040502050405020303" pitchFamily="18" charset="0"/>
+              </a:rPr>
+              <a:t>We </a:t>
+            </a:r>
+            <a:r>
+              <a:rPr lang="en-US" sz="1400" dirty="0" err="1">
+                <a:latin typeface="Georgia" panose="02040502050405020303" pitchFamily="18" charset="0"/>
+              </a:rPr>
+              <a:t>willen</a:t>
+            </a:r>
+            <a:r>
+              <a:rPr lang="en-US" sz="1400" dirty="0">
+                <a:latin typeface="Georgia" panose="02040502050405020303" pitchFamily="18" charset="0"/>
+              </a:rPr>
+              <a:t> </a:t>
+            </a:r>
+            <a:r>
+              <a:rPr lang="en-US" sz="1400" dirty="0" err="1">
+                <a:latin typeface="Georgia" panose="02040502050405020303" pitchFamily="18" charset="0"/>
+              </a:rPr>
+              <a:t>een</a:t>
+            </a:r>
+            <a:r>
+              <a:rPr lang="en-US" sz="1400" dirty="0">
+                <a:latin typeface="Georgia" panose="02040502050405020303" pitchFamily="18" charset="0"/>
+              </a:rPr>
+              <a:t> </a:t>
+            </a:r>
+            <a:r>
+              <a:rPr lang="en-US" sz="1400" dirty="0" err="1">
+                <a:latin typeface="Georgia" panose="02040502050405020303" pitchFamily="18" charset="0"/>
+              </a:rPr>
+              <a:t>methode</a:t>
+            </a:r>
+            <a:r>
+              <a:rPr lang="en-US" sz="1400" dirty="0">
+                <a:latin typeface="Georgia" panose="02040502050405020303" pitchFamily="18" charset="0"/>
+              </a:rPr>
+              <a:t> die in de linker </a:t>
+            </a:r>
+            <a:r>
+              <a:rPr lang="en-US" sz="1400" dirty="0" err="1">
+                <a:latin typeface="Georgia" panose="02040502050405020303" pitchFamily="18" charset="0"/>
+              </a:rPr>
+              <a:t>onderhoek</a:t>
+            </a:r>
+            <a:r>
+              <a:rPr lang="en-US" sz="1400" dirty="0">
+                <a:latin typeface="Georgia" panose="02040502050405020303" pitchFamily="18" charset="0"/>
+              </a:rPr>
+              <a:t> </a:t>
+            </a:r>
+            <a:r>
+              <a:rPr lang="en-US" sz="1400" dirty="0" err="1">
+                <a:latin typeface="Georgia" panose="02040502050405020303" pitchFamily="18" charset="0"/>
+              </a:rPr>
+              <a:t>ligt</a:t>
+            </a:r>
+            <a:r>
+              <a:rPr lang="en-US" sz="1400" dirty="0">
+                <a:latin typeface="Georgia" panose="02040502050405020303" pitchFamily="18" charset="0"/>
+              </a:rPr>
+              <a:t>.</a:t>
+            </a:r>
+          </a:p>
+        </p:txBody>
+      </p:sp>
+      <p:cxnSp>
+        <p:nvCxnSpPr>
+          <p:cNvPr id="39" name="Straight Arrow Connector 38">
+            <a:extLst>
+              <a:ext uri="{FF2B5EF4-FFF2-40B4-BE49-F238E27FC236}">
+                <a16:creationId xmlns:a16="http://schemas.microsoft.com/office/drawing/2014/main" id="{2AE628FB-4D2B-25B5-E977-B0061D4FFB4A}"/>
+              </a:ext>
+            </a:extLst>
+          </p:cNvPr>
+          <p:cNvCxnSpPr>
+            <a:cxnSpLocks/>
+            <a:stCxn id="47" idx="1"/>
+          </p:cNvCxnSpPr>
+          <p:nvPr/>
+        </p:nvCxnSpPr>
+        <p:spPr>
+          <a:xfrm flipH="1">
+            <a:off x="7916382" y="5784881"/>
+            <a:ext cx="1038302" cy="144206"/>
+          </a:xfrm>
+          <a:prstGeom prst="straightConnector1">
+            <a:avLst/>
+          </a:prstGeom>
+          <a:ln>
+            <a:tailEnd type="triangle"/>
+          </a:ln>
+        </p:spPr>
+        <p:style>
+          <a:lnRef idx="1">
+            <a:schemeClr val="dk1"/>
+          </a:lnRef>
+          <a:fillRef idx="0">
+            <a:schemeClr val="dk1"/>
+          </a:fillRef>
+          <a:effectRef idx="0">
+            <a:schemeClr val="dk1"/>
+          </a:effectRef>
+          <a:fontRef idx="minor">
+            <a:schemeClr val="tx1"/>
+          </a:fontRef>
+        </p:style>
+      </p:cxnSp>
+      <p:sp>
+        <p:nvSpPr>
+          <p:cNvPr id="47" name="TextBox 46">
+            <a:extLst>
+              <a:ext uri="{FF2B5EF4-FFF2-40B4-BE49-F238E27FC236}">
+                <a16:creationId xmlns:a16="http://schemas.microsoft.com/office/drawing/2014/main" id="{811125B0-6ED5-E2BE-E239-45C1488A85A7}"/>
+              </a:ext>
+            </a:extLst>
+          </p:cNvPr>
+          <p:cNvSpPr txBox="1"/>
+          <p:nvPr/>
+        </p:nvSpPr>
+        <p:spPr>
+          <a:xfrm>
+            <a:off x="8954684" y="5484799"/>
+            <a:ext cx="1436717" cy="600164"/>
+          </a:xfrm>
+          <a:prstGeom prst="rect">
+            <a:avLst/>
+          </a:prstGeom>
+          <a:noFill/>
+        </p:spPr>
+        <p:txBody>
+          <a:bodyPr wrap="square" rtlCol="0">
+            <a:spAutoFit/>
+          </a:bodyPr>
+          <a:lstStyle/>
+          <a:p>
+            <a:pPr algn="ctr"/>
+            <a:r>
+              <a:rPr lang="en-US" sz="1100" dirty="0" err="1">
+                <a:latin typeface="Georgia" panose="02040502050405020303" pitchFamily="18" charset="0"/>
+              </a:rPr>
+              <a:t>Puur</a:t>
+            </a:r>
+            <a:r>
+              <a:rPr lang="en-US" sz="1100" dirty="0">
+                <a:latin typeface="Georgia" panose="02040502050405020303" pitchFamily="18" charset="0"/>
+              </a:rPr>
+              <a:t> </a:t>
+            </a:r>
+            <a:r>
+              <a:rPr lang="en-US" sz="1100" dirty="0" err="1">
+                <a:latin typeface="Georgia" panose="02040502050405020303" pitchFamily="18" charset="0"/>
+              </a:rPr>
+              <a:t>illustratief</a:t>
+            </a:r>
+            <a:r>
+              <a:rPr lang="en-US" sz="1100" dirty="0">
+                <a:latin typeface="Georgia" panose="02040502050405020303" pitchFamily="18" charset="0"/>
+              </a:rPr>
+              <a:t> </a:t>
+            </a:r>
+            <a:r>
+              <a:rPr lang="en-US" sz="1100" dirty="0" err="1">
+                <a:latin typeface="Georgia" panose="02040502050405020303" pitchFamily="18" charset="0"/>
+              </a:rPr>
+              <a:t>voorbeeld</a:t>
+            </a:r>
+            <a:r>
+              <a:rPr lang="en-US" sz="1100" dirty="0">
+                <a:latin typeface="Georgia" panose="02040502050405020303" pitchFamily="18" charset="0"/>
+              </a:rPr>
+              <a:t> van </a:t>
+            </a:r>
+            <a:r>
+              <a:rPr lang="en-US" sz="1100" dirty="0" err="1">
+                <a:latin typeface="Georgia" panose="02040502050405020303" pitchFamily="18" charset="0"/>
+              </a:rPr>
+              <a:t>een</a:t>
+            </a:r>
+            <a:r>
+              <a:rPr lang="en-US" sz="1100" dirty="0">
+                <a:latin typeface="Georgia" panose="02040502050405020303" pitchFamily="18" charset="0"/>
+              </a:rPr>
+              <a:t> </a:t>
+            </a:r>
+            <a:r>
+              <a:rPr lang="en-US" sz="1100" dirty="0" err="1">
+                <a:latin typeface="Georgia" panose="02040502050405020303" pitchFamily="18" charset="0"/>
+              </a:rPr>
+              <a:t>tijdsreeks</a:t>
+            </a:r>
+            <a:endParaRPr lang="en-US" sz="1200" dirty="0">
+              <a:latin typeface="Georgia" panose="02040502050405020303" pitchFamily="18" charset="0"/>
+            </a:endParaRPr>
+          </a:p>
+        </p:txBody>
+      </p:sp>
+      <p:pic>
+        <p:nvPicPr>
+          <p:cNvPr id="62" name="Graphic 61">
+            <a:extLst>
+              <a:ext uri="{FF2B5EF4-FFF2-40B4-BE49-F238E27FC236}">
+                <a16:creationId xmlns:a16="http://schemas.microsoft.com/office/drawing/2014/main" id="{63B351C8-18F2-D36E-7024-78CCE2170B89}"/>
+              </a:ext>
+            </a:extLst>
+          </p:cNvPr>
+          <p:cNvPicPr>
+            <a:picLocks noChangeAspect="1"/>
+          </p:cNvPicPr>
+          <p:nvPr/>
+        </p:nvPicPr>
+        <p:blipFill>
+          <a:blip r:embed="rId18">
+            <a:extLst>
+              <a:ext uri="{28A0092B-C50C-407E-A947-70E740481C1C}">
+                <a14:useLocalDpi xmlns:a14="http://schemas.microsoft.com/office/drawing/2010/main" val="0"/>
+              </a:ext>
+              <a:ext uri="{96DAC541-7B7A-43D3-8B79-37D633B846F1}">
+                <asvg:svgBlip xmlns:asvg="http://schemas.microsoft.com/office/drawing/2016/SVG/main" r:embed="rId19"/>
+              </a:ext>
+            </a:extLst>
+          </a:blip>
+          <a:stretch>
+            <a:fillRect/>
+          </a:stretch>
+        </p:blipFill>
+        <p:spPr>
+          <a:xfrm>
+            <a:off x="868523" y="4871112"/>
+            <a:ext cx="7691709" cy="2115951"/>
           </a:xfrm>
           <a:prstGeom prst="rect">
             <a:avLst/>

</xml_diff>